<commit_message>
Started color tutorial in data-viz-02
</commit_message>
<xml_diff>
--- a/data-viz-02/src/data-visualization-02-bars.pptx
+++ b/data-viz-02/src/data-visualization-02-bars.pptx
@@ -5,7 +5,7 @@
     <p:sldMasterId id="2147483648" r:id="rId1"/>
   </p:sldMasterIdLst>
   <p:notesMasterIdLst>
-    <p:NotesMasterId r:id="rId75"/>
+    <p:NotesMasterId r:id="rId76"/>
   </p:notesMasterIdLst>
   <p:sldIdLst>
     <p:sldId id="256" r:id="rId2"/>
@@ -81,6 +81,7 @@
     <p:sldId id="326" r:id="rId72"/>
     <p:sldId id="327" r:id="rId73"/>
     <p:sldId id="328" r:id="rId74"/>
+    <p:sldId id="329" r:id="rId75"/>
   </p:sldIdLst>
   <p:sldSz cx="9144000" cy="6858000" type="screen4x3"/>
   <p:notesSz cx="6858000" cy="9144000"/>
@@ -3041,7 +3042,7 @@
           <a:p>
             <a:fld id="{18BDFEC3-8487-43E8-A154-7C12CBC1FFF2}" type="slidenum">
               <a:rPr lang="en-US"/>
-              <a:t>28</a:t>
+              <a:t>29</a:t>
             </a:fld>
             <a:endParaRPr lang="en-US"/>
           </a:p>
@@ -3387,7 +3388,7 @@
           <a:p>
             <a:fld id="{18BDFEC3-8487-43E8-A154-7C12CBC1FFF2}" type="slidenum">
               <a:rPr lang="en-US"/>
-              <a:t>29</a:t>
+              <a:t>30</a:t>
             </a:fld>
             <a:endParaRPr lang="en-US"/>
           </a:p>
@@ -4283,7 +4284,7 @@
           <a:p>
             <a:fld id="{18BDFEC3-8487-43E8-A154-7C12CBC1FFF2}" type="slidenum">
               <a:rPr lang="en-US"/>
-              <a:t>36</a:t>
+              <a:t>37</a:t>
             </a:fld>
             <a:endParaRPr lang="en-US"/>
           </a:p>
@@ -5083,7 +5084,7 @@
           <a:p>
             <a:fld id="{18BDFEC3-8487-43E8-A154-7C12CBC1FFF2}" type="slidenum">
               <a:rPr lang="en-US"/>
-              <a:t>38</a:t>
+              <a:t>39</a:t>
             </a:fld>
             <a:endParaRPr lang="en-US"/>
           </a:p>
@@ -5891,7 +5892,7 @@
           <a:p>
             <a:fld id="{18BDFEC3-8487-43E8-A154-7C12CBC1FFF2}" type="slidenum">
               <a:rPr lang="en-US"/>
-              <a:t>45</a:t>
+              <a:t>46</a:t>
             </a:fld>
             <a:endParaRPr lang="en-US"/>
           </a:p>
@@ -6253,7 +6254,7 @@
           <a:p>
             <a:fld id="{18BDFEC3-8487-43E8-A154-7C12CBC1FFF2}" type="slidenum">
               <a:rPr lang="en-US"/>
-              <a:t>49</a:t>
+              <a:t>50</a:t>
             </a:fld>
             <a:endParaRPr lang="en-US"/>
           </a:p>
@@ -6933,7 +6934,7 @@
           <a:p>
             <a:fld id="{18BDFEC3-8487-43E8-A154-7C12CBC1FFF2}" type="slidenum">
               <a:rPr lang="en-US"/>
-              <a:t>55</a:t>
+              <a:t>56</a:t>
             </a:fld>
             <a:endParaRPr lang="en-US"/>
           </a:p>
@@ -7103,7 +7104,7 @@
           <a:p>
             <a:fld id="{18BDFEC3-8487-43E8-A154-7C12CBC1FFF2}" type="slidenum">
               <a:rPr lang="en-US"/>
-              <a:t>64</a:t>
+              <a:t>65</a:t>
             </a:fld>
             <a:endParaRPr lang="en-US"/>
           </a:p>
@@ -14974,7 +14975,7 @@
       </p:sp>
       <p:pic>
         <p:nvPicPr>
-          <p:cNvPr descr="../images/02/graph-perception.png" id="0" name="Picture 1"/>
+          <p:cNvPr descr="../images/graph-perception.png" id="0" name="Picture 1"/>
           <p:cNvPicPr>
             <a:picLocks noGrp="1" noChangeAspect="1"/>
           </p:cNvPicPr>
@@ -15665,7 +15666,7 @@
       </p:sp>
       <p:pic>
         <p:nvPicPr>
-          <p:cNvPr descr="../images/02/crop-yield-bar-chart-position.png" id="0" name="Picture 1"/>
+          <p:cNvPr descr="../images/crop-yield-bar-chart-position.png" id="0" name="Picture 1"/>
           <p:cNvPicPr>
             <a:picLocks noGrp="1" noChangeAspect="1"/>
           </p:cNvPicPr>
@@ -15868,7 +15869,7 @@
       </p:sp>
       <p:pic>
         <p:nvPicPr>
-          <p:cNvPr descr="../images/02/crop-yield-bar-chart-length.png" id="0" name="Picture 1"/>
+          <p:cNvPr descr="../images/crop-yield-bar-chart-length.png" id="0" name="Picture 1"/>
           <p:cNvPicPr>
             <a:picLocks noGrp="1" noChangeAspect="1"/>
           </p:cNvPicPr>
@@ -16152,7 +16153,7 @@
       </p:sp>
       <p:pic>
         <p:nvPicPr>
-          <p:cNvPr descr="../images/02/simon_fuel_gauge1.png" id="0" name="Picture 1"/>
+          <p:cNvPr descr="../images/simon_fuel_gauge1.png" id="0" name="Picture 1"/>
           <p:cNvPicPr>
             <a:picLocks noGrp="1" noChangeAspect="1"/>
           </p:cNvPicPr>
@@ -16439,7 +16440,7 @@
       </p:sp>
       <p:pic>
         <p:nvPicPr>
-          <p:cNvPr descr="../images/02/simon_fuel_gauge2.png" id="0" name="Picture 1"/>
+          <p:cNvPr descr="../images/simon_fuel_gauge2.png" id="0" name="Picture 1"/>
           <p:cNvPicPr>
             <a:picLocks noGrp="1" noChangeAspect="1"/>
           </p:cNvPicPr>
@@ -16825,7 +16826,7 @@
       </p:sp>
       <p:pic>
         <p:nvPicPr>
-          <p:cNvPr descr="../images/02/crop-yield-bar-chart-position.png" id="0" name="Picture 1"/>
+          <p:cNvPr descr="../images/crop-yield-bar-chart-position.png" id="0" name="Picture 1"/>
           <p:cNvPicPr>
             <a:picLocks noGrp="1" noChangeAspect="1"/>
           </p:cNvPicPr>
@@ -17028,7 +17029,7 @@
       </p:sp>
       <p:pic>
         <p:nvPicPr>
-          <p:cNvPr descr="../images/02/crop-yield-bar-chart-length.png" id="0" name="Picture 1"/>
+          <p:cNvPr descr="../images/crop-yield-bar-chart-length.png" id="0" name="Picture 1"/>
           <p:cNvPicPr>
             <a:picLocks noGrp="1" noChangeAspect="1"/>
           </p:cNvPicPr>
@@ -17231,7 +17232,7 @@
       </p:sp>
       <p:pic>
         <p:nvPicPr>
-          <p:cNvPr descr="../images/02/sales-trend.png" id="0" name="Picture 1"/>
+          <p:cNvPr descr="../images/sales-trend.png" id="0" name="Picture 1"/>
           <p:cNvPicPr>
             <a:picLocks noGrp="1" noChangeAspect="1"/>
           </p:cNvPicPr>
@@ -17431,641 +17432,9 @@
           </a:p>
         </p:txBody>
       </p:sp>
-    </p:spTree>
-  </p:cSld>
-</p:sld>
-</file>
-
-<file path=ppt/slides/slide27.xml><?xml version="1.0" encoding="utf-8"?>
-<p:sld xmlns:a="http://schemas.openxmlformats.org/drawingml/2006/main" xmlns:r="http://schemas.openxmlformats.org/officeDocument/2006/relationships" xmlns:p="http://schemas.openxmlformats.org/presentationml/2006/main">
-  <p:cSld>
-    <p:spTree>
-      <p:nvGrpSpPr>
-        <p:cNvPr id="1" name=""/>
-        <p:cNvGrpSpPr/>
-        <p:nvPr/>
-      </p:nvGrpSpPr>
-      <p:grpSpPr>
-        <a:xfrm>
-          <a:off x="0" y="0"/>
-          <a:ext cx="0" cy="0"/>
-          <a:chOff x="0" y="0"/>
-          <a:chExt cx="0" cy="0"/>
-        </a:xfrm>
-      </p:grpSpPr>
-      <p:sp>
-        <p:nvSpPr>
-          <p:cNvPr id="2" name="Title 1"/>
-          <p:cNvSpPr>
-            <a:spLocks noGrp="1"/>
-          </p:cNvSpPr>
-          <p:nvPr>
-            <p:ph type="title"/>
-          </p:nvPr>
-        </p:nvSpPr>
-        <p:spPr/>
-        <p:txBody>
-          <a:bodyPr/>
-          <a:lstStyle/>
-          <a:p>
-            <a:pPr lvl="0" marL="0" indent="0">
-              <a:buNone/>
-            </a:pPr>
-            <a:r>
-              <a:rPr/>
-              <a:t>A</a:t>
-            </a:r>
-            <a:r>
-              <a:rPr/>
-              <a:t> </a:t>
-            </a:r>
-            <a:r>
-              <a:rPr/>
-              <a:t>quick</a:t>
-            </a:r>
-            <a:r>
-              <a:rPr/>
-              <a:t> </a:t>
-            </a:r>
-            <a:r>
-              <a:rPr/>
-              <a:t>tutorial</a:t>
-            </a:r>
-            <a:r>
-              <a:rPr/>
-              <a:t> </a:t>
-            </a:r>
-            <a:r>
-              <a:rPr/>
-              <a:t>on</a:t>
-            </a:r>
-            <a:r>
-              <a:rPr/>
-              <a:t> </a:t>
-            </a:r>
-            <a:r>
-              <a:rPr/>
-              <a:t>colors</a:t>
-            </a:r>
-          </a:p>
-        </p:txBody>
-      </p:sp>
-    </p:spTree>
-  </p:cSld>
-</p:sld>
-</file>
-
-<file path=ppt/slides/slide28.xml><?xml version="1.0" encoding="utf-8"?>
-<p:sld xmlns:a="http://schemas.openxmlformats.org/drawingml/2006/main" xmlns:r="http://schemas.openxmlformats.org/officeDocument/2006/relationships" xmlns:p="http://schemas.openxmlformats.org/presentationml/2006/main">
-  <p:cSld>
-    <p:spTree>
-      <p:nvGrpSpPr>
-        <p:cNvPr id="1" name=""/>
-        <p:cNvGrpSpPr/>
-        <p:nvPr/>
-      </p:nvGrpSpPr>
-      <p:grpSpPr>
-        <a:xfrm>
-          <a:off x="0" y="0"/>
-          <a:ext cx="0" cy="0"/>
-          <a:chOff x="0" y="0"/>
-          <a:chExt cx="0" cy="0"/>
-        </a:xfrm>
-      </p:grpSpPr>
-      <p:sp>
-        <p:nvSpPr>
-          <p:cNvPr id="2" name="Title 1"/>
-          <p:cNvSpPr>
-            <a:spLocks noGrp="1"/>
-          </p:cNvSpPr>
-          <p:nvPr>
-            <p:ph type="title"/>
-          </p:nvPr>
-        </p:nvSpPr>
-        <p:spPr/>
-        <p:txBody>
-          <a:bodyPr/>
-          <a:lstStyle/>
-          <a:p>
-            <a:pPr lvl="0" marL="0" indent="0">
-              <a:buNone/>
-            </a:pPr>
-            <a:r>
-              <a:rPr/>
-              <a:t>Bars</a:t>
-            </a:r>
-          </a:p>
-        </p:txBody>
-      </p:sp>
-      <p:sp>
-        <p:nvSpPr>
-          <p:cNvPr id="3" name="Content Placeholder 2"/>
-          <p:cNvSpPr>
-            <a:spLocks noGrp="1"/>
-          </p:cNvSpPr>
-          <p:nvPr>
-            <p:ph idx="1"/>
-          </p:nvPr>
-        </p:nvSpPr>
-        <p:spPr/>
-        <p:txBody>
-          <a:bodyPr/>
-          <a:lstStyle/>
-          <a:p>
-            <a:pPr lvl="1"/>
-            <a:r>
-              <a:rPr/>
-              <a:t>Fewer in numbers than points</a:t>
-            </a:r>
-          </a:p>
-          <a:p>
-            <a:pPr lvl="1"/>
-            <a:r>
-              <a:rPr/>
-              <a:t>Usually a summary statistic</a:t>
-            </a:r>
-          </a:p>
-          <a:p>
-            <a:pPr lvl="2"/>
-            <a:r>
-              <a:rPr/>
-              <a:t>Count</a:t>
-            </a:r>
-          </a:p>
-          <a:p>
-            <a:pPr lvl="2"/>
-            <a:r>
-              <a:rPr/>
-              <a:t>Percent</a:t>
-            </a:r>
-          </a:p>
-          <a:p>
-            <a:pPr lvl="2"/>
-            <a:r>
-              <a:rPr/>
-              <a:t>Average</a:t>
-            </a:r>
-          </a:p>
-          <a:p>
-            <a:pPr lvl="2"/>
-            <a:r>
-              <a:rPr/>
-              <a:t>Total</a:t>
-            </a:r>
-          </a:p>
-          <a:p>
-            <a:pPr lvl="1"/>
-            <a:r>
-              <a:rPr/>
-              <a:t>A bar chart is NOT a histogram</a:t>
-            </a:r>
-          </a:p>
-        </p:txBody>
-      </p:sp>
-    </p:spTree>
-  </p:cSld>
-</p:sld>
-</file>
-
-<file path=ppt/slides/slide29.xml><?xml version="1.0" encoding="utf-8"?>
-<p:sld xmlns:a="http://schemas.openxmlformats.org/drawingml/2006/main" xmlns:r="http://schemas.openxmlformats.org/officeDocument/2006/relationships" xmlns:p="http://schemas.openxmlformats.org/presentationml/2006/main">
-  <p:cSld>
-    <p:spTree>
-      <p:nvGrpSpPr>
-        <p:cNvPr id="1" name=""/>
-        <p:cNvGrpSpPr/>
-        <p:nvPr/>
-      </p:nvGrpSpPr>
-      <p:grpSpPr>
-        <a:xfrm>
-          <a:off x="0" y="0"/>
-          <a:ext cx="0" cy="0"/>
-          <a:chOff x="0" y="0"/>
-          <a:chExt cx="0" cy="0"/>
-        </a:xfrm>
-      </p:grpSpPr>
-      <p:sp>
-        <p:nvSpPr>
-          <p:cNvPr id="2" name="Title 1"/>
-          <p:cNvSpPr>
-            <a:spLocks noGrp="1"/>
-          </p:cNvSpPr>
-          <p:nvPr>
-            <p:ph type="title"/>
-          </p:nvPr>
-        </p:nvSpPr>
-        <p:spPr/>
-        <p:txBody>
-          <a:bodyPr/>
-          <a:lstStyle/>
-          <a:p>
-            <a:pPr lvl="0" marL="0" indent="0">
-              <a:buNone/>
-            </a:pPr>
-            <a:r>
-              <a:rPr/>
-              <a:t>Aesthetics</a:t>
-            </a:r>
-            <a:r>
-              <a:rPr/>
-              <a:t> </a:t>
-            </a:r>
-            <a:r>
-              <a:rPr/>
-              <a:t>for</a:t>
-            </a:r>
-            <a:r>
-              <a:rPr/>
-              <a:t> </a:t>
-            </a:r>
-            <a:r>
-              <a:rPr/>
-              <a:t>bars</a:t>
-            </a:r>
-          </a:p>
-        </p:txBody>
-      </p:sp>
-      <p:sp>
-        <p:nvSpPr>
-          <p:cNvPr id="3" name="Content Placeholder 2"/>
-          <p:cNvSpPr>
-            <a:spLocks noGrp="1"/>
-          </p:cNvSpPr>
-          <p:nvPr>
-            <p:ph idx="1"/>
-          </p:nvPr>
-        </p:nvSpPr>
-        <p:spPr/>
-        <p:txBody>
-          <a:bodyPr/>
-          <a:lstStyle/>
-          <a:p>
-            <a:pPr lvl="1"/>
-            <a:r>
-              <a:rPr/>
-              <a:t>Review</a:t>
-            </a:r>
-          </a:p>
-          <a:p>
-            <a:pPr lvl="2"/>
-            <a:r>
-              <a:rPr/>
-              <a:t>Location</a:t>
-            </a:r>
-          </a:p>
-          <a:p>
-            <a:pPr lvl="2"/>
-            <a:r>
-              <a:rPr/>
-              <a:t>Size</a:t>
-            </a:r>
-          </a:p>
-          <a:p>
-            <a:pPr lvl="2"/>
-            <a:r>
-              <a:rPr/>
-              <a:t>Color</a:t>
-            </a:r>
-          </a:p>
-          <a:p>
-            <a:pPr lvl="2"/>
-            <a:r>
-              <a:rPr/>
-              <a:t>NOT shape!!!</a:t>
-            </a:r>
-          </a:p>
-        </p:txBody>
-      </p:sp>
-    </p:spTree>
-  </p:cSld>
-</p:sld>
-</file>
-
-<file path=ppt/slides/slide3.xml><?xml version="1.0" encoding="utf-8"?>
-<p:sld xmlns:a="http://schemas.openxmlformats.org/drawingml/2006/main" xmlns:r="http://schemas.openxmlformats.org/officeDocument/2006/relationships" xmlns:p="http://schemas.openxmlformats.org/presentationml/2006/main">
-  <p:cSld>
-    <p:spTree>
-      <p:nvGrpSpPr>
-        <p:cNvPr id="1" name=""/>
-        <p:cNvGrpSpPr/>
-        <p:nvPr/>
-      </p:nvGrpSpPr>
-      <p:grpSpPr>
-        <a:xfrm>
-          <a:off x="0" y="0"/>
-          <a:ext cx="0" cy="0"/>
-          <a:chOff x="0" y="0"/>
-          <a:chExt cx="0" cy="0"/>
-        </a:xfrm>
-      </p:grpSpPr>
-      <p:sp>
-        <p:nvSpPr>
-          <p:cNvPr id="2" name="Title 1"/>
-          <p:cNvSpPr>
-            <a:spLocks noGrp="1"/>
-          </p:cNvSpPr>
-          <p:nvPr>
-            <p:ph type="title"/>
-          </p:nvPr>
-        </p:nvSpPr>
-        <p:spPr/>
-        <p:txBody>
-          <a:bodyPr/>
-          <a:lstStyle/>
-          <a:p>
-            <a:pPr lvl="0" marL="0" indent="0">
-              <a:buNone/>
-            </a:pPr>
-            <a:r>
-              <a:rPr/>
-              <a:t>To</a:t>
-            </a:r>
-            <a:r>
-              <a:rPr/>
-              <a:t> </a:t>
-            </a:r>
-            <a:r>
-              <a:rPr/>
-              <a:t>prepare</a:t>
-            </a:r>
-            <a:r>
-              <a:rPr/>
-              <a:t> </a:t>
-            </a:r>
-            <a:r>
-              <a:rPr/>
-              <a:t>for</a:t>
-            </a:r>
-            <a:r>
-              <a:rPr/>
-              <a:t> </a:t>
-            </a:r>
-            <a:r>
-              <a:rPr/>
-              <a:t>this</a:t>
-            </a:r>
-            <a:r>
-              <a:rPr/>
-              <a:t> </a:t>
-            </a:r>
-            <a:r>
-              <a:rPr/>
-              <a:t>section</a:t>
-            </a:r>
-          </a:p>
-        </p:txBody>
-      </p:sp>
       <p:pic>
         <p:nvPicPr>
-          <p:cNvPr descr="../images/02/kaggle-scotus-data.png" id="0" name="Picture 1"/>
-          <p:cNvPicPr>
-            <a:picLocks noGrp="1" noChangeAspect="1"/>
-          </p:cNvPicPr>
-          <p:nvPr/>
-        </p:nvPicPr>
-        <p:blipFill>
-          <a:blip r:embed="rId2"/>
-          <a:stretch>
-            <a:fillRect/>
-          </a:stretch>
-        </p:blipFill>
-        <p:spPr bwMode="auto">
-          <a:xfrm>
-            <a:off x="914400" y="1600200"/>
-            <a:ext cx="7327900" cy="4013200"/>
-          </a:xfrm>
-          <a:prstGeom prst="rect">
-            <a:avLst/>
-          </a:prstGeom>
-          <a:noFill/>
-          <a:ln w="9525">
-            <a:noFill/>
-            <a:headEnd/>
-            <a:tailEnd/>
-          </a:ln>
-        </p:spPr>
-      </p:pic>
-      <p:sp>
-        <p:nvSpPr>
-          <p:cNvPr id="1" name="TextBox 3"/>
-          <p:cNvSpPr txBox="1"/>
-          <p:nvPr/>
-        </p:nvSpPr>
-        <p:spPr>
-          <a:xfrm>
-            <a:off x="457200" y="5613400"/>
-            <a:ext cx="8229600" cy="508000"/>
-          </a:xfrm>
-          <a:prstGeom prst="rect">
-            <a:avLst/>
-          </a:prstGeom>
-          <a:noFill/>
-        </p:spPr>
-        <p:txBody>
-          <a:bodyPr/>
-          <a:lstStyle/>
-          <a:p>
-            <a:pPr lvl="0" marL="0" indent="0" algn="ctr">
-              <a:buNone/>
-            </a:pPr>
-            <a:r>
-              <a:rPr/>
-              <a:t>Kaggle</a:t>
-            </a:r>
-            <a:r>
-              <a:rPr/>
-              <a:t> </a:t>
-            </a:r>
-            <a:r>
-              <a:rPr/>
-              <a:t>datasets</a:t>
-            </a:r>
-            <a:r>
-              <a:rPr/>
-              <a:t> </a:t>
-            </a:r>
-            <a:r>
-              <a:rPr/>
-              <a:t>webpage</a:t>
-            </a:r>
-          </a:p>
-        </p:txBody>
-      </p:sp>
-    </p:spTree>
-  </p:cSld>
-</p:sld>
-</file>
-
-<file path=ppt/slides/slide30.xml><?xml version="1.0" encoding="utf-8"?>
-<p:sld xmlns:a="http://schemas.openxmlformats.org/drawingml/2006/main" xmlns:r="http://schemas.openxmlformats.org/officeDocument/2006/relationships" xmlns:p="http://schemas.openxmlformats.org/presentationml/2006/main">
-  <p:cSld>
-    <p:spTree>
-      <p:nvGrpSpPr>
-        <p:cNvPr id="1" name=""/>
-        <p:cNvGrpSpPr/>
-        <p:nvPr/>
-      </p:nvGrpSpPr>
-      <p:grpSpPr>
-        <a:xfrm>
-          <a:off x="0" y="0"/>
-          <a:ext cx="0" cy="0"/>
-          <a:chOff x="0" y="0"/>
-          <a:chExt cx="0" cy="0"/>
-        </a:xfrm>
-      </p:grpSpPr>
-      <p:sp>
-        <p:nvSpPr>
-          <p:cNvPr id="2" name="Title 1"/>
-          <p:cNvSpPr>
-            <a:spLocks noGrp="1"/>
-          </p:cNvSpPr>
-          <p:nvPr>
-            <p:ph type="title"/>
-          </p:nvPr>
-        </p:nvSpPr>
-        <p:spPr/>
-        <p:txBody>
-          <a:bodyPr/>
-          <a:lstStyle/>
-          <a:p>
-            <a:pPr lvl="0" marL="0" indent="0">
-              <a:buNone/>
-            </a:pPr>
-            <a:r>
-              <a:rPr/>
-              <a:t>Notes</a:t>
-            </a:r>
-            <a:r>
-              <a:rPr/>
-              <a:t> </a:t>
-            </a:r>
-            <a:r>
-              <a:rPr/>
-              <a:t>about</a:t>
-            </a:r>
-            <a:r>
-              <a:rPr/>
-              <a:t> </a:t>
-            </a:r>
-            <a:r>
-              <a:rPr/>
-              <a:t>this</a:t>
-            </a:r>
-            <a:r>
-              <a:rPr/>
-              <a:t> </a:t>
-            </a:r>
-            <a:r>
-              <a:rPr/>
-              <a:t>talk</a:t>
-            </a:r>
-          </a:p>
-        </p:txBody>
-      </p:sp>
-      <p:sp>
-        <p:nvSpPr>
-          <p:cNvPr id="3" name="Content Placeholder 2"/>
-          <p:cNvSpPr>
-            <a:spLocks noGrp="1"/>
-          </p:cNvSpPr>
-          <p:nvPr>
-            <p:ph idx="1"/>
-          </p:nvPr>
-        </p:nvSpPr>
-        <p:spPr/>
-        <p:txBody>
-          <a:bodyPr/>
-          <a:lstStyle/>
-          <a:p>
-            <a:pPr lvl="1"/>
-            <a:r>
-              <a:rPr/>
-              <a:t>Do not include this slide in the final presentation</a:t>
-            </a:r>
-          </a:p>
-          <a:p>
-            <a:pPr lvl="1"/>
-            <a:r>
-              <a:rPr/>
-              <a:t>If I do a flipped classroom, here would be a good place to split with most of the material before this slide being in lectures to be viewed before the class. Then the classrom lecture would start from about here (after a very quick review) and focus on the “On your own” exercises.</a:t>
-            </a:r>
-          </a:p>
-        </p:txBody>
-      </p:sp>
-    </p:spTree>
-  </p:cSld>
-</p:sld>
-</file>
-
-<file path=ppt/slides/slide31.xml><?xml version="1.0" encoding="utf-8"?>
-<p:sld xmlns:a="http://schemas.openxmlformats.org/drawingml/2006/main" xmlns:r="http://schemas.openxmlformats.org/officeDocument/2006/relationships" xmlns:p="http://schemas.openxmlformats.org/presentationml/2006/main">
-  <p:cSld>
-    <p:spTree>
-      <p:nvGrpSpPr>
-        <p:cNvPr id="1" name=""/>
-        <p:cNvGrpSpPr/>
-        <p:nvPr/>
-      </p:nvGrpSpPr>
-      <p:grpSpPr>
-        <a:xfrm>
-          <a:off x="0" y="0"/>
-          <a:ext cx="0" cy="0"/>
-          <a:chOff x="0" y="0"/>
-          <a:chExt cx="0" cy="0"/>
-        </a:xfrm>
-      </p:grpSpPr>
-      <p:sp>
-        <p:nvSpPr>
-          <p:cNvPr id="2" name="Title 1"/>
-          <p:cNvSpPr>
-            <a:spLocks noGrp="1"/>
-          </p:cNvSpPr>
-          <p:nvPr>
-            <p:ph type="title"/>
-          </p:nvPr>
-        </p:nvSpPr>
-        <p:spPr/>
-        <p:txBody>
-          <a:bodyPr/>
-          <a:lstStyle/>
-          <a:p>
-            <a:pPr lvl="0" marL="0" indent="0">
-              <a:buNone/>
-            </a:pPr>
-            <a:r>
-              <a:rPr/>
-              <a:t>Location</a:t>
-            </a:r>
-            <a:r>
-              <a:rPr/>
-              <a:t> </a:t>
-            </a:r>
-            <a:r>
-              <a:rPr/>
-              <a:t>(1</a:t>
-            </a:r>
-            <a:r>
-              <a:rPr/>
-              <a:t> </a:t>
-            </a:r>
-            <a:r>
-              <a:rPr/>
-              <a:t>of</a:t>
-            </a:r>
-            <a:r>
-              <a:rPr/>
-              <a:t> </a:t>
-            </a:r>
-            <a:r>
-              <a:rPr/>
-              <a:t>2)</a:t>
-            </a:r>
-          </a:p>
-        </p:txBody>
-      </p:sp>
-      <p:pic>
-        <p:nvPicPr>
-          <p:cNvPr descr="data-visualization-02-bars_files/figure-pptx/location-horizontal-1.png" id="0" name="Picture 1"/>
+          <p:cNvPr descr="data-visualization-02-bars_files/figure-pptx/rgb-1.png" id="0" name="Picture 1"/>
           <p:cNvPicPr>
             <a:picLocks noGrp="1" noChangeAspect="1"/>
           </p:cNvPicPr>
@@ -18098,6 +17467,612 @@
 </p:sld>
 </file>
 
+<file path=ppt/slides/slide27.xml><?xml version="1.0" encoding="utf-8"?>
+<p:sld xmlns:a="http://schemas.openxmlformats.org/drawingml/2006/main" xmlns:r="http://schemas.openxmlformats.org/officeDocument/2006/relationships" xmlns:p="http://schemas.openxmlformats.org/presentationml/2006/main">
+  <p:cSld>
+    <p:spTree>
+      <p:nvGrpSpPr>
+        <p:cNvPr id="1" name=""/>
+        <p:cNvGrpSpPr/>
+        <p:nvPr/>
+      </p:nvGrpSpPr>
+      <p:grpSpPr>
+        <a:xfrm>
+          <a:off x="0" y="0"/>
+          <a:ext cx="0" cy="0"/>
+          <a:chOff x="0" y="0"/>
+          <a:chExt cx="0" cy="0"/>
+        </a:xfrm>
+      </p:grpSpPr>
+      <p:sp>
+        <p:nvSpPr>
+          <p:cNvPr id="2" name="Title 1"/>
+          <p:cNvSpPr>
+            <a:spLocks noGrp="1"/>
+          </p:cNvSpPr>
+          <p:nvPr>
+            <p:ph type="title"/>
+          </p:nvPr>
+        </p:nvSpPr>
+        <p:spPr/>
+        <p:txBody>
+          <a:bodyPr/>
+          <a:lstStyle/>
+          <a:p>
+            <a:pPr lvl="0" marL="0" indent="0">
+              <a:buNone/>
+            </a:pPr>
+            <a:r>
+              <a:rPr/>
+              <a:t>Transitions</a:t>
+            </a:r>
+          </a:p>
+        </p:txBody>
+      </p:sp>
+      <p:pic>
+        <p:nvPicPr>
+          <p:cNvPr descr="data-visualization-02-bars_files/figure-pptx/transition-1.png" id="0" name="Picture 1"/>
+          <p:cNvPicPr>
+            <a:picLocks noGrp="1" noChangeAspect="1"/>
+          </p:cNvPicPr>
+          <p:nvPr/>
+        </p:nvPicPr>
+        <p:blipFill>
+          <a:blip r:embed="rId2"/>
+          <a:stretch>
+            <a:fillRect/>
+          </a:stretch>
+        </p:blipFill>
+        <p:spPr bwMode="auto">
+          <a:xfrm>
+            <a:off x="1752600" y="1600200"/>
+            <a:ext cx="5651500" cy="4521200"/>
+          </a:xfrm>
+          <a:prstGeom prst="rect">
+            <a:avLst/>
+          </a:prstGeom>
+          <a:noFill/>
+          <a:ln w="9525">
+            <a:noFill/>
+            <a:headEnd/>
+            <a:tailEnd/>
+          </a:ln>
+        </p:spPr>
+      </p:pic>
+    </p:spTree>
+  </p:cSld>
+</p:sld>
+</file>
+
+<file path=ppt/slides/slide28.xml><?xml version="1.0" encoding="utf-8"?>
+<p:sld xmlns:a="http://schemas.openxmlformats.org/drawingml/2006/main" xmlns:r="http://schemas.openxmlformats.org/officeDocument/2006/relationships" xmlns:p="http://schemas.openxmlformats.org/presentationml/2006/main">
+  <p:cSld>
+    <p:spTree>
+      <p:nvGrpSpPr>
+        <p:cNvPr id="1" name=""/>
+        <p:cNvGrpSpPr/>
+        <p:nvPr/>
+      </p:nvGrpSpPr>
+      <p:grpSpPr>
+        <a:xfrm>
+          <a:off x="0" y="0"/>
+          <a:ext cx="0" cy="0"/>
+          <a:chOff x="0" y="0"/>
+          <a:chExt cx="0" cy="0"/>
+        </a:xfrm>
+      </p:grpSpPr>
+      <p:sp>
+        <p:nvSpPr>
+          <p:cNvPr id="3" name="Content Placeholder 2"/>
+          <p:cNvSpPr>
+            <a:spLocks noGrp="1"/>
+          </p:cNvSpPr>
+          <p:nvPr>
+            <p:ph idx="1"/>
+          </p:nvPr>
+        </p:nvSpPr>
+        <p:spPr/>
+        <p:txBody>
+          <a:bodyPr/>
+          <a:lstStyle/>
+          <a:p>
+            <a:pPr lvl="0" marL="0" indent="0">
+              <a:buNone/>
+            </a:pPr>
+            <a:r>
+              <a:rPr/>
+              <a:t> ### A quick tutorial on colors</a:t>
+            </a:r>
+          </a:p>
+        </p:txBody>
+      </p:sp>
+    </p:spTree>
+  </p:cSld>
+</p:sld>
+</file>
+
+<file path=ppt/slides/slide29.xml><?xml version="1.0" encoding="utf-8"?>
+<p:sld xmlns:a="http://schemas.openxmlformats.org/drawingml/2006/main" xmlns:r="http://schemas.openxmlformats.org/officeDocument/2006/relationships" xmlns:p="http://schemas.openxmlformats.org/presentationml/2006/main">
+  <p:cSld>
+    <p:spTree>
+      <p:nvGrpSpPr>
+        <p:cNvPr id="1" name=""/>
+        <p:cNvGrpSpPr/>
+        <p:nvPr/>
+      </p:nvGrpSpPr>
+      <p:grpSpPr>
+        <a:xfrm>
+          <a:off x="0" y="0"/>
+          <a:ext cx="0" cy="0"/>
+          <a:chOff x="0" y="0"/>
+          <a:chExt cx="0" cy="0"/>
+        </a:xfrm>
+      </p:grpSpPr>
+      <p:sp>
+        <p:nvSpPr>
+          <p:cNvPr id="2" name="Title 1"/>
+          <p:cNvSpPr>
+            <a:spLocks noGrp="1"/>
+          </p:cNvSpPr>
+          <p:nvPr>
+            <p:ph type="title"/>
+          </p:nvPr>
+        </p:nvSpPr>
+        <p:spPr/>
+        <p:txBody>
+          <a:bodyPr/>
+          <a:lstStyle/>
+          <a:p>
+            <a:pPr lvl="0" marL="0" indent="0">
+              <a:buNone/>
+            </a:pPr>
+            <a:r>
+              <a:rPr/>
+              <a:t>Bars</a:t>
+            </a:r>
+          </a:p>
+        </p:txBody>
+      </p:sp>
+      <p:sp>
+        <p:nvSpPr>
+          <p:cNvPr id="3" name="Content Placeholder 2"/>
+          <p:cNvSpPr>
+            <a:spLocks noGrp="1"/>
+          </p:cNvSpPr>
+          <p:nvPr>
+            <p:ph idx="1"/>
+          </p:nvPr>
+        </p:nvSpPr>
+        <p:spPr/>
+        <p:txBody>
+          <a:bodyPr/>
+          <a:lstStyle/>
+          <a:p>
+            <a:pPr lvl="1"/>
+            <a:r>
+              <a:rPr/>
+              <a:t>Fewer in numbers than points</a:t>
+            </a:r>
+          </a:p>
+          <a:p>
+            <a:pPr lvl="1"/>
+            <a:r>
+              <a:rPr/>
+              <a:t>Usually a summary statistic</a:t>
+            </a:r>
+          </a:p>
+          <a:p>
+            <a:pPr lvl="2"/>
+            <a:r>
+              <a:rPr/>
+              <a:t>Count</a:t>
+            </a:r>
+          </a:p>
+          <a:p>
+            <a:pPr lvl="2"/>
+            <a:r>
+              <a:rPr/>
+              <a:t>Percent</a:t>
+            </a:r>
+          </a:p>
+          <a:p>
+            <a:pPr lvl="2"/>
+            <a:r>
+              <a:rPr/>
+              <a:t>Average</a:t>
+            </a:r>
+          </a:p>
+          <a:p>
+            <a:pPr lvl="2"/>
+            <a:r>
+              <a:rPr/>
+              <a:t>Total</a:t>
+            </a:r>
+          </a:p>
+          <a:p>
+            <a:pPr lvl="1"/>
+            <a:r>
+              <a:rPr/>
+              <a:t>A bar chart is NOT a histogram</a:t>
+            </a:r>
+          </a:p>
+        </p:txBody>
+      </p:sp>
+    </p:spTree>
+  </p:cSld>
+</p:sld>
+</file>
+
+<file path=ppt/slides/slide3.xml><?xml version="1.0" encoding="utf-8"?>
+<p:sld xmlns:a="http://schemas.openxmlformats.org/drawingml/2006/main" xmlns:r="http://schemas.openxmlformats.org/officeDocument/2006/relationships" xmlns:p="http://schemas.openxmlformats.org/presentationml/2006/main">
+  <p:cSld>
+    <p:spTree>
+      <p:nvGrpSpPr>
+        <p:cNvPr id="1" name=""/>
+        <p:cNvGrpSpPr/>
+        <p:nvPr/>
+      </p:nvGrpSpPr>
+      <p:grpSpPr>
+        <a:xfrm>
+          <a:off x="0" y="0"/>
+          <a:ext cx="0" cy="0"/>
+          <a:chOff x="0" y="0"/>
+          <a:chExt cx="0" cy="0"/>
+        </a:xfrm>
+      </p:grpSpPr>
+      <p:sp>
+        <p:nvSpPr>
+          <p:cNvPr id="2" name="Title 1"/>
+          <p:cNvSpPr>
+            <a:spLocks noGrp="1"/>
+          </p:cNvSpPr>
+          <p:nvPr>
+            <p:ph type="title"/>
+          </p:nvPr>
+        </p:nvSpPr>
+        <p:spPr/>
+        <p:txBody>
+          <a:bodyPr/>
+          <a:lstStyle/>
+          <a:p>
+            <a:pPr lvl="0" marL="0" indent="0">
+              <a:buNone/>
+            </a:pPr>
+            <a:r>
+              <a:rPr/>
+              <a:t>To</a:t>
+            </a:r>
+            <a:r>
+              <a:rPr/>
+              <a:t> </a:t>
+            </a:r>
+            <a:r>
+              <a:rPr/>
+              <a:t>prepare</a:t>
+            </a:r>
+            <a:r>
+              <a:rPr/>
+              <a:t> </a:t>
+            </a:r>
+            <a:r>
+              <a:rPr/>
+              <a:t>for</a:t>
+            </a:r>
+            <a:r>
+              <a:rPr/>
+              <a:t> </a:t>
+            </a:r>
+            <a:r>
+              <a:rPr/>
+              <a:t>this</a:t>
+            </a:r>
+            <a:r>
+              <a:rPr/>
+              <a:t> </a:t>
+            </a:r>
+            <a:r>
+              <a:rPr/>
+              <a:t>section</a:t>
+            </a:r>
+          </a:p>
+        </p:txBody>
+      </p:sp>
+      <p:pic>
+        <p:nvPicPr>
+          <p:cNvPr descr="../images/kaggle-scotus-data.png" id="0" name="Picture 1"/>
+          <p:cNvPicPr>
+            <a:picLocks noGrp="1" noChangeAspect="1"/>
+          </p:cNvPicPr>
+          <p:nvPr/>
+        </p:nvPicPr>
+        <p:blipFill>
+          <a:blip r:embed="rId2"/>
+          <a:stretch>
+            <a:fillRect/>
+          </a:stretch>
+        </p:blipFill>
+        <p:spPr bwMode="auto">
+          <a:xfrm>
+            <a:off x="914400" y="1600200"/>
+            <a:ext cx="7327900" cy="4013200"/>
+          </a:xfrm>
+          <a:prstGeom prst="rect">
+            <a:avLst/>
+          </a:prstGeom>
+          <a:noFill/>
+          <a:ln w="9525">
+            <a:noFill/>
+            <a:headEnd/>
+            <a:tailEnd/>
+          </a:ln>
+        </p:spPr>
+      </p:pic>
+      <p:sp>
+        <p:nvSpPr>
+          <p:cNvPr id="1" name="TextBox 3"/>
+          <p:cNvSpPr txBox="1"/>
+          <p:nvPr/>
+        </p:nvSpPr>
+        <p:spPr>
+          <a:xfrm>
+            <a:off x="457200" y="5613400"/>
+            <a:ext cx="8229600" cy="508000"/>
+          </a:xfrm>
+          <a:prstGeom prst="rect">
+            <a:avLst/>
+          </a:prstGeom>
+          <a:noFill/>
+        </p:spPr>
+        <p:txBody>
+          <a:bodyPr/>
+          <a:lstStyle/>
+          <a:p>
+            <a:pPr lvl="0" marL="0" indent="0" algn="ctr">
+              <a:buNone/>
+            </a:pPr>
+            <a:r>
+              <a:rPr/>
+              <a:t>Kaggle</a:t>
+            </a:r>
+            <a:r>
+              <a:rPr/>
+              <a:t> </a:t>
+            </a:r>
+            <a:r>
+              <a:rPr/>
+              <a:t>datasets</a:t>
+            </a:r>
+            <a:r>
+              <a:rPr/>
+              <a:t> </a:t>
+            </a:r>
+            <a:r>
+              <a:rPr/>
+              <a:t>webpage</a:t>
+            </a:r>
+          </a:p>
+        </p:txBody>
+      </p:sp>
+    </p:spTree>
+  </p:cSld>
+</p:sld>
+</file>
+
+<file path=ppt/slides/slide30.xml><?xml version="1.0" encoding="utf-8"?>
+<p:sld xmlns:a="http://schemas.openxmlformats.org/drawingml/2006/main" xmlns:r="http://schemas.openxmlformats.org/officeDocument/2006/relationships" xmlns:p="http://schemas.openxmlformats.org/presentationml/2006/main">
+  <p:cSld>
+    <p:spTree>
+      <p:nvGrpSpPr>
+        <p:cNvPr id="1" name=""/>
+        <p:cNvGrpSpPr/>
+        <p:nvPr/>
+      </p:nvGrpSpPr>
+      <p:grpSpPr>
+        <a:xfrm>
+          <a:off x="0" y="0"/>
+          <a:ext cx="0" cy="0"/>
+          <a:chOff x="0" y="0"/>
+          <a:chExt cx="0" cy="0"/>
+        </a:xfrm>
+      </p:grpSpPr>
+      <p:sp>
+        <p:nvSpPr>
+          <p:cNvPr id="2" name="Title 1"/>
+          <p:cNvSpPr>
+            <a:spLocks noGrp="1"/>
+          </p:cNvSpPr>
+          <p:nvPr>
+            <p:ph type="title"/>
+          </p:nvPr>
+        </p:nvSpPr>
+        <p:spPr/>
+        <p:txBody>
+          <a:bodyPr/>
+          <a:lstStyle/>
+          <a:p>
+            <a:pPr lvl="0" marL="0" indent="0">
+              <a:buNone/>
+            </a:pPr>
+            <a:r>
+              <a:rPr/>
+              <a:t>Aesthetics</a:t>
+            </a:r>
+            <a:r>
+              <a:rPr/>
+              <a:t> </a:t>
+            </a:r>
+            <a:r>
+              <a:rPr/>
+              <a:t>for</a:t>
+            </a:r>
+            <a:r>
+              <a:rPr/>
+              <a:t> </a:t>
+            </a:r>
+            <a:r>
+              <a:rPr/>
+              <a:t>bars</a:t>
+            </a:r>
+          </a:p>
+        </p:txBody>
+      </p:sp>
+      <p:sp>
+        <p:nvSpPr>
+          <p:cNvPr id="3" name="Content Placeholder 2"/>
+          <p:cNvSpPr>
+            <a:spLocks noGrp="1"/>
+          </p:cNvSpPr>
+          <p:nvPr>
+            <p:ph idx="1"/>
+          </p:nvPr>
+        </p:nvSpPr>
+        <p:spPr/>
+        <p:txBody>
+          <a:bodyPr/>
+          <a:lstStyle/>
+          <a:p>
+            <a:pPr lvl="1"/>
+            <a:r>
+              <a:rPr/>
+              <a:t>Review</a:t>
+            </a:r>
+          </a:p>
+          <a:p>
+            <a:pPr lvl="2"/>
+            <a:r>
+              <a:rPr/>
+              <a:t>Location</a:t>
+            </a:r>
+          </a:p>
+          <a:p>
+            <a:pPr lvl="2"/>
+            <a:r>
+              <a:rPr/>
+              <a:t>Size</a:t>
+            </a:r>
+          </a:p>
+          <a:p>
+            <a:pPr lvl="2"/>
+            <a:r>
+              <a:rPr/>
+              <a:t>Color</a:t>
+            </a:r>
+          </a:p>
+          <a:p>
+            <a:pPr lvl="2"/>
+            <a:r>
+              <a:rPr/>
+              <a:t>NOT shape!!!</a:t>
+            </a:r>
+          </a:p>
+        </p:txBody>
+      </p:sp>
+    </p:spTree>
+  </p:cSld>
+</p:sld>
+</file>
+
+<file path=ppt/slides/slide31.xml><?xml version="1.0" encoding="utf-8"?>
+<p:sld xmlns:a="http://schemas.openxmlformats.org/drawingml/2006/main" xmlns:r="http://schemas.openxmlformats.org/officeDocument/2006/relationships" xmlns:p="http://schemas.openxmlformats.org/presentationml/2006/main">
+  <p:cSld>
+    <p:spTree>
+      <p:nvGrpSpPr>
+        <p:cNvPr id="1" name=""/>
+        <p:cNvGrpSpPr/>
+        <p:nvPr/>
+      </p:nvGrpSpPr>
+      <p:grpSpPr>
+        <a:xfrm>
+          <a:off x="0" y="0"/>
+          <a:ext cx="0" cy="0"/>
+          <a:chOff x="0" y="0"/>
+          <a:chExt cx="0" cy="0"/>
+        </a:xfrm>
+      </p:grpSpPr>
+      <p:sp>
+        <p:nvSpPr>
+          <p:cNvPr id="2" name="Title 1"/>
+          <p:cNvSpPr>
+            <a:spLocks noGrp="1"/>
+          </p:cNvSpPr>
+          <p:nvPr>
+            <p:ph type="title"/>
+          </p:nvPr>
+        </p:nvSpPr>
+        <p:spPr/>
+        <p:txBody>
+          <a:bodyPr/>
+          <a:lstStyle/>
+          <a:p>
+            <a:pPr lvl="0" marL="0" indent="0">
+              <a:buNone/>
+            </a:pPr>
+            <a:r>
+              <a:rPr/>
+              <a:t>Notes</a:t>
+            </a:r>
+            <a:r>
+              <a:rPr/>
+              <a:t> </a:t>
+            </a:r>
+            <a:r>
+              <a:rPr/>
+              <a:t>about</a:t>
+            </a:r>
+            <a:r>
+              <a:rPr/>
+              <a:t> </a:t>
+            </a:r>
+            <a:r>
+              <a:rPr/>
+              <a:t>this</a:t>
+            </a:r>
+            <a:r>
+              <a:rPr/>
+              <a:t> </a:t>
+            </a:r>
+            <a:r>
+              <a:rPr/>
+              <a:t>talk</a:t>
+            </a:r>
+          </a:p>
+        </p:txBody>
+      </p:sp>
+      <p:sp>
+        <p:nvSpPr>
+          <p:cNvPr id="3" name="Content Placeholder 2"/>
+          <p:cNvSpPr>
+            <a:spLocks noGrp="1"/>
+          </p:cNvSpPr>
+          <p:nvPr>
+            <p:ph idx="1"/>
+          </p:nvPr>
+        </p:nvSpPr>
+        <p:spPr/>
+        <p:txBody>
+          <a:bodyPr/>
+          <a:lstStyle/>
+          <a:p>
+            <a:pPr lvl="1"/>
+            <a:r>
+              <a:rPr/>
+              <a:t>Do not include this slide in the final presentation</a:t>
+            </a:r>
+          </a:p>
+          <a:p>
+            <a:pPr lvl="1"/>
+            <a:r>
+              <a:rPr/>
+              <a:t>If I do a flipped classroom, here would be a good place to split with most of the material before this slide being in lectures to be viewed before the class. Then the classrom lecture would start from about here (after a very quick review) and focus on the “On your own” exercises.</a:t>
+            </a:r>
+          </a:p>
+        </p:txBody>
+      </p:sp>
+    </p:spTree>
+  </p:cSld>
+</p:sld>
+</file>
+
 <file path=ppt/slides/slide32.xml><?xml version="1.0" encoding="utf-8"?>
 <p:sld xmlns:a="http://schemas.openxmlformats.org/drawingml/2006/main" xmlns:r="http://schemas.openxmlformats.org/officeDocument/2006/relationships" xmlns:p="http://schemas.openxmlformats.org/presentationml/2006/main">
   <p:cSld>
@@ -18143,7 +18118,7 @@
             </a:r>
             <a:r>
               <a:rPr/>
-              <a:t>(2</a:t>
+              <a:t>(1</a:t>
             </a:r>
             <a:r>
               <a:rPr/>
@@ -18166,7 +18141,7 @@
       </p:sp>
       <p:pic>
         <p:nvPicPr>
-          <p:cNvPr descr="data-visualization-02-bars_files/figure-pptx/location-vertical-1.png" id="0" name="Picture 1"/>
+          <p:cNvPr descr="data-visualization-02-bars_files/figure-pptx/location-horizontal-1.png" id="0" name="Picture 1"/>
           <p:cNvPicPr>
             <a:picLocks noGrp="1" noChangeAspect="1"/>
           </p:cNvPicPr>
@@ -18236,50 +18211,65 @@
             </a:pPr>
             <a:r>
               <a:rPr/>
-              <a:t>On</a:t>
-            </a:r>
-            <a:r>
-              <a:rPr/>
-              <a:t> </a:t>
-            </a:r>
-            <a:r>
-              <a:rPr/>
-              <a:t>your</a:t>
-            </a:r>
-            <a:r>
-              <a:rPr/>
-              <a:t> </a:t>
-            </a:r>
-            <a:r>
-              <a:rPr/>
-              <a:t>own</a:t>
+              <a:t>Location</a:t>
+            </a:r>
+            <a:r>
+              <a:rPr/>
+              <a:t> </a:t>
+            </a:r>
+            <a:r>
+              <a:rPr/>
+              <a:t>(2</a:t>
+            </a:r>
+            <a:r>
+              <a:rPr/>
+              <a:t> </a:t>
+            </a:r>
+            <a:r>
+              <a:rPr/>
+              <a:t>of</a:t>
+            </a:r>
+            <a:r>
+              <a:rPr/>
+              <a:t> </a:t>
+            </a:r>
+            <a:r>
+              <a:rPr/>
+              <a:t>2)</a:t>
             </a:r>
           </a:p>
         </p:txBody>
       </p:sp>
-      <p:sp>
-        <p:nvSpPr>
-          <p:cNvPr id="3" name="Content Placeholder 2"/>
-          <p:cNvSpPr>
-            <a:spLocks noGrp="1"/>
-          </p:cNvSpPr>
-          <p:nvPr>
-            <p:ph idx="1"/>
-          </p:nvPr>
-        </p:nvSpPr>
-        <p:spPr/>
-        <p:txBody>
-          <a:bodyPr/>
-          <a:lstStyle/>
-          <a:p>
-            <a:pPr lvl="1"/>
-            <a:r>
-              <a:rPr/>
-              <a:t>Draw a horizontal and vertical bar chart showing the number of people in each gender (use the Sex variable).</a:t>
-            </a:r>
-          </a:p>
-        </p:txBody>
-      </p:sp>
+      <p:pic>
+        <p:nvPicPr>
+          <p:cNvPr descr="data-visualization-02-bars_files/figure-pptx/location-vertical-1.png" id="0" name="Picture 1"/>
+          <p:cNvPicPr>
+            <a:picLocks noGrp="1" noChangeAspect="1"/>
+          </p:cNvPicPr>
+          <p:nvPr/>
+        </p:nvPicPr>
+        <p:blipFill>
+          <a:blip r:embed="rId2"/>
+          <a:stretch>
+            <a:fillRect/>
+          </a:stretch>
+        </p:blipFill>
+        <p:spPr bwMode="auto">
+          <a:xfrm>
+            <a:off x="1752600" y="1600200"/>
+            <a:ext cx="5651500" cy="4521200"/>
+          </a:xfrm>
+          <a:prstGeom prst="rect">
+            <a:avLst/>
+          </a:prstGeom>
+          <a:noFill/>
+          <a:ln w="9525">
+            <a:noFill/>
+            <a:headEnd/>
+            <a:tailEnd/>
+          </a:ln>
+        </p:spPr>
+      </p:pic>
     </p:spTree>
   </p:cSld>
 </p:sld>
@@ -18322,23 +18312,23 @@
             </a:pPr>
             <a:r>
               <a:rPr/>
-              <a:t>Wait</a:t>
-            </a:r>
-            <a:r>
-              <a:rPr/>
-              <a:t> </a:t>
-            </a:r>
-            <a:r>
-              <a:rPr/>
-              <a:t>before</a:t>
-            </a:r>
-            <a:r>
-              <a:rPr/>
-              <a:t> </a:t>
-            </a:r>
-            <a:r>
-              <a:rPr/>
-              <a:t>showing</a:t>
+              <a:t>On</a:t>
+            </a:r>
+            <a:r>
+              <a:rPr/>
+              <a:t> </a:t>
+            </a:r>
+            <a:r>
+              <a:rPr/>
+              <a:t>your</a:t>
+            </a:r>
+            <a:r>
+              <a:rPr/>
+              <a:t> </a:t>
+            </a:r>
+            <a:r>
+              <a:rPr/>
+              <a:t>own</a:t>
             </a:r>
           </a:p>
         </p:txBody>
@@ -18358,30 +18348,10 @@
           <a:bodyPr/>
           <a:lstStyle/>
           <a:p>
-            <a:pPr lvl="0" marL="0" indent="0">
-              <a:buNone/>
-            </a:pPr>
-            <a:r>
-              <a:rPr/>
-              <a:t>((Python code))</a:t>
-            </a:r>
-          </a:p>
-          <a:p>
-            <a:pPr lvl="0" marL="0" indent="0">
-              <a:buNone/>
-            </a:pPr>
-            <a:r>
-              <a:rPr/>
-              <a:t>((R code))</a:t>
-            </a:r>
-          </a:p>
-          <a:p>
-            <a:pPr lvl="0" marL="0" indent="0">
-              <a:buNone/>
-            </a:pPr>
-            <a:r>
-              <a:rPr/>
-              <a:t>((Tableau steps))</a:t>
+            <a:pPr lvl="1"/>
+            <a:r>
+              <a:rPr/>
+              <a:t>Draw a horizontal and vertical bar chart showing the number of people in each gender (use the Sex variable).</a:t>
             </a:r>
           </a:p>
         </p:txBody>
@@ -18428,47 +18398,23 @@
             </a:pPr>
             <a:r>
               <a:rPr/>
-              <a:t>What</a:t>
-            </a:r>
-            <a:r>
-              <a:rPr/>
-              <a:t> </a:t>
-            </a:r>
-            <a:r>
-              <a:rPr/>
-              <a:t>your</a:t>
-            </a:r>
-            <a:r>
-              <a:rPr/>
-              <a:t> </a:t>
-            </a:r>
-            <a:r>
-              <a:rPr/>
-              <a:t>visualization</a:t>
-            </a:r>
-            <a:r>
-              <a:rPr/>
-              <a:t> </a:t>
-            </a:r>
-            <a:r>
-              <a:rPr/>
-              <a:t>might</a:t>
-            </a:r>
-            <a:r>
-              <a:rPr/>
-              <a:t> </a:t>
-            </a:r>
-            <a:r>
-              <a:rPr/>
-              <a:t>look</a:t>
-            </a:r>
-            <a:r>
-              <a:rPr/>
-              <a:t> </a:t>
-            </a:r>
-            <a:r>
-              <a:rPr/>
-              <a:t>like</a:t>
+              <a:t>Wait</a:t>
+            </a:r>
+            <a:r>
+              <a:rPr/>
+              <a:t> </a:t>
+            </a:r>
+            <a:r>
+              <a:rPr/>
+              <a:t>before</a:t>
+            </a:r>
+            <a:r>
+              <a:rPr/>
+              <a:t> </a:t>
+            </a:r>
+            <a:r>
+              <a:rPr/>
+              <a:t>showing</a:t>
             </a:r>
           </a:p>
         </p:txBody>
@@ -18493,7 +18439,25 @@
             </a:pPr>
             <a:r>
               <a:rPr/>
-              <a:t>((Show visualization))</a:t>
+              <a:t>((Python code))</a:t>
+            </a:r>
+          </a:p>
+          <a:p>
+            <a:pPr lvl="0" marL="0" indent="0">
+              <a:buNone/>
+            </a:pPr>
+            <a:r>
+              <a:rPr/>
+              <a:t>((R code))</a:t>
+            </a:r>
+          </a:p>
+          <a:p>
+            <a:pPr lvl="0" marL="0" indent="0">
+              <a:buNone/>
+            </a:pPr>
+            <a:r>
+              <a:rPr/>
+              <a:t>((Tableau steps))</a:t>
             </a:r>
           </a:p>
         </p:txBody>
@@ -18540,23 +18504,47 @@
             </a:pPr>
             <a:r>
               <a:rPr/>
-              <a:t>Thoughts</a:t>
-            </a:r>
-            <a:r>
-              <a:rPr/>
-              <a:t> </a:t>
-            </a:r>
-            <a:r>
-              <a:rPr/>
-              <a:t>on</a:t>
-            </a:r>
-            <a:r>
-              <a:rPr/>
-              <a:t> </a:t>
-            </a:r>
-            <a:r>
-              <a:rPr/>
-              <a:t>location</a:t>
+              <a:t>What</a:t>
+            </a:r>
+            <a:r>
+              <a:rPr/>
+              <a:t> </a:t>
+            </a:r>
+            <a:r>
+              <a:rPr/>
+              <a:t>your</a:t>
+            </a:r>
+            <a:r>
+              <a:rPr/>
+              <a:t> </a:t>
+            </a:r>
+            <a:r>
+              <a:rPr/>
+              <a:t>visualization</a:t>
+            </a:r>
+            <a:r>
+              <a:rPr/>
+              <a:t> </a:t>
+            </a:r>
+            <a:r>
+              <a:rPr/>
+              <a:t>might</a:t>
+            </a:r>
+            <a:r>
+              <a:rPr/>
+              <a:t> </a:t>
+            </a:r>
+            <a:r>
+              <a:rPr/>
+              <a:t>look</a:t>
+            </a:r>
+            <a:r>
+              <a:rPr/>
+              <a:t> </a:t>
+            </a:r>
+            <a:r>
+              <a:rPr/>
+              <a:t>like</a:t>
             </a:r>
           </a:p>
         </p:txBody>
@@ -18576,17 +18564,12 @@
           <a:bodyPr/>
           <a:lstStyle/>
           <a:p>
-            <a:pPr lvl="1"/>
-            <a:r>
-              <a:rPr/>
-              <a:t>Axis labels often fit better on vertical location</a:t>
-            </a:r>
-          </a:p>
-          <a:p>
-            <a:pPr lvl="1"/>
-            <a:r>
-              <a:rPr/>
-              <a:t>Cannot vary both X and Y</a:t>
+            <a:pPr lvl="0" marL="0" indent="0">
+              <a:buNone/>
+            </a:pPr>
+            <a:r>
+              <a:rPr/>
+              <a:t>((Show visualization))</a:t>
             </a:r>
           </a:p>
         </p:txBody>
@@ -18633,7 +18616,23 @@
             </a:pPr>
             <a:r>
               <a:rPr/>
-              <a:t>Size</a:t>
+              <a:t>Thoughts</a:t>
+            </a:r>
+            <a:r>
+              <a:rPr/>
+              <a:t> </a:t>
+            </a:r>
+            <a:r>
+              <a:rPr/>
+              <a:t>on</a:t>
+            </a:r>
+            <a:r>
+              <a:rPr/>
+              <a:t> </a:t>
+            </a:r>
+            <a:r>
+              <a:rPr/>
+              <a:t>location</a:t>
             </a:r>
           </a:p>
         </p:txBody>
@@ -18656,21 +18655,14 @@
             <a:pPr lvl="1"/>
             <a:r>
               <a:rPr/>
-              <a:t>Length varies, width doesn’t</a:t>
-            </a:r>
-          </a:p>
-          <a:p>
-            <a:pPr lvl="2"/>
-            <a:r>
-              <a:rPr/>
-              <a:t>Exception, mosaic plots</a:t>
-            </a:r>
-          </a:p>
-          <a:p>
-            <a:pPr lvl="2"/>
-            <a:r>
-              <a:rPr/>
-              <a:t>Think about gaps between bars</a:t>
+              <a:t>Axis labels often fit better on vertical location</a:t>
+            </a:r>
+          </a:p>
+          <a:p>
+            <a:pPr lvl="1"/>
+            <a:r>
+              <a:rPr/>
+              <a:t>Cannot vary both X and Y</a:t>
             </a:r>
           </a:p>
         </p:txBody>
@@ -18717,6 +18709,90 @@
             </a:pPr>
             <a:r>
               <a:rPr/>
+              <a:t>Size</a:t>
+            </a:r>
+          </a:p>
+        </p:txBody>
+      </p:sp>
+      <p:sp>
+        <p:nvSpPr>
+          <p:cNvPr id="3" name="Content Placeholder 2"/>
+          <p:cNvSpPr>
+            <a:spLocks noGrp="1"/>
+          </p:cNvSpPr>
+          <p:nvPr>
+            <p:ph idx="1"/>
+          </p:nvPr>
+        </p:nvSpPr>
+        <p:spPr/>
+        <p:txBody>
+          <a:bodyPr/>
+          <a:lstStyle/>
+          <a:p>
+            <a:pPr lvl="1"/>
+            <a:r>
+              <a:rPr/>
+              <a:t>Length varies, width doesn’t</a:t>
+            </a:r>
+          </a:p>
+          <a:p>
+            <a:pPr lvl="2"/>
+            <a:r>
+              <a:rPr/>
+              <a:t>Exception, mosaic plots</a:t>
+            </a:r>
+          </a:p>
+          <a:p>
+            <a:pPr lvl="2"/>
+            <a:r>
+              <a:rPr/>
+              <a:t>Think about gaps between bars</a:t>
+            </a:r>
+          </a:p>
+        </p:txBody>
+      </p:sp>
+    </p:spTree>
+  </p:cSld>
+</p:sld>
+</file>
+
+<file path=ppt/slides/slide39.xml><?xml version="1.0" encoding="utf-8"?>
+<p:sld xmlns:a="http://schemas.openxmlformats.org/drawingml/2006/main" xmlns:r="http://schemas.openxmlformats.org/officeDocument/2006/relationships" xmlns:p="http://schemas.openxmlformats.org/presentationml/2006/main">
+  <p:cSld>
+    <p:spTree>
+      <p:nvGrpSpPr>
+        <p:cNvPr id="1" name=""/>
+        <p:cNvGrpSpPr/>
+        <p:nvPr/>
+      </p:nvGrpSpPr>
+      <p:grpSpPr>
+        <a:xfrm>
+          <a:off x="0" y="0"/>
+          <a:ext cx="0" cy="0"/>
+          <a:chOff x="0" y="0"/>
+          <a:chExt cx="0" cy="0"/>
+        </a:xfrm>
+      </p:grpSpPr>
+      <p:sp>
+        <p:nvSpPr>
+          <p:cNvPr id="2" name="Title 1"/>
+          <p:cNvSpPr>
+            <a:spLocks noGrp="1"/>
+          </p:cNvSpPr>
+          <p:nvPr>
+            <p:ph type="title"/>
+          </p:nvPr>
+        </p:nvSpPr>
+        <p:spPr/>
+        <p:txBody>
+          <a:bodyPr/>
+          <a:lstStyle/>
+          <a:p>
+            <a:pPr lvl="0" marL="0" indent="0">
+              <a:buNone/>
+            </a:pPr>
+            <a:r>
+              <a:rPr/>
               <a:t>Don’t</a:t>
             </a:r>
             <a:r>
@@ -18764,7 +18840,7 @@
       </p:sp>
       <p:pic>
         <p:nvPicPr>
-          <p:cNvPr descr="../images/02/alternate-white-and-black.png" id="0" name="Picture 1"/>
+          <p:cNvPr descr="../images/alternate-white-and-black.png" id="0" name="Picture 1"/>
           <p:cNvPicPr>
             <a:picLocks noGrp="1" noChangeAspect="1"/>
           </p:cNvPicPr>
@@ -18891,7 +18967,7 @@
 </p:sld>
 </file>
 
-<file path=ppt/slides/slide39.xml><?xml version="1.0" encoding="utf-8"?>
+<file path=ppt/slides/slide4.xml><?xml version="1.0" encoding="utf-8"?>
 <p:sld xmlns:a="http://schemas.openxmlformats.org/drawingml/2006/main" xmlns:r="http://schemas.openxmlformats.org/officeDocument/2006/relationships" xmlns:p="http://schemas.openxmlformats.org/presentationml/2006/main">
   <p:cSld>
     <p:spTree>
@@ -18928,6 +19004,119 @@
             </a:pPr>
             <a:r>
               <a:rPr/>
+              <a:t>To</a:t>
+            </a:r>
+            <a:r>
+              <a:rPr/>
+              <a:t> </a:t>
+            </a:r>
+            <a:r>
+              <a:rPr/>
+              <a:t>prepare</a:t>
+            </a:r>
+            <a:r>
+              <a:rPr/>
+              <a:t> </a:t>
+            </a:r>
+            <a:r>
+              <a:rPr/>
+              <a:t>for</a:t>
+            </a:r>
+            <a:r>
+              <a:rPr/>
+              <a:t> </a:t>
+            </a:r>
+            <a:r>
+              <a:rPr/>
+              <a:t>this</a:t>
+            </a:r>
+            <a:r>
+              <a:rPr/>
+              <a:t> </a:t>
+            </a:r>
+            <a:r>
+              <a:rPr/>
+              <a:t>section</a:t>
+            </a:r>
+          </a:p>
+        </p:txBody>
+      </p:sp>
+      <p:sp>
+        <p:nvSpPr>
+          <p:cNvPr id="3" name="Content Placeholder 2"/>
+          <p:cNvSpPr>
+            <a:spLocks noGrp="1"/>
+          </p:cNvSpPr>
+          <p:nvPr>
+            <p:ph idx="1"/>
+          </p:nvPr>
+        </p:nvSpPr>
+        <p:spPr/>
+        <p:txBody>
+          <a:bodyPr/>
+          <a:lstStyle/>
+          <a:p>
+            <a:pPr lvl="0" marL="0" indent="0">
+              <a:buNone/>
+            </a:pPr>
+            <a:r>
+              <a:rPr/>
+              <a:t>Download the scotus_cases.csv data set, or go to the original source, the Kaggle datasets repository.</a:t>
+            </a:r>
+          </a:p>
+          <a:p>
+            <a:pPr lvl="0" marL="0" indent="0">
+              <a:buNone/>
+            </a:pPr>
+            <a:r>
+              <a:rPr/>
+              <a:t>Import the data and create a bar chart showing the frequency of opinions written by year_filed. Note that there are a few typos and a few rows that do not belong. You can remove these, but they will not affect any of the analyses we are considering.</a:t>
+            </a:r>
+          </a:p>
+        </p:txBody>
+      </p:sp>
+    </p:spTree>
+  </p:cSld>
+</p:sld>
+</file>
+
+<file path=ppt/slides/slide40.xml><?xml version="1.0" encoding="utf-8"?>
+<p:sld xmlns:a="http://schemas.openxmlformats.org/drawingml/2006/main" xmlns:r="http://schemas.openxmlformats.org/officeDocument/2006/relationships" xmlns:p="http://schemas.openxmlformats.org/presentationml/2006/main">
+  <p:cSld>
+    <p:spTree>
+      <p:nvGrpSpPr>
+        <p:cNvPr id="1" name=""/>
+        <p:cNvGrpSpPr/>
+        <p:nvPr/>
+      </p:nvGrpSpPr>
+      <p:grpSpPr>
+        <a:xfrm>
+          <a:off x="0" y="0"/>
+          <a:ext cx="0" cy="0"/>
+          <a:chOff x="0" y="0"/>
+          <a:chExt cx="0" cy="0"/>
+        </a:xfrm>
+      </p:grpSpPr>
+      <p:sp>
+        <p:nvSpPr>
+          <p:cNvPr id="2" name="Title 1"/>
+          <p:cNvSpPr>
+            <a:spLocks noGrp="1"/>
+          </p:cNvSpPr>
+          <p:nvPr>
+            <p:ph type="title"/>
+          </p:nvPr>
+        </p:nvSpPr>
+        <p:spPr/>
+        <p:txBody>
+          <a:bodyPr/>
+          <a:lstStyle/>
+          <a:p>
+            <a:pPr lvl="0" marL="0" indent="0">
+              <a:buNone/>
+            </a:pPr>
+            <a:r>
+              <a:rPr/>
               <a:t>Optical</a:t>
             </a:r>
             <a:r>
@@ -18943,7 +19132,7 @@
       </p:sp>
       <p:pic>
         <p:nvPicPr>
-          <p:cNvPr descr="../images/02/optical-illusion-bars.png" id="0" name="Picture 1"/>
+          <p:cNvPr descr="../images/optical-illusion-bars.png" id="0" name="Picture 1"/>
           <p:cNvPicPr>
             <a:picLocks noGrp="1" noChangeAspect="1"/>
           </p:cNvPicPr>
@@ -19054,7 +19243,7 @@
 </p:sld>
 </file>
 
-<file path=ppt/slides/slide4.xml><?xml version="1.0" encoding="utf-8"?>
+<file path=ppt/slides/slide41.xml><?xml version="1.0" encoding="utf-8"?>
 <p:sld xmlns:a="http://schemas.openxmlformats.org/drawingml/2006/main" xmlns:r="http://schemas.openxmlformats.org/officeDocument/2006/relationships" xmlns:p="http://schemas.openxmlformats.org/presentationml/2006/main">
   <p:cSld>
     <p:spTree>
@@ -19073,12 +19262,12 @@
       </p:grpSpPr>
       <p:sp>
         <p:nvSpPr>
-          <p:cNvPr id="2" name="Title 1"/>
+          <p:cNvPr id="3" name="Content Placeholder 2"/>
           <p:cNvSpPr>
             <a:spLocks noGrp="1"/>
           </p:cNvSpPr>
           <p:nvPr>
-            <p:ph type="title"/>
+            <p:ph idx="1"/>
           </p:nvPr>
         </p:nvSpPr>
         <p:spPr/>
@@ -19091,64 +19280,16 @@
             </a:pPr>
             <a:r>
               <a:rPr/>
-              <a:t>To</a:t>
-            </a:r>
-            <a:r>
-              <a:rPr/>
-              <a:t> </a:t>
-            </a:r>
-            <a:r>
-              <a:rPr/>
-              <a:t>prepare</a:t>
-            </a:r>
-            <a:r>
-              <a:rPr/>
-              <a:t> </a:t>
-            </a:r>
-            <a:r>
-              <a:rPr/>
-              <a:t>for</a:t>
-            </a:r>
-            <a:r>
-              <a:rPr/>
-              <a:t> </a:t>
-            </a:r>
-            <a:r>
-              <a:rPr/>
-              <a:t>this</a:t>
-            </a:r>
-            <a:r>
-              <a:rPr/>
-              <a:t> </a:t>
-            </a:r>
-            <a:r>
-              <a:rPr/>
-              <a:t>section</a:t>
-            </a:r>
-          </a:p>
-        </p:txBody>
-      </p:sp>
-      <p:sp>
-        <p:nvSpPr>
-          <p:cNvPr id="3" name="Content Placeholder 2"/>
-          <p:cNvSpPr>
-            <a:spLocks noGrp="1"/>
-          </p:cNvSpPr>
-          <p:nvPr>
-            <p:ph idx="1"/>
-          </p:nvPr>
-        </p:nvSpPr>
-        <p:spPr/>
-        <p:txBody>
-          <a:bodyPr/>
-          <a:lstStyle/>
+              <a:t>If the widths are the same and the bars are empty, then you can get a differnt problem. You might get confused as to what is the bar and what is the gap, as in this optical illusion.</a:t>
+            </a:r>
+          </a:p>
           <a:p>
             <a:pPr lvl="0" marL="0" indent="0">
               <a:buNone/>
             </a:pPr>
             <a:r>
               <a:rPr/>
-              <a:t>Download the scotus_cases.csv data set, or go to the original source, the Kaggle datasets repository.</a:t>
+              <a:t>As a general rule, the gap between bars should be about 10 to 20 percent of the width of the bars. Most visualization software has sensible defaults, but beware when you have a very large number of bars. There’s always a bit of rounding when you place pixels on a screen or on a page. Your software is trying to fill the available plotting area, so it may have to squeeze or stretch one gap or another. This unevenness can become noticeable when the gaps are only a few pixels wide.</a:t>
             </a:r>
           </a:p>
           <a:p>
@@ -19157,7 +19298,7 @@
             </a:pPr>
             <a:r>
               <a:rPr/>
-              <a:t>Import the data and create a bar chart showing the frequency of opinions written by year_filed. Note that there are a few typos and a few rows that do not belong. You can remove these, but they will not affect any of the analyses we are considering.</a:t>
+              <a:t>((Show an example of this using the scotus data))</a:t>
             </a:r>
           </a:p>
         </p:txBody>
@@ -19167,72 +19308,7 @@
 </p:sld>
 </file>
 
-<file path=ppt/slides/slide40.xml><?xml version="1.0" encoding="utf-8"?>
-<p:sld xmlns:a="http://schemas.openxmlformats.org/drawingml/2006/main" xmlns:r="http://schemas.openxmlformats.org/officeDocument/2006/relationships" xmlns:p="http://schemas.openxmlformats.org/presentationml/2006/main">
-  <p:cSld>
-    <p:spTree>
-      <p:nvGrpSpPr>
-        <p:cNvPr id="1" name=""/>
-        <p:cNvGrpSpPr/>
-        <p:nvPr/>
-      </p:nvGrpSpPr>
-      <p:grpSpPr>
-        <a:xfrm>
-          <a:off x="0" y="0"/>
-          <a:ext cx="0" cy="0"/>
-          <a:chOff x="0" y="0"/>
-          <a:chExt cx="0" cy="0"/>
-        </a:xfrm>
-      </p:grpSpPr>
-      <p:sp>
-        <p:nvSpPr>
-          <p:cNvPr id="3" name="Content Placeholder 2"/>
-          <p:cNvSpPr>
-            <a:spLocks noGrp="1"/>
-          </p:cNvSpPr>
-          <p:nvPr>
-            <p:ph idx="1"/>
-          </p:nvPr>
-        </p:nvSpPr>
-        <p:spPr/>
-        <p:txBody>
-          <a:bodyPr/>
-          <a:lstStyle/>
-          <a:p>
-            <a:pPr lvl="0" marL="0" indent="0">
-              <a:buNone/>
-            </a:pPr>
-            <a:r>
-              <a:rPr/>
-              <a:t>If the widths are the same and the bars are empty, then you can get a differnt problem. You might get confused as to what is the bar and what is the gap, as in this optical illusion.</a:t>
-            </a:r>
-          </a:p>
-          <a:p>
-            <a:pPr lvl="0" marL="0" indent="0">
-              <a:buNone/>
-            </a:pPr>
-            <a:r>
-              <a:rPr/>
-              <a:t>As a general rule, the gap between bars should be about 10 to 20 percent of the width of the bars. Most visualization software has sensible defaults, but beware when you have a very large number of bars. There’s always a bit of rounding when you place pixels on a screen or on a page. Your software is trying to fill the available plotting area, so it may have to squeeze or stretch one gap or another. This unevenness can become noticeable when the gaps are only a few pixels wide.</a:t>
-            </a:r>
-          </a:p>
-          <a:p>
-            <a:pPr lvl="0" marL="0" indent="0">
-              <a:buNone/>
-            </a:pPr>
-            <a:r>
-              <a:rPr/>
-              <a:t>((Show an example of this using the scotus data))</a:t>
-            </a:r>
-          </a:p>
-        </p:txBody>
-      </p:sp>
-    </p:spTree>
-  </p:cSld>
-</p:sld>
-</file>
-
-<file path=ppt/slides/slide41.xml><?xml version="1.0" encoding="utf-8"?>
+<file path=ppt/slides/slide42.xml><?xml version="1.0" encoding="utf-8"?>
 <p:sld xmlns:a="http://schemas.openxmlformats.org/drawingml/2006/main" xmlns:r="http://schemas.openxmlformats.org/officeDocument/2006/relationships" xmlns:p="http://schemas.openxmlformats.org/presentationml/2006/main">
   <p:cSld>
     <p:spTree>
@@ -19309,92 +19385,6 @@
 </p:sld>
 </file>
 
-<file path=ppt/slides/slide42.xml><?xml version="1.0" encoding="utf-8"?>
-<p:sld xmlns:a="http://schemas.openxmlformats.org/drawingml/2006/main" xmlns:r="http://schemas.openxmlformats.org/officeDocument/2006/relationships" xmlns:p="http://schemas.openxmlformats.org/presentationml/2006/main">
-  <p:cSld>
-    <p:spTree>
-      <p:nvGrpSpPr>
-        <p:cNvPr id="1" name=""/>
-        <p:cNvGrpSpPr/>
-        <p:nvPr/>
-      </p:nvGrpSpPr>
-      <p:grpSpPr>
-        <a:xfrm>
-          <a:off x="0" y="0"/>
-          <a:ext cx="0" cy="0"/>
-          <a:chOff x="0" y="0"/>
-          <a:chExt cx="0" cy="0"/>
-        </a:xfrm>
-      </p:grpSpPr>
-      <p:sp>
-        <p:nvSpPr>
-          <p:cNvPr id="2" name="Title 1"/>
-          <p:cNvSpPr>
-            <a:spLocks noGrp="1"/>
-          </p:cNvSpPr>
-          <p:nvPr>
-            <p:ph type="title"/>
-          </p:nvPr>
-        </p:nvSpPr>
-        <p:spPr/>
-        <p:txBody>
-          <a:bodyPr/>
-          <a:lstStyle/>
-          <a:p>
-            <a:pPr lvl="0" marL="0" indent="0">
-              <a:buNone/>
-            </a:pPr>
-            <a:r>
-              <a:rPr/>
-              <a:t>On</a:t>
-            </a:r>
-            <a:r>
-              <a:rPr/>
-              <a:t> </a:t>
-            </a:r>
-            <a:r>
-              <a:rPr/>
-              <a:t>your</a:t>
-            </a:r>
-            <a:r>
-              <a:rPr/>
-              <a:t> </a:t>
-            </a:r>
-            <a:r>
-              <a:rPr/>
-              <a:t>own</a:t>
-            </a:r>
-          </a:p>
-        </p:txBody>
-      </p:sp>
-      <p:sp>
-        <p:nvSpPr>
-          <p:cNvPr id="3" name="Content Placeholder 2"/>
-          <p:cNvSpPr>
-            <a:spLocks noGrp="1"/>
-          </p:cNvSpPr>
-          <p:nvPr>
-            <p:ph idx="1"/>
-          </p:nvPr>
-        </p:nvSpPr>
-        <p:spPr/>
-        <p:txBody>
-          <a:bodyPr/>
-          <a:lstStyle/>
-          <a:p>
-            <a:pPr lvl="1"/>
-            <a:r>
-              <a:rPr/>
-              <a:t>Make the first class bar red to show Leonardo di Caprio’s perspective on the Titanic.</a:t>
-            </a:r>
-          </a:p>
-        </p:txBody>
-      </p:sp>
-    </p:spTree>
-  </p:cSld>
-</p:sld>
-</file>
-
 <file path=ppt/slides/slide43.xml><?xml version="1.0" encoding="utf-8"?>
 <p:sld xmlns:a="http://schemas.openxmlformats.org/drawingml/2006/main" xmlns:r="http://schemas.openxmlformats.org/officeDocument/2006/relationships" xmlns:p="http://schemas.openxmlformats.org/presentationml/2006/main">
   <p:cSld>
@@ -19432,23 +19422,23 @@
             </a:pPr>
             <a:r>
               <a:rPr/>
-              <a:t>Wait</a:t>
-            </a:r>
-            <a:r>
-              <a:rPr/>
-              <a:t> </a:t>
-            </a:r>
-            <a:r>
-              <a:rPr/>
-              <a:t>before</a:t>
-            </a:r>
-            <a:r>
-              <a:rPr/>
-              <a:t> </a:t>
-            </a:r>
-            <a:r>
-              <a:rPr/>
-              <a:t>showing</a:t>
+              <a:t>On</a:t>
+            </a:r>
+            <a:r>
+              <a:rPr/>
+              <a:t> </a:t>
+            </a:r>
+            <a:r>
+              <a:rPr/>
+              <a:t>your</a:t>
+            </a:r>
+            <a:r>
+              <a:rPr/>
+              <a:t> </a:t>
+            </a:r>
+            <a:r>
+              <a:rPr/>
+              <a:t>own</a:t>
             </a:r>
           </a:p>
         </p:txBody>
@@ -19468,30 +19458,10 @@
           <a:bodyPr/>
           <a:lstStyle/>
           <a:p>
-            <a:pPr lvl="0" marL="0" indent="0">
-              <a:buNone/>
-            </a:pPr>
-            <a:r>
-              <a:rPr/>
-              <a:t>((Python code))</a:t>
-            </a:r>
-          </a:p>
-          <a:p>
-            <a:pPr lvl="0" marL="0" indent="0">
-              <a:buNone/>
-            </a:pPr>
-            <a:r>
-              <a:rPr/>
-              <a:t>((R code))</a:t>
-            </a:r>
-          </a:p>
-          <a:p>
-            <a:pPr lvl="0" marL="0" indent="0">
-              <a:buNone/>
-            </a:pPr>
-            <a:r>
-              <a:rPr/>
-              <a:t>((Tableau steps))</a:t>
+            <a:pPr lvl="1"/>
+            <a:r>
+              <a:rPr/>
+              <a:t>Make the first class bar red to show Leonardo di Caprio’s perspective on the Titanic.</a:t>
             </a:r>
           </a:p>
         </p:txBody>
@@ -19538,47 +19508,23 @@
             </a:pPr>
             <a:r>
               <a:rPr/>
-              <a:t>What</a:t>
-            </a:r>
-            <a:r>
-              <a:rPr/>
-              <a:t> </a:t>
-            </a:r>
-            <a:r>
-              <a:rPr/>
-              <a:t>your</a:t>
-            </a:r>
-            <a:r>
-              <a:rPr/>
-              <a:t> </a:t>
-            </a:r>
-            <a:r>
-              <a:rPr/>
-              <a:t>visualization</a:t>
-            </a:r>
-            <a:r>
-              <a:rPr/>
-              <a:t> </a:t>
-            </a:r>
-            <a:r>
-              <a:rPr/>
-              <a:t>might</a:t>
-            </a:r>
-            <a:r>
-              <a:rPr/>
-              <a:t> </a:t>
-            </a:r>
-            <a:r>
-              <a:rPr/>
-              <a:t>look</a:t>
-            </a:r>
-            <a:r>
-              <a:rPr/>
-              <a:t> </a:t>
-            </a:r>
-            <a:r>
-              <a:rPr/>
-              <a:t>like</a:t>
+              <a:t>Wait</a:t>
+            </a:r>
+            <a:r>
+              <a:rPr/>
+              <a:t> </a:t>
+            </a:r>
+            <a:r>
+              <a:rPr/>
+              <a:t>before</a:t>
+            </a:r>
+            <a:r>
+              <a:rPr/>
+              <a:t> </a:t>
+            </a:r>
+            <a:r>
+              <a:rPr/>
+              <a:t>showing</a:t>
             </a:r>
           </a:p>
         </p:txBody>
@@ -19603,7 +19549,25 @@
             </a:pPr>
             <a:r>
               <a:rPr/>
-              <a:t>((Show visualization))</a:t>
+              <a:t>((Python code))</a:t>
+            </a:r>
+          </a:p>
+          <a:p>
+            <a:pPr lvl="0" marL="0" indent="0">
+              <a:buNone/>
+            </a:pPr>
+            <a:r>
+              <a:rPr/>
+              <a:t>((R code))</a:t>
+            </a:r>
+          </a:p>
+          <a:p>
+            <a:pPr lvl="0" marL="0" indent="0">
+              <a:buNone/>
+            </a:pPr>
+            <a:r>
+              <a:rPr/>
+              <a:t>((Tableau steps))</a:t>
             </a:r>
           </a:p>
         </p:txBody>
@@ -19650,7 +19614,47 @@
             </a:pPr>
             <a:r>
               <a:rPr/>
-              <a:t>Color</a:t>
+              <a:t>What</a:t>
+            </a:r>
+            <a:r>
+              <a:rPr/>
+              <a:t> </a:t>
+            </a:r>
+            <a:r>
+              <a:rPr/>
+              <a:t>your</a:t>
+            </a:r>
+            <a:r>
+              <a:rPr/>
+              <a:t> </a:t>
+            </a:r>
+            <a:r>
+              <a:rPr/>
+              <a:t>visualization</a:t>
+            </a:r>
+            <a:r>
+              <a:rPr/>
+              <a:t> </a:t>
+            </a:r>
+            <a:r>
+              <a:rPr/>
+              <a:t>might</a:t>
+            </a:r>
+            <a:r>
+              <a:rPr/>
+              <a:t> </a:t>
+            </a:r>
+            <a:r>
+              <a:rPr/>
+              <a:t>look</a:t>
+            </a:r>
+            <a:r>
+              <a:rPr/>
+              <a:t> </a:t>
+            </a:r>
+            <a:r>
+              <a:rPr/>
+              <a:t>like</a:t>
             </a:r>
           </a:p>
         </p:txBody>
@@ -19670,17 +19674,12 @@
           <a:bodyPr/>
           <a:lstStyle/>
           <a:p>
-            <a:pPr lvl="1"/>
-            <a:r>
-              <a:rPr/>
-              <a:t>Use for emphasis in simple bar charts</a:t>
-            </a:r>
-          </a:p>
-          <a:p>
-            <a:pPr lvl="1"/>
-            <a:r>
-              <a:rPr/>
-              <a:t>Very important for stacked or side-by-side bar charts</a:t>
+            <a:pPr lvl="0" marL="0" indent="0">
+              <a:buNone/>
+            </a:pPr>
+            <a:r>
+              <a:rPr/>
+              <a:t>((Show visualization))</a:t>
             </a:r>
           </a:p>
         </p:txBody>
@@ -19727,23 +19726,7 @@
             </a:pPr>
             <a:r>
               <a:rPr/>
-              <a:t>On</a:t>
-            </a:r>
-            <a:r>
-              <a:rPr/>
-              <a:t> </a:t>
-            </a:r>
-            <a:r>
-              <a:rPr/>
-              <a:t>your</a:t>
-            </a:r>
-            <a:r>
-              <a:rPr/>
-              <a:t> </a:t>
-            </a:r>
-            <a:r>
-              <a:rPr/>
-              <a:t>own</a:t>
+              <a:t>Color</a:t>
             </a:r>
           </a:p>
         </p:txBody>
@@ -19766,7 +19749,14 @@
             <a:pPr lvl="1"/>
             <a:r>
               <a:rPr/>
-              <a:t>Revise this visualization so the first class bar is red.</a:t>
+              <a:t>Use for emphasis in simple bar charts</a:t>
+            </a:r>
+          </a:p>
+          <a:p>
+            <a:pPr lvl="1"/>
+            <a:r>
+              <a:rPr/>
+              <a:t>Very important for stacked or side-by-side bar charts</a:t>
             </a:r>
           </a:p>
         </p:txBody>
@@ -19813,23 +19803,23 @@
             </a:pPr>
             <a:r>
               <a:rPr/>
-              <a:t>Wait</a:t>
-            </a:r>
-            <a:r>
-              <a:rPr/>
-              <a:t> </a:t>
-            </a:r>
-            <a:r>
-              <a:rPr/>
-              <a:t>before</a:t>
-            </a:r>
-            <a:r>
-              <a:rPr/>
-              <a:t> </a:t>
-            </a:r>
-            <a:r>
-              <a:rPr/>
-              <a:t>showing</a:t>
+              <a:t>On</a:t>
+            </a:r>
+            <a:r>
+              <a:rPr/>
+              <a:t> </a:t>
+            </a:r>
+            <a:r>
+              <a:rPr/>
+              <a:t>your</a:t>
+            </a:r>
+            <a:r>
+              <a:rPr/>
+              <a:t> </a:t>
+            </a:r>
+            <a:r>
+              <a:rPr/>
+              <a:t>own</a:t>
             </a:r>
           </a:p>
         </p:txBody>
@@ -19849,30 +19839,10 @@
           <a:bodyPr/>
           <a:lstStyle/>
           <a:p>
-            <a:pPr lvl="0" marL="0" indent="0">
-              <a:buNone/>
-            </a:pPr>
-            <a:r>
-              <a:rPr/>
-              <a:t>((Python code))</a:t>
-            </a:r>
-          </a:p>
-          <a:p>
-            <a:pPr lvl="0" marL="0" indent="0">
-              <a:buNone/>
-            </a:pPr>
-            <a:r>
-              <a:rPr/>
-              <a:t>((R code))</a:t>
-            </a:r>
-          </a:p>
-          <a:p>
-            <a:pPr lvl="0" marL="0" indent="0">
-              <a:buNone/>
-            </a:pPr>
-            <a:r>
-              <a:rPr/>
-              <a:t>((Tableau steps))</a:t>
+            <a:pPr lvl="1"/>
+            <a:r>
+              <a:rPr/>
+              <a:t>Revise this visualization so the first class bar is red.</a:t>
             </a:r>
           </a:p>
         </p:txBody>
@@ -19919,47 +19889,23 @@
             </a:pPr>
             <a:r>
               <a:rPr/>
-              <a:t>What</a:t>
-            </a:r>
-            <a:r>
-              <a:rPr/>
-              <a:t> </a:t>
-            </a:r>
-            <a:r>
-              <a:rPr/>
-              <a:t>your</a:t>
-            </a:r>
-            <a:r>
-              <a:rPr/>
-              <a:t> </a:t>
-            </a:r>
-            <a:r>
-              <a:rPr/>
-              <a:t>visualization</a:t>
-            </a:r>
-            <a:r>
-              <a:rPr/>
-              <a:t> </a:t>
-            </a:r>
-            <a:r>
-              <a:rPr/>
-              <a:t>might</a:t>
-            </a:r>
-            <a:r>
-              <a:rPr/>
-              <a:t> </a:t>
-            </a:r>
-            <a:r>
-              <a:rPr/>
-              <a:t>look</a:t>
-            </a:r>
-            <a:r>
-              <a:rPr/>
-              <a:t> </a:t>
-            </a:r>
-            <a:r>
-              <a:rPr/>
-              <a:t>like</a:t>
+              <a:t>Wait</a:t>
+            </a:r>
+            <a:r>
+              <a:rPr/>
+              <a:t> </a:t>
+            </a:r>
+            <a:r>
+              <a:rPr/>
+              <a:t>before</a:t>
+            </a:r>
+            <a:r>
+              <a:rPr/>
+              <a:t> </a:t>
+            </a:r>
+            <a:r>
+              <a:rPr/>
+              <a:t>showing</a:t>
             </a:r>
           </a:p>
         </p:txBody>
@@ -19984,7 +19930,25 @@
             </a:pPr>
             <a:r>
               <a:rPr/>
-              <a:t>((Show visualization))</a:t>
+              <a:t>((Python code))</a:t>
+            </a:r>
+          </a:p>
+          <a:p>
+            <a:pPr lvl="0" marL="0" indent="0">
+              <a:buNone/>
+            </a:pPr>
+            <a:r>
+              <a:rPr/>
+              <a:t>((R code))</a:t>
+            </a:r>
+          </a:p>
+          <a:p>
+            <a:pPr lvl="0" marL="0" indent="0">
+              <a:buNone/>
+            </a:pPr>
+            <a:r>
+              <a:rPr/>
+              <a:t>((Tableau steps))</a:t>
             </a:r>
           </a:p>
         </p:txBody>
@@ -20031,23 +19995,47 @@
             </a:pPr>
             <a:r>
               <a:rPr/>
-              <a:t>Stack</a:t>
-            </a:r>
-            <a:r>
-              <a:rPr/>
-              <a:t> </a:t>
-            </a:r>
-            <a:r>
-              <a:rPr/>
-              <a:t>versus</a:t>
-            </a:r>
-            <a:r>
-              <a:rPr/>
-              <a:t> </a:t>
-            </a:r>
-            <a:r>
-              <a:rPr/>
-              <a:t>dodge</a:t>
+              <a:t>What</a:t>
+            </a:r>
+            <a:r>
+              <a:rPr/>
+              <a:t> </a:t>
+            </a:r>
+            <a:r>
+              <a:rPr/>
+              <a:t>your</a:t>
+            </a:r>
+            <a:r>
+              <a:rPr/>
+              <a:t> </a:t>
+            </a:r>
+            <a:r>
+              <a:rPr/>
+              <a:t>visualization</a:t>
+            </a:r>
+            <a:r>
+              <a:rPr/>
+              <a:t> </a:t>
+            </a:r>
+            <a:r>
+              <a:rPr/>
+              <a:t>might</a:t>
+            </a:r>
+            <a:r>
+              <a:rPr/>
+              <a:t> </a:t>
+            </a:r>
+            <a:r>
+              <a:rPr/>
+              <a:t>look</a:t>
+            </a:r>
+            <a:r>
+              <a:rPr/>
+              <a:t> </a:t>
+            </a:r>
+            <a:r>
+              <a:rPr/>
+              <a:t>like</a:t>
             </a:r>
           </a:p>
         </p:txBody>
@@ -20067,52 +20055,12 @@
           <a:bodyPr/>
           <a:lstStyle/>
           <a:p>
-            <a:pPr lvl="1"/>
-            <a:r>
-              <a:rPr/>
-              <a:t>Summarize by two categories</a:t>
-            </a:r>
-          </a:p>
-          <a:p>
-            <a:pPr lvl="1"/>
-            <a:r>
-              <a:rPr/>
-              <a:t>Facet</a:t>
-            </a:r>
-          </a:p>
-          <a:p>
-            <a:pPr lvl="2"/>
-            <a:r>
-              <a:rPr/>
-              <a:t>Separate plots</a:t>
-            </a:r>
-          </a:p>
-          <a:p>
-            <a:pPr lvl="1"/>
-            <a:r>
-              <a:rPr/>
-              <a:t>Dodge</a:t>
-            </a:r>
-          </a:p>
-          <a:p>
-            <a:pPr lvl="2"/>
-            <a:r>
-              <a:rPr/>
-              <a:t>Side by side</a:t>
-            </a:r>
-          </a:p>
-          <a:p>
-            <a:pPr lvl="1"/>
-            <a:r>
-              <a:rPr/>
-              <a:t>Stack</a:t>
-            </a:r>
-          </a:p>
-          <a:p>
-            <a:pPr lvl="2"/>
-            <a:r>
-              <a:rPr/>
-              <a:t>One on top, one on bottom</a:t>
+            <a:pPr lvl="0" marL="0" indent="0">
+              <a:buNone/>
+            </a:pPr>
+            <a:r>
+              <a:rPr/>
+              <a:t>((Show visualization))</a:t>
             </a:r>
           </a:p>
         </p:txBody>
@@ -20263,73 +20211,92 @@
             </a:pPr>
             <a:r>
               <a:rPr/>
-              <a:t>Titanic</a:t>
-            </a:r>
-            <a:r>
-              <a:rPr/>
-              <a:t> </a:t>
-            </a:r>
-            <a:r>
-              <a:rPr/>
-              <a:t>passenger</a:t>
-            </a:r>
-            <a:r>
-              <a:rPr/>
-              <a:t> </a:t>
-            </a:r>
-            <a:r>
-              <a:rPr/>
-              <a:t>count</a:t>
-            </a:r>
-            <a:r>
-              <a:rPr/>
-              <a:t> </a:t>
-            </a:r>
-            <a:r>
-              <a:rPr/>
-              <a:t>by</a:t>
-            </a:r>
-            <a:r>
-              <a:rPr/>
-              <a:t> </a:t>
-            </a:r>
-            <a:r>
-              <a:rPr/>
-              <a:t>gender</a:t>
+              <a:t>Stack</a:t>
+            </a:r>
+            <a:r>
+              <a:rPr/>
+              <a:t> </a:t>
+            </a:r>
+            <a:r>
+              <a:rPr/>
+              <a:t>versus</a:t>
+            </a:r>
+            <a:r>
+              <a:rPr/>
+              <a:t> </a:t>
+            </a:r>
+            <a:r>
+              <a:rPr/>
+              <a:t>dodge</a:t>
             </a:r>
           </a:p>
         </p:txBody>
       </p:sp>
-      <p:pic>
-        <p:nvPicPr>
-          <p:cNvPr descr="data-visualization-02-bars_files/figure-pptx/count-by-gender-1.png" id="0" name="Picture 1"/>
-          <p:cNvPicPr>
-            <a:picLocks noGrp="1" noChangeAspect="1"/>
-          </p:cNvPicPr>
-          <p:nvPr/>
-        </p:nvPicPr>
-        <p:blipFill>
-          <a:blip r:embed="rId2"/>
-          <a:stretch>
-            <a:fillRect/>
-          </a:stretch>
-        </p:blipFill>
-        <p:spPr bwMode="auto">
-          <a:xfrm>
-            <a:off x="1752600" y="1600200"/>
-            <a:ext cx="5651500" cy="4521200"/>
-          </a:xfrm>
-          <a:prstGeom prst="rect">
-            <a:avLst/>
-          </a:prstGeom>
-          <a:noFill/>
-          <a:ln w="9525">
-            <a:noFill/>
-            <a:headEnd/>
-            <a:tailEnd/>
-          </a:ln>
-        </p:spPr>
-      </p:pic>
+      <p:sp>
+        <p:nvSpPr>
+          <p:cNvPr id="3" name="Content Placeholder 2"/>
+          <p:cNvSpPr>
+            <a:spLocks noGrp="1"/>
+          </p:cNvSpPr>
+          <p:nvPr>
+            <p:ph idx="1"/>
+          </p:nvPr>
+        </p:nvSpPr>
+        <p:spPr/>
+        <p:txBody>
+          <a:bodyPr/>
+          <a:lstStyle/>
+          <a:p>
+            <a:pPr lvl="1"/>
+            <a:r>
+              <a:rPr/>
+              <a:t>Summarize by two categories</a:t>
+            </a:r>
+          </a:p>
+          <a:p>
+            <a:pPr lvl="1"/>
+            <a:r>
+              <a:rPr/>
+              <a:t>Facet</a:t>
+            </a:r>
+          </a:p>
+          <a:p>
+            <a:pPr lvl="2"/>
+            <a:r>
+              <a:rPr/>
+              <a:t>Separate plots</a:t>
+            </a:r>
+          </a:p>
+          <a:p>
+            <a:pPr lvl="1"/>
+            <a:r>
+              <a:rPr/>
+              <a:t>Dodge</a:t>
+            </a:r>
+          </a:p>
+          <a:p>
+            <a:pPr lvl="2"/>
+            <a:r>
+              <a:rPr/>
+              <a:t>Side by side</a:t>
+            </a:r>
+          </a:p>
+          <a:p>
+            <a:pPr lvl="1"/>
+            <a:r>
+              <a:rPr/>
+              <a:t>Stack</a:t>
+            </a:r>
+          </a:p>
+          <a:p>
+            <a:pPr lvl="2"/>
+            <a:r>
+              <a:rPr/>
+              <a:t>One on top, one on bottom</a:t>
+            </a:r>
+          </a:p>
+        </p:txBody>
+      </p:sp>
     </p:spTree>
   </p:cSld>
 </p:sld>
@@ -20404,22 +20371,14 @@
             </a:r>
             <a:r>
               <a:rPr/>
-              <a:t>passenger</a:t>
-            </a:r>
-            <a:r>
-              <a:rPr/>
-              <a:t> </a:t>
-            </a:r>
-            <a:r>
-              <a:rPr/>
-              <a:t>class</a:t>
+              <a:t>gender</a:t>
             </a:r>
           </a:p>
         </p:txBody>
       </p:sp>
       <p:pic>
         <p:nvPicPr>
-          <p:cNvPr descr="data-visualization-02-bars_files/figure-pptx/count-by-passenger-class-1.png" id="0" name="Picture 1"/>
+          <p:cNvPr descr="data-visualization-02-bars_files/figure-pptx/count-by-gender-1.png" id="0" name="Picture 1"/>
           <p:cNvPicPr>
             <a:picLocks noGrp="1" noChangeAspect="1"/>
           </p:cNvPicPr>
@@ -20497,14 +20456,46 @@
             </a:r>
             <a:r>
               <a:rPr/>
-              <a:t>facet</a:t>
+              <a:t>passenger</a:t>
+            </a:r>
+            <a:r>
+              <a:rPr/>
+              <a:t> </a:t>
+            </a:r>
+            <a:r>
+              <a:rPr/>
+              <a:t>count</a:t>
+            </a:r>
+            <a:r>
+              <a:rPr/>
+              <a:t> </a:t>
+            </a:r>
+            <a:r>
+              <a:rPr/>
+              <a:t>by</a:t>
+            </a:r>
+            <a:r>
+              <a:rPr/>
+              <a:t> </a:t>
+            </a:r>
+            <a:r>
+              <a:rPr/>
+              <a:t>passenger</a:t>
+            </a:r>
+            <a:r>
+              <a:rPr/>
+              <a:t> </a:t>
+            </a:r>
+            <a:r>
+              <a:rPr/>
+              <a:t>class</a:t>
             </a:r>
           </a:p>
         </p:txBody>
       </p:sp>
       <p:pic>
         <p:nvPicPr>
-          <p:cNvPr descr="data-visualization-02-bars_files/figure-pptx/count-by-facet-1.png" id="0" name="Picture 1"/>
+          <p:cNvPr descr="data-visualization-02-bars_files/figure-pptx/count-by-passenger-class-1.png" id="0" name="Picture 1"/>
           <p:cNvPicPr>
             <a:picLocks noGrp="1" noChangeAspect="1"/>
           </p:cNvPicPr>
@@ -20582,14 +20573,14 @@
             </a:r>
             <a:r>
               <a:rPr/>
-              <a:t>dodge</a:t>
+              <a:t>facet</a:t>
             </a:r>
           </a:p>
         </p:txBody>
       </p:sp>
       <p:pic>
         <p:nvPicPr>
-          <p:cNvPr descr="data-visualization-02-bars_files/figure-pptx/count-by-dodge-1.png" id="0" name="Picture 1"/>
+          <p:cNvPr descr="data-visualization-02-bars_files/figure-pptx/count-by-facet-1.png" id="0" name="Picture 1"/>
           <p:cNvPicPr>
             <a:picLocks noGrp="1" noChangeAspect="1"/>
           </p:cNvPicPr>
@@ -20667,14 +20658,14 @@
             </a:r>
             <a:r>
               <a:rPr/>
-              <a:t>stack</a:t>
+              <a:t>dodge</a:t>
             </a:r>
           </a:p>
         </p:txBody>
       </p:sp>
       <p:pic>
         <p:nvPicPr>
-          <p:cNvPr descr="data-visualization-02-bars_files/figure-pptx/count-by-stack-1.png" id="0" name="Picture 1"/>
+          <p:cNvPr descr="data-visualization-02-bars_files/figure-pptx/count-by-dodge-1.png" id="0" name="Picture 1"/>
           <p:cNvPicPr>
             <a:picLocks noGrp="1" noChangeAspect="1"/>
           </p:cNvPicPr>
@@ -20744,275 +20735,22 @@
             </a:pPr>
             <a:r>
               <a:rPr/>
-              <a:t>On</a:t>
-            </a:r>
-            <a:r>
-              <a:rPr/>
-              <a:t> </a:t>
-            </a:r>
-            <a:r>
-              <a:rPr/>
-              <a:t>your</a:t>
-            </a:r>
-            <a:r>
-              <a:rPr/>
-              <a:t> </a:t>
-            </a:r>
-            <a:r>
-              <a:rPr/>
-              <a:t>own</a:t>
-            </a:r>
-          </a:p>
-        </p:txBody>
-      </p:sp>
-      <p:sp>
-        <p:nvSpPr>
-          <p:cNvPr id="3" name="Content Placeholder 2"/>
-          <p:cNvSpPr>
-            <a:spLocks noGrp="1"/>
-          </p:cNvSpPr>
-          <p:nvPr>
-            <p:ph idx="1"/>
-          </p:nvPr>
-        </p:nvSpPr>
-        <p:spPr/>
-        <p:txBody>
-          <a:bodyPr/>
-          <a:lstStyle/>
-          <a:p>
-            <a:pPr lvl="1"/>
-            <a:r>
-              <a:rPr/>
-              <a:t>Draw a bar chart showing counts involving both mortality and gender. Use a panel, then stacking, then dodging. Which do you like best?</a:t>
-            </a:r>
-          </a:p>
-        </p:txBody>
-      </p:sp>
-    </p:spTree>
-  </p:cSld>
-</p:sld>
-</file>
-
-<file path=ppt/slides/slide56.xml><?xml version="1.0" encoding="utf-8"?>
-<p:sld xmlns:a="http://schemas.openxmlformats.org/drawingml/2006/main" xmlns:r="http://schemas.openxmlformats.org/officeDocument/2006/relationships" xmlns:p="http://schemas.openxmlformats.org/presentationml/2006/main">
-  <p:cSld>
-    <p:spTree>
-      <p:nvGrpSpPr>
-        <p:cNvPr id="1" name=""/>
-        <p:cNvGrpSpPr/>
-        <p:nvPr/>
-      </p:nvGrpSpPr>
-      <p:grpSpPr>
-        <a:xfrm>
-          <a:off x="0" y="0"/>
-          <a:ext cx="0" cy="0"/>
-          <a:chOff x="0" y="0"/>
-          <a:chExt cx="0" cy="0"/>
-        </a:xfrm>
-      </p:grpSpPr>
-      <p:sp>
-        <p:nvSpPr>
-          <p:cNvPr id="2" name="Title 1"/>
-          <p:cNvSpPr>
-            <a:spLocks noGrp="1"/>
-          </p:cNvSpPr>
-          <p:nvPr>
-            <p:ph type="title"/>
-          </p:nvPr>
-        </p:nvSpPr>
-        <p:spPr/>
-        <p:txBody>
-          <a:bodyPr/>
-          <a:lstStyle/>
-          <a:p>
-            <a:pPr lvl="0" marL="0" indent="0">
-              <a:buNone/>
-            </a:pPr>
-            <a:r>
-              <a:rPr/>
-              <a:t>Wait</a:t>
-            </a:r>
-            <a:r>
-              <a:rPr/>
-              <a:t> </a:t>
-            </a:r>
-            <a:r>
-              <a:rPr/>
-              <a:t>a</a:t>
-            </a:r>
-            <a:r>
-              <a:rPr/>
-              <a:t> </a:t>
-            </a:r>
-            <a:r>
-              <a:rPr/>
-              <a:t>bit</a:t>
-            </a:r>
-            <a:r>
-              <a:rPr/>
-              <a:t> </a:t>
-            </a:r>
-            <a:r>
-              <a:rPr/>
-              <a:t>before</a:t>
-            </a:r>
-            <a:r>
-              <a:rPr/>
-              <a:t> </a:t>
-            </a:r>
-            <a:r>
-              <a:rPr/>
-              <a:t>showing</a:t>
-            </a:r>
-            <a:r>
-              <a:rPr/>
-              <a:t> </a:t>
-            </a:r>
-            <a:r>
-              <a:rPr/>
-              <a:t>the</a:t>
-            </a:r>
-            <a:r>
-              <a:rPr/>
-              <a:t> </a:t>
-            </a:r>
-            <a:r>
-              <a:rPr/>
-              <a:t>code</a:t>
-            </a:r>
-          </a:p>
-        </p:txBody>
-      </p:sp>
-      <p:sp>
-        <p:nvSpPr>
-          <p:cNvPr id="3" name="Content Placeholder 2"/>
-          <p:cNvSpPr>
-            <a:spLocks noGrp="1"/>
-          </p:cNvSpPr>
-          <p:nvPr>
-            <p:ph idx="1"/>
-          </p:nvPr>
-        </p:nvSpPr>
-        <p:spPr/>
-        <p:txBody>
-          <a:bodyPr/>
-          <a:lstStyle/>
-          <a:p>
-            <a:pPr lvl="1"/>
-            <a:r>
-              <a:rPr/>
-              <a:t>Did you make the panel/stack/dodge Survived or did you make it Sex? Here’s some code, but yours might be different.</a:t>
-            </a:r>
-          </a:p>
-          <a:p>
-            <a:pPr lvl="0" marL="0" indent="0">
-              <a:buNone/>
-            </a:pPr>
-            <a:r>
-              <a:rPr/>
-              <a:t>((Show Python code))</a:t>
-            </a:r>
-          </a:p>
-          <a:p>
-            <a:pPr lvl="0" marL="0" indent="0">
-              <a:buNone/>
-            </a:pPr>
-            <a:r>
-              <a:rPr/>
-              <a:t>R code</a:t>
-            </a:r>
-          </a:p>
-          <a:p>
-            <a:pPr lvl="0" marL="1270000" indent="0">
-              <a:buNone/>
-            </a:pPr>
-            <a:r>
-              <a:rPr sz="1800">
-                <a:latin typeface="Courier"/>
-              </a:rPr>
-              <a:t>titanic %&gt;%
-  ggplot(aes(x=Sex, fill=Survived)) +
-    geom_bar() +
-    facet_grid(cols=vars(Survived))</a:t>
-            </a:r>
-          </a:p>
-          <a:p>
-            <a:pPr lvl="0" marL="0" indent="0">
-              <a:buNone/>
-            </a:pPr>
-            <a:r>
-              <a:rPr/>
-              <a:t>((Show Tableau))</a:t>
-            </a:r>
-          </a:p>
-        </p:txBody>
-      </p:sp>
-    </p:spTree>
-  </p:cSld>
-</p:sld>
-</file>
-
-<file path=ppt/slides/slide57.xml><?xml version="1.0" encoding="utf-8"?>
-<p:sld xmlns:a="http://schemas.openxmlformats.org/drawingml/2006/main" xmlns:r="http://schemas.openxmlformats.org/officeDocument/2006/relationships" xmlns:p="http://schemas.openxmlformats.org/presentationml/2006/main">
-  <p:cSld>
-    <p:spTree>
-      <p:nvGrpSpPr>
-        <p:cNvPr id="1" name=""/>
-        <p:cNvGrpSpPr/>
-        <p:nvPr/>
-      </p:nvGrpSpPr>
-      <p:grpSpPr>
-        <a:xfrm>
-          <a:off x="0" y="0"/>
-          <a:ext cx="0" cy="0"/>
-          <a:chOff x="0" y="0"/>
-          <a:chExt cx="0" cy="0"/>
-        </a:xfrm>
-      </p:grpSpPr>
-      <p:sp>
-        <p:nvSpPr>
-          <p:cNvPr id="2" name="Title 1"/>
-          <p:cNvSpPr>
-            <a:spLocks noGrp="1"/>
-          </p:cNvSpPr>
-          <p:nvPr>
-            <p:ph type="title"/>
-          </p:nvPr>
-        </p:nvSpPr>
-        <p:spPr/>
-        <p:txBody>
-          <a:bodyPr/>
-          <a:lstStyle/>
-          <a:p>
-            <a:pPr lvl="0" marL="0" indent="0">
-              <a:buNone/>
-            </a:pPr>
-            <a:r>
-              <a:rPr/>
-              <a:t>Panel,</a:t>
-            </a:r>
-            <a:r>
-              <a:rPr/>
-              <a:t> </a:t>
-            </a:r>
-            <a:r>
-              <a:rPr/>
-              <a:t>one</a:t>
-            </a:r>
-            <a:r>
-              <a:rPr/>
-              <a:t> </a:t>
-            </a:r>
-            <a:r>
-              <a:rPr/>
-              <a:t>approach</a:t>
+              <a:t>Titanic</a:t>
+            </a:r>
+            <a:r>
+              <a:rPr/>
+              <a:t> </a:t>
+            </a:r>
+            <a:r>
+              <a:rPr/>
+              <a:t>stack</a:t>
             </a:r>
           </a:p>
         </p:txBody>
       </p:sp>
       <p:pic>
         <p:nvPicPr>
-          <p:cNvPr descr="data-visualization-02-bars_files/figure-pptx/mortality-by-panel-1.png" id="0" name="Picture 1"/>
+          <p:cNvPr descr="data-visualization-02-bars_files/figure-pptx/count-by-stack-1.png" id="0" name="Picture 1"/>
           <p:cNvPicPr>
             <a:picLocks noGrp="1" noChangeAspect="1"/>
           </p:cNvPicPr>
@@ -21045,6 +20783,251 @@
 </p:sld>
 </file>
 
+<file path=ppt/slides/slide56.xml><?xml version="1.0" encoding="utf-8"?>
+<p:sld xmlns:a="http://schemas.openxmlformats.org/drawingml/2006/main" xmlns:r="http://schemas.openxmlformats.org/officeDocument/2006/relationships" xmlns:p="http://schemas.openxmlformats.org/presentationml/2006/main">
+  <p:cSld>
+    <p:spTree>
+      <p:nvGrpSpPr>
+        <p:cNvPr id="1" name=""/>
+        <p:cNvGrpSpPr/>
+        <p:nvPr/>
+      </p:nvGrpSpPr>
+      <p:grpSpPr>
+        <a:xfrm>
+          <a:off x="0" y="0"/>
+          <a:ext cx="0" cy="0"/>
+          <a:chOff x="0" y="0"/>
+          <a:chExt cx="0" cy="0"/>
+        </a:xfrm>
+      </p:grpSpPr>
+      <p:sp>
+        <p:nvSpPr>
+          <p:cNvPr id="2" name="Title 1"/>
+          <p:cNvSpPr>
+            <a:spLocks noGrp="1"/>
+          </p:cNvSpPr>
+          <p:nvPr>
+            <p:ph type="title"/>
+          </p:nvPr>
+        </p:nvSpPr>
+        <p:spPr/>
+        <p:txBody>
+          <a:bodyPr/>
+          <a:lstStyle/>
+          <a:p>
+            <a:pPr lvl="0" marL="0" indent="0">
+              <a:buNone/>
+            </a:pPr>
+            <a:r>
+              <a:rPr/>
+              <a:t>On</a:t>
+            </a:r>
+            <a:r>
+              <a:rPr/>
+              <a:t> </a:t>
+            </a:r>
+            <a:r>
+              <a:rPr/>
+              <a:t>your</a:t>
+            </a:r>
+            <a:r>
+              <a:rPr/>
+              <a:t> </a:t>
+            </a:r>
+            <a:r>
+              <a:rPr/>
+              <a:t>own</a:t>
+            </a:r>
+          </a:p>
+        </p:txBody>
+      </p:sp>
+      <p:sp>
+        <p:nvSpPr>
+          <p:cNvPr id="3" name="Content Placeholder 2"/>
+          <p:cNvSpPr>
+            <a:spLocks noGrp="1"/>
+          </p:cNvSpPr>
+          <p:nvPr>
+            <p:ph idx="1"/>
+          </p:nvPr>
+        </p:nvSpPr>
+        <p:spPr/>
+        <p:txBody>
+          <a:bodyPr/>
+          <a:lstStyle/>
+          <a:p>
+            <a:pPr lvl="1"/>
+            <a:r>
+              <a:rPr/>
+              <a:t>Draw a bar chart showing counts involving both mortality and gender. Use a panel, then stacking, then dodging. Which do you like best?</a:t>
+            </a:r>
+          </a:p>
+        </p:txBody>
+      </p:sp>
+    </p:spTree>
+  </p:cSld>
+</p:sld>
+</file>
+
+<file path=ppt/slides/slide57.xml><?xml version="1.0" encoding="utf-8"?>
+<p:sld xmlns:a="http://schemas.openxmlformats.org/drawingml/2006/main" xmlns:r="http://schemas.openxmlformats.org/officeDocument/2006/relationships" xmlns:p="http://schemas.openxmlformats.org/presentationml/2006/main">
+  <p:cSld>
+    <p:spTree>
+      <p:nvGrpSpPr>
+        <p:cNvPr id="1" name=""/>
+        <p:cNvGrpSpPr/>
+        <p:nvPr/>
+      </p:nvGrpSpPr>
+      <p:grpSpPr>
+        <a:xfrm>
+          <a:off x="0" y="0"/>
+          <a:ext cx="0" cy="0"/>
+          <a:chOff x="0" y="0"/>
+          <a:chExt cx="0" cy="0"/>
+        </a:xfrm>
+      </p:grpSpPr>
+      <p:sp>
+        <p:nvSpPr>
+          <p:cNvPr id="2" name="Title 1"/>
+          <p:cNvSpPr>
+            <a:spLocks noGrp="1"/>
+          </p:cNvSpPr>
+          <p:nvPr>
+            <p:ph type="title"/>
+          </p:nvPr>
+        </p:nvSpPr>
+        <p:spPr/>
+        <p:txBody>
+          <a:bodyPr/>
+          <a:lstStyle/>
+          <a:p>
+            <a:pPr lvl="0" marL="0" indent="0">
+              <a:buNone/>
+            </a:pPr>
+            <a:r>
+              <a:rPr/>
+              <a:t>Wait</a:t>
+            </a:r>
+            <a:r>
+              <a:rPr/>
+              <a:t> </a:t>
+            </a:r>
+            <a:r>
+              <a:rPr/>
+              <a:t>a</a:t>
+            </a:r>
+            <a:r>
+              <a:rPr/>
+              <a:t> </a:t>
+            </a:r>
+            <a:r>
+              <a:rPr/>
+              <a:t>bit</a:t>
+            </a:r>
+            <a:r>
+              <a:rPr/>
+              <a:t> </a:t>
+            </a:r>
+            <a:r>
+              <a:rPr/>
+              <a:t>before</a:t>
+            </a:r>
+            <a:r>
+              <a:rPr/>
+              <a:t> </a:t>
+            </a:r>
+            <a:r>
+              <a:rPr/>
+              <a:t>showing</a:t>
+            </a:r>
+            <a:r>
+              <a:rPr/>
+              <a:t> </a:t>
+            </a:r>
+            <a:r>
+              <a:rPr/>
+              <a:t>the</a:t>
+            </a:r>
+            <a:r>
+              <a:rPr/>
+              <a:t> </a:t>
+            </a:r>
+            <a:r>
+              <a:rPr/>
+              <a:t>code</a:t>
+            </a:r>
+          </a:p>
+        </p:txBody>
+      </p:sp>
+      <p:sp>
+        <p:nvSpPr>
+          <p:cNvPr id="3" name="Content Placeholder 2"/>
+          <p:cNvSpPr>
+            <a:spLocks noGrp="1"/>
+          </p:cNvSpPr>
+          <p:nvPr>
+            <p:ph idx="1"/>
+          </p:nvPr>
+        </p:nvSpPr>
+        <p:spPr/>
+        <p:txBody>
+          <a:bodyPr/>
+          <a:lstStyle/>
+          <a:p>
+            <a:pPr lvl="1"/>
+            <a:r>
+              <a:rPr/>
+              <a:t>Did you make the panel/stack/dodge Survived or did you make it Sex? Here’s some code, but yours might be different.</a:t>
+            </a:r>
+          </a:p>
+          <a:p>
+            <a:pPr lvl="0" marL="0" indent="0">
+              <a:buNone/>
+            </a:pPr>
+            <a:r>
+              <a:rPr/>
+              <a:t>((Show Python code))</a:t>
+            </a:r>
+          </a:p>
+          <a:p>
+            <a:pPr lvl="0" marL="0" indent="0">
+              <a:buNone/>
+            </a:pPr>
+            <a:r>
+              <a:rPr/>
+              <a:t>R code</a:t>
+            </a:r>
+          </a:p>
+          <a:p>
+            <a:pPr lvl="0" marL="1270000" indent="0">
+              <a:buNone/>
+            </a:pPr>
+            <a:r>
+              <a:rPr sz="1800">
+                <a:latin typeface="Courier"/>
+              </a:rPr>
+              <a:t>titanic %&gt;%
+  ggplot(aes(x=Sex, fill=Survived)) +
+    geom_bar() +
+    facet_grid(cols=vars(Survived))</a:t>
+            </a:r>
+          </a:p>
+          <a:p>
+            <a:pPr lvl="0" marL="0" indent="0">
+              <a:buNone/>
+            </a:pPr>
+            <a:r>
+              <a:rPr/>
+              <a:t>((Show Tableau))</a:t>
+            </a:r>
+          </a:p>
+        </p:txBody>
+      </p:sp>
+    </p:spTree>
+  </p:cSld>
+</p:sld>
+</file>
+
 <file path=ppt/slides/slide58.xml><?xml version="1.0" encoding="utf-8"?>
 <p:sld xmlns:a="http://schemas.openxmlformats.org/drawingml/2006/main" xmlns:r="http://schemas.openxmlformats.org/officeDocument/2006/relationships" xmlns:p="http://schemas.openxmlformats.org/presentationml/2006/main">
   <p:cSld>
@@ -21090,7 +21073,7 @@
             </a:r>
             <a:r>
               <a:rPr/>
-              <a:t>alternate</a:t>
+              <a:t>one</a:t>
             </a:r>
             <a:r>
               <a:rPr/>
@@ -21105,7 +21088,7 @@
       </p:sp>
       <p:pic>
         <p:nvPicPr>
-          <p:cNvPr descr="data-visualization-02-bars_files/figure-pptx/mortality-by-panel-alt-1.png" id="0" name="Picture 1"/>
+          <p:cNvPr descr="data-visualization-02-bars_files/figure-pptx/mortality-by-panel-1.png" id="0" name="Picture 1"/>
           <p:cNvPicPr>
             <a:picLocks noGrp="1" noChangeAspect="1"/>
           </p:cNvPicPr>
@@ -21175,15 +21158,15 @@
             </a:pPr>
             <a:r>
               <a:rPr/>
-              <a:t>Stack,</a:t>
-            </a:r>
-            <a:r>
-              <a:rPr/>
-              <a:t> </a:t>
-            </a:r>
-            <a:r>
-              <a:rPr/>
-              <a:t>one</a:t>
+              <a:t>Panel,</a:t>
+            </a:r>
+            <a:r>
+              <a:rPr/>
+              <a:t> </a:t>
+            </a:r>
+            <a:r>
+              <a:rPr/>
+              <a:t>alternate</a:t>
             </a:r>
             <a:r>
               <a:rPr/>
@@ -21198,7 +21181,7 @@
       </p:sp>
       <p:pic>
         <p:nvPicPr>
-          <p:cNvPr descr="data-visualization-02-bars_files/figure-pptx/mortality-by-stack-1.png" id="0" name="Picture 1"/>
+          <p:cNvPr descr="data-visualization-02-bars_files/figure-pptx/mortality-by-panel-alt-1.png" id="0" name="Picture 1"/>
           <p:cNvPicPr>
             <a:picLocks noGrp="1" noChangeAspect="1"/>
           </p:cNvPicPr>
@@ -21380,7 +21363,7 @@
             </a:r>
             <a:r>
               <a:rPr/>
-              <a:t>alternate</a:t>
+              <a:t>one</a:t>
             </a:r>
             <a:r>
               <a:rPr/>
@@ -21395,7 +21378,7 @@
       </p:sp>
       <p:pic>
         <p:nvPicPr>
-          <p:cNvPr descr="data-visualization-02-bars_files/figure-pptx/mortality-by-stack-alt-1.png" id="0" name="Picture 1"/>
+          <p:cNvPr descr="data-visualization-02-bars_files/figure-pptx/mortality-by-stack-1.png" id="0" name="Picture 1"/>
           <p:cNvPicPr>
             <a:picLocks noGrp="1" noChangeAspect="1"/>
           </p:cNvPicPr>
@@ -21465,15 +21448,15 @@
             </a:pPr>
             <a:r>
               <a:rPr/>
-              <a:t>Dodge,</a:t>
-            </a:r>
-            <a:r>
-              <a:rPr/>
-              <a:t> </a:t>
-            </a:r>
-            <a:r>
-              <a:rPr/>
-              <a:t>one</a:t>
+              <a:t>Stack,</a:t>
+            </a:r>
+            <a:r>
+              <a:rPr/>
+              <a:t> </a:t>
+            </a:r>
+            <a:r>
+              <a:rPr/>
+              <a:t>alternate</a:t>
             </a:r>
             <a:r>
               <a:rPr/>
@@ -21488,7 +21471,7 @@
       </p:sp>
       <p:pic>
         <p:nvPicPr>
-          <p:cNvPr descr="data-visualization-02-bars_files/figure-pptx/mortality-by-dodge-1.png" id="0" name="Picture 1"/>
+          <p:cNvPr descr="data-visualization-02-bars_files/figure-pptx/mortality-by-stack-alt-1.png" id="0" name="Picture 1"/>
           <p:cNvPicPr>
             <a:picLocks noGrp="1" noChangeAspect="1"/>
           </p:cNvPicPr>
@@ -21566,7 +21549,7 @@
             </a:r>
             <a:r>
               <a:rPr/>
-              <a:t>alternate</a:t>
+              <a:t>one</a:t>
             </a:r>
             <a:r>
               <a:rPr/>
@@ -21581,7 +21564,7 @@
       </p:sp>
       <p:pic>
         <p:nvPicPr>
-          <p:cNvPr descr="data-visualization-02-bars_files/figure-pptx/mortality-by-dodge-alt-1.png" id="0" name="Picture 1"/>
+          <p:cNvPr descr="data-visualization-02-bars_files/figure-pptx/mortality-by-dodge-1.png" id="0" name="Picture 1"/>
           <p:cNvPicPr>
             <a:picLocks noGrp="1" noChangeAspect="1"/>
           </p:cNvPicPr>
@@ -21651,65 +21634,57 @@
             </a:pPr>
             <a:r>
               <a:rPr/>
-              <a:t>Group</a:t>
-            </a:r>
-            <a:r>
-              <a:rPr/>
-              <a:t> </a:t>
-            </a:r>
-            <a:r>
-              <a:rPr/>
-              <a:t>exercise</a:t>
+              <a:t>Dodge,</a:t>
+            </a:r>
+            <a:r>
+              <a:rPr/>
+              <a:t> </a:t>
+            </a:r>
+            <a:r>
+              <a:rPr/>
+              <a:t>alternate</a:t>
+            </a:r>
+            <a:r>
+              <a:rPr/>
+              <a:t> </a:t>
+            </a:r>
+            <a:r>
+              <a:rPr/>
+              <a:t>approach</a:t>
             </a:r>
           </a:p>
         </p:txBody>
       </p:sp>
-      <p:sp>
-        <p:nvSpPr>
-          <p:cNvPr id="3" name="Content Placeholder 2"/>
-          <p:cNvSpPr>
-            <a:spLocks noGrp="1"/>
-          </p:cNvSpPr>
-          <p:nvPr>
-            <p:ph idx="1"/>
-          </p:nvPr>
-        </p:nvSpPr>
-        <p:spPr/>
-        <p:txBody>
-          <a:bodyPr/>
-          <a:lstStyle/>
-          <a:p>
-            <a:pPr lvl="1"/>
-            <a:r>
-              <a:rPr/>
-              <a:t>Review the following visualization in your group</a:t>
-            </a:r>
-          </a:p>
-          <a:p>
-            <a:pPr lvl="2"/>
-            <a:r>
-              <a:rPr/>
-              <a:t>Summarize what aesthetics appear in the graph</a:t>
-            </a:r>
-          </a:p>
-          <a:p>
-            <a:pPr lvl="2"/>
-            <a:r>
-              <a:rPr/>
-              <a:t>What variables map to each aesthetic?</a:t>
-            </a:r>
-          </a:p>
-          <a:p>
-            <a:pPr lvl="0" marL="0" indent="0">
-              <a:buNone/>
-            </a:pPr>
-            <a:r>
-              <a:rPr/>
-              <a:t>((Provide visualization. Maybe use the visualization from the earlier exercise?))</a:t>
-            </a:r>
-          </a:p>
-        </p:txBody>
-      </p:sp>
+      <p:pic>
+        <p:nvPicPr>
+          <p:cNvPr descr="data-visualization-02-bars_files/figure-pptx/mortality-by-dodge-alt-1.png" id="0" name="Picture 1"/>
+          <p:cNvPicPr>
+            <a:picLocks noGrp="1" noChangeAspect="1"/>
+          </p:cNvPicPr>
+          <p:nvPr/>
+        </p:nvPicPr>
+        <p:blipFill>
+          <a:blip r:embed="rId2"/>
+          <a:stretch>
+            <a:fillRect/>
+          </a:stretch>
+        </p:blipFill>
+        <p:spPr bwMode="auto">
+          <a:xfrm>
+            <a:off x="1752600" y="1600200"/>
+            <a:ext cx="5651500" cy="4521200"/>
+          </a:xfrm>
+          <a:prstGeom prst="rect">
+            <a:avLst/>
+          </a:prstGeom>
+          <a:noFill/>
+          <a:ln w="9525">
+            <a:noFill/>
+            <a:headEnd/>
+            <a:tailEnd/>
+          </a:ln>
+        </p:spPr>
+      </p:pic>
     </p:spTree>
   </p:cSld>
 </p:sld>
@@ -21752,7 +21727,15 @@
             </a:pPr>
             <a:r>
               <a:rPr/>
-              <a:t>Summarizations</a:t>
+              <a:t>Group</a:t>
+            </a:r>
+            <a:r>
+              <a:rPr/>
+              <a:t> </a:t>
+            </a:r>
+            <a:r>
+              <a:rPr/>
+              <a:t>exercise</a:t>
             </a:r>
           </a:p>
         </p:txBody>
@@ -21775,42 +21758,30 @@
             <a:pPr lvl="1"/>
             <a:r>
               <a:rPr/>
-              <a:t>One number summary (mean or percentage)</a:t>
-            </a:r>
-          </a:p>
-          <a:p>
-            <a:pPr lvl="1"/>
-            <a:r>
-              <a:rPr/>
-              <a:t>Two number summary (error bars)</a:t>
-            </a:r>
-          </a:p>
-          <a:p>
-            <a:pPr lvl="1"/>
-            <a:r>
-              <a:rPr/>
-              <a:t>Five number summary (boxplots)</a:t>
-            </a:r>
-          </a:p>
-          <a:p>
-            <a:pPr lvl="1"/>
-            <a:r>
-              <a:rPr/>
-              <a:t>All the data</a:t>
+              <a:t>Review the following visualization in your group</a:t>
             </a:r>
           </a:p>
           <a:p>
             <a:pPr lvl="2"/>
             <a:r>
               <a:rPr/>
-              <a:t>Jittering</a:t>
+              <a:t>Summarize what aesthetics appear in the graph</a:t>
             </a:r>
           </a:p>
           <a:p>
             <a:pPr lvl="2"/>
             <a:r>
               <a:rPr/>
-              <a:t>Opacity</a:t>
+              <a:t>What variables map to each aesthetic?</a:t>
+            </a:r>
+          </a:p>
+          <a:p>
+            <a:pPr lvl="0" marL="0" indent="0">
+              <a:buNone/>
+            </a:pPr>
+            <a:r>
+              <a:rPr/>
+              <a:t>((Provide visualization. Maybe use the visualization from the earlier exercise?))</a:t>
             </a:r>
           </a:p>
         </p:txBody>
@@ -21857,39 +21828,7 @@
             </a:pPr>
             <a:r>
               <a:rPr/>
-              <a:t>Switching</a:t>
-            </a:r>
-            <a:r>
-              <a:rPr/>
-              <a:t> </a:t>
-            </a:r>
-            <a:r>
-              <a:rPr/>
-              <a:t>from</a:t>
-            </a:r>
-            <a:r>
-              <a:rPr/>
-              <a:t> </a:t>
-            </a:r>
-            <a:r>
-              <a:rPr/>
-              <a:t>count</a:t>
-            </a:r>
-            <a:r>
-              <a:rPr/>
-              <a:t> </a:t>
-            </a:r>
-            <a:r>
-              <a:rPr/>
-              <a:t>to</a:t>
-            </a:r>
-            <a:r>
-              <a:rPr/>
-              <a:t> </a:t>
-            </a:r>
-            <a:r>
-              <a:rPr/>
-              <a:t>percent</a:t>
+              <a:t>Summarizations</a:t>
             </a:r>
           </a:p>
         </p:txBody>
@@ -21909,12 +21848,45 @@
           <a:bodyPr/>
           <a:lstStyle/>
           <a:p>
-            <a:pPr lvl="0" marL="0" indent="0">
-              <a:buNone/>
-            </a:pPr>
-            <a:r>
-              <a:rPr/>
-              <a:t>((Show the code in Python, R, and Tableau. Explain why you might want counts versus percents.))</a:t>
+            <a:pPr lvl="1"/>
+            <a:r>
+              <a:rPr/>
+              <a:t>One number summary (mean or percentage)</a:t>
+            </a:r>
+          </a:p>
+          <a:p>
+            <a:pPr lvl="1"/>
+            <a:r>
+              <a:rPr/>
+              <a:t>Two number summary (error bars)</a:t>
+            </a:r>
+          </a:p>
+          <a:p>
+            <a:pPr lvl="1"/>
+            <a:r>
+              <a:rPr/>
+              <a:t>Five number summary (boxplots)</a:t>
+            </a:r>
+          </a:p>
+          <a:p>
+            <a:pPr lvl="1"/>
+            <a:r>
+              <a:rPr/>
+              <a:t>All the data</a:t>
+            </a:r>
+          </a:p>
+          <a:p>
+            <a:pPr lvl="2"/>
+            <a:r>
+              <a:rPr/>
+              <a:t>Jittering</a:t>
+            </a:r>
+          </a:p>
+          <a:p>
+            <a:pPr lvl="2"/>
+            <a:r>
+              <a:rPr/>
+              <a:t>Opacity</a:t>
             </a:r>
           </a:p>
         </p:txBody>
@@ -21961,23 +21933,39 @@
             </a:pPr>
             <a:r>
               <a:rPr/>
-              <a:t>Example</a:t>
-            </a:r>
-            <a:r>
-              <a:rPr/>
-              <a:t> </a:t>
-            </a:r>
-            <a:r>
-              <a:rPr/>
-              <a:t>with</a:t>
-            </a:r>
-            <a:r>
-              <a:rPr/>
-              <a:t> </a:t>
-            </a:r>
-            <a:r>
-              <a:rPr/>
-              <a:t>means</a:t>
+              <a:t>Switching</a:t>
+            </a:r>
+            <a:r>
+              <a:rPr/>
+              <a:t> </a:t>
+            </a:r>
+            <a:r>
+              <a:rPr/>
+              <a:t>from</a:t>
+            </a:r>
+            <a:r>
+              <a:rPr/>
+              <a:t> </a:t>
+            </a:r>
+            <a:r>
+              <a:rPr/>
+              <a:t>count</a:t>
+            </a:r>
+            <a:r>
+              <a:rPr/>
+              <a:t> </a:t>
+            </a:r>
+            <a:r>
+              <a:rPr/>
+              <a:t>to</a:t>
+            </a:r>
+            <a:r>
+              <a:rPr/>
+              <a:t> </a:t>
+            </a:r>
+            <a:r>
+              <a:rPr/>
+              <a:t>percent</a:t>
             </a:r>
           </a:p>
         </p:txBody>
@@ -22002,7 +21990,7 @@
             </a:pPr>
             <a:r>
               <a:rPr/>
-              <a:t>((Need to find the right data set to illustrate this. Maybe the Saratoga house prices?))</a:t>
+              <a:t>((Show the code in Python, R, and Tableau. Explain why you might want counts versus percents.))</a:t>
             </a:r>
           </a:p>
         </p:txBody>
@@ -22065,7 +22053,7 @@
             </a:r>
             <a:r>
               <a:rPr/>
-              <a:t>totals</a:t>
+              <a:t>means</a:t>
             </a:r>
           </a:p>
         </p:txBody>
@@ -22090,7 +22078,7 @@
             </a:pPr>
             <a:r>
               <a:rPr/>
-              <a:t>((Same data. What means tell you versus totals.))</a:t>
+              <a:t>((Need to find the right data set to illustrate this. Maybe the Saratoga house prices?))</a:t>
             </a:r>
           </a:p>
         </p:txBody>
@@ -22137,15 +22125,23 @@
             </a:pPr>
             <a:r>
               <a:rPr/>
-              <a:t>Boxplots</a:t>
-            </a:r>
-            <a:r>
-              <a:rPr/>
-              <a:t> </a:t>
-            </a:r>
-            <a:r>
-              <a:rPr/>
-              <a:t>example</a:t>
+              <a:t>Example</a:t>
+            </a:r>
+            <a:r>
+              <a:rPr/>
+              <a:t> </a:t>
+            </a:r>
+            <a:r>
+              <a:rPr/>
+              <a:t>with</a:t>
+            </a:r>
+            <a:r>
+              <a:rPr/>
+              <a:t> </a:t>
+            </a:r>
+            <a:r>
+              <a:rPr/>
+              <a:t>totals</a:t>
             </a:r>
           </a:p>
         </p:txBody>
@@ -22170,7 +22166,7 @@
             </a:pPr>
             <a:r>
               <a:rPr/>
-              <a:t>((Include an explanation of what a boxplot is))</a:t>
+              <a:t>((Same data. What means tell you versus totals.))</a:t>
             </a:r>
           </a:p>
         </p:txBody>
@@ -22217,7 +22213,7 @@
             </a:pPr>
             <a:r>
               <a:rPr/>
-              <a:t>Jittering</a:t>
+              <a:t>Boxplots</a:t>
             </a:r>
             <a:r>
               <a:rPr/>
@@ -22250,7 +22246,7 @@
             </a:pPr>
             <a:r>
               <a:rPr/>
-              <a:t>((Include an explanation on when it doesn’t work.))</a:t>
+              <a:t>((Include an explanation of what a boxplot is))</a:t>
             </a:r>
           </a:p>
         </p:txBody>
@@ -22401,7 +22397,7 @@
             </a:pPr>
             <a:r>
               <a:rPr/>
-              <a:t>Opacity</a:t>
+              <a:t>Jittering</a:t>
             </a:r>
             <a:r>
               <a:rPr/>
@@ -22434,7 +22430,7 @@
             </a:pPr>
             <a:r>
               <a:rPr/>
-              <a:t>((Note the computational expense.))</a:t>
+              <a:t>((Include an explanation on when it doesn’t work.))</a:t>
             </a:r>
           </a:p>
         </p:txBody>
@@ -22481,23 +22477,15 @@
             </a:pPr>
             <a:r>
               <a:rPr/>
-              <a:t>On</a:t>
-            </a:r>
-            <a:r>
-              <a:rPr/>
-              <a:t> </a:t>
-            </a:r>
-            <a:r>
-              <a:rPr/>
-              <a:t>your</a:t>
-            </a:r>
-            <a:r>
-              <a:rPr/>
-              <a:t> </a:t>
-            </a:r>
-            <a:r>
-              <a:rPr/>
-              <a:t>own</a:t>
+              <a:t>Opacity</a:t>
+            </a:r>
+            <a:r>
+              <a:rPr/>
+              <a:t> </a:t>
+            </a:r>
+            <a:r>
+              <a:rPr/>
+              <a:t>example</a:t>
             </a:r>
           </a:p>
         </p:txBody>
@@ -22522,7 +22510,7 @@
             </a:pPr>
             <a:r>
               <a:rPr/>
-              <a:t>((Find a totally different data set and get the students to draw four different visualizations. Have them divide into groups that like the same visualization software and have each person do a different visualization.))</a:t>
+              <a:t>((Note the computational expense.))</a:t>
             </a:r>
           </a:p>
         </p:txBody>
@@ -22569,7 +22557,23 @@
             </a:pPr>
             <a:r>
               <a:rPr/>
-              <a:t>Summary</a:t>
+              <a:t>On</a:t>
+            </a:r>
+            <a:r>
+              <a:rPr/>
+              <a:t> </a:t>
+            </a:r>
+            <a:r>
+              <a:rPr/>
+              <a:t>your</a:t>
+            </a:r>
+            <a:r>
+              <a:rPr/>
+              <a:t> </a:t>
+            </a:r>
+            <a:r>
+              <a:rPr/>
+              <a:t>own</a:t>
             </a:r>
           </a:p>
         </p:txBody>
@@ -22589,52 +22593,12 @@
           <a:bodyPr/>
           <a:lstStyle/>
           <a:p>
-            <a:pPr lvl="1"/>
-            <a:r>
-              <a:rPr/>
-              <a:t>“A mapping of data to the visual aesthetics of geometries/marks”</a:t>
-            </a:r>
-          </a:p>
-          <a:p>
-            <a:pPr lvl="2"/>
-            <a:r>
-              <a:rPr/>
-              <a:t>Bars are a type of geometry/mark</a:t>
-            </a:r>
-          </a:p>
-          <a:p>
-            <a:pPr lvl="2"/>
-            <a:r>
-              <a:rPr/>
-              <a:t>Aesthetics for bars include location, size, color</a:t>
-            </a:r>
-          </a:p>
-          <a:p>
-            <a:pPr lvl="2"/>
-            <a:r>
-              <a:rPr/>
-              <a:t>Stack versus dodge</a:t>
-            </a:r>
-          </a:p>
-          <a:p>
-            <a:pPr lvl="1"/>
-            <a:r>
-              <a:rPr/>
-              <a:t>Basic tips</a:t>
-            </a:r>
-          </a:p>
-          <a:p>
-            <a:pPr lvl="2"/>
-            <a:r>
-              <a:rPr/>
-              <a:t>Place comparators close</a:t>
-            </a:r>
-          </a:p>
-          <a:p>
-            <a:pPr lvl="2"/>
-            <a:r>
-              <a:rPr/>
-              <a:t>Use axis ticks, light grid lines</a:t>
+            <a:pPr lvl="0" marL="0" indent="0">
+              <a:buNone/>
+            </a:pPr>
+            <a:r>
+              <a:rPr/>
+              <a:t>((Find a totally different data set and get the students to draw four different visualizations. Have them divide into groups that like the same visualization software and have each person do a different visualization.))</a:t>
             </a:r>
           </a:p>
         </p:txBody>
@@ -22645,6 +22609,118 @@
 </file>
 
 <file path=ppt/slides/slide73.xml><?xml version="1.0" encoding="utf-8"?>
+<p:sld xmlns:a="http://schemas.openxmlformats.org/drawingml/2006/main" xmlns:r="http://schemas.openxmlformats.org/officeDocument/2006/relationships" xmlns:p="http://schemas.openxmlformats.org/presentationml/2006/main">
+  <p:cSld>
+    <p:spTree>
+      <p:nvGrpSpPr>
+        <p:cNvPr id="1" name=""/>
+        <p:cNvGrpSpPr/>
+        <p:nvPr/>
+      </p:nvGrpSpPr>
+      <p:grpSpPr>
+        <a:xfrm>
+          <a:off x="0" y="0"/>
+          <a:ext cx="0" cy="0"/>
+          <a:chOff x="0" y="0"/>
+          <a:chExt cx="0" cy="0"/>
+        </a:xfrm>
+      </p:grpSpPr>
+      <p:sp>
+        <p:nvSpPr>
+          <p:cNvPr id="2" name="Title 1"/>
+          <p:cNvSpPr>
+            <a:spLocks noGrp="1"/>
+          </p:cNvSpPr>
+          <p:nvPr>
+            <p:ph type="title"/>
+          </p:nvPr>
+        </p:nvSpPr>
+        <p:spPr/>
+        <p:txBody>
+          <a:bodyPr/>
+          <a:lstStyle/>
+          <a:p>
+            <a:pPr lvl="0" marL="0" indent="0">
+              <a:buNone/>
+            </a:pPr>
+            <a:r>
+              <a:rPr/>
+              <a:t>Summary</a:t>
+            </a:r>
+          </a:p>
+        </p:txBody>
+      </p:sp>
+      <p:sp>
+        <p:nvSpPr>
+          <p:cNvPr id="3" name="Content Placeholder 2"/>
+          <p:cNvSpPr>
+            <a:spLocks noGrp="1"/>
+          </p:cNvSpPr>
+          <p:nvPr>
+            <p:ph idx="1"/>
+          </p:nvPr>
+        </p:nvSpPr>
+        <p:spPr/>
+        <p:txBody>
+          <a:bodyPr/>
+          <a:lstStyle/>
+          <a:p>
+            <a:pPr lvl="1"/>
+            <a:r>
+              <a:rPr/>
+              <a:t>“A mapping of data to the visual aesthetics of geometries/marks”</a:t>
+            </a:r>
+          </a:p>
+          <a:p>
+            <a:pPr lvl="2"/>
+            <a:r>
+              <a:rPr/>
+              <a:t>Bars are a type of geometry/mark</a:t>
+            </a:r>
+          </a:p>
+          <a:p>
+            <a:pPr lvl="2"/>
+            <a:r>
+              <a:rPr/>
+              <a:t>Aesthetics for bars include location, size, color</a:t>
+            </a:r>
+          </a:p>
+          <a:p>
+            <a:pPr lvl="2"/>
+            <a:r>
+              <a:rPr/>
+              <a:t>Stack versus dodge</a:t>
+            </a:r>
+          </a:p>
+          <a:p>
+            <a:pPr lvl="1"/>
+            <a:r>
+              <a:rPr/>
+              <a:t>Basic tips</a:t>
+            </a:r>
+          </a:p>
+          <a:p>
+            <a:pPr lvl="2"/>
+            <a:r>
+              <a:rPr/>
+              <a:t>Place comparators close</a:t>
+            </a:r>
+          </a:p>
+          <a:p>
+            <a:pPr lvl="2"/>
+            <a:r>
+              <a:rPr/>
+              <a:t>Use axis ticks, light grid lines</a:t>
+            </a:r>
+          </a:p>
+        </p:txBody>
+      </p:sp>
+    </p:spTree>
+  </p:cSld>
+</p:sld>
+</file>
+
+<file path=ppt/slides/slide74.xml><?xml version="1.0" encoding="utf-8"?>
 <p:sld xmlns:a="http://schemas.openxmlformats.org/drawingml/2006/main" xmlns:r="http://schemas.openxmlformats.org/officeDocument/2006/relationships" xmlns:p="http://schemas.openxmlformats.org/presentationml/2006/main">
   <p:cSld>
     <p:spTree>
@@ -22949,7 +23025,7 @@
       </p:sp>
       <p:pic>
         <p:nvPicPr>
-          <p:cNvPr descr="../images/02/texas-bar-chart.png" id="0" name="Picture 1"/>
+          <p:cNvPr descr="../images/texas-bar-chart.png" id="0" name="Picture 1"/>
           <p:cNvPicPr>
             <a:picLocks noGrp="1" noChangeAspect="1"/>
           </p:cNvPicPr>

</xml_diff>

<commit_message>
More gradient work in data-viz-02
</commit_message>
<xml_diff>
--- a/data-viz-02/src/data-visualization-02-bars.pptx
+++ b/data-viz-02/src/data-visualization-02-bars.pptx
@@ -5,7 +5,7 @@
     <p:sldMasterId id="2147483648" r:id="rId1"/>
   </p:sldMasterIdLst>
   <p:notesMasterIdLst>
-    <p:NotesMasterId r:id="rId84"/>
+    <p:NotesMasterId r:id="rId87"/>
   </p:notesMasterIdLst>
   <p:sldIdLst>
     <p:sldId id="256" r:id="rId2"/>
@@ -90,6 +90,9 @@
     <p:sldId id="335" r:id="rId81"/>
     <p:sldId id="336" r:id="rId82"/>
     <p:sldId id="337" r:id="rId83"/>
+    <p:sldId id="338" r:id="rId84"/>
+    <p:sldId id="339" r:id="rId85"/>
+    <p:sldId id="340" r:id="rId86"/>
   </p:sldIdLst>
   <p:sldSz cx="9144000" cy="6858000" type="screen4x3"/>
   <p:notesSz cx="6858000" cy="9144000"/>
@@ -2724,7 +2727,7 @@
           <a:p>
             <a:fld id="{18BDFEC3-8487-43E8-A154-7C12CBC1FFF2}" type="slidenum">
               <a:rPr lang="en-US"/>
-              <a:t>34</a:t>
+              <a:t>37</a:t>
             </a:fld>
             <a:endParaRPr lang="en-US"/>
           </a:p>
@@ -3356,7 +3359,7 @@
           <a:p>
             <a:fld id="{18BDFEC3-8487-43E8-A154-7C12CBC1FFF2}" type="slidenum">
               <a:rPr lang="en-US"/>
-              <a:t>37</a:t>
+              <a:t>40</a:t>
             </a:fld>
             <a:endParaRPr lang="en-US"/>
           </a:p>
@@ -3702,7 +3705,7 @@
           <a:p>
             <a:fld id="{18BDFEC3-8487-43E8-A154-7C12CBC1FFF2}" type="slidenum">
               <a:rPr lang="en-US"/>
-              <a:t>38</a:t>
+              <a:t>41</a:t>
             </a:fld>
             <a:endParaRPr lang="en-US"/>
           </a:p>
@@ -4598,7 +4601,7 @@
           <a:p>
             <a:fld id="{18BDFEC3-8487-43E8-A154-7C12CBC1FFF2}" type="slidenum">
               <a:rPr lang="en-US"/>
-              <a:t>45</a:t>
+              <a:t>48</a:t>
             </a:fld>
             <a:endParaRPr lang="en-US"/>
           </a:p>
@@ -5398,7 +5401,7 @@
           <a:p>
             <a:fld id="{18BDFEC3-8487-43E8-A154-7C12CBC1FFF2}" type="slidenum">
               <a:rPr lang="en-US"/>
-              <a:t>47</a:t>
+              <a:t>50</a:t>
             </a:fld>
             <a:endParaRPr lang="en-US"/>
           </a:p>
@@ -6206,7 +6209,7 @@
           <a:p>
             <a:fld id="{18BDFEC3-8487-43E8-A154-7C12CBC1FFF2}" type="slidenum">
               <a:rPr lang="en-US"/>
-              <a:t>54</a:t>
+              <a:t>57</a:t>
             </a:fld>
             <a:endParaRPr lang="en-US"/>
           </a:p>
@@ -6568,7 +6571,7 @@
           <a:p>
             <a:fld id="{18BDFEC3-8487-43E8-A154-7C12CBC1FFF2}" type="slidenum">
               <a:rPr lang="en-US"/>
-              <a:t>58</a:t>
+              <a:t>61</a:t>
             </a:fld>
             <a:endParaRPr lang="en-US"/>
           </a:p>
@@ -7248,7 +7251,7 @@
           <a:p>
             <a:fld id="{18BDFEC3-8487-43E8-A154-7C12CBC1FFF2}" type="slidenum">
               <a:rPr lang="en-US"/>
-              <a:t>64</a:t>
+              <a:t>67</a:t>
             </a:fld>
             <a:endParaRPr lang="en-US"/>
           </a:p>
@@ -7692,7 +7695,7 @@
           <a:p>
             <a:fld id="{18BDFEC3-8487-43E8-A154-7C12CBC1FFF2}" type="slidenum">
               <a:rPr lang="en-US"/>
-              <a:t>73</a:t>
+              <a:t>76</a:t>
             </a:fld>
             <a:endParaRPr lang="en-US"/>
           </a:p>
@@ -18578,9 +18581,56 @@
           </a:p>
         </p:txBody>
       </p:sp>
+    </p:spTree>
+  </p:cSld>
+</p:sld>
+</file>
+
+<file path=ppt/slides/slide34.xml><?xml version="1.0" encoding="utf-8"?>
+<p:sld xmlns:a="http://schemas.openxmlformats.org/drawingml/2006/main" xmlns:r="http://schemas.openxmlformats.org/officeDocument/2006/relationships" xmlns:p="http://schemas.openxmlformats.org/presentationml/2006/main">
+  <p:cSld>
+    <p:spTree>
+      <p:nvGrpSpPr>
+        <p:cNvPr id="1" name=""/>
+        <p:cNvGrpSpPr/>
+        <p:nvPr/>
+      </p:nvGrpSpPr>
+      <p:grpSpPr>
+        <a:xfrm>
+          <a:off x="0" y="0"/>
+          <a:ext cx="0" cy="0"/>
+          <a:chOff x="0" y="0"/>
+          <a:chExt cx="0" cy="0"/>
+        </a:xfrm>
+      </p:grpSpPr>
+      <p:sp>
+        <p:nvSpPr>
+          <p:cNvPr id="2" name="Title 1"/>
+          <p:cNvSpPr>
+            <a:spLocks noGrp="1"/>
+          </p:cNvSpPr>
+          <p:nvPr>
+            <p:ph type="title"/>
+          </p:nvPr>
+        </p:nvSpPr>
+        <p:spPr/>
+        <p:txBody>
+          <a:bodyPr/>
+          <a:lstStyle/>
+          <a:p>
+            <a:pPr lvl="0" marL="0" indent="0">
+              <a:buNone/>
+            </a:pPr>
+            <a:r>
+              <a:rPr/>
+              <a:t>Gradients</a:t>
+            </a:r>
+          </a:p>
+        </p:txBody>
+      </p:sp>
       <p:pic>
         <p:nvPicPr>
-          <p:cNvPr descr="data-visualization-02-bars_files/figure-pptx/rgb-1.png" id="0" name="Picture 1"/>
+          <p:cNvPr descr="data-visualization-02-bars_files/figure-pptx/rgb-0-1.png" id="0" name="Picture 1"/>
           <p:cNvPicPr>
             <a:picLocks noGrp="1" noChangeAspect="1"/>
           </p:cNvPicPr>
@@ -18613,7 +18663,7 @@
 </p:sld>
 </file>
 
-<file path=ppt/slides/slide34.xml><?xml version="1.0" encoding="utf-8"?>
+<file path=ppt/slides/slide35.xml><?xml version="1.0" encoding="utf-8"?>
 <p:sld xmlns:a="http://schemas.openxmlformats.org/drawingml/2006/main" xmlns:r="http://schemas.openxmlformats.org/officeDocument/2006/relationships" xmlns:p="http://schemas.openxmlformats.org/presentationml/2006/main">
   <p:cSld>
     <p:spTree>
@@ -18632,12 +18682,12 @@
       </p:grpSpPr>
       <p:sp>
         <p:nvSpPr>
-          <p:cNvPr id="3" name="Content Placeholder 2"/>
+          <p:cNvPr id="2" name="Title 1"/>
           <p:cNvSpPr>
             <a:spLocks noGrp="1"/>
           </p:cNvSpPr>
           <p:nvPr>
-            <p:ph idx="1"/>
+            <p:ph type="title"/>
           </p:nvPr>
         </p:nvSpPr>
         <p:spPr/>
@@ -18648,6 +18698,37 @@
             <a:pPr lvl="0" marL="0" indent="0">
               <a:buNone/>
             </a:pPr>
+            <a:r>
+              <a:rPr/>
+              <a:t>Gradients</a:t>
+            </a:r>
+          </a:p>
+        </p:txBody>
+      </p:sp>
+      <p:sp>
+        <p:nvSpPr>
+          <p:cNvPr id="3" name="Content Placeholder 2"/>
+          <p:cNvSpPr>
+            <a:spLocks noGrp="1"/>
+          </p:cNvSpPr>
+          <p:nvPr>
+            <p:ph idx="1"/>
+          </p:nvPr>
+        </p:nvSpPr>
+        <p:spPr/>
+        <p:txBody>
+          <a:bodyPr/>
+          <a:lstStyle/>
+          <a:p>
+            <a:pPr lvl="0" marL="1270000" indent="0">
+              <a:buNone/>
+            </a:pPr>
+            <a:r>
+              <a:rPr sz="1800">
+                <a:latin typeface="Courier"/>
+              </a:rPr>
+              <a:t>## function (...)  .Primitive("c")</a:t>
+            </a:r>
           </a:p>
         </p:txBody>
       </p:sp>
@@ -18656,7 +18737,102 @@
 </p:sld>
 </file>
 
-<file path=ppt/slides/slide35.xml><?xml version="1.0" encoding="utf-8"?>
+<file path=ppt/slides/slide36.xml><?xml version="1.0" encoding="utf-8"?>
+<p:sld xmlns:a="http://schemas.openxmlformats.org/drawingml/2006/main" xmlns:r="http://schemas.openxmlformats.org/officeDocument/2006/relationships" xmlns:p="http://schemas.openxmlformats.org/presentationml/2006/main">
+  <p:cSld>
+    <p:spTree>
+      <p:nvGrpSpPr>
+        <p:cNvPr id="1" name=""/>
+        <p:cNvGrpSpPr/>
+        <p:nvPr/>
+      </p:nvGrpSpPr>
+      <p:grpSpPr>
+        <a:xfrm>
+          <a:off x="0" y="0"/>
+          <a:ext cx="0" cy="0"/>
+          <a:chOff x="0" y="0"/>
+          <a:chExt cx="0" cy="0"/>
+        </a:xfrm>
+      </p:grpSpPr>
+      <p:pic>
+        <p:nvPicPr>
+          <p:cNvPr descr="data-visualization-02-bars_files/figure-pptx/rgb-gradient-1.png" id="0" name="Picture 1"/>
+          <p:cNvPicPr>
+            <a:picLocks noGrp="1" noChangeAspect="1"/>
+          </p:cNvPicPr>
+          <p:nvPr/>
+        </p:nvPicPr>
+        <p:blipFill>
+          <a:blip r:embed="rId2"/>
+          <a:stretch>
+            <a:fillRect/>
+          </a:stretch>
+        </p:blipFill>
+        <p:spPr bwMode="auto">
+          <a:xfrm>
+            <a:off x="1752600" y="1600200"/>
+            <a:ext cx="5651500" cy="4521200"/>
+          </a:xfrm>
+          <a:prstGeom prst="rect">
+            <a:avLst/>
+          </a:prstGeom>
+          <a:noFill/>
+          <a:ln w="9525">
+            <a:noFill/>
+            <a:headEnd/>
+            <a:tailEnd/>
+          </a:ln>
+        </p:spPr>
+      </p:pic>
+    </p:spTree>
+  </p:cSld>
+</p:sld>
+</file>
+
+<file path=ppt/slides/slide37.xml><?xml version="1.0" encoding="utf-8"?>
+<p:sld xmlns:a="http://schemas.openxmlformats.org/drawingml/2006/main" xmlns:r="http://schemas.openxmlformats.org/officeDocument/2006/relationships" xmlns:p="http://schemas.openxmlformats.org/presentationml/2006/main">
+  <p:cSld>
+    <p:spTree>
+      <p:nvGrpSpPr>
+        <p:cNvPr id="1" name=""/>
+        <p:cNvGrpSpPr/>
+        <p:nvPr/>
+      </p:nvGrpSpPr>
+      <p:grpSpPr>
+        <a:xfrm>
+          <a:off x="0" y="0"/>
+          <a:ext cx="0" cy="0"/>
+          <a:chOff x="0" y="0"/>
+          <a:chExt cx="0" cy="0"/>
+        </a:xfrm>
+      </p:grpSpPr>
+      <p:sp>
+        <p:nvSpPr>
+          <p:cNvPr id="3" name="Content Placeholder 2"/>
+          <p:cNvSpPr>
+            <a:spLocks noGrp="1"/>
+          </p:cNvSpPr>
+          <p:nvPr>
+            <p:ph idx="1"/>
+          </p:nvPr>
+        </p:nvSpPr>
+        <p:spPr/>
+        <p:txBody>
+          <a:bodyPr/>
+          <a:lstStyle/>
+          <a:p>
+            <a:pPr lvl="0" marL="0" indent="0">
+              <a:buNone/>
+            </a:pPr>
+          </a:p>
+        </p:txBody>
+      </p:sp>
+    </p:spTree>
+  </p:cSld>
+</p:sld>
+</file>
+
+<file path=ppt/slides/slide38.xml><?xml version="1.0" encoding="utf-8"?>
 <p:sld xmlns:a="http://schemas.openxmlformats.org/drawingml/2006/main" xmlns:r="http://schemas.openxmlformats.org/officeDocument/2006/relationships" xmlns:p="http://schemas.openxmlformats.org/presentationml/2006/main">
   <p:cSld>
     <p:spTree>
@@ -18733,279 +18909,6 @@
 </p:sld>
 </file>
 
-<file path=ppt/slides/slide36.xml><?xml version="1.0" encoding="utf-8"?>
-<p:sld xmlns:a="http://schemas.openxmlformats.org/drawingml/2006/main" xmlns:r="http://schemas.openxmlformats.org/officeDocument/2006/relationships" xmlns:p="http://schemas.openxmlformats.org/presentationml/2006/main">
-  <p:cSld>
-    <p:spTree>
-      <p:nvGrpSpPr>
-        <p:cNvPr id="1" name=""/>
-        <p:cNvGrpSpPr/>
-        <p:nvPr/>
-      </p:nvGrpSpPr>
-      <p:grpSpPr>
-        <a:xfrm>
-          <a:off x="0" y="0"/>
-          <a:ext cx="0" cy="0"/>
-          <a:chOff x="0" y="0"/>
-          <a:chExt cx="0" cy="0"/>
-        </a:xfrm>
-      </p:grpSpPr>
-      <p:sp>
-        <p:nvSpPr>
-          <p:cNvPr id="3" name="Content Placeholder 2"/>
-          <p:cNvSpPr>
-            <a:spLocks noGrp="1"/>
-          </p:cNvSpPr>
-          <p:nvPr>
-            <p:ph idx="1"/>
-          </p:nvPr>
-        </p:nvSpPr>
-        <p:spPr/>
-        <p:txBody>
-          <a:bodyPr/>
-          <a:lstStyle/>
-          <a:p>
-            <a:pPr lvl="0" marL="0" indent="0">
-              <a:buNone/>
-            </a:pPr>
-            <a:r>
-              <a:rPr/>
-              <a:t> ### A quick tutorial on colors</a:t>
-            </a:r>
-          </a:p>
-        </p:txBody>
-      </p:sp>
-    </p:spTree>
-  </p:cSld>
-</p:sld>
-</file>
-
-<file path=ppt/slides/slide37.xml><?xml version="1.0" encoding="utf-8"?>
-<p:sld xmlns:a="http://schemas.openxmlformats.org/drawingml/2006/main" xmlns:r="http://schemas.openxmlformats.org/officeDocument/2006/relationships" xmlns:p="http://schemas.openxmlformats.org/presentationml/2006/main">
-  <p:cSld>
-    <p:spTree>
-      <p:nvGrpSpPr>
-        <p:cNvPr id="1" name=""/>
-        <p:cNvGrpSpPr/>
-        <p:nvPr/>
-      </p:nvGrpSpPr>
-      <p:grpSpPr>
-        <a:xfrm>
-          <a:off x="0" y="0"/>
-          <a:ext cx="0" cy="0"/>
-          <a:chOff x="0" y="0"/>
-          <a:chExt cx="0" cy="0"/>
-        </a:xfrm>
-      </p:grpSpPr>
-      <p:sp>
-        <p:nvSpPr>
-          <p:cNvPr id="2" name="Title 1"/>
-          <p:cNvSpPr>
-            <a:spLocks noGrp="1"/>
-          </p:cNvSpPr>
-          <p:nvPr>
-            <p:ph type="title"/>
-          </p:nvPr>
-        </p:nvSpPr>
-        <p:spPr/>
-        <p:txBody>
-          <a:bodyPr/>
-          <a:lstStyle/>
-          <a:p>
-            <a:pPr lvl="0" marL="0" indent="0">
-              <a:buNone/>
-            </a:pPr>
-            <a:r>
-              <a:rPr/>
-              <a:t>Bars</a:t>
-            </a:r>
-          </a:p>
-        </p:txBody>
-      </p:sp>
-      <p:sp>
-        <p:nvSpPr>
-          <p:cNvPr id="3" name="Content Placeholder 2"/>
-          <p:cNvSpPr>
-            <a:spLocks noGrp="1"/>
-          </p:cNvSpPr>
-          <p:nvPr>
-            <p:ph idx="1"/>
-          </p:nvPr>
-        </p:nvSpPr>
-        <p:spPr/>
-        <p:txBody>
-          <a:bodyPr/>
-          <a:lstStyle/>
-          <a:p>
-            <a:pPr lvl="1"/>
-            <a:r>
-              <a:rPr/>
-              <a:t>Fewer in numbers than points</a:t>
-            </a:r>
-          </a:p>
-          <a:p>
-            <a:pPr lvl="1"/>
-            <a:r>
-              <a:rPr/>
-              <a:t>Usually a summary statistic</a:t>
-            </a:r>
-          </a:p>
-          <a:p>
-            <a:pPr lvl="2"/>
-            <a:r>
-              <a:rPr/>
-              <a:t>Count</a:t>
-            </a:r>
-          </a:p>
-          <a:p>
-            <a:pPr lvl="2"/>
-            <a:r>
-              <a:rPr/>
-              <a:t>Percent</a:t>
-            </a:r>
-          </a:p>
-          <a:p>
-            <a:pPr lvl="2"/>
-            <a:r>
-              <a:rPr/>
-              <a:t>Average</a:t>
-            </a:r>
-          </a:p>
-          <a:p>
-            <a:pPr lvl="2"/>
-            <a:r>
-              <a:rPr/>
-              <a:t>Total</a:t>
-            </a:r>
-          </a:p>
-          <a:p>
-            <a:pPr lvl="1"/>
-            <a:r>
-              <a:rPr/>
-              <a:t>A bar chart is NOT a histogram</a:t>
-            </a:r>
-          </a:p>
-        </p:txBody>
-      </p:sp>
-    </p:spTree>
-  </p:cSld>
-</p:sld>
-</file>
-
-<file path=ppt/slides/slide38.xml><?xml version="1.0" encoding="utf-8"?>
-<p:sld xmlns:a="http://schemas.openxmlformats.org/drawingml/2006/main" xmlns:r="http://schemas.openxmlformats.org/officeDocument/2006/relationships" xmlns:p="http://schemas.openxmlformats.org/presentationml/2006/main">
-  <p:cSld>
-    <p:spTree>
-      <p:nvGrpSpPr>
-        <p:cNvPr id="1" name=""/>
-        <p:cNvGrpSpPr/>
-        <p:nvPr/>
-      </p:nvGrpSpPr>
-      <p:grpSpPr>
-        <a:xfrm>
-          <a:off x="0" y="0"/>
-          <a:ext cx="0" cy="0"/>
-          <a:chOff x="0" y="0"/>
-          <a:chExt cx="0" cy="0"/>
-        </a:xfrm>
-      </p:grpSpPr>
-      <p:sp>
-        <p:nvSpPr>
-          <p:cNvPr id="2" name="Title 1"/>
-          <p:cNvSpPr>
-            <a:spLocks noGrp="1"/>
-          </p:cNvSpPr>
-          <p:nvPr>
-            <p:ph type="title"/>
-          </p:nvPr>
-        </p:nvSpPr>
-        <p:spPr/>
-        <p:txBody>
-          <a:bodyPr/>
-          <a:lstStyle/>
-          <a:p>
-            <a:pPr lvl="0" marL="0" indent="0">
-              <a:buNone/>
-            </a:pPr>
-            <a:r>
-              <a:rPr/>
-              <a:t>Aesthetics</a:t>
-            </a:r>
-            <a:r>
-              <a:rPr/>
-              <a:t> </a:t>
-            </a:r>
-            <a:r>
-              <a:rPr/>
-              <a:t>for</a:t>
-            </a:r>
-            <a:r>
-              <a:rPr/>
-              <a:t> </a:t>
-            </a:r>
-            <a:r>
-              <a:rPr/>
-              <a:t>bars</a:t>
-            </a:r>
-          </a:p>
-        </p:txBody>
-      </p:sp>
-      <p:sp>
-        <p:nvSpPr>
-          <p:cNvPr id="3" name="Content Placeholder 2"/>
-          <p:cNvSpPr>
-            <a:spLocks noGrp="1"/>
-          </p:cNvSpPr>
-          <p:nvPr>
-            <p:ph idx="1"/>
-          </p:nvPr>
-        </p:nvSpPr>
-        <p:spPr/>
-        <p:txBody>
-          <a:bodyPr/>
-          <a:lstStyle/>
-          <a:p>
-            <a:pPr lvl="1"/>
-            <a:r>
-              <a:rPr/>
-              <a:t>Review</a:t>
-            </a:r>
-          </a:p>
-          <a:p>
-            <a:pPr lvl="2"/>
-            <a:r>
-              <a:rPr/>
-              <a:t>Location</a:t>
-            </a:r>
-          </a:p>
-          <a:p>
-            <a:pPr lvl="2"/>
-            <a:r>
-              <a:rPr/>
-              <a:t>Size</a:t>
-            </a:r>
-          </a:p>
-          <a:p>
-            <a:pPr lvl="2"/>
-            <a:r>
-              <a:rPr/>
-              <a:t>Color</a:t>
-            </a:r>
-          </a:p>
-          <a:p>
-            <a:pPr lvl="2"/>
-            <a:r>
-              <a:rPr/>
-              <a:t>NOT shape!!!</a:t>
-            </a:r>
-          </a:p>
-        </p:txBody>
-      </p:sp>
-    </p:spTree>
-  </p:cSld>
-</p:sld>
-</file>
-
 <file path=ppt/slides/slide39.xml><?xml version="1.0" encoding="utf-8"?>
 <p:sld xmlns:a="http://schemas.openxmlformats.org/drawingml/2006/main" xmlns:r="http://schemas.openxmlformats.org/officeDocument/2006/relationships" xmlns:p="http://schemas.openxmlformats.org/presentationml/2006/main">
   <p:cSld>
@@ -19025,12 +18928,12 @@
       </p:grpSpPr>
       <p:sp>
         <p:nvSpPr>
-          <p:cNvPr id="2" name="Title 1"/>
+          <p:cNvPr id="3" name="Content Placeholder 2"/>
           <p:cNvSpPr>
             <a:spLocks noGrp="1"/>
           </p:cNvSpPr>
           <p:nvPr>
-            <p:ph type="title"/>
+            <p:ph idx="1"/>
           </p:nvPr>
         </p:nvSpPr>
         <p:spPr/>
@@ -19043,61 +18946,7 @@
             </a:pPr>
             <a:r>
               <a:rPr/>
-              <a:t>Notes</a:t>
-            </a:r>
-            <a:r>
-              <a:rPr/>
-              <a:t> </a:t>
-            </a:r>
-            <a:r>
-              <a:rPr/>
-              <a:t>about</a:t>
-            </a:r>
-            <a:r>
-              <a:rPr/>
-              <a:t> </a:t>
-            </a:r>
-            <a:r>
-              <a:rPr/>
-              <a:t>this</a:t>
-            </a:r>
-            <a:r>
-              <a:rPr/>
-              <a:t> </a:t>
-            </a:r>
-            <a:r>
-              <a:rPr/>
-              <a:t>talk</a:t>
-            </a:r>
-          </a:p>
-        </p:txBody>
-      </p:sp>
-      <p:sp>
-        <p:nvSpPr>
-          <p:cNvPr id="3" name="Content Placeholder 2"/>
-          <p:cNvSpPr>
-            <a:spLocks noGrp="1"/>
-          </p:cNvSpPr>
-          <p:nvPr>
-            <p:ph idx="1"/>
-          </p:nvPr>
-        </p:nvSpPr>
-        <p:spPr/>
-        <p:txBody>
-          <a:bodyPr/>
-          <a:lstStyle/>
-          <a:p>
-            <a:pPr lvl="1"/>
-            <a:r>
-              <a:rPr/>
-              <a:t>Do not include this slide in the final presentation</a:t>
-            </a:r>
-          </a:p>
-          <a:p>
-            <a:pPr lvl="1"/>
-            <a:r>
-              <a:rPr/>
-              <a:t>If I do a flipped classroom, here would be a good place to split with most of the material before this slide being in lectures to be viewed before the class. Then the classrom lecture would start from about here (after a very quick review) and focus on the “On your own” exercises.</a:t>
+              <a:t> ### A quick tutorial on colors</a:t>
             </a:r>
           </a:p>
         </p:txBody>
@@ -19213,6 +19062,17 @@
               <a:t>Import the data and create a bar chart showing the frequency of opinions written by year_filed. Note that there are a few typos and a few rows that do not belong. You can remove these, but they will not affect any of the analyses we are considering.</a:t>
             </a:r>
           </a:p>
+          <a:p>
+            <a:pPr lvl="0" marL="1270000" indent="0">
+              <a:buNone/>
+            </a:pPr>
+            <a:r>
+              <a:rPr sz="1800">
+                <a:latin typeface="Courier"/>
+              </a:rPr>
+              <a:t>## `curl` package not installed, falling back to using `url()`</a:t>
+            </a:r>
+          </a:p>
         </p:txBody>
       </p:sp>
     </p:spTree>
@@ -19221,6 +19081,333 @@
 </file>
 
 <file path=ppt/slides/slide40.xml><?xml version="1.0" encoding="utf-8"?>
+<p:sld xmlns:a="http://schemas.openxmlformats.org/drawingml/2006/main" xmlns:r="http://schemas.openxmlformats.org/officeDocument/2006/relationships" xmlns:p="http://schemas.openxmlformats.org/presentationml/2006/main">
+  <p:cSld>
+    <p:spTree>
+      <p:nvGrpSpPr>
+        <p:cNvPr id="1" name=""/>
+        <p:cNvGrpSpPr/>
+        <p:nvPr/>
+      </p:nvGrpSpPr>
+      <p:grpSpPr>
+        <a:xfrm>
+          <a:off x="0" y="0"/>
+          <a:ext cx="0" cy="0"/>
+          <a:chOff x="0" y="0"/>
+          <a:chExt cx="0" cy="0"/>
+        </a:xfrm>
+      </p:grpSpPr>
+      <p:sp>
+        <p:nvSpPr>
+          <p:cNvPr id="2" name="Title 1"/>
+          <p:cNvSpPr>
+            <a:spLocks noGrp="1"/>
+          </p:cNvSpPr>
+          <p:nvPr>
+            <p:ph type="title"/>
+          </p:nvPr>
+        </p:nvSpPr>
+        <p:spPr/>
+        <p:txBody>
+          <a:bodyPr/>
+          <a:lstStyle/>
+          <a:p>
+            <a:pPr lvl="0" marL="0" indent="0">
+              <a:buNone/>
+            </a:pPr>
+            <a:r>
+              <a:rPr/>
+              <a:t>Bars</a:t>
+            </a:r>
+          </a:p>
+        </p:txBody>
+      </p:sp>
+      <p:sp>
+        <p:nvSpPr>
+          <p:cNvPr id="3" name="Content Placeholder 2"/>
+          <p:cNvSpPr>
+            <a:spLocks noGrp="1"/>
+          </p:cNvSpPr>
+          <p:nvPr>
+            <p:ph idx="1"/>
+          </p:nvPr>
+        </p:nvSpPr>
+        <p:spPr/>
+        <p:txBody>
+          <a:bodyPr/>
+          <a:lstStyle/>
+          <a:p>
+            <a:pPr lvl="1"/>
+            <a:r>
+              <a:rPr/>
+              <a:t>Fewer in numbers than points</a:t>
+            </a:r>
+          </a:p>
+          <a:p>
+            <a:pPr lvl="1"/>
+            <a:r>
+              <a:rPr/>
+              <a:t>Usually a summary statistic</a:t>
+            </a:r>
+          </a:p>
+          <a:p>
+            <a:pPr lvl="2"/>
+            <a:r>
+              <a:rPr/>
+              <a:t>Count</a:t>
+            </a:r>
+          </a:p>
+          <a:p>
+            <a:pPr lvl="2"/>
+            <a:r>
+              <a:rPr/>
+              <a:t>Percent</a:t>
+            </a:r>
+          </a:p>
+          <a:p>
+            <a:pPr lvl="2"/>
+            <a:r>
+              <a:rPr/>
+              <a:t>Average</a:t>
+            </a:r>
+          </a:p>
+          <a:p>
+            <a:pPr lvl="2"/>
+            <a:r>
+              <a:rPr/>
+              <a:t>Total</a:t>
+            </a:r>
+          </a:p>
+          <a:p>
+            <a:pPr lvl="1"/>
+            <a:r>
+              <a:rPr/>
+              <a:t>A bar chart is NOT a histogram</a:t>
+            </a:r>
+          </a:p>
+        </p:txBody>
+      </p:sp>
+    </p:spTree>
+  </p:cSld>
+</p:sld>
+</file>
+
+<file path=ppt/slides/slide41.xml><?xml version="1.0" encoding="utf-8"?>
+<p:sld xmlns:a="http://schemas.openxmlformats.org/drawingml/2006/main" xmlns:r="http://schemas.openxmlformats.org/officeDocument/2006/relationships" xmlns:p="http://schemas.openxmlformats.org/presentationml/2006/main">
+  <p:cSld>
+    <p:spTree>
+      <p:nvGrpSpPr>
+        <p:cNvPr id="1" name=""/>
+        <p:cNvGrpSpPr/>
+        <p:nvPr/>
+      </p:nvGrpSpPr>
+      <p:grpSpPr>
+        <a:xfrm>
+          <a:off x="0" y="0"/>
+          <a:ext cx="0" cy="0"/>
+          <a:chOff x="0" y="0"/>
+          <a:chExt cx="0" cy="0"/>
+        </a:xfrm>
+      </p:grpSpPr>
+      <p:sp>
+        <p:nvSpPr>
+          <p:cNvPr id="2" name="Title 1"/>
+          <p:cNvSpPr>
+            <a:spLocks noGrp="1"/>
+          </p:cNvSpPr>
+          <p:nvPr>
+            <p:ph type="title"/>
+          </p:nvPr>
+        </p:nvSpPr>
+        <p:spPr/>
+        <p:txBody>
+          <a:bodyPr/>
+          <a:lstStyle/>
+          <a:p>
+            <a:pPr lvl="0" marL="0" indent="0">
+              <a:buNone/>
+            </a:pPr>
+            <a:r>
+              <a:rPr/>
+              <a:t>Aesthetics</a:t>
+            </a:r>
+            <a:r>
+              <a:rPr/>
+              <a:t> </a:t>
+            </a:r>
+            <a:r>
+              <a:rPr/>
+              <a:t>for</a:t>
+            </a:r>
+            <a:r>
+              <a:rPr/>
+              <a:t> </a:t>
+            </a:r>
+            <a:r>
+              <a:rPr/>
+              <a:t>bars</a:t>
+            </a:r>
+          </a:p>
+        </p:txBody>
+      </p:sp>
+      <p:sp>
+        <p:nvSpPr>
+          <p:cNvPr id="3" name="Content Placeholder 2"/>
+          <p:cNvSpPr>
+            <a:spLocks noGrp="1"/>
+          </p:cNvSpPr>
+          <p:nvPr>
+            <p:ph idx="1"/>
+          </p:nvPr>
+        </p:nvSpPr>
+        <p:spPr/>
+        <p:txBody>
+          <a:bodyPr/>
+          <a:lstStyle/>
+          <a:p>
+            <a:pPr lvl="1"/>
+            <a:r>
+              <a:rPr/>
+              <a:t>Review</a:t>
+            </a:r>
+          </a:p>
+          <a:p>
+            <a:pPr lvl="2"/>
+            <a:r>
+              <a:rPr/>
+              <a:t>Location</a:t>
+            </a:r>
+          </a:p>
+          <a:p>
+            <a:pPr lvl="2"/>
+            <a:r>
+              <a:rPr/>
+              <a:t>Size</a:t>
+            </a:r>
+          </a:p>
+          <a:p>
+            <a:pPr lvl="2"/>
+            <a:r>
+              <a:rPr/>
+              <a:t>Color</a:t>
+            </a:r>
+          </a:p>
+          <a:p>
+            <a:pPr lvl="2"/>
+            <a:r>
+              <a:rPr/>
+              <a:t>NOT shape!!!</a:t>
+            </a:r>
+          </a:p>
+        </p:txBody>
+      </p:sp>
+    </p:spTree>
+  </p:cSld>
+</p:sld>
+</file>
+
+<file path=ppt/slides/slide42.xml><?xml version="1.0" encoding="utf-8"?>
+<p:sld xmlns:a="http://schemas.openxmlformats.org/drawingml/2006/main" xmlns:r="http://schemas.openxmlformats.org/officeDocument/2006/relationships" xmlns:p="http://schemas.openxmlformats.org/presentationml/2006/main">
+  <p:cSld>
+    <p:spTree>
+      <p:nvGrpSpPr>
+        <p:cNvPr id="1" name=""/>
+        <p:cNvGrpSpPr/>
+        <p:nvPr/>
+      </p:nvGrpSpPr>
+      <p:grpSpPr>
+        <a:xfrm>
+          <a:off x="0" y="0"/>
+          <a:ext cx="0" cy="0"/>
+          <a:chOff x="0" y="0"/>
+          <a:chExt cx="0" cy="0"/>
+        </a:xfrm>
+      </p:grpSpPr>
+      <p:sp>
+        <p:nvSpPr>
+          <p:cNvPr id="2" name="Title 1"/>
+          <p:cNvSpPr>
+            <a:spLocks noGrp="1"/>
+          </p:cNvSpPr>
+          <p:nvPr>
+            <p:ph type="title"/>
+          </p:nvPr>
+        </p:nvSpPr>
+        <p:spPr/>
+        <p:txBody>
+          <a:bodyPr/>
+          <a:lstStyle/>
+          <a:p>
+            <a:pPr lvl="0" marL="0" indent="0">
+              <a:buNone/>
+            </a:pPr>
+            <a:r>
+              <a:rPr/>
+              <a:t>Notes</a:t>
+            </a:r>
+            <a:r>
+              <a:rPr/>
+              <a:t> </a:t>
+            </a:r>
+            <a:r>
+              <a:rPr/>
+              <a:t>about</a:t>
+            </a:r>
+            <a:r>
+              <a:rPr/>
+              <a:t> </a:t>
+            </a:r>
+            <a:r>
+              <a:rPr/>
+              <a:t>this</a:t>
+            </a:r>
+            <a:r>
+              <a:rPr/>
+              <a:t> </a:t>
+            </a:r>
+            <a:r>
+              <a:rPr/>
+              <a:t>talk</a:t>
+            </a:r>
+          </a:p>
+        </p:txBody>
+      </p:sp>
+      <p:sp>
+        <p:nvSpPr>
+          <p:cNvPr id="3" name="Content Placeholder 2"/>
+          <p:cNvSpPr>
+            <a:spLocks noGrp="1"/>
+          </p:cNvSpPr>
+          <p:nvPr>
+            <p:ph idx="1"/>
+          </p:nvPr>
+        </p:nvSpPr>
+        <p:spPr/>
+        <p:txBody>
+          <a:bodyPr/>
+          <a:lstStyle/>
+          <a:p>
+            <a:pPr lvl="1"/>
+            <a:r>
+              <a:rPr/>
+              <a:t>Do not include this slide in the final presentation</a:t>
+            </a:r>
+          </a:p>
+          <a:p>
+            <a:pPr lvl="1"/>
+            <a:r>
+              <a:rPr/>
+              <a:t>If I do a flipped classroom, here would be a good place to split with most of the material before this slide being in lectures to be viewed before the class. Then the classrom lecture would start from about here (after a very quick review) and focus on the “On your own” exercises.</a:t>
+            </a:r>
+          </a:p>
+        </p:txBody>
+      </p:sp>
+    </p:spTree>
+  </p:cSld>
+</p:sld>
+</file>
+
+<file path=ppt/slides/slide43.xml><?xml version="1.0" encoding="utf-8"?>
 <p:sld xmlns:a="http://schemas.openxmlformats.org/drawingml/2006/main" xmlns:r="http://schemas.openxmlformats.org/officeDocument/2006/relationships" xmlns:p="http://schemas.openxmlformats.org/presentationml/2006/main">
   <p:cSld>
     <p:spTree>
@@ -19321,7 +19508,7 @@
 </p:sld>
 </file>
 
-<file path=ppt/slides/slide41.xml><?xml version="1.0" encoding="utf-8"?>
+<file path=ppt/slides/slide44.xml><?xml version="1.0" encoding="utf-8"?>
 <p:sld xmlns:a="http://schemas.openxmlformats.org/drawingml/2006/main" xmlns:r="http://schemas.openxmlformats.org/officeDocument/2006/relationships" xmlns:p="http://schemas.openxmlformats.org/presentationml/2006/main">
   <p:cSld>
     <p:spTree>
@@ -19422,310 +19609,6 @@
 </p:sld>
 </file>
 
-<file path=ppt/slides/slide42.xml><?xml version="1.0" encoding="utf-8"?>
-<p:sld xmlns:a="http://schemas.openxmlformats.org/drawingml/2006/main" xmlns:r="http://schemas.openxmlformats.org/officeDocument/2006/relationships" xmlns:p="http://schemas.openxmlformats.org/presentationml/2006/main">
-  <p:cSld>
-    <p:spTree>
-      <p:nvGrpSpPr>
-        <p:cNvPr id="1" name=""/>
-        <p:cNvGrpSpPr/>
-        <p:nvPr/>
-      </p:nvGrpSpPr>
-      <p:grpSpPr>
-        <a:xfrm>
-          <a:off x="0" y="0"/>
-          <a:ext cx="0" cy="0"/>
-          <a:chOff x="0" y="0"/>
-          <a:chExt cx="0" cy="0"/>
-        </a:xfrm>
-      </p:grpSpPr>
-      <p:sp>
-        <p:nvSpPr>
-          <p:cNvPr id="2" name="Title 1"/>
-          <p:cNvSpPr>
-            <a:spLocks noGrp="1"/>
-          </p:cNvSpPr>
-          <p:nvPr>
-            <p:ph type="title"/>
-          </p:nvPr>
-        </p:nvSpPr>
-        <p:spPr/>
-        <p:txBody>
-          <a:bodyPr/>
-          <a:lstStyle/>
-          <a:p>
-            <a:pPr lvl="0" marL="0" indent="0">
-              <a:buNone/>
-            </a:pPr>
-            <a:r>
-              <a:rPr/>
-              <a:t>On</a:t>
-            </a:r>
-            <a:r>
-              <a:rPr/>
-              <a:t> </a:t>
-            </a:r>
-            <a:r>
-              <a:rPr/>
-              <a:t>your</a:t>
-            </a:r>
-            <a:r>
-              <a:rPr/>
-              <a:t> </a:t>
-            </a:r>
-            <a:r>
-              <a:rPr/>
-              <a:t>own</a:t>
-            </a:r>
-          </a:p>
-        </p:txBody>
-      </p:sp>
-      <p:sp>
-        <p:nvSpPr>
-          <p:cNvPr id="3" name="Content Placeholder 2"/>
-          <p:cNvSpPr>
-            <a:spLocks noGrp="1"/>
-          </p:cNvSpPr>
-          <p:nvPr>
-            <p:ph idx="1"/>
-          </p:nvPr>
-        </p:nvSpPr>
-        <p:spPr/>
-        <p:txBody>
-          <a:bodyPr/>
-          <a:lstStyle/>
-          <a:p>
-            <a:pPr lvl="1"/>
-            <a:r>
-              <a:rPr/>
-              <a:t>Draw a horizontal and vertical bar chart showing the number of people in each gender (use the Sex variable).</a:t>
-            </a:r>
-          </a:p>
-        </p:txBody>
-      </p:sp>
-    </p:spTree>
-  </p:cSld>
-</p:sld>
-</file>
-
-<file path=ppt/slides/slide43.xml><?xml version="1.0" encoding="utf-8"?>
-<p:sld xmlns:a="http://schemas.openxmlformats.org/drawingml/2006/main" xmlns:r="http://schemas.openxmlformats.org/officeDocument/2006/relationships" xmlns:p="http://schemas.openxmlformats.org/presentationml/2006/main">
-  <p:cSld>
-    <p:spTree>
-      <p:nvGrpSpPr>
-        <p:cNvPr id="1" name=""/>
-        <p:cNvGrpSpPr/>
-        <p:nvPr/>
-      </p:nvGrpSpPr>
-      <p:grpSpPr>
-        <a:xfrm>
-          <a:off x="0" y="0"/>
-          <a:ext cx="0" cy="0"/>
-          <a:chOff x="0" y="0"/>
-          <a:chExt cx="0" cy="0"/>
-        </a:xfrm>
-      </p:grpSpPr>
-      <p:sp>
-        <p:nvSpPr>
-          <p:cNvPr id="2" name="Title 1"/>
-          <p:cNvSpPr>
-            <a:spLocks noGrp="1"/>
-          </p:cNvSpPr>
-          <p:nvPr>
-            <p:ph type="title"/>
-          </p:nvPr>
-        </p:nvSpPr>
-        <p:spPr/>
-        <p:txBody>
-          <a:bodyPr/>
-          <a:lstStyle/>
-          <a:p>
-            <a:pPr lvl="0" marL="0" indent="0">
-              <a:buNone/>
-            </a:pPr>
-            <a:r>
-              <a:rPr/>
-              <a:t>Wait</a:t>
-            </a:r>
-            <a:r>
-              <a:rPr/>
-              <a:t> </a:t>
-            </a:r>
-            <a:r>
-              <a:rPr/>
-              <a:t>before</a:t>
-            </a:r>
-            <a:r>
-              <a:rPr/>
-              <a:t> </a:t>
-            </a:r>
-            <a:r>
-              <a:rPr/>
-              <a:t>showing</a:t>
-            </a:r>
-          </a:p>
-        </p:txBody>
-      </p:sp>
-      <p:sp>
-        <p:nvSpPr>
-          <p:cNvPr id="3" name="Content Placeholder 2"/>
-          <p:cNvSpPr>
-            <a:spLocks noGrp="1"/>
-          </p:cNvSpPr>
-          <p:nvPr>
-            <p:ph idx="1"/>
-          </p:nvPr>
-        </p:nvSpPr>
-        <p:spPr/>
-        <p:txBody>
-          <a:bodyPr/>
-          <a:lstStyle/>
-          <a:p>
-            <a:pPr lvl="0" marL="0" indent="0">
-              <a:buNone/>
-            </a:pPr>
-            <a:r>
-              <a:rPr/>
-              <a:t>((Python code))</a:t>
-            </a:r>
-          </a:p>
-          <a:p>
-            <a:pPr lvl="0" marL="0" indent="0">
-              <a:buNone/>
-            </a:pPr>
-            <a:r>
-              <a:rPr/>
-              <a:t>((R code))</a:t>
-            </a:r>
-          </a:p>
-          <a:p>
-            <a:pPr lvl="0" marL="0" indent="0">
-              <a:buNone/>
-            </a:pPr>
-            <a:r>
-              <a:rPr/>
-              <a:t>((Tableau steps))</a:t>
-            </a:r>
-          </a:p>
-        </p:txBody>
-      </p:sp>
-    </p:spTree>
-  </p:cSld>
-</p:sld>
-</file>
-
-<file path=ppt/slides/slide44.xml><?xml version="1.0" encoding="utf-8"?>
-<p:sld xmlns:a="http://schemas.openxmlformats.org/drawingml/2006/main" xmlns:r="http://schemas.openxmlformats.org/officeDocument/2006/relationships" xmlns:p="http://schemas.openxmlformats.org/presentationml/2006/main">
-  <p:cSld>
-    <p:spTree>
-      <p:nvGrpSpPr>
-        <p:cNvPr id="1" name=""/>
-        <p:cNvGrpSpPr/>
-        <p:nvPr/>
-      </p:nvGrpSpPr>
-      <p:grpSpPr>
-        <a:xfrm>
-          <a:off x="0" y="0"/>
-          <a:ext cx="0" cy="0"/>
-          <a:chOff x="0" y="0"/>
-          <a:chExt cx="0" cy="0"/>
-        </a:xfrm>
-      </p:grpSpPr>
-      <p:sp>
-        <p:nvSpPr>
-          <p:cNvPr id="2" name="Title 1"/>
-          <p:cNvSpPr>
-            <a:spLocks noGrp="1"/>
-          </p:cNvSpPr>
-          <p:nvPr>
-            <p:ph type="title"/>
-          </p:nvPr>
-        </p:nvSpPr>
-        <p:spPr/>
-        <p:txBody>
-          <a:bodyPr/>
-          <a:lstStyle/>
-          <a:p>
-            <a:pPr lvl="0" marL="0" indent="0">
-              <a:buNone/>
-            </a:pPr>
-            <a:r>
-              <a:rPr/>
-              <a:t>What</a:t>
-            </a:r>
-            <a:r>
-              <a:rPr/>
-              <a:t> </a:t>
-            </a:r>
-            <a:r>
-              <a:rPr/>
-              <a:t>your</a:t>
-            </a:r>
-            <a:r>
-              <a:rPr/>
-              <a:t> </a:t>
-            </a:r>
-            <a:r>
-              <a:rPr/>
-              <a:t>visualization</a:t>
-            </a:r>
-            <a:r>
-              <a:rPr/>
-              <a:t> </a:t>
-            </a:r>
-            <a:r>
-              <a:rPr/>
-              <a:t>might</a:t>
-            </a:r>
-            <a:r>
-              <a:rPr/>
-              <a:t> </a:t>
-            </a:r>
-            <a:r>
-              <a:rPr/>
-              <a:t>look</a:t>
-            </a:r>
-            <a:r>
-              <a:rPr/>
-              <a:t> </a:t>
-            </a:r>
-            <a:r>
-              <a:rPr/>
-              <a:t>like</a:t>
-            </a:r>
-          </a:p>
-        </p:txBody>
-      </p:sp>
-      <p:sp>
-        <p:nvSpPr>
-          <p:cNvPr id="3" name="Content Placeholder 2"/>
-          <p:cNvSpPr>
-            <a:spLocks noGrp="1"/>
-          </p:cNvSpPr>
-          <p:nvPr>
-            <p:ph idx="1"/>
-          </p:nvPr>
-        </p:nvSpPr>
-        <p:spPr/>
-        <p:txBody>
-          <a:bodyPr/>
-          <a:lstStyle/>
-          <a:p>
-            <a:pPr lvl="0" marL="0" indent="0">
-              <a:buNone/>
-            </a:pPr>
-            <a:r>
-              <a:rPr/>
-              <a:t>((Show visualization))</a:t>
-            </a:r>
-          </a:p>
-        </p:txBody>
-      </p:sp>
-    </p:spTree>
-  </p:cSld>
-</p:sld>
-</file>
-
 <file path=ppt/slides/slide45.xml><?xml version="1.0" encoding="utf-8"?>
 <p:sld xmlns:a="http://schemas.openxmlformats.org/drawingml/2006/main" xmlns:r="http://schemas.openxmlformats.org/officeDocument/2006/relationships" xmlns:p="http://schemas.openxmlformats.org/presentationml/2006/main">
   <p:cSld>
@@ -19763,23 +19646,23 @@
             </a:pPr>
             <a:r>
               <a:rPr/>
-              <a:t>Thoughts</a:t>
-            </a:r>
-            <a:r>
-              <a:rPr/>
-              <a:t> </a:t>
-            </a:r>
-            <a:r>
-              <a:rPr/>
-              <a:t>on</a:t>
-            </a:r>
-            <a:r>
-              <a:rPr/>
-              <a:t> </a:t>
-            </a:r>
-            <a:r>
-              <a:rPr/>
-              <a:t>location</a:t>
+              <a:t>On</a:t>
+            </a:r>
+            <a:r>
+              <a:rPr/>
+              <a:t> </a:t>
+            </a:r>
+            <a:r>
+              <a:rPr/>
+              <a:t>your</a:t>
+            </a:r>
+            <a:r>
+              <a:rPr/>
+              <a:t> </a:t>
+            </a:r>
+            <a:r>
+              <a:rPr/>
+              <a:t>own</a:t>
             </a:r>
           </a:p>
         </p:txBody>
@@ -19802,14 +19685,7 @@
             <a:pPr lvl="1"/>
             <a:r>
               <a:rPr/>
-              <a:t>Axis labels often fit better on vertical location</a:t>
-            </a:r>
-          </a:p>
-          <a:p>
-            <a:pPr lvl="1"/>
-            <a:r>
-              <a:rPr/>
-              <a:t>Cannot vary both X and Y</a:t>
+              <a:t>Draw a horizontal and vertical bar chart showing the number of people in each gender (use the Sex variable).</a:t>
             </a:r>
           </a:p>
         </p:txBody>
@@ -19856,7 +19732,23 @@
             </a:pPr>
             <a:r>
               <a:rPr/>
-              <a:t>Size</a:t>
+              <a:t>Wait</a:t>
+            </a:r>
+            <a:r>
+              <a:rPr/>
+              <a:t> </a:t>
+            </a:r>
+            <a:r>
+              <a:rPr/>
+              <a:t>before</a:t>
+            </a:r>
+            <a:r>
+              <a:rPr/>
+              <a:t> </a:t>
+            </a:r>
+            <a:r>
+              <a:rPr/>
+              <a:t>showing</a:t>
             </a:r>
           </a:p>
         </p:txBody>
@@ -19876,24 +19768,30 @@
           <a:bodyPr/>
           <a:lstStyle/>
           <a:p>
-            <a:pPr lvl="1"/>
-            <a:r>
-              <a:rPr/>
-              <a:t>Length varies, width doesn’t</a:t>
-            </a:r>
-          </a:p>
-          <a:p>
-            <a:pPr lvl="2"/>
-            <a:r>
-              <a:rPr/>
-              <a:t>Exception, mosaic plots</a:t>
-            </a:r>
-          </a:p>
-          <a:p>
-            <a:pPr lvl="2"/>
-            <a:r>
-              <a:rPr/>
-              <a:t>Think about gaps between bars</a:t>
+            <a:pPr lvl="0" marL="0" indent="0">
+              <a:buNone/>
+            </a:pPr>
+            <a:r>
+              <a:rPr/>
+              <a:t>((Python code))</a:t>
+            </a:r>
+          </a:p>
+          <a:p>
+            <a:pPr lvl="0" marL="0" indent="0">
+              <a:buNone/>
+            </a:pPr>
+            <a:r>
+              <a:rPr/>
+              <a:t>((R code))</a:t>
+            </a:r>
+          </a:p>
+          <a:p>
+            <a:pPr lvl="0" marL="0" indent="0">
+              <a:buNone/>
+            </a:pPr>
+            <a:r>
+              <a:rPr/>
+              <a:t>((Tableau steps))</a:t>
             </a:r>
           </a:p>
         </p:txBody>
@@ -19904,6 +19802,399 @@
 </file>
 
 <file path=ppt/slides/slide47.xml><?xml version="1.0" encoding="utf-8"?>
+<p:sld xmlns:a="http://schemas.openxmlformats.org/drawingml/2006/main" xmlns:r="http://schemas.openxmlformats.org/officeDocument/2006/relationships" xmlns:p="http://schemas.openxmlformats.org/presentationml/2006/main">
+  <p:cSld>
+    <p:spTree>
+      <p:nvGrpSpPr>
+        <p:cNvPr id="1" name=""/>
+        <p:cNvGrpSpPr/>
+        <p:nvPr/>
+      </p:nvGrpSpPr>
+      <p:grpSpPr>
+        <a:xfrm>
+          <a:off x="0" y="0"/>
+          <a:ext cx="0" cy="0"/>
+          <a:chOff x="0" y="0"/>
+          <a:chExt cx="0" cy="0"/>
+        </a:xfrm>
+      </p:grpSpPr>
+      <p:sp>
+        <p:nvSpPr>
+          <p:cNvPr id="2" name="Title 1"/>
+          <p:cNvSpPr>
+            <a:spLocks noGrp="1"/>
+          </p:cNvSpPr>
+          <p:nvPr>
+            <p:ph type="title"/>
+          </p:nvPr>
+        </p:nvSpPr>
+        <p:spPr/>
+        <p:txBody>
+          <a:bodyPr/>
+          <a:lstStyle/>
+          <a:p>
+            <a:pPr lvl="0" marL="0" indent="0">
+              <a:buNone/>
+            </a:pPr>
+            <a:r>
+              <a:rPr/>
+              <a:t>What</a:t>
+            </a:r>
+            <a:r>
+              <a:rPr/>
+              <a:t> </a:t>
+            </a:r>
+            <a:r>
+              <a:rPr/>
+              <a:t>your</a:t>
+            </a:r>
+            <a:r>
+              <a:rPr/>
+              <a:t> </a:t>
+            </a:r>
+            <a:r>
+              <a:rPr/>
+              <a:t>visualization</a:t>
+            </a:r>
+            <a:r>
+              <a:rPr/>
+              <a:t> </a:t>
+            </a:r>
+            <a:r>
+              <a:rPr/>
+              <a:t>might</a:t>
+            </a:r>
+            <a:r>
+              <a:rPr/>
+              <a:t> </a:t>
+            </a:r>
+            <a:r>
+              <a:rPr/>
+              <a:t>look</a:t>
+            </a:r>
+            <a:r>
+              <a:rPr/>
+              <a:t> </a:t>
+            </a:r>
+            <a:r>
+              <a:rPr/>
+              <a:t>like</a:t>
+            </a:r>
+          </a:p>
+        </p:txBody>
+      </p:sp>
+      <p:sp>
+        <p:nvSpPr>
+          <p:cNvPr id="3" name="Content Placeholder 2"/>
+          <p:cNvSpPr>
+            <a:spLocks noGrp="1"/>
+          </p:cNvSpPr>
+          <p:nvPr>
+            <p:ph idx="1"/>
+          </p:nvPr>
+        </p:nvSpPr>
+        <p:spPr/>
+        <p:txBody>
+          <a:bodyPr/>
+          <a:lstStyle/>
+          <a:p>
+            <a:pPr lvl="0" marL="0" indent="0">
+              <a:buNone/>
+            </a:pPr>
+            <a:r>
+              <a:rPr/>
+              <a:t>((Show visualization))</a:t>
+            </a:r>
+          </a:p>
+        </p:txBody>
+      </p:sp>
+    </p:spTree>
+  </p:cSld>
+</p:sld>
+</file>
+
+<file path=ppt/slides/slide48.xml><?xml version="1.0" encoding="utf-8"?>
+<p:sld xmlns:a="http://schemas.openxmlformats.org/drawingml/2006/main" xmlns:r="http://schemas.openxmlformats.org/officeDocument/2006/relationships" xmlns:p="http://schemas.openxmlformats.org/presentationml/2006/main">
+  <p:cSld>
+    <p:spTree>
+      <p:nvGrpSpPr>
+        <p:cNvPr id="1" name=""/>
+        <p:cNvGrpSpPr/>
+        <p:nvPr/>
+      </p:nvGrpSpPr>
+      <p:grpSpPr>
+        <a:xfrm>
+          <a:off x="0" y="0"/>
+          <a:ext cx="0" cy="0"/>
+          <a:chOff x="0" y="0"/>
+          <a:chExt cx="0" cy="0"/>
+        </a:xfrm>
+      </p:grpSpPr>
+      <p:sp>
+        <p:nvSpPr>
+          <p:cNvPr id="2" name="Title 1"/>
+          <p:cNvSpPr>
+            <a:spLocks noGrp="1"/>
+          </p:cNvSpPr>
+          <p:nvPr>
+            <p:ph type="title"/>
+          </p:nvPr>
+        </p:nvSpPr>
+        <p:spPr/>
+        <p:txBody>
+          <a:bodyPr/>
+          <a:lstStyle/>
+          <a:p>
+            <a:pPr lvl="0" marL="0" indent="0">
+              <a:buNone/>
+            </a:pPr>
+            <a:r>
+              <a:rPr/>
+              <a:t>Thoughts</a:t>
+            </a:r>
+            <a:r>
+              <a:rPr/>
+              <a:t> </a:t>
+            </a:r>
+            <a:r>
+              <a:rPr/>
+              <a:t>on</a:t>
+            </a:r>
+            <a:r>
+              <a:rPr/>
+              <a:t> </a:t>
+            </a:r>
+            <a:r>
+              <a:rPr/>
+              <a:t>location</a:t>
+            </a:r>
+          </a:p>
+        </p:txBody>
+      </p:sp>
+      <p:sp>
+        <p:nvSpPr>
+          <p:cNvPr id="3" name="Content Placeholder 2"/>
+          <p:cNvSpPr>
+            <a:spLocks noGrp="1"/>
+          </p:cNvSpPr>
+          <p:nvPr>
+            <p:ph idx="1"/>
+          </p:nvPr>
+        </p:nvSpPr>
+        <p:spPr/>
+        <p:txBody>
+          <a:bodyPr/>
+          <a:lstStyle/>
+          <a:p>
+            <a:pPr lvl="1"/>
+            <a:r>
+              <a:rPr/>
+              <a:t>Axis labels often fit better on vertical location</a:t>
+            </a:r>
+          </a:p>
+          <a:p>
+            <a:pPr lvl="1"/>
+            <a:r>
+              <a:rPr/>
+              <a:t>Cannot vary both X and Y</a:t>
+            </a:r>
+          </a:p>
+        </p:txBody>
+      </p:sp>
+    </p:spTree>
+  </p:cSld>
+</p:sld>
+</file>
+
+<file path=ppt/slides/slide49.xml><?xml version="1.0" encoding="utf-8"?>
+<p:sld xmlns:a="http://schemas.openxmlformats.org/drawingml/2006/main" xmlns:r="http://schemas.openxmlformats.org/officeDocument/2006/relationships" xmlns:p="http://schemas.openxmlformats.org/presentationml/2006/main">
+  <p:cSld>
+    <p:spTree>
+      <p:nvGrpSpPr>
+        <p:cNvPr id="1" name=""/>
+        <p:cNvGrpSpPr/>
+        <p:nvPr/>
+      </p:nvGrpSpPr>
+      <p:grpSpPr>
+        <a:xfrm>
+          <a:off x="0" y="0"/>
+          <a:ext cx="0" cy="0"/>
+          <a:chOff x="0" y="0"/>
+          <a:chExt cx="0" cy="0"/>
+        </a:xfrm>
+      </p:grpSpPr>
+      <p:sp>
+        <p:nvSpPr>
+          <p:cNvPr id="2" name="Title 1"/>
+          <p:cNvSpPr>
+            <a:spLocks noGrp="1"/>
+          </p:cNvSpPr>
+          <p:nvPr>
+            <p:ph type="title"/>
+          </p:nvPr>
+        </p:nvSpPr>
+        <p:spPr/>
+        <p:txBody>
+          <a:bodyPr/>
+          <a:lstStyle/>
+          <a:p>
+            <a:pPr lvl="0" marL="0" indent="0">
+              <a:buNone/>
+            </a:pPr>
+            <a:r>
+              <a:rPr/>
+              <a:t>Size</a:t>
+            </a:r>
+          </a:p>
+        </p:txBody>
+      </p:sp>
+      <p:sp>
+        <p:nvSpPr>
+          <p:cNvPr id="3" name="Content Placeholder 2"/>
+          <p:cNvSpPr>
+            <a:spLocks noGrp="1"/>
+          </p:cNvSpPr>
+          <p:nvPr>
+            <p:ph idx="1"/>
+          </p:nvPr>
+        </p:nvSpPr>
+        <p:spPr/>
+        <p:txBody>
+          <a:bodyPr/>
+          <a:lstStyle/>
+          <a:p>
+            <a:pPr lvl="1"/>
+            <a:r>
+              <a:rPr/>
+              <a:t>Length varies, width doesn’t</a:t>
+            </a:r>
+          </a:p>
+          <a:p>
+            <a:pPr lvl="2"/>
+            <a:r>
+              <a:rPr/>
+              <a:t>Exception, mosaic plots</a:t>
+            </a:r>
+          </a:p>
+          <a:p>
+            <a:pPr lvl="2"/>
+            <a:r>
+              <a:rPr/>
+              <a:t>Think about gaps between bars</a:t>
+            </a:r>
+          </a:p>
+        </p:txBody>
+      </p:sp>
+    </p:spTree>
+  </p:cSld>
+</p:sld>
+</file>
+
+<file path=ppt/slides/slide5.xml><?xml version="1.0" encoding="utf-8"?>
+<p:sld xmlns:a="http://schemas.openxmlformats.org/drawingml/2006/main" xmlns:r="http://schemas.openxmlformats.org/officeDocument/2006/relationships" xmlns:p="http://schemas.openxmlformats.org/presentationml/2006/main">
+  <p:cSld>
+    <p:spTree>
+      <p:nvGrpSpPr>
+        <p:cNvPr id="1" name=""/>
+        <p:cNvGrpSpPr/>
+        <p:nvPr/>
+      </p:nvGrpSpPr>
+      <p:grpSpPr>
+        <a:xfrm>
+          <a:off x="0" y="0"/>
+          <a:ext cx="0" cy="0"/>
+          <a:chOff x="0" y="0"/>
+          <a:chExt cx="0" cy="0"/>
+        </a:xfrm>
+      </p:grpSpPr>
+      <p:sp>
+        <p:nvSpPr>
+          <p:cNvPr id="2" name="Title 1"/>
+          <p:cNvSpPr>
+            <a:spLocks noGrp="1"/>
+          </p:cNvSpPr>
+          <p:nvPr>
+            <p:ph type="title"/>
+          </p:nvPr>
+        </p:nvSpPr>
+        <p:spPr/>
+        <p:txBody>
+          <a:bodyPr/>
+          <a:lstStyle/>
+          <a:p>
+            <a:pPr lvl="0" marL="0" indent="0">
+              <a:buNone/>
+            </a:pPr>
+            <a:r>
+              <a:rPr/>
+              <a:t>Python</a:t>
+            </a:r>
+            <a:r>
+              <a:rPr/>
+              <a:t> </a:t>
+            </a:r>
+            <a:r>
+              <a:rPr/>
+              <a:t>code</a:t>
+            </a:r>
+            <a:r>
+              <a:rPr/>
+              <a:t> </a:t>
+            </a:r>
+            <a:r>
+              <a:rPr/>
+              <a:t>to</a:t>
+            </a:r>
+            <a:r>
+              <a:rPr/>
+              <a:t> </a:t>
+            </a:r>
+            <a:r>
+              <a:rPr/>
+              <a:t>get</a:t>
+            </a:r>
+            <a:r>
+              <a:rPr/>
+              <a:t> </a:t>
+            </a:r>
+            <a:r>
+              <a:rPr/>
+              <a:t>started</a:t>
+            </a:r>
+          </a:p>
+        </p:txBody>
+      </p:sp>
+      <p:sp>
+        <p:nvSpPr>
+          <p:cNvPr id="3" name="Content Placeholder 2"/>
+          <p:cNvSpPr>
+            <a:spLocks noGrp="1"/>
+          </p:cNvSpPr>
+          <p:nvPr>
+            <p:ph idx="1"/>
+          </p:nvPr>
+        </p:nvSpPr>
+        <p:spPr/>
+        <p:txBody>
+          <a:bodyPr/>
+          <a:lstStyle/>
+          <a:p>
+            <a:pPr lvl="0" marL="0" indent="0">
+              <a:buNone/>
+            </a:pPr>
+            <a:r>
+              <a:rPr/>
+              <a:t>((Add later))</a:t>
+            </a:r>
+          </a:p>
+        </p:txBody>
+      </p:sp>
+    </p:spTree>
+  </p:cSld>
+</p:sld>
+</file>
+
+<file path=ppt/slides/slide50.xml><?xml version="1.0" encoding="utf-8"?>
 <p:sld xmlns:a="http://schemas.openxmlformats.org/drawingml/2006/main" xmlns:r="http://schemas.openxmlformats.org/officeDocument/2006/relationships" xmlns:p="http://schemas.openxmlformats.org/presentationml/2006/main">
   <p:cSld>
     <p:spTree>
@@ -20114,7 +20405,7 @@
 </p:sld>
 </file>
 
-<file path=ppt/slides/slide48.xml><?xml version="1.0" encoding="utf-8"?>
+<file path=ppt/slides/slide51.xml><?xml version="1.0" encoding="utf-8"?>
 <p:sld xmlns:a="http://schemas.openxmlformats.org/drawingml/2006/main" xmlns:r="http://schemas.openxmlformats.org/officeDocument/2006/relationships" xmlns:p="http://schemas.openxmlformats.org/presentationml/2006/main">
   <p:cSld>
     <p:spTree>
@@ -20277,7 +20568,7 @@
 </p:sld>
 </file>
 
-<file path=ppt/slides/slide49.xml><?xml version="1.0" encoding="utf-8"?>
+<file path=ppt/slides/slide52.xml><?xml version="1.0" encoding="utf-8"?>
 <p:sld xmlns:a="http://schemas.openxmlformats.org/drawingml/2006/main" xmlns:r="http://schemas.openxmlformats.org/officeDocument/2006/relationships" xmlns:p="http://schemas.openxmlformats.org/presentationml/2006/main">
   <p:cSld>
     <p:spTree>
@@ -20342,111 +20633,7 @@
 </p:sld>
 </file>
 
-<file path=ppt/slides/slide5.xml><?xml version="1.0" encoding="utf-8"?>
-<p:sld xmlns:a="http://schemas.openxmlformats.org/drawingml/2006/main" xmlns:r="http://schemas.openxmlformats.org/officeDocument/2006/relationships" xmlns:p="http://schemas.openxmlformats.org/presentationml/2006/main">
-  <p:cSld>
-    <p:spTree>
-      <p:nvGrpSpPr>
-        <p:cNvPr id="1" name=""/>
-        <p:cNvGrpSpPr/>
-        <p:nvPr/>
-      </p:nvGrpSpPr>
-      <p:grpSpPr>
-        <a:xfrm>
-          <a:off x="0" y="0"/>
-          <a:ext cx="0" cy="0"/>
-          <a:chOff x="0" y="0"/>
-          <a:chExt cx="0" cy="0"/>
-        </a:xfrm>
-      </p:grpSpPr>
-      <p:sp>
-        <p:nvSpPr>
-          <p:cNvPr id="2" name="Title 1"/>
-          <p:cNvSpPr>
-            <a:spLocks noGrp="1"/>
-          </p:cNvSpPr>
-          <p:nvPr>
-            <p:ph type="title"/>
-          </p:nvPr>
-        </p:nvSpPr>
-        <p:spPr/>
-        <p:txBody>
-          <a:bodyPr/>
-          <a:lstStyle/>
-          <a:p>
-            <a:pPr lvl="0" marL="0" indent="0">
-              <a:buNone/>
-            </a:pPr>
-            <a:r>
-              <a:rPr/>
-              <a:t>Python</a:t>
-            </a:r>
-            <a:r>
-              <a:rPr/>
-              <a:t> </a:t>
-            </a:r>
-            <a:r>
-              <a:rPr/>
-              <a:t>code</a:t>
-            </a:r>
-            <a:r>
-              <a:rPr/>
-              <a:t> </a:t>
-            </a:r>
-            <a:r>
-              <a:rPr/>
-              <a:t>to</a:t>
-            </a:r>
-            <a:r>
-              <a:rPr/>
-              <a:t> </a:t>
-            </a:r>
-            <a:r>
-              <a:rPr/>
-              <a:t>get</a:t>
-            </a:r>
-            <a:r>
-              <a:rPr/>
-              <a:t> </a:t>
-            </a:r>
-            <a:r>
-              <a:rPr/>
-              <a:t>started</a:t>
-            </a:r>
-          </a:p>
-        </p:txBody>
-      </p:sp>
-      <p:sp>
-        <p:nvSpPr>
-          <p:cNvPr id="3" name="Content Placeholder 2"/>
-          <p:cNvSpPr>
-            <a:spLocks noGrp="1"/>
-          </p:cNvSpPr>
-          <p:nvPr>
-            <p:ph idx="1"/>
-          </p:nvPr>
-        </p:nvSpPr>
-        <p:spPr/>
-        <p:txBody>
-          <a:bodyPr/>
-          <a:lstStyle/>
-          <a:p>
-            <a:pPr lvl="0" marL="0" indent="0">
-              <a:buNone/>
-            </a:pPr>
-            <a:r>
-              <a:rPr/>
-              <a:t>((Add later))</a:t>
-            </a:r>
-          </a:p>
-        </p:txBody>
-      </p:sp>
-    </p:spTree>
-  </p:cSld>
-</p:sld>
-</file>
-
-<file path=ppt/slides/slide50.xml><?xml version="1.0" encoding="utf-8"?>
+<file path=ppt/slides/slide53.xml><?xml version="1.0" encoding="utf-8"?>
 <p:sld xmlns:a="http://schemas.openxmlformats.org/drawingml/2006/main" xmlns:r="http://schemas.openxmlformats.org/officeDocument/2006/relationships" xmlns:p="http://schemas.openxmlformats.org/presentationml/2006/main">
   <p:cSld>
     <p:spTree>
@@ -20523,310 +20710,6 @@
 </p:sld>
 </file>
 
-<file path=ppt/slides/slide51.xml><?xml version="1.0" encoding="utf-8"?>
-<p:sld xmlns:a="http://schemas.openxmlformats.org/drawingml/2006/main" xmlns:r="http://schemas.openxmlformats.org/officeDocument/2006/relationships" xmlns:p="http://schemas.openxmlformats.org/presentationml/2006/main">
-  <p:cSld>
-    <p:spTree>
-      <p:nvGrpSpPr>
-        <p:cNvPr id="1" name=""/>
-        <p:cNvGrpSpPr/>
-        <p:nvPr/>
-      </p:nvGrpSpPr>
-      <p:grpSpPr>
-        <a:xfrm>
-          <a:off x="0" y="0"/>
-          <a:ext cx="0" cy="0"/>
-          <a:chOff x="0" y="0"/>
-          <a:chExt cx="0" cy="0"/>
-        </a:xfrm>
-      </p:grpSpPr>
-      <p:sp>
-        <p:nvSpPr>
-          <p:cNvPr id="2" name="Title 1"/>
-          <p:cNvSpPr>
-            <a:spLocks noGrp="1"/>
-          </p:cNvSpPr>
-          <p:nvPr>
-            <p:ph type="title"/>
-          </p:nvPr>
-        </p:nvSpPr>
-        <p:spPr/>
-        <p:txBody>
-          <a:bodyPr/>
-          <a:lstStyle/>
-          <a:p>
-            <a:pPr lvl="0" marL="0" indent="0">
-              <a:buNone/>
-            </a:pPr>
-            <a:r>
-              <a:rPr/>
-              <a:t>On</a:t>
-            </a:r>
-            <a:r>
-              <a:rPr/>
-              <a:t> </a:t>
-            </a:r>
-            <a:r>
-              <a:rPr/>
-              <a:t>your</a:t>
-            </a:r>
-            <a:r>
-              <a:rPr/>
-              <a:t> </a:t>
-            </a:r>
-            <a:r>
-              <a:rPr/>
-              <a:t>own</a:t>
-            </a:r>
-          </a:p>
-        </p:txBody>
-      </p:sp>
-      <p:sp>
-        <p:nvSpPr>
-          <p:cNvPr id="3" name="Content Placeholder 2"/>
-          <p:cNvSpPr>
-            <a:spLocks noGrp="1"/>
-          </p:cNvSpPr>
-          <p:nvPr>
-            <p:ph idx="1"/>
-          </p:nvPr>
-        </p:nvSpPr>
-        <p:spPr/>
-        <p:txBody>
-          <a:bodyPr/>
-          <a:lstStyle/>
-          <a:p>
-            <a:pPr lvl="1"/>
-            <a:r>
-              <a:rPr/>
-              <a:t>Make the first class bar red to show Leonardo di Caprio’s perspective on the Titanic.</a:t>
-            </a:r>
-          </a:p>
-        </p:txBody>
-      </p:sp>
-    </p:spTree>
-  </p:cSld>
-</p:sld>
-</file>
-
-<file path=ppt/slides/slide52.xml><?xml version="1.0" encoding="utf-8"?>
-<p:sld xmlns:a="http://schemas.openxmlformats.org/drawingml/2006/main" xmlns:r="http://schemas.openxmlformats.org/officeDocument/2006/relationships" xmlns:p="http://schemas.openxmlformats.org/presentationml/2006/main">
-  <p:cSld>
-    <p:spTree>
-      <p:nvGrpSpPr>
-        <p:cNvPr id="1" name=""/>
-        <p:cNvGrpSpPr/>
-        <p:nvPr/>
-      </p:nvGrpSpPr>
-      <p:grpSpPr>
-        <a:xfrm>
-          <a:off x="0" y="0"/>
-          <a:ext cx="0" cy="0"/>
-          <a:chOff x="0" y="0"/>
-          <a:chExt cx="0" cy="0"/>
-        </a:xfrm>
-      </p:grpSpPr>
-      <p:sp>
-        <p:nvSpPr>
-          <p:cNvPr id="2" name="Title 1"/>
-          <p:cNvSpPr>
-            <a:spLocks noGrp="1"/>
-          </p:cNvSpPr>
-          <p:nvPr>
-            <p:ph type="title"/>
-          </p:nvPr>
-        </p:nvSpPr>
-        <p:spPr/>
-        <p:txBody>
-          <a:bodyPr/>
-          <a:lstStyle/>
-          <a:p>
-            <a:pPr lvl="0" marL="0" indent="0">
-              <a:buNone/>
-            </a:pPr>
-            <a:r>
-              <a:rPr/>
-              <a:t>Wait</a:t>
-            </a:r>
-            <a:r>
-              <a:rPr/>
-              <a:t> </a:t>
-            </a:r>
-            <a:r>
-              <a:rPr/>
-              <a:t>before</a:t>
-            </a:r>
-            <a:r>
-              <a:rPr/>
-              <a:t> </a:t>
-            </a:r>
-            <a:r>
-              <a:rPr/>
-              <a:t>showing</a:t>
-            </a:r>
-          </a:p>
-        </p:txBody>
-      </p:sp>
-      <p:sp>
-        <p:nvSpPr>
-          <p:cNvPr id="3" name="Content Placeholder 2"/>
-          <p:cNvSpPr>
-            <a:spLocks noGrp="1"/>
-          </p:cNvSpPr>
-          <p:nvPr>
-            <p:ph idx="1"/>
-          </p:nvPr>
-        </p:nvSpPr>
-        <p:spPr/>
-        <p:txBody>
-          <a:bodyPr/>
-          <a:lstStyle/>
-          <a:p>
-            <a:pPr lvl="0" marL="0" indent="0">
-              <a:buNone/>
-            </a:pPr>
-            <a:r>
-              <a:rPr/>
-              <a:t>((Python code))</a:t>
-            </a:r>
-          </a:p>
-          <a:p>
-            <a:pPr lvl="0" marL="0" indent="0">
-              <a:buNone/>
-            </a:pPr>
-            <a:r>
-              <a:rPr/>
-              <a:t>((R code))</a:t>
-            </a:r>
-          </a:p>
-          <a:p>
-            <a:pPr lvl="0" marL="0" indent="0">
-              <a:buNone/>
-            </a:pPr>
-            <a:r>
-              <a:rPr/>
-              <a:t>((Tableau steps))</a:t>
-            </a:r>
-          </a:p>
-        </p:txBody>
-      </p:sp>
-    </p:spTree>
-  </p:cSld>
-</p:sld>
-</file>
-
-<file path=ppt/slides/slide53.xml><?xml version="1.0" encoding="utf-8"?>
-<p:sld xmlns:a="http://schemas.openxmlformats.org/drawingml/2006/main" xmlns:r="http://schemas.openxmlformats.org/officeDocument/2006/relationships" xmlns:p="http://schemas.openxmlformats.org/presentationml/2006/main">
-  <p:cSld>
-    <p:spTree>
-      <p:nvGrpSpPr>
-        <p:cNvPr id="1" name=""/>
-        <p:cNvGrpSpPr/>
-        <p:nvPr/>
-      </p:nvGrpSpPr>
-      <p:grpSpPr>
-        <a:xfrm>
-          <a:off x="0" y="0"/>
-          <a:ext cx="0" cy="0"/>
-          <a:chOff x="0" y="0"/>
-          <a:chExt cx="0" cy="0"/>
-        </a:xfrm>
-      </p:grpSpPr>
-      <p:sp>
-        <p:nvSpPr>
-          <p:cNvPr id="2" name="Title 1"/>
-          <p:cNvSpPr>
-            <a:spLocks noGrp="1"/>
-          </p:cNvSpPr>
-          <p:nvPr>
-            <p:ph type="title"/>
-          </p:nvPr>
-        </p:nvSpPr>
-        <p:spPr/>
-        <p:txBody>
-          <a:bodyPr/>
-          <a:lstStyle/>
-          <a:p>
-            <a:pPr lvl="0" marL="0" indent="0">
-              <a:buNone/>
-            </a:pPr>
-            <a:r>
-              <a:rPr/>
-              <a:t>What</a:t>
-            </a:r>
-            <a:r>
-              <a:rPr/>
-              <a:t> </a:t>
-            </a:r>
-            <a:r>
-              <a:rPr/>
-              <a:t>your</a:t>
-            </a:r>
-            <a:r>
-              <a:rPr/>
-              <a:t> </a:t>
-            </a:r>
-            <a:r>
-              <a:rPr/>
-              <a:t>visualization</a:t>
-            </a:r>
-            <a:r>
-              <a:rPr/>
-              <a:t> </a:t>
-            </a:r>
-            <a:r>
-              <a:rPr/>
-              <a:t>might</a:t>
-            </a:r>
-            <a:r>
-              <a:rPr/>
-              <a:t> </a:t>
-            </a:r>
-            <a:r>
-              <a:rPr/>
-              <a:t>look</a:t>
-            </a:r>
-            <a:r>
-              <a:rPr/>
-              <a:t> </a:t>
-            </a:r>
-            <a:r>
-              <a:rPr/>
-              <a:t>like</a:t>
-            </a:r>
-          </a:p>
-        </p:txBody>
-      </p:sp>
-      <p:sp>
-        <p:nvSpPr>
-          <p:cNvPr id="3" name="Content Placeholder 2"/>
-          <p:cNvSpPr>
-            <a:spLocks noGrp="1"/>
-          </p:cNvSpPr>
-          <p:nvPr>
-            <p:ph idx="1"/>
-          </p:nvPr>
-        </p:nvSpPr>
-        <p:spPr/>
-        <p:txBody>
-          <a:bodyPr/>
-          <a:lstStyle/>
-          <a:p>
-            <a:pPr lvl="0" marL="0" indent="0">
-              <a:buNone/>
-            </a:pPr>
-            <a:r>
-              <a:rPr/>
-              <a:t>((Show visualization))</a:t>
-            </a:r>
-          </a:p>
-        </p:txBody>
-      </p:sp>
-    </p:spTree>
-  </p:cSld>
-</p:sld>
-</file>
-
 <file path=ppt/slides/slide54.xml><?xml version="1.0" encoding="utf-8"?>
 <p:sld xmlns:a="http://schemas.openxmlformats.org/drawingml/2006/main" xmlns:r="http://schemas.openxmlformats.org/officeDocument/2006/relationships" xmlns:p="http://schemas.openxmlformats.org/presentationml/2006/main">
   <p:cSld>
@@ -20864,7 +20747,23 @@
             </a:pPr>
             <a:r>
               <a:rPr/>
-              <a:t>Color</a:t>
+              <a:t>On</a:t>
+            </a:r>
+            <a:r>
+              <a:rPr/>
+              <a:t> </a:t>
+            </a:r>
+            <a:r>
+              <a:rPr/>
+              <a:t>your</a:t>
+            </a:r>
+            <a:r>
+              <a:rPr/>
+              <a:t> </a:t>
+            </a:r>
+            <a:r>
+              <a:rPr/>
+              <a:t>own</a:t>
             </a:r>
           </a:p>
         </p:txBody>
@@ -20887,14 +20786,7 @@
             <a:pPr lvl="1"/>
             <a:r>
               <a:rPr/>
-              <a:t>Use for emphasis in simple bar charts</a:t>
-            </a:r>
-          </a:p>
-          <a:p>
-            <a:pPr lvl="1"/>
-            <a:r>
-              <a:rPr/>
-              <a:t>Very important for stacked or side-by-side bar charts</a:t>
+              <a:t>Make the first class bar red to show Leonardo di Caprio’s perspective on the Titanic.</a:t>
             </a:r>
           </a:p>
         </p:txBody>
@@ -20941,23 +20833,23 @@
             </a:pPr>
             <a:r>
               <a:rPr/>
-              <a:t>On</a:t>
-            </a:r>
-            <a:r>
-              <a:rPr/>
-              <a:t> </a:t>
-            </a:r>
-            <a:r>
-              <a:rPr/>
-              <a:t>your</a:t>
-            </a:r>
-            <a:r>
-              <a:rPr/>
-              <a:t> </a:t>
-            </a:r>
-            <a:r>
-              <a:rPr/>
-              <a:t>own</a:t>
+              <a:t>Wait</a:t>
+            </a:r>
+            <a:r>
+              <a:rPr/>
+              <a:t> </a:t>
+            </a:r>
+            <a:r>
+              <a:rPr/>
+              <a:t>before</a:t>
+            </a:r>
+            <a:r>
+              <a:rPr/>
+              <a:t> </a:t>
+            </a:r>
+            <a:r>
+              <a:rPr/>
+              <a:t>showing</a:t>
             </a:r>
           </a:p>
         </p:txBody>
@@ -20977,10 +20869,30 @@
           <a:bodyPr/>
           <a:lstStyle/>
           <a:p>
-            <a:pPr lvl="1"/>
-            <a:r>
-              <a:rPr/>
-              <a:t>Revise this visualization so the first class bar is red.</a:t>
+            <a:pPr lvl="0" marL="0" indent="0">
+              <a:buNone/>
+            </a:pPr>
+            <a:r>
+              <a:rPr/>
+              <a:t>((Python code))</a:t>
+            </a:r>
+          </a:p>
+          <a:p>
+            <a:pPr lvl="0" marL="0" indent="0">
+              <a:buNone/>
+            </a:pPr>
+            <a:r>
+              <a:rPr/>
+              <a:t>((R code))</a:t>
+            </a:r>
+          </a:p>
+          <a:p>
+            <a:pPr lvl="0" marL="0" indent="0">
+              <a:buNone/>
+            </a:pPr>
+            <a:r>
+              <a:rPr/>
+              <a:t>((Tableau steps))</a:t>
             </a:r>
           </a:p>
         </p:txBody>
@@ -21027,23 +20939,47 @@
             </a:pPr>
             <a:r>
               <a:rPr/>
-              <a:t>Wait</a:t>
-            </a:r>
-            <a:r>
-              <a:rPr/>
-              <a:t> </a:t>
-            </a:r>
-            <a:r>
-              <a:rPr/>
-              <a:t>before</a:t>
-            </a:r>
-            <a:r>
-              <a:rPr/>
-              <a:t> </a:t>
-            </a:r>
-            <a:r>
-              <a:rPr/>
-              <a:t>showing</a:t>
+              <a:t>What</a:t>
+            </a:r>
+            <a:r>
+              <a:rPr/>
+              <a:t> </a:t>
+            </a:r>
+            <a:r>
+              <a:rPr/>
+              <a:t>your</a:t>
+            </a:r>
+            <a:r>
+              <a:rPr/>
+              <a:t> </a:t>
+            </a:r>
+            <a:r>
+              <a:rPr/>
+              <a:t>visualization</a:t>
+            </a:r>
+            <a:r>
+              <a:rPr/>
+              <a:t> </a:t>
+            </a:r>
+            <a:r>
+              <a:rPr/>
+              <a:t>might</a:t>
+            </a:r>
+            <a:r>
+              <a:rPr/>
+              <a:t> </a:t>
+            </a:r>
+            <a:r>
+              <a:rPr/>
+              <a:t>look</a:t>
+            </a:r>
+            <a:r>
+              <a:rPr/>
+              <a:t> </a:t>
+            </a:r>
+            <a:r>
+              <a:rPr/>
+              <a:t>like</a:t>
             </a:r>
           </a:p>
         </p:txBody>
@@ -21068,25 +21004,7 @@
             </a:pPr>
             <a:r>
               <a:rPr/>
-              <a:t>((Python code))</a:t>
-            </a:r>
-          </a:p>
-          <a:p>
-            <a:pPr lvl="0" marL="0" indent="0">
-              <a:buNone/>
-            </a:pPr>
-            <a:r>
-              <a:rPr/>
-              <a:t>((R code))</a:t>
-            </a:r>
-          </a:p>
-          <a:p>
-            <a:pPr lvl="0" marL="0" indent="0">
-              <a:buNone/>
-            </a:pPr>
-            <a:r>
-              <a:rPr/>
-              <a:t>((Tableau steps))</a:t>
+              <a:t>((Show visualization))</a:t>
             </a:r>
           </a:p>
         </p:txBody>
@@ -21133,47 +21051,7 @@
             </a:pPr>
             <a:r>
               <a:rPr/>
-              <a:t>What</a:t>
-            </a:r>
-            <a:r>
-              <a:rPr/>
-              <a:t> </a:t>
-            </a:r>
-            <a:r>
-              <a:rPr/>
-              <a:t>your</a:t>
-            </a:r>
-            <a:r>
-              <a:rPr/>
-              <a:t> </a:t>
-            </a:r>
-            <a:r>
-              <a:rPr/>
-              <a:t>visualization</a:t>
-            </a:r>
-            <a:r>
-              <a:rPr/>
-              <a:t> </a:t>
-            </a:r>
-            <a:r>
-              <a:rPr/>
-              <a:t>might</a:t>
-            </a:r>
-            <a:r>
-              <a:rPr/>
-              <a:t> </a:t>
-            </a:r>
-            <a:r>
-              <a:rPr/>
-              <a:t>look</a:t>
-            </a:r>
-            <a:r>
-              <a:rPr/>
-              <a:t> </a:t>
-            </a:r>
-            <a:r>
-              <a:rPr/>
-              <a:t>like</a:t>
+              <a:t>Color</a:t>
             </a:r>
           </a:p>
         </p:txBody>
@@ -21193,12 +21071,17 @@
           <a:bodyPr/>
           <a:lstStyle/>
           <a:p>
-            <a:pPr lvl="0" marL="0" indent="0">
-              <a:buNone/>
-            </a:pPr>
-            <a:r>
-              <a:rPr/>
-              <a:t>((Show visualization))</a:t>
+            <a:pPr lvl="1"/>
+            <a:r>
+              <a:rPr/>
+              <a:t>Use for emphasis in simple bar charts</a:t>
+            </a:r>
+          </a:p>
+          <a:p>
+            <a:pPr lvl="1"/>
+            <a:r>
+              <a:rPr/>
+              <a:t>Very important for stacked or side-by-side bar charts</a:t>
             </a:r>
           </a:p>
         </p:txBody>
@@ -21245,23 +21128,23 @@
             </a:pPr>
             <a:r>
               <a:rPr/>
-              <a:t>Stack</a:t>
-            </a:r>
-            <a:r>
-              <a:rPr/>
-              <a:t> </a:t>
-            </a:r>
-            <a:r>
-              <a:rPr/>
-              <a:t>versus</a:t>
-            </a:r>
-            <a:r>
-              <a:rPr/>
-              <a:t> </a:t>
-            </a:r>
-            <a:r>
-              <a:rPr/>
-              <a:t>dodge</a:t>
+              <a:t>On</a:t>
+            </a:r>
+            <a:r>
+              <a:rPr/>
+              <a:t> </a:t>
+            </a:r>
+            <a:r>
+              <a:rPr/>
+              <a:t>your</a:t>
+            </a:r>
+            <a:r>
+              <a:rPr/>
+              <a:t> </a:t>
+            </a:r>
+            <a:r>
+              <a:rPr/>
+              <a:t>own</a:t>
             </a:r>
           </a:p>
         </p:txBody>
@@ -21284,49 +21167,7 @@
             <a:pPr lvl="1"/>
             <a:r>
               <a:rPr/>
-              <a:t>Summarize by two categories</a:t>
-            </a:r>
-          </a:p>
-          <a:p>
-            <a:pPr lvl="1"/>
-            <a:r>
-              <a:rPr/>
-              <a:t>Facet</a:t>
-            </a:r>
-          </a:p>
-          <a:p>
-            <a:pPr lvl="2"/>
-            <a:r>
-              <a:rPr/>
-              <a:t>Separate plots</a:t>
-            </a:r>
-          </a:p>
-          <a:p>
-            <a:pPr lvl="1"/>
-            <a:r>
-              <a:rPr/>
-              <a:t>Dodge</a:t>
-            </a:r>
-          </a:p>
-          <a:p>
-            <a:pPr lvl="2"/>
-            <a:r>
-              <a:rPr/>
-              <a:t>Side by side</a:t>
-            </a:r>
-          </a:p>
-          <a:p>
-            <a:pPr lvl="1"/>
-            <a:r>
-              <a:rPr/>
-              <a:t>Stack</a:t>
-            </a:r>
-          </a:p>
-          <a:p>
-            <a:pPr lvl="2"/>
-            <a:r>
-              <a:rPr/>
-              <a:t>One on top, one on bottom</a:t>
+              <a:t>Revise this visualization so the first class bar is red.</a:t>
             </a:r>
           </a:p>
         </p:txBody>
@@ -21373,73 +21214,70 @@
             </a:pPr>
             <a:r>
               <a:rPr/>
-              <a:t>Titanic</a:t>
-            </a:r>
-            <a:r>
-              <a:rPr/>
-              <a:t> </a:t>
-            </a:r>
-            <a:r>
-              <a:rPr/>
-              <a:t>passenger</a:t>
-            </a:r>
-            <a:r>
-              <a:rPr/>
-              <a:t> </a:t>
-            </a:r>
-            <a:r>
-              <a:rPr/>
-              <a:t>count</a:t>
-            </a:r>
-            <a:r>
-              <a:rPr/>
-              <a:t> </a:t>
-            </a:r>
-            <a:r>
-              <a:rPr/>
-              <a:t>by</a:t>
-            </a:r>
-            <a:r>
-              <a:rPr/>
-              <a:t> </a:t>
-            </a:r>
-            <a:r>
-              <a:rPr/>
-              <a:t>gender</a:t>
+              <a:t>Wait</a:t>
+            </a:r>
+            <a:r>
+              <a:rPr/>
+              <a:t> </a:t>
+            </a:r>
+            <a:r>
+              <a:rPr/>
+              <a:t>before</a:t>
+            </a:r>
+            <a:r>
+              <a:rPr/>
+              <a:t> </a:t>
+            </a:r>
+            <a:r>
+              <a:rPr/>
+              <a:t>showing</a:t>
             </a:r>
           </a:p>
         </p:txBody>
       </p:sp>
-      <p:pic>
-        <p:nvPicPr>
-          <p:cNvPr descr="data-visualization-02-bars_files/figure-pptx/count-by-gender-1.png" id="0" name="Picture 1"/>
-          <p:cNvPicPr>
-            <a:picLocks noGrp="1" noChangeAspect="1"/>
-          </p:cNvPicPr>
-          <p:nvPr/>
-        </p:nvPicPr>
-        <p:blipFill>
-          <a:blip r:embed="rId2"/>
-          <a:stretch>
-            <a:fillRect/>
-          </a:stretch>
-        </p:blipFill>
-        <p:spPr bwMode="auto">
-          <a:xfrm>
-            <a:off x="1752600" y="1600200"/>
-            <a:ext cx="5651500" cy="4521200"/>
-          </a:xfrm>
-          <a:prstGeom prst="rect">
-            <a:avLst/>
-          </a:prstGeom>
-          <a:noFill/>
-          <a:ln w="9525">
-            <a:noFill/>
-            <a:headEnd/>
-            <a:tailEnd/>
-          </a:ln>
-        </p:spPr>
-      </p:pic>
+      <p:sp>
+        <p:nvSpPr>
+          <p:cNvPr id="3" name="Content Placeholder 2"/>
+          <p:cNvSpPr>
+            <a:spLocks noGrp="1"/>
+          </p:cNvSpPr>
+          <p:nvPr>
+            <p:ph idx="1"/>
+          </p:nvPr>
+        </p:nvSpPr>
+        <p:spPr/>
+        <p:txBody>
+          <a:bodyPr/>
+          <a:lstStyle/>
+          <a:p>
+            <a:pPr lvl="0" marL="0" indent="0">
+              <a:buNone/>
+            </a:pPr>
+            <a:r>
+              <a:rPr/>
+              <a:t>((Python code))</a:t>
+            </a:r>
+          </a:p>
+          <a:p>
+            <a:pPr lvl="0" marL="0" indent="0">
+              <a:buNone/>
+            </a:pPr>
+            <a:r>
+              <a:rPr/>
+              <a:t>((R code))</a:t>
+            </a:r>
+          </a:p>
+          <a:p>
+            <a:pPr lvl="0" marL="0" indent="0">
+              <a:buNone/>
+            </a:pPr>
+            <a:r>
+              <a:rPr/>
+              <a:t>((Tableau steps))</a:t>
+            </a:r>
+          </a:p>
+        </p:txBody>
+      </p:sp>
     </p:spTree>
   </p:cSld>
 </p:sld>
@@ -21586,81 +21424,76 @@
             </a:pPr>
             <a:r>
               <a:rPr/>
-              <a:t>Titanic</a:t>
-            </a:r>
-            <a:r>
-              <a:rPr/>
-              <a:t> </a:t>
-            </a:r>
-            <a:r>
-              <a:rPr/>
-              <a:t>passenger</a:t>
-            </a:r>
-            <a:r>
-              <a:rPr/>
-              <a:t> </a:t>
-            </a:r>
-            <a:r>
-              <a:rPr/>
-              <a:t>count</a:t>
-            </a:r>
-            <a:r>
-              <a:rPr/>
-              <a:t> </a:t>
-            </a:r>
-            <a:r>
-              <a:rPr/>
-              <a:t>by</a:t>
-            </a:r>
-            <a:r>
-              <a:rPr/>
-              <a:t> </a:t>
-            </a:r>
-            <a:r>
-              <a:rPr/>
-              <a:t>passenger</a:t>
-            </a:r>
-            <a:r>
-              <a:rPr/>
-              <a:t> </a:t>
-            </a:r>
-            <a:r>
-              <a:rPr/>
-              <a:t>class</a:t>
+              <a:t>What</a:t>
+            </a:r>
+            <a:r>
+              <a:rPr/>
+              <a:t> </a:t>
+            </a:r>
+            <a:r>
+              <a:rPr/>
+              <a:t>your</a:t>
+            </a:r>
+            <a:r>
+              <a:rPr/>
+              <a:t> </a:t>
+            </a:r>
+            <a:r>
+              <a:rPr/>
+              <a:t>visualization</a:t>
+            </a:r>
+            <a:r>
+              <a:rPr/>
+              <a:t> </a:t>
+            </a:r>
+            <a:r>
+              <a:rPr/>
+              <a:t>might</a:t>
+            </a:r>
+            <a:r>
+              <a:rPr/>
+              <a:t> </a:t>
+            </a:r>
+            <a:r>
+              <a:rPr/>
+              <a:t>look</a:t>
+            </a:r>
+            <a:r>
+              <a:rPr/>
+              <a:t> </a:t>
+            </a:r>
+            <a:r>
+              <a:rPr/>
+              <a:t>like</a:t>
             </a:r>
           </a:p>
         </p:txBody>
       </p:sp>
-      <p:pic>
-        <p:nvPicPr>
-          <p:cNvPr descr="data-visualization-02-bars_files/figure-pptx/count-by-passenger-class-1.png" id="0" name="Picture 1"/>
-          <p:cNvPicPr>
-            <a:picLocks noGrp="1" noChangeAspect="1"/>
-          </p:cNvPicPr>
-          <p:nvPr/>
-        </p:nvPicPr>
-        <p:blipFill>
-          <a:blip r:embed="rId2"/>
-          <a:stretch>
-            <a:fillRect/>
-          </a:stretch>
-        </p:blipFill>
-        <p:spPr bwMode="auto">
-          <a:xfrm>
-            <a:off x="1752600" y="1600200"/>
-            <a:ext cx="5651500" cy="4521200"/>
-          </a:xfrm>
-          <a:prstGeom prst="rect">
-            <a:avLst/>
-          </a:prstGeom>
-          <a:noFill/>
-          <a:ln w="9525">
-            <a:noFill/>
-            <a:headEnd/>
-            <a:tailEnd/>
-          </a:ln>
-        </p:spPr>
-      </p:pic>
+      <p:sp>
+        <p:nvSpPr>
+          <p:cNvPr id="3" name="Content Placeholder 2"/>
+          <p:cNvSpPr>
+            <a:spLocks noGrp="1"/>
+          </p:cNvSpPr>
+          <p:nvPr>
+            <p:ph idx="1"/>
+          </p:nvPr>
+        </p:nvSpPr>
+        <p:spPr/>
+        <p:txBody>
+          <a:bodyPr/>
+          <a:lstStyle/>
+          <a:p>
+            <a:pPr lvl="0" marL="0" indent="0">
+              <a:buNone/>
+            </a:pPr>
+            <a:r>
+              <a:rPr/>
+              <a:t>((Show visualization))</a:t>
+            </a:r>
+          </a:p>
+        </p:txBody>
+      </p:sp>
     </p:spTree>
   </p:cSld>
 </p:sld>
@@ -21703,49 +21536,92 @@
             </a:pPr>
             <a:r>
               <a:rPr/>
-              <a:t>Titanic</a:t>
-            </a:r>
-            <a:r>
-              <a:rPr/>
-              <a:t> </a:t>
-            </a:r>
-            <a:r>
-              <a:rPr/>
-              <a:t>facet</a:t>
+              <a:t>Stack</a:t>
+            </a:r>
+            <a:r>
+              <a:rPr/>
+              <a:t> </a:t>
+            </a:r>
+            <a:r>
+              <a:rPr/>
+              <a:t>versus</a:t>
+            </a:r>
+            <a:r>
+              <a:rPr/>
+              <a:t> </a:t>
+            </a:r>
+            <a:r>
+              <a:rPr/>
+              <a:t>dodge</a:t>
             </a:r>
           </a:p>
         </p:txBody>
       </p:sp>
-      <p:pic>
-        <p:nvPicPr>
-          <p:cNvPr descr="data-visualization-02-bars_files/figure-pptx/count-by-facet-1.png" id="0" name="Picture 1"/>
-          <p:cNvPicPr>
-            <a:picLocks noGrp="1" noChangeAspect="1"/>
-          </p:cNvPicPr>
-          <p:nvPr/>
-        </p:nvPicPr>
-        <p:blipFill>
-          <a:blip r:embed="rId2"/>
-          <a:stretch>
-            <a:fillRect/>
-          </a:stretch>
-        </p:blipFill>
-        <p:spPr bwMode="auto">
-          <a:xfrm>
-            <a:off x="1752600" y="1600200"/>
-            <a:ext cx="5651500" cy="4521200"/>
-          </a:xfrm>
-          <a:prstGeom prst="rect">
-            <a:avLst/>
-          </a:prstGeom>
-          <a:noFill/>
-          <a:ln w="9525">
-            <a:noFill/>
-            <a:headEnd/>
-            <a:tailEnd/>
-          </a:ln>
-        </p:spPr>
-      </p:pic>
+      <p:sp>
+        <p:nvSpPr>
+          <p:cNvPr id="3" name="Content Placeholder 2"/>
+          <p:cNvSpPr>
+            <a:spLocks noGrp="1"/>
+          </p:cNvSpPr>
+          <p:nvPr>
+            <p:ph idx="1"/>
+          </p:nvPr>
+        </p:nvSpPr>
+        <p:spPr/>
+        <p:txBody>
+          <a:bodyPr/>
+          <a:lstStyle/>
+          <a:p>
+            <a:pPr lvl="1"/>
+            <a:r>
+              <a:rPr/>
+              <a:t>Summarize by two categories</a:t>
+            </a:r>
+          </a:p>
+          <a:p>
+            <a:pPr lvl="1"/>
+            <a:r>
+              <a:rPr/>
+              <a:t>Facet</a:t>
+            </a:r>
+          </a:p>
+          <a:p>
+            <a:pPr lvl="2"/>
+            <a:r>
+              <a:rPr/>
+              <a:t>Separate plots</a:t>
+            </a:r>
+          </a:p>
+          <a:p>
+            <a:pPr lvl="1"/>
+            <a:r>
+              <a:rPr/>
+              <a:t>Dodge</a:t>
+            </a:r>
+          </a:p>
+          <a:p>
+            <a:pPr lvl="2"/>
+            <a:r>
+              <a:rPr/>
+              <a:t>Side by side</a:t>
+            </a:r>
+          </a:p>
+          <a:p>
+            <a:pPr lvl="1"/>
+            <a:r>
+              <a:rPr/>
+              <a:t>Stack</a:t>
+            </a:r>
+          </a:p>
+          <a:p>
+            <a:pPr lvl="2"/>
+            <a:r>
+              <a:rPr/>
+              <a:t>One on top, one on bottom</a:t>
+            </a:r>
+          </a:p>
+        </p:txBody>
+      </p:sp>
     </p:spTree>
   </p:cSld>
 </p:sld>
@@ -21796,14 +21672,38 @@
             </a:r>
             <a:r>
               <a:rPr/>
-              <a:t>dodge</a:t>
+              <a:t>passenger</a:t>
+            </a:r>
+            <a:r>
+              <a:rPr/>
+              <a:t> </a:t>
+            </a:r>
+            <a:r>
+              <a:rPr/>
+              <a:t>count</a:t>
+            </a:r>
+            <a:r>
+              <a:rPr/>
+              <a:t> </a:t>
+            </a:r>
+            <a:r>
+              <a:rPr/>
+              <a:t>by</a:t>
+            </a:r>
+            <a:r>
+              <a:rPr/>
+              <a:t> </a:t>
+            </a:r>
+            <a:r>
+              <a:rPr/>
+              <a:t>gender</a:t>
             </a:r>
           </a:p>
         </p:txBody>
       </p:sp>
       <p:pic>
         <p:nvPicPr>
-          <p:cNvPr descr="data-visualization-02-bars_files/figure-pptx/count-by-dodge-1.png" id="0" name="Picture 1"/>
+          <p:cNvPr descr="data-visualization-02-bars_files/figure-pptx/count-by-gender-1.png" id="0" name="Picture 1"/>
           <p:cNvPicPr>
             <a:picLocks noGrp="1" noChangeAspect="1"/>
           </p:cNvPicPr>
@@ -21881,14 +21781,46 @@
             </a:r>
             <a:r>
               <a:rPr/>
-              <a:t>stack</a:t>
+              <a:t>passenger</a:t>
+            </a:r>
+            <a:r>
+              <a:rPr/>
+              <a:t> </a:t>
+            </a:r>
+            <a:r>
+              <a:rPr/>
+              <a:t>count</a:t>
+            </a:r>
+            <a:r>
+              <a:rPr/>
+              <a:t> </a:t>
+            </a:r>
+            <a:r>
+              <a:rPr/>
+              <a:t>by</a:t>
+            </a:r>
+            <a:r>
+              <a:rPr/>
+              <a:t> </a:t>
+            </a:r>
+            <a:r>
+              <a:rPr/>
+              <a:t>passenger</a:t>
+            </a:r>
+            <a:r>
+              <a:rPr/>
+              <a:t> </a:t>
+            </a:r>
+            <a:r>
+              <a:rPr/>
+              <a:t>class</a:t>
             </a:r>
           </a:p>
         </p:txBody>
       </p:sp>
       <p:pic>
         <p:nvPicPr>
-          <p:cNvPr descr="data-visualization-02-bars_files/figure-pptx/count-by-stack-1.png" id="0" name="Picture 1"/>
+          <p:cNvPr descr="data-visualization-02-bars_files/figure-pptx/count-by-passenger-class-1.png" id="0" name="Picture 1"/>
           <p:cNvPicPr>
             <a:picLocks noGrp="1" noChangeAspect="1"/>
           </p:cNvPicPr>
@@ -21958,50 +21890,49 @@
             </a:pPr>
             <a:r>
               <a:rPr/>
-              <a:t>On</a:t>
-            </a:r>
-            <a:r>
-              <a:rPr/>
-              <a:t> </a:t>
-            </a:r>
-            <a:r>
-              <a:rPr/>
-              <a:t>your</a:t>
-            </a:r>
-            <a:r>
-              <a:rPr/>
-              <a:t> </a:t>
-            </a:r>
-            <a:r>
-              <a:rPr/>
-              <a:t>own</a:t>
+              <a:t>Titanic</a:t>
+            </a:r>
+            <a:r>
+              <a:rPr/>
+              <a:t> </a:t>
+            </a:r>
+            <a:r>
+              <a:rPr/>
+              <a:t>facet</a:t>
             </a:r>
           </a:p>
         </p:txBody>
       </p:sp>
-      <p:sp>
-        <p:nvSpPr>
-          <p:cNvPr id="3" name="Content Placeholder 2"/>
-          <p:cNvSpPr>
-            <a:spLocks noGrp="1"/>
-          </p:cNvSpPr>
-          <p:nvPr>
-            <p:ph idx="1"/>
-          </p:nvPr>
-        </p:nvSpPr>
-        <p:spPr/>
-        <p:txBody>
-          <a:bodyPr/>
-          <a:lstStyle/>
-          <a:p>
-            <a:pPr lvl="1"/>
-            <a:r>
-              <a:rPr/>
-              <a:t>Draw a bar chart showing counts involving both mortality and gender. Use a panel, then stacking, then dodging. Which do you like best?</a:t>
-            </a:r>
-          </a:p>
-        </p:txBody>
-      </p:sp>
+      <p:pic>
+        <p:nvPicPr>
+          <p:cNvPr descr="data-visualization-02-bars_files/figure-pptx/count-by-facet-1.png" id="0" name="Picture 1"/>
+          <p:cNvPicPr>
+            <a:picLocks noGrp="1" noChangeAspect="1"/>
+          </p:cNvPicPr>
+          <p:nvPr/>
+        </p:nvPicPr>
+        <p:blipFill>
+          <a:blip r:embed="rId2"/>
+          <a:stretch>
+            <a:fillRect/>
+          </a:stretch>
+        </p:blipFill>
+        <p:spPr bwMode="auto">
+          <a:xfrm>
+            <a:off x="1752600" y="1600200"/>
+            <a:ext cx="5651500" cy="4521200"/>
+          </a:xfrm>
+          <a:prstGeom prst="rect">
+            <a:avLst/>
+          </a:prstGeom>
+          <a:noFill/>
+          <a:ln w="9525">
+            <a:noFill/>
+            <a:headEnd/>
+            <a:tailEnd/>
+          </a:ln>
+        </p:spPr>
+      </p:pic>
     </p:spTree>
   </p:cSld>
 </p:sld>
@@ -22044,123 +21975,49 @@
             </a:pPr>
             <a:r>
               <a:rPr/>
-              <a:t>Wait</a:t>
-            </a:r>
-            <a:r>
-              <a:rPr/>
-              <a:t> </a:t>
-            </a:r>
-            <a:r>
-              <a:rPr/>
-              <a:t>a</a:t>
-            </a:r>
-            <a:r>
-              <a:rPr/>
-              <a:t> </a:t>
-            </a:r>
-            <a:r>
-              <a:rPr/>
-              <a:t>bit</a:t>
-            </a:r>
-            <a:r>
-              <a:rPr/>
-              <a:t> </a:t>
-            </a:r>
-            <a:r>
-              <a:rPr/>
-              <a:t>before</a:t>
-            </a:r>
-            <a:r>
-              <a:rPr/>
-              <a:t> </a:t>
-            </a:r>
-            <a:r>
-              <a:rPr/>
-              <a:t>showing</a:t>
-            </a:r>
-            <a:r>
-              <a:rPr/>
-              <a:t> </a:t>
-            </a:r>
-            <a:r>
-              <a:rPr/>
-              <a:t>the</a:t>
-            </a:r>
-            <a:r>
-              <a:rPr/>
-              <a:t> </a:t>
-            </a:r>
-            <a:r>
-              <a:rPr/>
-              <a:t>code</a:t>
+              <a:t>Titanic</a:t>
+            </a:r>
+            <a:r>
+              <a:rPr/>
+              <a:t> </a:t>
+            </a:r>
+            <a:r>
+              <a:rPr/>
+              <a:t>dodge</a:t>
             </a:r>
           </a:p>
         </p:txBody>
       </p:sp>
-      <p:sp>
-        <p:nvSpPr>
-          <p:cNvPr id="3" name="Content Placeholder 2"/>
-          <p:cNvSpPr>
-            <a:spLocks noGrp="1"/>
-          </p:cNvSpPr>
-          <p:nvPr>
-            <p:ph idx="1"/>
-          </p:nvPr>
-        </p:nvSpPr>
-        <p:spPr/>
-        <p:txBody>
-          <a:bodyPr/>
-          <a:lstStyle/>
-          <a:p>
-            <a:pPr lvl="1"/>
-            <a:r>
-              <a:rPr/>
-              <a:t>Did you make the panel/stack/dodge Survived or did you make it Sex? Here’s some code, but yours might be different.</a:t>
-            </a:r>
-          </a:p>
-          <a:p>
-            <a:pPr lvl="0" marL="0" indent="0">
-              <a:buNone/>
-            </a:pPr>
-            <a:r>
-              <a:rPr/>
-              <a:t>((Show Python code))</a:t>
-            </a:r>
-          </a:p>
-          <a:p>
-            <a:pPr lvl="0" marL="0" indent="0">
-              <a:buNone/>
-            </a:pPr>
-            <a:r>
-              <a:rPr/>
-              <a:t>R code</a:t>
-            </a:r>
-          </a:p>
-          <a:p>
-            <a:pPr lvl="0" marL="1270000" indent="0">
-              <a:buNone/>
-            </a:pPr>
-            <a:r>
-              <a:rPr sz="1800">
-                <a:latin typeface="Courier"/>
-              </a:rPr>
-              <a:t>titanic %&gt;%
-  ggplot(aes(x=Sex, fill=Survived)) +
-    geom_bar() +
-    facet_grid(cols=vars(Survived))</a:t>
-            </a:r>
-          </a:p>
-          <a:p>
-            <a:pPr lvl="0" marL="0" indent="0">
-              <a:buNone/>
-            </a:pPr>
-            <a:r>
-              <a:rPr/>
-              <a:t>((Show Tableau))</a:t>
-            </a:r>
-          </a:p>
-        </p:txBody>
-      </p:sp>
+      <p:pic>
+        <p:nvPicPr>
+          <p:cNvPr descr="data-visualization-02-bars_files/figure-pptx/count-by-dodge-1.png" id="0" name="Picture 1"/>
+          <p:cNvPicPr>
+            <a:picLocks noGrp="1" noChangeAspect="1"/>
+          </p:cNvPicPr>
+          <p:nvPr/>
+        </p:nvPicPr>
+        <p:blipFill>
+          <a:blip r:embed="rId2"/>
+          <a:stretch>
+            <a:fillRect/>
+          </a:stretch>
+        </p:blipFill>
+        <p:spPr bwMode="auto">
+          <a:xfrm>
+            <a:off x="1752600" y="1600200"/>
+            <a:ext cx="5651500" cy="4521200"/>
+          </a:xfrm>
+          <a:prstGeom prst="rect">
+            <a:avLst/>
+          </a:prstGeom>
+          <a:noFill/>
+          <a:ln w="9525">
+            <a:noFill/>
+            <a:headEnd/>
+            <a:tailEnd/>
+          </a:ln>
+        </p:spPr>
+      </p:pic>
     </p:spTree>
   </p:cSld>
 </p:sld>
@@ -22203,30 +22060,22 @@
             </a:pPr>
             <a:r>
               <a:rPr/>
-              <a:t>Panel,</a:t>
-            </a:r>
-            <a:r>
-              <a:rPr/>
-              <a:t> </a:t>
-            </a:r>
-            <a:r>
-              <a:rPr/>
-              <a:t>one</a:t>
-            </a:r>
-            <a:r>
-              <a:rPr/>
-              <a:t> </a:t>
-            </a:r>
-            <a:r>
-              <a:rPr/>
-              <a:t>approach</a:t>
+              <a:t>Titanic</a:t>
+            </a:r>
+            <a:r>
+              <a:rPr/>
+              <a:t> </a:t>
+            </a:r>
+            <a:r>
+              <a:rPr/>
+              <a:t>stack</a:t>
             </a:r>
           </a:p>
         </p:txBody>
       </p:sp>
       <p:pic>
         <p:nvPicPr>
-          <p:cNvPr descr="data-visualization-02-bars_files/figure-pptx/mortality-by-panel-1.png" id="0" name="Picture 1"/>
+          <p:cNvPr descr="data-visualization-02-bars_files/figure-pptx/count-by-stack-1.png" id="0" name="Picture 1"/>
           <p:cNvPicPr>
             <a:picLocks noGrp="1" noChangeAspect="1"/>
           </p:cNvPicPr>
@@ -22296,57 +22145,50 @@
             </a:pPr>
             <a:r>
               <a:rPr/>
-              <a:t>Panel,</a:t>
-            </a:r>
-            <a:r>
-              <a:rPr/>
-              <a:t> </a:t>
-            </a:r>
-            <a:r>
-              <a:rPr/>
-              <a:t>alternate</a:t>
-            </a:r>
-            <a:r>
-              <a:rPr/>
-              <a:t> </a:t>
-            </a:r>
-            <a:r>
-              <a:rPr/>
-              <a:t>approach</a:t>
+              <a:t>On</a:t>
+            </a:r>
+            <a:r>
+              <a:rPr/>
+              <a:t> </a:t>
+            </a:r>
+            <a:r>
+              <a:rPr/>
+              <a:t>your</a:t>
+            </a:r>
+            <a:r>
+              <a:rPr/>
+              <a:t> </a:t>
+            </a:r>
+            <a:r>
+              <a:rPr/>
+              <a:t>own</a:t>
             </a:r>
           </a:p>
         </p:txBody>
       </p:sp>
-      <p:pic>
-        <p:nvPicPr>
-          <p:cNvPr descr="data-visualization-02-bars_files/figure-pptx/mortality-by-panel-alt-1.png" id="0" name="Picture 1"/>
-          <p:cNvPicPr>
-            <a:picLocks noGrp="1" noChangeAspect="1"/>
-          </p:cNvPicPr>
-          <p:nvPr/>
-        </p:nvPicPr>
-        <p:blipFill>
-          <a:blip r:embed="rId2"/>
-          <a:stretch>
-            <a:fillRect/>
-          </a:stretch>
-        </p:blipFill>
-        <p:spPr bwMode="auto">
-          <a:xfrm>
-            <a:off x="1752600" y="1600200"/>
-            <a:ext cx="5651500" cy="4521200"/>
-          </a:xfrm>
-          <a:prstGeom prst="rect">
-            <a:avLst/>
-          </a:prstGeom>
-          <a:noFill/>
-          <a:ln w="9525">
-            <a:noFill/>
-            <a:headEnd/>
-            <a:tailEnd/>
-          </a:ln>
-        </p:spPr>
-      </p:pic>
+      <p:sp>
+        <p:nvSpPr>
+          <p:cNvPr id="3" name="Content Placeholder 2"/>
+          <p:cNvSpPr>
+            <a:spLocks noGrp="1"/>
+          </p:cNvSpPr>
+          <p:nvPr>
+            <p:ph idx="1"/>
+          </p:nvPr>
+        </p:nvSpPr>
+        <p:spPr/>
+        <p:txBody>
+          <a:bodyPr/>
+          <a:lstStyle/>
+          <a:p>
+            <a:pPr lvl="1"/>
+            <a:r>
+              <a:rPr/>
+              <a:t>Draw a bar chart showing counts involving both mortality and gender. Use a panel, then stacking, then dodging. Which do you like best?</a:t>
+            </a:r>
+          </a:p>
+        </p:txBody>
+      </p:sp>
     </p:spTree>
   </p:cSld>
 </p:sld>
@@ -22389,57 +22231,123 @@
             </a:pPr>
             <a:r>
               <a:rPr/>
-              <a:t>Stack,</a:t>
-            </a:r>
-            <a:r>
-              <a:rPr/>
-              <a:t> </a:t>
-            </a:r>
-            <a:r>
-              <a:rPr/>
-              <a:t>one</a:t>
-            </a:r>
-            <a:r>
-              <a:rPr/>
-              <a:t> </a:t>
-            </a:r>
-            <a:r>
-              <a:rPr/>
-              <a:t>approach</a:t>
+              <a:t>Wait</a:t>
+            </a:r>
+            <a:r>
+              <a:rPr/>
+              <a:t> </a:t>
+            </a:r>
+            <a:r>
+              <a:rPr/>
+              <a:t>a</a:t>
+            </a:r>
+            <a:r>
+              <a:rPr/>
+              <a:t> </a:t>
+            </a:r>
+            <a:r>
+              <a:rPr/>
+              <a:t>bit</a:t>
+            </a:r>
+            <a:r>
+              <a:rPr/>
+              <a:t> </a:t>
+            </a:r>
+            <a:r>
+              <a:rPr/>
+              <a:t>before</a:t>
+            </a:r>
+            <a:r>
+              <a:rPr/>
+              <a:t> </a:t>
+            </a:r>
+            <a:r>
+              <a:rPr/>
+              <a:t>showing</a:t>
+            </a:r>
+            <a:r>
+              <a:rPr/>
+              <a:t> </a:t>
+            </a:r>
+            <a:r>
+              <a:rPr/>
+              <a:t>the</a:t>
+            </a:r>
+            <a:r>
+              <a:rPr/>
+              <a:t> </a:t>
+            </a:r>
+            <a:r>
+              <a:rPr/>
+              <a:t>code</a:t>
             </a:r>
           </a:p>
         </p:txBody>
       </p:sp>
-      <p:pic>
-        <p:nvPicPr>
-          <p:cNvPr descr="data-visualization-02-bars_files/figure-pptx/mortality-by-stack-1.png" id="0" name="Picture 1"/>
-          <p:cNvPicPr>
-            <a:picLocks noGrp="1" noChangeAspect="1"/>
-          </p:cNvPicPr>
-          <p:nvPr/>
-        </p:nvPicPr>
-        <p:blipFill>
-          <a:blip r:embed="rId2"/>
-          <a:stretch>
-            <a:fillRect/>
-          </a:stretch>
-        </p:blipFill>
-        <p:spPr bwMode="auto">
-          <a:xfrm>
-            <a:off x="1752600" y="1600200"/>
-            <a:ext cx="5651500" cy="4521200"/>
-          </a:xfrm>
-          <a:prstGeom prst="rect">
-            <a:avLst/>
-          </a:prstGeom>
-          <a:noFill/>
-          <a:ln w="9525">
-            <a:noFill/>
-            <a:headEnd/>
-            <a:tailEnd/>
-          </a:ln>
-        </p:spPr>
-      </p:pic>
+      <p:sp>
+        <p:nvSpPr>
+          <p:cNvPr id="3" name="Content Placeholder 2"/>
+          <p:cNvSpPr>
+            <a:spLocks noGrp="1"/>
+          </p:cNvSpPr>
+          <p:nvPr>
+            <p:ph idx="1"/>
+          </p:nvPr>
+        </p:nvSpPr>
+        <p:spPr/>
+        <p:txBody>
+          <a:bodyPr/>
+          <a:lstStyle/>
+          <a:p>
+            <a:pPr lvl="1"/>
+            <a:r>
+              <a:rPr/>
+              <a:t>Did you make the panel/stack/dodge Survived or did you make it Sex? Here’s some code, but yours might be different.</a:t>
+            </a:r>
+          </a:p>
+          <a:p>
+            <a:pPr lvl="0" marL="0" indent="0">
+              <a:buNone/>
+            </a:pPr>
+            <a:r>
+              <a:rPr/>
+              <a:t>((Show Python code))</a:t>
+            </a:r>
+          </a:p>
+          <a:p>
+            <a:pPr lvl="0" marL="0" indent="0">
+              <a:buNone/>
+            </a:pPr>
+            <a:r>
+              <a:rPr/>
+              <a:t>R code</a:t>
+            </a:r>
+          </a:p>
+          <a:p>
+            <a:pPr lvl="0" marL="1270000" indent="0">
+              <a:buNone/>
+            </a:pPr>
+            <a:r>
+              <a:rPr sz="1800">
+                <a:latin typeface="Courier"/>
+              </a:rPr>
+              <a:t>titanic %&gt;%
+  ggplot(aes(x=Sex, fill=Survived)) +
+    geom_bar() +
+    facet_grid(cols=vars(Survived))</a:t>
+            </a:r>
+          </a:p>
+          <a:p>
+            <a:pPr lvl="0" marL="0" indent="0">
+              <a:buNone/>
+            </a:pPr>
+            <a:r>
+              <a:rPr/>
+              <a:t>((Show Tableau))</a:t>
+            </a:r>
+          </a:p>
+        </p:txBody>
+      </p:sp>
     </p:spTree>
   </p:cSld>
 </p:sld>
@@ -22482,15 +22390,15 @@
             </a:pPr>
             <a:r>
               <a:rPr/>
-              <a:t>Stack,</a:t>
-            </a:r>
-            <a:r>
-              <a:rPr/>
-              <a:t> </a:t>
-            </a:r>
-            <a:r>
-              <a:rPr/>
-              <a:t>alternate</a:t>
+              <a:t>Panel,</a:t>
+            </a:r>
+            <a:r>
+              <a:rPr/>
+              <a:t> </a:t>
+            </a:r>
+            <a:r>
+              <a:rPr/>
+              <a:t>one</a:t>
             </a:r>
             <a:r>
               <a:rPr/>
@@ -22505,7 +22413,7 @@
       </p:sp>
       <p:pic>
         <p:nvPicPr>
-          <p:cNvPr descr="data-visualization-02-bars_files/figure-pptx/mortality-by-stack-alt-1.png" id="0" name="Picture 1"/>
+          <p:cNvPr descr="data-visualization-02-bars_files/figure-pptx/mortality-by-panel-1.png" id="0" name="Picture 1"/>
           <p:cNvPicPr>
             <a:picLocks noGrp="1" noChangeAspect="1"/>
           </p:cNvPicPr>
@@ -22679,15 +22587,15 @@
             </a:pPr>
             <a:r>
               <a:rPr/>
-              <a:t>Dodge,</a:t>
-            </a:r>
-            <a:r>
-              <a:rPr/>
-              <a:t> </a:t>
-            </a:r>
-            <a:r>
-              <a:rPr/>
-              <a:t>one</a:t>
+              <a:t>Panel,</a:t>
+            </a:r>
+            <a:r>
+              <a:rPr/>
+              <a:t> </a:t>
+            </a:r>
+            <a:r>
+              <a:rPr/>
+              <a:t>alternate</a:t>
             </a:r>
             <a:r>
               <a:rPr/>
@@ -22702,7 +22610,7 @@
       </p:sp>
       <p:pic>
         <p:nvPicPr>
-          <p:cNvPr descr="data-visualization-02-bars_files/figure-pptx/mortality-by-dodge-1.png" id="0" name="Picture 1"/>
+          <p:cNvPr descr="data-visualization-02-bars_files/figure-pptx/mortality-by-panel-alt-1.png" id="0" name="Picture 1"/>
           <p:cNvPicPr>
             <a:picLocks noGrp="1" noChangeAspect="1"/>
           </p:cNvPicPr>
@@ -22772,15 +22680,15 @@
             </a:pPr>
             <a:r>
               <a:rPr/>
-              <a:t>Dodge,</a:t>
-            </a:r>
-            <a:r>
-              <a:rPr/>
-              <a:t> </a:t>
-            </a:r>
-            <a:r>
-              <a:rPr/>
-              <a:t>alternate</a:t>
+              <a:t>Stack,</a:t>
+            </a:r>
+            <a:r>
+              <a:rPr/>
+              <a:t> </a:t>
+            </a:r>
+            <a:r>
+              <a:rPr/>
+              <a:t>one</a:t>
             </a:r>
             <a:r>
               <a:rPr/>
@@ -22795,7 +22703,7 @@
       </p:sp>
       <p:pic>
         <p:nvPicPr>
-          <p:cNvPr descr="data-visualization-02-bars_files/figure-pptx/mortality-by-dodge-alt-1.png" id="0" name="Picture 1"/>
+          <p:cNvPr descr="data-visualization-02-bars_files/figure-pptx/mortality-by-stack-1.png" id="0" name="Picture 1"/>
           <p:cNvPicPr>
             <a:picLocks noGrp="1" noChangeAspect="1"/>
           </p:cNvPicPr>
@@ -22865,65 +22773,57 @@
             </a:pPr>
             <a:r>
               <a:rPr/>
-              <a:t>Group</a:t>
-            </a:r>
-            <a:r>
-              <a:rPr/>
-              <a:t> </a:t>
-            </a:r>
-            <a:r>
-              <a:rPr/>
-              <a:t>exercise</a:t>
+              <a:t>Stack,</a:t>
+            </a:r>
+            <a:r>
+              <a:rPr/>
+              <a:t> </a:t>
+            </a:r>
+            <a:r>
+              <a:rPr/>
+              <a:t>alternate</a:t>
+            </a:r>
+            <a:r>
+              <a:rPr/>
+              <a:t> </a:t>
+            </a:r>
+            <a:r>
+              <a:rPr/>
+              <a:t>approach</a:t>
             </a:r>
           </a:p>
         </p:txBody>
       </p:sp>
-      <p:sp>
-        <p:nvSpPr>
-          <p:cNvPr id="3" name="Content Placeholder 2"/>
-          <p:cNvSpPr>
-            <a:spLocks noGrp="1"/>
-          </p:cNvSpPr>
-          <p:nvPr>
-            <p:ph idx="1"/>
-          </p:nvPr>
-        </p:nvSpPr>
-        <p:spPr/>
-        <p:txBody>
-          <a:bodyPr/>
-          <a:lstStyle/>
-          <a:p>
-            <a:pPr lvl="1"/>
-            <a:r>
-              <a:rPr/>
-              <a:t>Review the following visualization in your group</a:t>
-            </a:r>
-          </a:p>
-          <a:p>
-            <a:pPr lvl="2"/>
-            <a:r>
-              <a:rPr/>
-              <a:t>Summarize what aesthetics appear in the graph</a:t>
-            </a:r>
-          </a:p>
-          <a:p>
-            <a:pPr lvl="2"/>
-            <a:r>
-              <a:rPr/>
-              <a:t>What variables map to each aesthetic?</a:t>
-            </a:r>
-          </a:p>
-          <a:p>
-            <a:pPr lvl="0" marL="0" indent="0">
-              <a:buNone/>
-            </a:pPr>
-            <a:r>
-              <a:rPr/>
-              <a:t>((Provide visualization. Maybe use the visualization from the earlier exercise?))</a:t>
-            </a:r>
-          </a:p>
-        </p:txBody>
-      </p:sp>
+      <p:pic>
+        <p:nvPicPr>
+          <p:cNvPr descr="data-visualization-02-bars_files/figure-pptx/mortality-by-stack-alt-1.png" id="0" name="Picture 1"/>
+          <p:cNvPicPr>
+            <a:picLocks noGrp="1" noChangeAspect="1"/>
+          </p:cNvPicPr>
+          <p:nvPr/>
+        </p:nvPicPr>
+        <p:blipFill>
+          <a:blip r:embed="rId2"/>
+          <a:stretch>
+            <a:fillRect/>
+          </a:stretch>
+        </p:blipFill>
+        <p:spPr bwMode="auto">
+          <a:xfrm>
+            <a:off x="1752600" y="1600200"/>
+            <a:ext cx="5651500" cy="4521200"/>
+          </a:xfrm>
+          <a:prstGeom prst="rect">
+            <a:avLst/>
+          </a:prstGeom>
+          <a:noFill/>
+          <a:ln w="9525">
+            <a:noFill/>
+            <a:headEnd/>
+            <a:tailEnd/>
+          </a:ln>
+        </p:spPr>
+      </p:pic>
     </p:spTree>
   </p:cSld>
 </p:sld>
@@ -22966,69 +22866,57 @@
             </a:pPr>
             <a:r>
               <a:rPr/>
-              <a:t>Summarizations</a:t>
+              <a:t>Dodge,</a:t>
+            </a:r>
+            <a:r>
+              <a:rPr/>
+              <a:t> </a:t>
+            </a:r>
+            <a:r>
+              <a:rPr/>
+              <a:t>one</a:t>
+            </a:r>
+            <a:r>
+              <a:rPr/>
+              <a:t> </a:t>
+            </a:r>
+            <a:r>
+              <a:rPr/>
+              <a:t>approach</a:t>
             </a:r>
           </a:p>
         </p:txBody>
       </p:sp>
-      <p:sp>
-        <p:nvSpPr>
-          <p:cNvPr id="3" name="Content Placeholder 2"/>
-          <p:cNvSpPr>
-            <a:spLocks noGrp="1"/>
-          </p:cNvSpPr>
-          <p:nvPr>
-            <p:ph idx="1"/>
-          </p:nvPr>
-        </p:nvSpPr>
-        <p:spPr/>
-        <p:txBody>
-          <a:bodyPr/>
-          <a:lstStyle/>
-          <a:p>
-            <a:pPr lvl="1"/>
-            <a:r>
-              <a:rPr/>
-              <a:t>One number summary (mean or percentage)</a:t>
-            </a:r>
-          </a:p>
-          <a:p>
-            <a:pPr lvl="1"/>
-            <a:r>
-              <a:rPr/>
-              <a:t>Two number summary (error bars)</a:t>
-            </a:r>
-          </a:p>
-          <a:p>
-            <a:pPr lvl="1"/>
-            <a:r>
-              <a:rPr/>
-              <a:t>Five number summary (boxplots)</a:t>
-            </a:r>
-          </a:p>
-          <a:p>
-            <a:pPr lvl="1"/>
-            <a:r>
-              <a:rPr/>
-              <a:t>All the data</a:t>
-            </a:r>
-          </a:p>
-          <a:p>
-            <a:pPr lvl="2"/>
-            <a:r>
-              <a:rPr/>
-              <a:t>Jittering</a:t>
-            </a:r>
-          </a:p>
-          <a:p>
-            <a:pPr lvl="2"/>
-            <a:r>
-              <a:rPr/>
-              <a:t>Opacity</a:t>
-            </a:r>
-          </a:p>
-        </p:txBody>
-      </p:sp>
+      <p:pic>
+        <p:nvPicPr>
+          <p:cNvPr descr="data-visualization-02-bars_files/figure-pptx/mortality-by-dodge-1.png" id="0" name="Picture 1"/>
+          <p:cNvPicPr>
+            <a:picLocks noGrp="1" noChangeAspect="1"/>
+          </p:cNvPicPr>
+          <p:nvPr/>
+        </p:nvPicPr>
+        <p:blipFill>
+          <a:blip r:embed="rId2"/>
+          <a:stretch>
+            <a:fillRect/>
+          </a:stretch>
+        </p:blipFill>
+        <p:spPr bwMode="auto">
+          <a:xfrm>
+            <a:off x="1752600" y="1600200"/>
+            <a:ext cx="5651500" cy="4521200"/>
+          </a:xfrm>
+          <a:prstGeom prst="rect">
+            <a:avLst/>
+          </a:prstGeom>
+          <a:noFill/>
+          <a:ln w="9525">
+            <a:noFill/>
+            <a:headEnd/>
+            <a:tailEnd/>
+          </a:ln>
+        </p:spPr>
+      </p:pic>
     </p:spTree>
   </p:cSld>
 </p:sld>
@@ -23071,68 +22959,57 @@
             </a:pPr>
             <a:r>
               <a:rPr/>
-              <a:t>Switching</a:t>
-            </a:r>
-            <a:r>
-              <a:rPr/>
-              <a:t> </a:t>
-            </a:r>
-            <a:r>
-              <a:rPr/>
-              <a:t>from</a:t>
-            </a:r>
-            <a:r>
-              <a:rPr/>
-              <a:t> </a:t>
-            </a:r>
-            <a:r>
-              <a:rPr/>
-              <a:t>count</a:t>
-            </a:r>
-            <a:r>
-              <a:rPr/>
-              <a:t> </a:t>
-            </a:r>
-            <a:r>
-              <a:rPr/>
-              <a:t>to</a:t>
-            </a:r>
-            <a:r>
-              <a:rPr/>
-              <a:t> </a:t>
-            </a:r>
-            <a:r>
-              <a:rPr/>
-              <a:t>percent</a:t>
+              <a:t>Dodge,</a:t>
+            </a:r>
+            <a:r>
+              <a:rPr/>
+              <a:t> </a:t>
+            </a:r>
+            <a:r>
+              <a:rPr/>
+              <a:t>alternate</a:t>
+            </a:r>
+            <a:r>
+              <a:rPr/>
+              <a:t> </a:t>
+            </a:r>
+            <a:r>
+              <a:rPr/>
+              <a:t>approach</a:t>
             </a:r>
           </a:p>
         </p:txBody>
       </p:sp>
-      <p:sp>
-        <p:nvSpPr>
-          <p:cNvPr id="3" name="Content Placeholder 2"/>
-          <p:cNvSpPr>
-            <a:spLocks noGrp="1"/>
-          </p:cNvSpPr>
-          <p:nvPr>
-            <p:ph idx="1"/>
-          </p:nvPr>
-        </p:nvSpPr>
-        <p:spPr/>
-        <p:txBody>
-          <a:bodyPr/>
-          <a:lstStyle/>
-          <a:p>
-            <a:pPr lvl="0" marL="0" indent="0">
-              <a:buNone/>
-            </a:pPr>
-            <a:r>
-              <a:rPr/>
-              <a:t>((Show the code in Python, R, and Tableau. Explain why you might want counts versus percents.))</a:t>
-            </a:r>
-          </a:p>
-        </p:txBody>
-      </p:sp>
+      <p:pic>
+        <p:nvPicPr>
+          <p:cNvPr descr="data-visualization-02-bars_files/figure-pptx/mortality-by-dodge-alt-1.png" id="0" name="Picture 1"/>
+          <p:cNvPicPr>
+            <a:picLocks noGrp="1" noChangeAspect="1"/>
+          </p:cNvPicPr>
+          <p:nvPr/>
+        </p:nvPicPr>
+        <p:blipFill>
+          <a:blip r:embed="rId2"/>
+          <a:stretch>
+            <a:fillRect/>
+          </a:stretch>
+        </p:blipFill>
+        <p:spPr bwMode="auto">
+          <a:xfrm>
+            <a:off x="1752600" y="1600200"/>
+            <a:ext cx="5651500" cy="4521200"/>
+          </a:xfrm>
+          <a:prstGeom prst="rect">
+            <a:avLst/>
+          </a:prstGeom>
+          <a:noFill/>
+          <a:ln w="9525">
+            <a:noFill/>
+            <a:headEnd/>
+            <a:tailEnd/>
+          </a:ln>
+        </p:spPr>
+      </p:pic>
     </p:spTree>
   </p:cSld>
 </p:sld>
@@ -23175,23 +23052,15 @@
             </a:pPr>
             <a:r>
               <a:rPr/>
-              <a:t>Example</a:t>
-            </a:r>
-            <a:r>
-              <a:rPr/>
-              <a:t> </a:t>
-            </a:r>
-            <a:r>
-              <a:rPr/>
-              <a:t>with</a:t>
-            </a:r>
-            <a:r>
-              <a:rPr/>
-              <a:t> </a:t>
-            </a:r>
-            <a:r>
-              <a:rPr/>
-              <a:t>means</a:t>
+              <a:t>Group</a:t>
+            </a:r>
+            <a:r>
+              <a:rPr/>
+              <a:t> </a:t>
+            </a:r>
+            <a:r>
+              <a:rPr/>
+              <a:t>exercise</a:t>
             </a:r>
           </a:p>
         </p:txBody>
@@ -23211,12 +23080,33 @@
           <a:bodyPr/>
           <a:lstStyle/>
           <a:p>
+            <a:pPr lvl="1"/>
+            <a:r>
+              <a:rPr/>
+              <a:t>Review the following visualization in your group</a:t>
+            </a:r>
+          </a:p>
+          <a:p>
+            <a:pPr lvl="2"/>
+            <a:r>
+              <a:rPr/>
+              <a:t>Summarize what aesthetics appear in the graph</a:t>
+            </a:r>
+          </a:p>
+          <a:p>
+            <a:pPr lvl="2"/>
+            <a:r>
+              <a:rPr/>
+              <a:t>What variables map to each aesthetic?</a:t>
+            </a:r>
+          </a:p>
+          <a:p>
             <a:pPr lvl="0" marL="0" indent="0">
               <a:buNone/>
             </a:pPr>
             <a:r>
               <a:rPr/>
-              <a:t>((Need to find the right data set to illustrate this. Maybe the Saratoga house prices?))</a:t>
+              <a:t>((Provide visualization. Maybe use the visualization from the earlier exercise?))</a:t>
             </a:r>
           </a:p>
         </p:txBody>
@@ -23263,23 +23153,7 @@
             </a:pPr>
             <a:r>
               <a:rPr/>
-              <a:t>Example</a:t>
-            </a:r>
-            <a:r>
-              <a:rPr/>
-              <a:t> </a:t>
-            </a:r>
-            <a:r>
-              <a:rPr/>
-              <a:t>with</a:t>
-            </a:r>
-            <a:r>
-              <a:rPr/>
-              <a:t> </a:t>
-            </a:r>
-            <a:r>
-              <a:rPr/>
-              <a:t>totals</a:t>
+              <a:t>Summarizations</a:t>
             </a:r>
           </a:p>
         </p:txBody>
@@ -23299,12 +23173,45 @@
           <a:bodyPr/>
           <a:lstStyle/>
           <a:p>
-            <a:pPr lvl="0" marL="0" indent="0">
-              <a:buNone/>
-            </a:pPr>
-            <a:r>
-              <a:rPr/>
-              <a:t>((Same data. What means tell you versus totals.))</a:t>
+            <a:pPr lvl="1"/>
+            <a:r>
+              <a:rPr/>
+              <a:t>One number summary (mean or percentage)</a:t>
+            </a:r>
+          </a:p>
+          <a:p>
+            <a:pPr lvl="1"/>
+            <a:r>
+              <a:rPr/>
+              <a:t>Two number summary (error bars)</a:t>
+            </a:r>
+          </a:p>
+          <a:p>
+            <a:pPr lvl="1"/>
+            <a:r>
+              <a:rPr/>
+              <a:t>Five number summary (boxplots)</a:t>
+            </a:r>
+          </a:p>
+          <a:p>
+            <a:pPr lvl="1"/>
+            <a:r>
+              <a:rPr/>
+              <a:t>All the data</a:t>
+            </a:r>
+          </a:p>
+          <a:p>
+            <a:pPr lvl="2"/>
+            <a:r>
+              <a:rPr/>
+              <a:t>Jittering</a:t>
+            </a:r>
+          </a:p>
+          <a:p>
+            <a:pPr lvl="2"/>
+            <a:r>
+              <a:rPr/>
+              <a:t>Opacity</a:t>
             </a:r>
           </a:p>
         </p:txBody>
@@ -23351,15 +23258,39 @@
             </a:pPr>
             <a:r>
               <a:rPr/>
-              <a:t>Boxplots</a:t>
-            </a:r>
-            <a:r>
-              <a:rPr/>
-              <a:t> </a:t>
-            </a:r>
-            <a:r>
-              <a:rPr/>
-              <a:t>example</a:t>
+              <a:t>Switching</a:t>
+            </a:r>
+            <a:r>
+              <a:rPr/>
+              <a:t> </a:t>
+            </a:r>
+            <a:r>
+              <a:rPr/>
+              <a:t>from</a:t>
+            </a:r>
+            <a:r>
+              <a:rPr/>
+              <a:t> </a:t>
+            </a:r>
+            <a:r>
+              <a:rPr/>
+              <a:t>count</a:t>
+            </a:r>
+            <a:r>
+              <a:rPr/>
+              <a:t> </a:t>
+            </a:r>
+            <a:r>
+              <a:rPr/>
+              <a:t>to</a:t>
+            </a:r>
+            <a:r>
+              <a:rPr/>
+              <a:t> </a:t>
+            </a:r>
+            <a:r>
+              <a:rPr/>
+              <a:t>percent</a:t>
             </a:r>
           </a:p>
         </p:txBody>
@@ -23384,7 +23315,7 @@
             </a:pPr>
             <a:r>
               <a:rPr/>
-              <a:t>((Include an explanation of what a boxplot is))</a:t>
+              <a:t>((Show the code in Python, R, and Tableau. Explain why you might want counts versus percents.))</a:t>
             </a:r>
           </a:p>
         </p:txBody>
@@ -23431,15 +23362,23 @@
             </a:pPr>
             <a:r>
               <a:rPr/>
-              <a:t>Jittering</a:t>
-            </a:r>
-            <a:r>
-              <a:rPr/>
-              <a:t> </a:t>
-            </a:r>
-            <a:r>
-              <a:rPr/>
-              <a:t>example</a:t>
+              <a:t>Example</a:t>
+            </a:r>
+            <a:r>
+              <a:rPr/>
+              <a:t> </a:t>
+            </a:r>
+            <a:r>
+              <a:rPr/>
+              <a:t>with</a:t>
+            </a:r>
+            <a:r>
+              <a:rPr/>
+              <a:t> </a:t>
+            </a:r>
+            <a:r>
+              <a:rPr/>
+              <a:t>means</a:t>
             </a:r>
           </a:p>
         </p:txBody>
@@ -23464,7 +23403,7 @@
             </a:pPr>
             <a:r>
               <a:rPr/>
-              <a:t>((Include an explanation on when it doesn’t work.))</a:t>
+              <a:t>((Need to find the right data set to illustrate this. Maybe the Saratoga house prices?))</a:t>
             </a:r>
           </a:p>
         </p:txBody>
@@ -23511,15 +23450,23 @@
             </a:pPr>
             <a:r>
               <a:rPr/>
-              <a:t>Opacity</a:t>
-            </a:r>
-            <a:r>
-              <a:rPr/>
-              <a:t> </a:t>
-            </a:r>
-            <a:r>
-              <a:rPr/>
-              <a:t>example</a:t>
+              <a:t>Example</a:t>
+            </a:r>
+            <a:r>
+              <a:rPr/>
+              <a:t> </a:t>
+            </a:r>
+            <a:r>
+              <a:rPr/>
+              <a:t>with</a:t>
+            </a:r>
+            <a:r>
+              <a:rPr/>
+              <a:t> </a:t>
+            </a:r>
+            <a:r>
+              <a:rPr/>
+              <a:t>totals</a:t>
             </a:r>
           </a:p>
         </p:txBody>
@@ -23544,7 +23491,7 @@
             </a:pPr>
             <a:r>
               <a:rPr/>
-              <a:t>((Note the computational expense.))</a:t>
+              <a:t>((Same data. What means tell you versus totals.))</a:t>
             </a:r>
           </a:p>
         </p:txBody>
@@ -23732,23 +23679,15 @@
             </a:pPr>
             <a:r>
               <a:rPr/>
-              <a:t>On</a:t>
-            </a:r>
-            <a:r>
-              <a:rPr/>
-              <a:t> </a:t>
-            </a:r>
-            <a:r>
-              <a:rPr/>
-              <a:t>your</a:t>
-            </a:r>
-            <a:r>
-              <a:rPr/>
-              <a:t> </a:t>
-            </a:r>
-            <a:r>
-              <a:rPr/>
-              <a:t>own</a:t>
+              <a:t>Boxplots</a:t>
+            </a:r>
+            <a:r>
+              <a:rPr/>
+              <a:t> </a:t>
+            </a:r>
+            <a:r>
+              <a:rPr/>
+              <a:t>example</a:t>
             </a:r>
           </a:p>
         </p:txBody>
@@ -23773,7 +23712,7 @@
             </a:pPr>
             <a:r>
               <a:rPr/>
-              <a:t>((Find a totally different data set and get the students to draw four different visualizations. Have them divide into groups that like the same visualization software and have each person do a different visualization.))</a:t>
+              <a:t>((Include an explanation of what a boxplot is))</a:t>
             </a:r>
           </a:p>
         </p:txBody>
@@ -23820,7 +23759,15 @@
             </a:pPr>
             <a:r>
               <a:rPr/>
-              <a:t>Summary</a:t>
+              <a:t>Jittering</a:t>
+            </a:r>
+            <a:r>
+              <a:rPr/>
+              <a:t> </a:t>
+            </a:r>
+            <a:r>
+              <a:rPr/>
+              <a:t>example</a:t>
             </a:r>
           </a:p>
         </p:txBody>
@@ -23840,52 +23787,12 @@
           <a:bodyPr/>
           <a:lstStyle/>
           <a:p>
-            <a:pPr lvl="1"/>
-            <a:r>
-              <a:rPr/>
-              <a:t>“A mapping of data to the visual aesthetics of geometries/marks”</a:t>
-            </a:r>
-          </a:p>
-          <a:p>
-            <a:pPr lvl="2"/>
-            <a:r>
-              <a:rPr/>
-              <a:t>Bars are a type of geometry/mark</a:t>
-            </a:r>
-          </a:p>
-          <a:p>
-            <a:pPr lvl="2"/>
-            <a:r>
-              <a:rPr/>
-              <a:t>Aesthetics for bars include location, size, color</a:t>
-            </a:r>
-          </a:p>
-          <a:p>
-            <a:pPr lvl="2"/>
-            <a:r>
-              <a:rPr/>
-              <a:t>Stack versus dodge</a:t>
-            </a:r>
-          </a:p>
-          <a:p>
-            <a:pPr lvl="1"/>
-            <a:r>
-              <a:rPr/>
-              <a:t>Basic tips</a:t>
-            </a:r>
-          </a:p>
-          <a:p>
-            <a:pPr lvl="2"/>
-            <a:r>
-              <a:rPr/>
-              <a:t>Place comparators close</a:t>
-            </a:r>
-          </a:p>
-          <a:p>
-            <a:pPr lvl="2"/>
-            <a:r>
-              <a:rPr/>
-              <a:t>Use axis ticks, light grid lines</a:t>
+            <a:pPr lvl="0" marL="0" indent="0">
+              <a:buNone/>
+            </a:pPr>
+            <a:r>
+              <a:rPr/>
+              <a:t>((Include an explanation on when it doesn’t work.))</a:t>
             </a:r>
           </a:p>
         </p:txBody>
@@ -23896,6 +23803,286 @@
 </file>
 
 <file path=ppt/slides/slide82.xml><?xml version="1.0" encoding="utf-8"?>
+<p:sld xmlns:a="http://schemas.openxmlformats.org/drawingml/2006/main" xmlns:r="http://schemas.openxmlformats.org/officeDocument/2006/relationships" xmlns:p="http://schemas.openxmlformats.org/presentationml/2006/main">
+  <p:cSld>
+    <p:spTree>
+      <p:nvGrpSpPr>
+        <p:cNvPr id="1" name=""/>
+        <p:cNvGrpSpPr/>
+        <p:nvPr/>
+      </p:nvGrpSpPr>
+      <p:grpSpPr>
+        <a:xfrm>
+          <a:off x="0" y="0"/>
+          <a:ext cx="0" cy="0"/>
+          <a:chOff x="0" y="0"/>
+          <a:chExt cx="0" cy="0"/>
+        </a:xfrm>
+      </p:grpSpPr>
+      <p:sp>
+        <p:nvSpPr>
+          <p:cNvPr id="2" name="Title 1"/>
+          <p:cNvSpPr>
+            <a:spLocks noGrp="1"/>
+          </p:cNvSpPr>
+          <p:nvPr>
+            <p:ph type="title"/>
+          </p:nvPr>
+        </p:nvSpPr>
+        <p:spPr/>
+        <p:txBody>
+          <a:bodyPr/>
+          <a:lstStyle/>
+          <a:p>
+            <a:pPr lvl="0" marL="0" indent="0">
+              <a:buNone/>
+            </a:pPr>
+            <a:r>
+              <a:rPr/>
+              <a:t>Opacity</a:t>
+            </a:r>
+            <a:r>
+              <a:rPr/>
+              <a:t> </a:t>
+            </a:r>
+            <a:r>
+              <a:rPr/>
+              <a:t>example</a:t>
+            </a:r>
+          </a:p>
+        </p:txBody>
+      </p:sp>
+      <p:sp>
+        <p:nvSpPr>
+          <p:cNvPr id="3" name="Content Placeholder 2"/>
+          <p:cNvSpPr>
+            <a:spLocks noGrp="1"/>
+          </p:cNvSpPr>
+          <p:nvPr>
+            <p:ph idx="1"/>
+          </p:nvPr>
+        </p:nvSpPr>
+        <p:spPr/>
+        <p:txBody>
+          <a:bodyPr/>
+          <a:lstStyle/>
+          <a:p>
+            <a:pPr lvl="0" marL="0" indent="0">
+              <a:buNone/>
+            </a:pPr>
+            <a:r>
+              <a:rPr/>
+              <a:t>((Note the computational expense.))</a:t>
+            </a:r>
+          </a:p>
+        </p:txBody>
+      </p:sp>
+    </p:spTree>
+  </p:cSld>
+</p:sld>
+</file>
+
+<file path=ppt/slides/slide83.xml><?xml version="1.0" encoding="utf-8"?>
+<p:sld xmlns:a="http://schemas.openxmlformats.org/drawingml/2006/main" xmlns:r="http://schemas.openxmlformats.org/officeDocument/2006/relationships" xmlns:p="http://schemas.openxmlformats.org/presentationml/2006/main">
+  <p:cSld>
+    <p:spTree>
+      <p:nvGrpSpPr>
+        <p:cNvPr id="1" name=""/>
+        <p:cNvGrpSpPr/>
+        <p:nvPr/>
+      </p:nvGrpSpPr>
+      <p:grpSpPr>
+        <a:xfrm>
+          <a:off x="0" y="0"/>
+          <a:ext cx="0" cy="0"/>
+          <a:chOff x="0" y="0"/>
+          <a:chExt cx="0" cy="0"/>
+        </a:xfrm>
+      </p:grpSpPr>
+      <p:sp>
+        <p:nvSpPr>
+          <p:cNvPr id="2" name="Title 1"/>
+          <p:cNvSpPr>
+            <a:spLocks noGrp="1"/>
+          </p:cNvSpPr>
+          <p:nvPr>
+            <p:ph type="title"/>
+          </p:nvPr>
+        </p:nvSpPr>
+        <p:spPr/>
+        <p:txBody>
+          <a:bodyPr/>
+          <a:lstStyle/>
+          <a:p>
+            <a:pPr lvl="0" marL="0" indent="0">
+              <a:buNone/>
+            </a:pPr>
+            <a:r>
+              <a:rPr/>
+              <a:t>On</a:t>
+            </a:r>
+            <a:r>
+              <a:rPr/>
+              <a:t> </a:t>
+            </a:r>
+            <a:r>
+              <a:rPr/>
+              <a:t>your</a:t>
+            </a:r>
+            <a:r>
+              <a:rPr/>
+              <a:t> </a:t>
+            </a:r>
+            <a:r>
+              <a:rPr/>
+              <a:t>own</a:t>
+            </a:r>
+          </a:p>
+        </p:txBody>
+      </p:sp>
+      <p:sp>
+        <p:nvSpPr>
+          <p:cNvPr id="3" name="Content Placeholder 2"/>
+          <p:cNvSpPr>
+            <a:spLocks noGrp="1"/>
+          </p:cNvSpPr>
+          <p:nvPr>
+            <p:ph idx="1"/>
+          </p:nvPr>
+        </p:nvSpPr>
+        <p:spPr/>
+        <p:txBody>
+          <a:bodyPr/>
+          <a:lstStyle/>
+          <a:p>
+            <a:pPr lvl="0" marL="0" indent="0">
+              <a:buNone/>
+            </a:pPr>
+            <a:r>
+              <a:rPr/>
+              <a:t>((Find a totally different data set and get the students to draw four different visualizations. Have them divide into groups that like the same visualization software and have each person do a different visualization.))</a:t>
+            </a:r>
+          </a:p>
+        </p:txBody>
+      </p:sp>
+    </p:spTree>
+  </p:cSld>
+</p:sld>
+</file>
+
+<file path=ppt/slides/slide84.xml><?xml version="1.0" encoding="utf-8"?>
+<p:sld xmlns:a="http://schemas.openxmlformats.org/drawingml/2006/main" xmlns:r="http://schemas.openxmlformats.org/officeDocument/2006/relationships" xmlns:p="http://schemas.openxmlformats.org/presentationml/2006/main">
+  <p:cSld>
+    <p:spTree>
+      <p:nvGrpSpPr>
+        <p:cNvPr id="1" name=""/>
+        <p:cNvGrpSpPr/>
+        <p:nvPr/>
+      </p:nvGrpSpPr>
+      <p:grpSpPr>
+        <a:xfrm>
+          <a:off x="0" y="0"/>
+          <a:ext cx="0" cy="0"/>
+          <a:chOff x="0" y="0"/>
+          <a:chExt cx="0" cy="0"/>
+        </a:xfrm>
+      </p:grpSpPr>
+      <p:sp>
+        <p:nvSpPr>
+          <p:cNvPr id="2" name="Title 1"/>
+          <p:cNvSpPr>
+            <a:spLocks noGrp="1"/>
+          </p:cNvSpPr>
+          <p:nvPr>
+            <p:ph type="title"/>
+          </p:nvPr>
+        </p:nvSpPr>
+        <p:spPr/>
+        <p:txBody>
+          <a:bodyPr/>
+          <a:lstStyle/>
+          <a:p>
+            <a:pPr lvl="0" marL="0" indent="0">
+              <a:buNone/>
+            </a:pPr>
+            <a:r>
+              <a:rPr/>
+              <a:t>Summary</a:t>
+            </a:r>
+          </a:p>
+        </p:txBody>
+      </p:sp>
+      <p:sp>
+        <p:nvSpPr>
+          <p:cNvPr id="3" name="Content Placeholder 2"/>
+          <p:cNvSpPr>
+            <a:spLocks noGrp="1"/>
+          </p:cNvSpPr>
+          <p:nvPr>
+            <p:ph idx="1"/>
+          </p:nvPr>
+        </p:nvSpPr>
+        <p:spPr/>
+        <p:txBody>
+          <a:bodyPr/>
+          <a:lstStyle/>
+          <a:p>
+            <a:pPr lvl="1"/>
+            <a:r>
+              <a:rPr/>
+              <a:t>“A mapping of data to the visual aesthetics of geometries/marks”</a:t>
+            </a:r>
+          </a:p>
+          <a:p>
+            <a:pPr lvl="2"/>
+            <a:r>
+              <a:rPr/>
+              <a:t>Bars are a type of geometry/mark</a:t>
+            </a:r>
+          </a:p>
+          <a:p>
+            <a:pPr lvl="2"/>
+            <a:r>
+              <a:rPr/>
+              <a:t>Aesthetics for bars include location, size, color</a:t>
+            </a:r>
+          </a:p>
+          <a:p>
+            <a:pPr lvl="2"/>
+            <a:r>
+              <a:rPr/>
+              <a:t>Stack versus dodge</a:t>
+            </a:r>
+          </a:p>
+          <a:p>
+            <a:pPr lvl="1"/>
+            <a:r>
+              <a:rPr/>
+              <a:t>Basic tips</a:t>
+            </a:r>
+          </a:p>
+          <a:p>
+            <a:pPr lvl="2"/>
+            <a:r>
+              <a:rPr/>
+              <a:t>Place comparators close</a:t>
+            </a:r>
+          </a:p>
+          <a:p>
+            <a:pPr lvl="2"/>
+            <a:r>
+              <a:rPr/>
+              <a:t>Use axis ticks, light grid lines</a:t>
+            </a:r>
+          </a:p>
+        </p:txBody>
+      </p:sp>
+    </p:spTree>
+  </p:cSld>
+</p:sld>
+</file>
+
+<file path=ppt/slides/slide85.xml><?xml version="1.0" encoding="utf-8"?>
 <p:sld xmlns:a="http://schemas.openxmlformats.org/drawingml/2006/main" xmlns:r="http://schemas.openxmlformats.org/officeDocument/2006/relationships" xmlns:p="http://schemas.openxmlformats.org/presentationml/2006/main">
   <p:cSld>
     <p:spTree>

</xml_diff>

<commit_message>
Added yellow, cyan, magenta to data-viz-02
</commit_message>
<xml_diff>
--- a/data-viz-02/src/data-visualization-02-bars.pptx
+++ b/data-viz-02/src/data-visualization-02-bars.pptx
@@ -5,7 +5,7 @@
     <p:sldMasterId id="2147483648" r:id="rId1"/>
   </p:sldMasterIdLst>
   <p:notesMasterIdLst>
-    <p:NotesMasterId r:id="rId87"/>
+    <p:NotesMasterId r:id="rId89"/>
   </p:notesMasterIdLst>
   <p:sldIdLst>
     <p:sldId id="256" r:id="rId2"/>
@@ -93,6 +93,8 @@
     <p:sldId id="338" r:id="rId84"/>
     <p:sldId id="339" r:id="rId85"/>
     <p:sldId id="340" r:id="rId86"/>
+    <p:sldId id="341" r:id="rId87"/>
+    <p:sldId id="342" r:id="rId88"/>
   </p:sldIdLst>
   <p:sldSz cx="9144000" cy="6858000" type="screen4x3"/>
   <p:notesSz cx="6858000" cy="9144000"/>
@@ -2727,7 +2729,7 @@
           <a:p>
             <a:fld id="{18BDFEC3-8487-43E8-A154-7C12CBC1FFF2}" type="slidenum">
               <a:rPr lang="en-US"/>
-              <a:t>37</a:t>
+              <a:t>39</a:t>
             </a:fld>
             <a:endParaRPr lang="en-US"/>
           </a:p>
@@ -3359,7 +3361,7 @@
           <a:p>
             <a:fld id="{18BDFEC3-8487-43E8-A154-7C12CBC1FFF2}" type="slidenum">
               <a:rPr lang="en-US"/>
-              <a:t>40</a:t>
+              <a:t>42</a:t>
             </a:fld>
             <a:endParaRPr lang="en-US"/>
           </a:p>
@@ -3705,7 +3707,7 @@
           <a:p>
             <a:fld id="{18BDFEC3-8487-43E8-A154-7C12CBC1FFF2}" type="slidenum">
               <a:rPr lang="en-US"/>
-              <a:t>41</a:t>
+              <a:t>43</a:t>
             </a:fld>
             <a:endParaRPr lang="en-US"/>
           </a:p>
@@ -4601,7 +4603,7 @@
           <a:p>
             <a:fld id="{18BDFEC3-8487-43E8-A154-7C12CBC1FFF2}" type="slidenum">
               <a:rPr lang="en-US"/>
-              <a:t>48</a:t>
+              <a:t>50</a:t>
             </a:fld>
             <a:endParaRPr lang="en-US"/>
           </a:p>
@@ -5401,7 +5403,7 @@
           <a:p>
             <a:fld id="{18BDFEC3-8487-43E8-A154-7C12CBC1FFF2}" type="slidenum">
               <a:rPr lang="en-US"/>
-              <a:t>50</a:t>
+              <a:t>52</a:t>
             </a:fld>
             <a:endParaRPr lang="en-US"/>
           </a:p>
@@ -6209,7 +6211,7 @@
           <a:p>
             <a:fld id="{18BDFEC3-8487-43E8-A154-7C12CBC1FFF2}" type="slidenum">
               <a:rPr lang="en-US"/>
-              <a:t>57</a:t>
+              <a:t>59</a:t>
             </a:fld>
             <a:endParaRPr lang="en-US"/>
           </a:p>
@@ -6571,7 +6573,7 @@
           <a:p>
             <a:fld id="{18BDFEC3-8487-43E8-A154-7C12CBC1FFF2}" type="slidenum">
               <a:rPr lang="en-US"/>
-              <a:t>61</a:t>
+              <a:t>63</a:t>
             </a:fld>
             <a:endParaRPr lang="en-US"/>
           </a:p>
@@ -7251,7 +7253,7 @@
           <a:p>
             <a:fld id="{18BDFEC3-8487-43E8-A154-7C12CBC1FFF2}" type="slidenum">
               <a:rPr lang="en-US"/>
-              <a:t>67</a:t>
+              <a:t>69</a:t>
             </a:fld>
             <a:endParaRPr lang="en-US"/>
           </a:p>
@@ -7695,7 +7697,7 @@
           <a:p>
             <a:fld id="{18BDFEC3-8487-43E8-A154-7C12CBC1FFF2}" type="slidenum">
               <a:rPr lang="en-US"/>
-              <a:t>76</a:t>
+              <a:t>78</a:t>
             </a:fld>
             <a:endParaRPr lang="en-US"/>
           </a:p>
@@ -17867,12 +17869,12 @@
       </p:grpSpPr>
       <p:sp>
         <p:nvSpPr>
-          <p:cNvPr id="3" name="Content Placeholder 2"/>
+          <p:cNvPr id="2" name="Title 1"/>
           <p:cNvSpPr>
             <a:spLocks noGrp="1"/>
           </p:cNvSpPr>
           <p:nvPr>
-            <p:ph idx="1"/>
+            <p:ph type="title"/>
           </p:nvPr>
         </p:nvSpPr>
         <p:spPr/>
@@ -17885,7 +17887,124 @@
             </a:pPr>
             <a:r>
               <a:rPr/>
-              <a:t> ### Hexadecimal codes for RGB + Hexadecimal digits (base 16) + 0-9, A-F + Two hexadecimal digits represent the numbers 0-255. + #rrggbb format + #000000 is pure black + #FFFFFF is pure white + #FF0000 is pure red + #00FF00 is pure green + #0000FF is pure blue + You can mix and match to get 16,777,216 colors + #800080 is purple, #FF69B4 is pink, #40e0d0 is turquoise</a:t>
+              <a:t>Hexadecimal</a:t>
+            </a:r>
+            <a:r>
+              <a:rPr/>
+              <a:t> </a:t>
+            </a:r>
+            <a:r>
+              <a:rPr/>
+              <a:t>codes</a:t>
+            </a:r>
+            <a:r>
+              <a:rPr/>
+              <a:t> </a:t>
+            </a:r>
+            <a:r>
+              <a:rPr/>
+              <a:t>for</a:t>
+            </a:r>
+            <a:r>
+              <a:rPr/>
+              <a:t> </a:t>
+            </a:r>
+            <a:r>
+              <a:rPr/>
+              <a:t>RGB</a:t>
+            </a:r>
+          </a:p>
+        </p:txBody>
+      </p:sp>
+      <p:sp>
+        <p:nvSpPr>
+          <p:cNvPr id="3" name="Content Placeholder 2"/>
+          <p:cNvSpPr>
+            <a:spLocks noGrp="1"/>
+          </p:cNvSpPr>
+          <p:nvPr>
+            <p:ph idx="1"/>
+          </p:nvPr>
+        </p:nvSpPr>
+        <p:spPr/>
+        <p:txBody>
+          <a:bodyPr/>
+          <a:lstStyle/>
+          <a:p>
+            <a:pPr lvl="1"/>
+            <a:r>
+              <a:rPr/>
+              <a:t>Hexadecimal digits (base 16)</a:t>
+            </a:r>
+          </a:p>
+          <a:p>
+            <a:pPr lvl="2"/>
+            <a:r>
+              <a:rPr/>
+              <a:t>0-9, A-F</a:t>
+            </a:r>
+          </a:p>
+          <a:p>
+            <a:pPr lvl="2"/>
+            <a:r>
+              <a:rPr/>
+              <a:t>Two hexadecimal digits represent the numbers 0-255.</a:t>
+            </a:r>
+          </a:p>
+          <a:p>
+            <a:pPr lvl="1"/>
+            <a:r>
+              <a:rPr/>
+              <a:t>#rrggbb format</a:t>
+            </a:r>
+          </a:p>
+          <a:p>
+            <a:pPr lvl="2"/>
+            <a:r>
+              <a:rPr/>
+              <a:t>#000000 is pure black</a:t>
+            </a:r>
+          </a:p>
+          <a:p>
+            <a:pPr lvl="2"/>
+            <a:r>
+              <a:rPr/>
+              <a:t>#FFFFFF is pure white</a:t>
+            </a:r>
+          </a:p>
+          <a:p>
+            <a:pPr lvl="2"/>
+            <a:r>
+              <a:rPr/>
+              <a:t>#FF0000 is pure red</a:t>
+            </a:r>
+          </a:p>
+          <a:p>
+            <a:pPr lvl="2"/>
+            <a:r>
+              <a:rPr/>
+              <a:t>#00FF00 is pure green</a:t>
+            </a:r>
+          </a:p>
+          <a:p>
+            <a:pPr lvl="2"/>
+            <a:r>
+              <a:rPr/>
+              <a:t>#0000FF is pure blue</a:t>
+            </a:r>
+          </a:p>
+          <a:p>
+            <a:pPr lvl="1"/>
+            <a:r>
+              <a:rPr/>
+              <a:t>You can mix and match to get 16,777,216 colors</a:t>
+            </a:r>
+          </a:p>
+          <a:p>
+            <a:pPr lvl="2"/>
+            <a:r>
+              <a:rPr/>
+              <a:t>#800080 is purple, #FF69B4 is pink, #40e0d0 is turquoise</a:t>
             </a:r>
           </a:p>
         </p:txBody>
@@ -18825,6 +18944,17 @@
               <a:buNone/>
             </a:pPr>
           </a:p>
+          <a:p>
+            <a:pPr lvl="0" marL="1270000" indent="0">
+              <a:buNone/>
+            </a:pPr>
+            <a:r>
+              <a:rPr sz="1800">
+                <a:latin typeface="Courier"/>
+              </a:rPr>
+              <a:t>## function (...)  .Primitive("c")</a:t>
+            </a:r>
+          </a:p>
         </p:txBody>
       </p:sp>
     </p:spTree>
@@ -18849,34 +18979,9 @@
           <a:chExt cx="0" cy="0"/>
         </a:xfrm>
       </p:grpSpPr>
-      <p:sp>
-        <p:nvSpPr>
-          <p:cNvPr id="2" name="Title 1"/>
-          <p:cNvSpPr>
-            <a:spLocks noGrp="1"/>
-          </p:cNvSpPr>
-          <p:nvPr>
-            <p:ph type="title"/>
-          </p:nvPr>
-        </p:nvSpPr>
-        <p:spPr/>
-        <p:txBody>
-          <a:bodyPr/>
-          <a:lstStyle/>
-          <a:p>
-            <a:pPr lvl="0" marL="0" indent="0">
-              <a:buNone/>
-            </a:pPr>
-            <a:r>
-              <a:rPr/>
-              <a:t>Transitions</a:t>
-            </a:r>
-          </a:p>
-        </p:txBody>
-      </p:sp>
       <p:pic>
         <p:nvPicPr>
-          <p:cNvPr descr="data-visualization-02-bars_files/figure-pptx/transition-1.png" id="0" name="Picture 1"/>
+          <p:cNvPr descr="data-visualization-02-bars_files/figure-pptx/rgb-gradient1-1.png" id="0" name="Picture 1"/>
           <p:cNvPicPr>
             <a:picLocks noGrp="1" noChangeAspect="1"/>
           </p:cNvPicPr>
@@ -18944,10 +19049,6 @@
             <a:pPr lvl="0" marL="0" indent="0">
               <a:buNone/>
             </a:pPr>
-            <a:r>
-              <a:rPr/>
-              <a:t> ### A quick tutorial on colors</a:t>
-            </a:r>
           </a:p>
         </p:txBody>
       </p:sp>
@@ -19117,76 +19218,41 @@
             </a:pPr>
             <a:r>
               <a:rPr/>
-              <a:t>Bars</a:t>
+              <a:t>Transitions</a:t>
             </a:r>
           </a:p>
         </p:txBody>
       </p:sp>
-      <p:sp>
-        <p:nvSpPr>
-          <p:cNvPr id="3" name="Content Placeholder 2"/>
-          <p:cNvSpPr>
-            <a:spLocks noGrp="1"/>
-          </p:cNvSpPr>
-          <p:nvPr>
-            <p:ph idx="1"/>
-          </p:nvPr>
-        </p:nvSpPr>
-        <p:spPr/>
-        <p:txBody>
-          <a:bodyPr/>
-          <a:lstStyle/>
-          <a:p>
-            <a:pPr lvl="1"/>
-            <a:r>
-              <a:rPr/>
-              <a:t>Fewer in numbers than points</a:t>
-            </a:r>
-          </a:p>
-          <a:p>
-            <a:pPr lvl="1"/>
-            <a:r>
-              <a:rPr/>
-              <a:t>Usually a summary statistic</a:t>
-            </a:r>
-          </a:p>
-          <a:p>
-            <a:pPr lvl="2"/>
-            <a:r>
-              <a:rPr/>
-              <a:t>Count</a:t>
-            </a:r>
-          </a:p>
-          <a:p>
-            <a:pPr lvl="2"/>
-            <a:r>
-              <a:rPr/>
-              <a:t>Percent</a:t>
-            </a:r>
-          </a:p>
-          <a:p>
-            <a:pPr lvl="2"/>
-            <a:r>
-              <a:rPr/>
-              <a:t>Average</a:t>
-            </a:r>
-          </a:p>
-          <a:p>
-            <a:pPr lvl="2"/>
-            <a:r>
-              <a:rPr/>
-              <a:t>Total</a:t>
-            </a:r>
-          </a:p>
-          <a:p>
-            <a:pPr lvl="1"/>
-            <a:r>
-              <a:rPr/>
-              <a:t>A bar chart is NOT a histogram</a:t>
-            </a:r>
-          </a:p>
-        </p:txBody>
-      </p:sp>
+      <p:pic>
+        <p:nvPicPr>
+          <p:cNvPr descr="data-visualization-02-bars_files/figure-pptx/transition-1.png" id="0" name="Picture 1"/>
+          <p:cNvPicPr>
+            <a:picLocks noGrp="1" noChangeAspect="1"/>
+          </p:cNvPicPr>
+          <p:nvPr/>
+        </p:nvPicPr>
+        <p:blipFill>
+          <a:blip r:embed="rId2"/>
+          <a:stretch>
+            <a:fillRect/>
+          </a:stretch>
+        </p:blipFill>
+        <p:spPr bwMode="auto">
+          <a:xfrm>
+            <a:off x="1752600" y="1600200"/>
+            <a:ext cx="5651500" cy="4521200"/>
+          </a:xfrm>
+          <a:prstGeom prst="rect">
+            <a:avLst/>
+          </a:prstGeom>
+          <a:noFill/>
+          <a:ln w="9525">
+            <a:noFill/>
+            <a:headEnd/>
+            <a:tailEnd/>
+          </a:ln>
+        </p:spPr>
+      </p:pic>
     </p:spTree>
   </p:cSld>
 </p:sld>
@@ -19211,12 +19277,12 @@
       </p:grpSpPr>
       <p:sp>
         <p:nvSpPr>
-          <p:cNvPr id="2" name="Title 1"/>
+          <p:cNvPr id="3" name="Content Placeholder 2"/>
           <p:cNvSpPr>
             <a:spLocks noGrp="1"/>
           </p:cNvSpPr>
           <p:nvPr>
-            <p:ph type="title"/>
+            <p:ph idx="1"/>
           </p:nvPr>
         </p:nvSpPr>
         <p:spPr/>
@@ -19229,74 +19295,7 @@
             </a:pPr>
             <a:r>
               <a:rPr/>
-              <a:t>Aesthetics</a:t>
-            </a:r>
-            <a:r>
-              <a:rPr/>
-              <a:t> </a:t>
-            </a:r>
-            <a:r>
-              <a:rPr/>
-              <a:t>for</a:t>
-            </a:r>
-            <a:r>
-              <a:rPr/>
-              <a:t> </a:t>
-            </a:r>
-            <a:r>
-              <a:rPr/>
-              <a:t>bars</a:t>
-            </a:r>
-          </a:p>
-        </p:txBody>
-      </p:sp>
-      <p:sp>
-        <p:nvSpPr>
-          <p:cNvPr id="3" name="Content Placeholder 2"/>
-          <p:cNvSpPr>
-            <a:spLocks noGrp="1"/>
-          </p:cNvSpPr>
-          <p:nvPr>
-            <p:ph idx="1"/>
-          </p:nvPr>
-        </p:nvSpPr>
-        <p:spPr/>
-        <p:txBody>
-          <a:bodyPr/>
-          <a:lstStyle/>
-          <a:p>
-            <a:pPr lvl="1"/>
-            <a:r>
-              <a:rPr/>
-              <a:t>Review</a:t>
-            </a:r>
-          </a:p>
-          <a:p>
-            <a:pPr lvl="2"/>
-            <a:r>
-              <a:rPr/>
-              <a:t>Location</a:t>
-            </a:r>
-          </a:p>
-          <a:p>
-            <a:pPr lvl="2"/>
-            <a:r>
-              <a:rPr/>
-              <a:t>Size</a:t>
-            </a:r>
-          </a:p>
-          <a:p>
-            <a:pPr lvl="2"/>
-            <a:r>
-              <a:rPr/>
-              <a:t>Color</a:t>
-            </a:r>
-          </a:p>
-          <a:p>
-            <a:pPr lvl="2"/>
-            <a:r>
-              <a:rPr/>
-              <a:t>NOT shape!!!</a:t>
+              <a:t> ### A quick tutorial on colors</a:t>
             </a:r>
           </a:p>
         </p:txBody>
@@ -19343,31 +19342,7 @@
             </a:pPr>
             <a:r>
               <a:rPr/>
-              <a:t>Notes</a:t>
-            </a:r>
-            <a:r>
-              <a:rPr/>
-              <a:t> </a:t>
-            </a:r>
-            <a:r>
-              <a:rPr/>
-              <a:t>about</a:t>
-            </a:r>
-            <a:r>
-              <a:rPr/>
-              <a:t> </a:t>
-            </a:r>
-            <a:r>
-              <a:rPr/>
-              <a:t>this</a:t>
-            </a:r>
-            <a:r>
-              <a:rPr/>
-              <a:t> </a:t>
-            </a:r>
-            <a:r>
-              <a:rPr/>
-              <a:t>talk</a:t>
+              <a:t>Bars</a:t>
             </a:r>
           </a:p>
         </p:txBody>
@@ -19390,14 +19365,49 @@
             <a:pPr lvl="1"/>
             <a:r>
               <a:rPr/>
-              <a:t>Do not include this slide in the final presentation</a:t>
+              <a:t>Fewer in numbers than points</a:t>
             </a:r>
           </a:p>
           <a:p>
             <a:pPr lvl="1"/>
             <a:r>
               <a:rPr/>
-              <a:t>If I do a flipped classroom, here would be a good place to split with most of the material before this slide being in lectures to be viewed before the class. Then the classrom lecture would start from about here (after a very quick review) and focus on the “On your own” exercises.</a:t>
+              <a:t>Usually a summary statistic</a:t>
+            </a:r>
+          </a:p>
+          <a:p>
+            <a:pPr lvl="2"/>
+            <a:r>
+              <a:rPr/>
+              <a:t>Count</a:t>
+            </a:r>
+          </a:p>
+          <a:p>
+            <a:pPr lvl="2"/>
+            <a:r>
+              <a:rPr/>
+              <a:t>Percent</a:t>
+            </a:r>
+          </a:p>
+          <a:p>
+            <a:pPr lvl="2"/>
+            <a:r>
+              <a:rPr/>
+              <a:t>Average</a:t>
+            </a:r>
+          </a:p>
+          <a:p>
+            <a:pPr lvl="2"/>
+            <a:r>
+              <a:rPr/>
+              <a:t>Total</a:t>
+            </a:r>
+          </a:p>
+          <a:p>
+            <a:pPr lvl="1"/>
+            <a:r>
+              <a:rPr/>
+              <a:t>A bar chart is NOT a histogram</a:t>
             </a:r>
           </a:p>
         </p:txBody>
@@ -19408,6 +19418,221 @@
 </file>
 
 <file path=ppt/slides/slide43.xml><?xml version="1.0" encoding="utf-8"?>
+<p:sld xmlns:a="http://schemas.openxmlformats.org/drawingml/2006/main" xmlns:r="http://schemas.openxmlformats.org/officeDocument/2006/relationships" xmlns:p="http://schemas.openxmlformats.org/presentationml/2006/main">
+  <p:cSld>
+    <p:spTree>
+      <p:nvGrpSpPr>
+        <p:cNvPr id="1" name=""/>
+        <p:cNvGrpSpPr/>
+        <p:nvPr/>
+      </p:nvGrpSpPr>
+      <p:grpSpPr>
+        <a:xfrm>
+          <a:off x="0" y="0"/>
+          <a:ext cx="0" cy="0"/>
+          <a:chOff x="0" y="0"/>
+          <a:chExt cx="0" cy="0"/>
+        </a:xfrm>
+      </p:grpSpPr>
+      <p:sp>
+        <p:nvSpPr>
+          <p:cNvPr id="2" name="Title 1"/>
+          <p:cNvSpPr>
+            <a:spLocks noGrp="1"/>
+          </p:cNvSpPr>
+          <p:nvPr>
+            <p:ph type="title"/>
+          </p:nvPr>
+        </p:nvSpPr>
+        <p:spPr/>
+        <p:txBody>
+          <a:bodyPr/>
+          <a:lstStyle/>
+          <a:p>
+            <a:pPr lvl="0" marL="0" indent="0">
+              <a:buNone/>
+            </a:pPr>
+            <a:r>
+              <a:rPr/>
+              <a:t>Aesthetics</a:t>
+            </a:r>
+            <a:r>
+              <a:rPr/>
+              <a:t> </a:t>
+            </a:r>
+            <a:r>
+              <a:rPr/>
+              <a:t>for</a:t>
+            </a:r>
+            <a:r>
+              <a:rPr/>
+              <a:t> </a:t>
+            </a:r>
+            <a:r>
+              <a:rPr/>
+              <a:t>bars</a:t>
+            </a:r>
+          </a:p>
+        </p:txBody>
+      </p:sp>
+      <p:sp>
+        <p:nvSpPr>
+          <p:cNvPr id="3" name="Content Placeholder 2"/>
+          <p:cNvSpPr>
+            <a:spLocks noGrp="1"/>
+          </p:cNvSpPr>
+          <p:nvPr>
+            <p:ph idx="1"/>
+          </p:nvPr>
+        </p:nvSpPr>
+        <p:spPr/>
+        <p:txBody>
+          <a:bodyPr/>
+          <a:lstStyle/>
+          <a:p>
+            <a:pPr lvl="1"/>
+            <a:r>
+              <a:rPr/>
+              <a:t>Review</a:t>
+            </a:r>
+          </a:p>
+          <a:p>
+            <a:pPr lvl="2"/>
+            <a:r>
+              <a:rPr/>
+              <a:t>Location</a:t>
+            </a:r>
+          </a:p>
+          <a:p>
+            <a:pPr lvl="2"/>
+            <a:r>
+              <a:rPr/>
+              <a:t>Size</a:t>
+            </a:r>
+          </a:p>
+          <a:p>
+            <a:pPr lvl="2"/>
+            <a:r>
+              <a:rPr/>
+              <a:t>Color</a:t>
+            </a:r>
+          </a:p>
+          <a:p>
+            <a:pPr lvl="2"/>
+            <a:r>
+              <a:rPr/>
+              <a:t>NOT shape!!!</a:t>
+            </a:r>
+          </a:p>
+        </p:txBody>
+      </p:sp>
+    </p:spTree>
+  </p:cSld>
+</p:sld>
+</file>
+
+<file path=ppt/slides/slide44.xml><?xml version="1.0" encoding="utf-8"?>
+<p:sld xmlns:a="http://schemas.openxmlformats.org/drawingml/2006/main" xmlns:r="http://schemas.openxmlformats.org/officeDocument/2006/relationships" xmlns:p="http://schemas.openxmlformats.org/presentationml/2006/main">
+  <p:cSld>
+    <p:spTree>
+      <p:nvGrpSpPr>
+        <p:cNvPr id="1" name=""/>
+        <p:cNvGrpSpPr/>
+        <p:nvPr/>
+      </p:nvGrpSpPr>
+      <p:grpSpPr>
+        <a:xfrm>
+          <a:off x="0" y="0"/>
+          <a:ext cx="0" cy="0"/>
+          <a:chOff x="0" y="0"/>
+          <a:chExt cx="0" cy="0"/>
+        </a:xfrm>
+      </p:grpSpPr>
+      <p:sp>
+        <p:nvSpPr>
+          <p:cNvPr id="2" name="Title 1"/>
+          <p:cNvSpPr>
+            <a:spLocks noGrp="1"/>
+          </p:cNvSpPr>
+          <p:nvPr>
+            <p:ph type="title"/>
+          </p:nvPr>
+        </p:nvSpPr>
+        <p:spPr/>
+        <p:txBody>
+          <a:bodyPr/>
+          <a:lstStyle/>
+          <a:p>
+            <a:pPr lvl="0" marL="0" indent="0">
+              <a:buNone/>
+            </a:pPr>
+            <a:r>
+              <a:rPr/>
+              <a:t>Notes</a:t>
+            </a:r>
+            <a:r>
+              <a:rPr/>
+              <a:t> </a:t>
+            </a:r>
+            <a:r>
+              <a:rPr/>
+              <a:t>about</a:t>
+            </a:r>
+            <a:r>
+              <a:rPr/>
+              <a:t> </a:t>
+            </a:r>
+            <a:r>
+              <a:rPr/>
+              <a:t>this</a:t>
+            </a:r>
+            <a:r>
+              <a:rPr/>
+              <a:t> </a:t>
+            </a:r>
+            <a:r>
+              <a:rPr/>
+              <a:t>talk</a:t>
+            </a:r>
+          </a:p>
+        </p:txBody>
+      </p:sp>
+      <p:sp>
+        <p:nvSpPr>
+          <p:cNvPr id="3" name="Content Placeholder 2"/>
+          <p:cNvSpPr>
+            <a:spLocks noGrp="1"/>
+          </p:cNvSpPr>
+          <p:nvPr>
+            <p:ph idx="1"/>
+          </p:nvPr>
+        </p:nvSpPr>
+        <p:spPr/>
+        <p:txBody>
+          <a:bodyPr/>
+          <a:lstStyle/>
+          <a:p>
+            <a:pPr lvl="1"/>
+            <a:r>
+              <a:rPr/>
+              <a:t>Do not include this slide in the final presentation</a:t>
+            </a:r>
+          </a:p>
+          <a:p>
+            <a:pPr lvl="1"/>
+            <a:r>
+              <a:rPr/>
+              <a:t>If I do a flipped classroom, here would be a good place to split with most of the material before this slide being in lectures to be viewed before the class. Then the classrom lecture would start from about here (after a very quick review) and focus on the “On your own” exercises.</a:t>
+            </a:r>
+          </a:p>
+        </p:txBody>
+      </p:sp>
+    </p:spTree>
+  </p:cSld>
+</p:sld>
+</file>
+
+<file path=ppt/slides/slide45.xml><?xml version="1.0" encoding="utf-8"?>
 <p:sld xmlns:a="http://schemas.openxmlformats.org/drawingml/2006/main" xmlns:r="http://schemas.openxmlformats.org/officeDocument/2006/relationships" xmlns:p="http://schemas.openxmlformats.org/presentationml/2006/main">
   <p:cSld>
     <p:spTree>
@@ -19508,7 +19733,7 @@
 </p:sld>
 </file>
 
-<file path=ppt/slides/slide44.xml><?xml version="1.0" encoding="utf-8"?>
+<file path=ppt/slides/slide46.xml><?xml version="1.0" encoding="utf-8"?>
 <p:sld xmlns:a="http://schemas.openxmlformats.org/drawingml/2006/main" xmlns:r="http://schemas.openxmlformats.org/officeDocument/2006/relationships" xmlns:p="http://schemas.openxmlformats.org/presentationml/2006/main">
   <p:cSld>
     <p:spTree>
@@ -19609,198 +19834,6 @@
 </p:sld>
 </file>
 
-<file path=ppt/slides/slide45.xml><?xml version="1.0" encoding="utf-8"?>
-<p:sld xmlns:a="http://schemas.openxmlformats.org/drawingml/2006/main" xmlns:r="http://schemas.openxmlformats.org/officeDocument/2006/relationships" xmlns:p="http://schemas.openxmlformats.org/presentationml/2006/main">
-  <p:cSld>
-    <p:spTree>
-      <p:nvGrpSpPr>
-        <p:cNvPr id="1" name=""/>
-        <p:cNvGrpSpPr/>
-        <p:nvPr/>
-      </p:nvGrpSpPr>
-      <p:grpSpPr>
-        <a:xfrm>
-          <a:off x="0" y="0"/>
-          <a:ext cx="0" cy="0"/>
-          <a:chOff x="0" y="0"/>
-          <a:chExt cx="0" cy="0"/>
-        </a:xfrm>
-      </p:grpSpPr>
-      <p:sp>
-        <p:nvSpPr>
-          <p:cNvPr id="2" name="Title 1"/>
-          <p:cNvSpPr>
-            <a:spLocks noGrp="1"/>
-          </p:cNvSpPr>
-          <p:nvPr>
-            <p:ph type="title"/>
-          </p:nvPr>
-        </p:nvSpPr>
-        <p:spPr/>
-        <p:txBody>
-          <a:bodyPr/>
-          <a:lstStyle/>
-          <a:p>
-            <a:pPr lvl="0" marL="0" indent="0">
-              <a:buNone/>
-            </a:pPr>
-            <a:r>
-              <a:rPr/>
-              <a:t>On</a:t>
-            </a:r>
-            <a:r>
-              <a:rPr/>
-              <a:t> </a:t>
-            </a:r>
-            <a:r>
-              <a:rPr/>
-              <a:t>your</a:t>
-            </a:r>
-            <a:r>
-              <a:rPr/>
-              <a:t> </a:t>
-            </a:r>
-            <a:r>
-              <a:rPr/>
-              <a:t>own</a:t>
-            </a:r>
-          </a:p>
-        </p:txBody>
-      </p:sp>
-      <p:sp>
-        <p:nvSpPr>
-          <p:cNvPr id="3" name="Content Placeholder 2"/>
-          <p:cNvSpPr>
-            <a:spLocks noGrp="1"/>
-          </p:cNvSpPr>
-          <p:nvPr>
-            <p:ph idx="1"/>
-          </p:nvPr>
-        </p:nvSpPr>
-        <p:spPr/>
-        <p:txBody>
-          <a:bodyPr/>
-          <a:lstStyle/>
-          <a:p>
-            <a:pPr lvl="1"/>
-            <a:r>
-              <a:rPr/>
-              <a:t>Draw a horizontal and vertical bar chart showing the number of people in each gender (use the Sex variable).</a:t>
-            </a:r>
-          </a:p>
-        </p:txBody>
-      </p:sp>
-    </p:spTree>
-  </p:cSld>
-</p:sld>
-</file>
-
-<file path=ppt/slides/slide46.xml><?xml version="1.0" encoding="utf-8"?>
-<p:sld xmlns:a="http://schemas.openxmlformats.org/drawingml/2006/main" xmlns:r="http://schemas.openxmlformats.org/officeDocument/2006/relationships" xmlns:p="http://schemas.openxmlformats.org/presentationml/2006/main">
-  <p:cSld>
-    <p:spTree>
-      <p:nvGrpSpPr>
-        <p:cNvPr id="1" name=""/>
-        <p:cNvGrpSpPr/>
-        <p:nvPr/>
-      </p:nvGrpSpPr>
-      <p:grpSpPr>
-        <a:xfrm>
-          <a:off x="0" y="0"/>
-          <a:ext cx="0" cy="0"/>
-          <a:chOff x="0" y="0"/>
-          <a:chExt cx="0" cy="0"/>
-        </a:xfrm>
-      </p:grpSpPr>
-      <p:sp>
-        <p:nvSpPr>
-          <p:cNvPr id="2" name="Title 1"/>
-          <p:cNvSpPr>
-            <a:spLocks noGrp="1"/>
-          </p:cNvSpPr>
-          <p:nvPr>
-            <p:ph type="title"/>
-          </p:nvPr>
-        </p:nvSpPr>
-        <p:spPr/>
-        <p:txBody>
-          <a:bodyPr/>
-          <a:lstStyle/>
-          <a:p>
-            <a:pPr lvl="0" marL="0" indent="0">
-              <a:buNone/>
-            </a:pPr>
-            <a:r>
-              <a:rPr/>
-              <a:t>Wait</a:t>
-            </a:r>
-            <a:r>
-              <a:rPr/>
-              <a:t> </a:t>
-            </a:r>
-            <a:r>
-              <a:rPr/>
-              <a:t>before</a:t>
-            </a:r>
-            <a:r>
-              <a:rPr/>
-              <a:t> </a:t>
-            </a:r>
-            <a:r>
-              <a:rPr/>
-              <a:t>showing</a:t>
-            </a:r>
-          </a:p>
-        </p:txBody>
-      </p:sp>
-      <p:sp>
-        <p:nvSpPr>
-          <p:cNvPr id="3" name="Content Placeholder 2"/>
-          <p:cNvSpPr>
-            <a:spLocks noGrp="1"/>
-          </p:cNvSpPr>
-          <p:nvPr>
-            <p:ph idx="1"/>
-          </p:nvPr>
-        </p:nvSpPr>
-        <p:spPr/>
-        <p:txBody>
-          <a:bodyPr/>
-          <a:lstStyle/>
-          <a:p>
-            <a:pPr lvl="0" marL="0" indent="0">
-              <a:buNone/>
-            </a:pPr>
-            <a:r>
-              <a:rPr/>
-              <a:t>((Python code))</a:t>
-            </a:r>
-          </a:p>
-          <a:p>
-            <a:pPr lvl="0" marL="0" indent="0">
-              <a:buNone/>
-            </a:pPr>
-            <a:r>
-              <a:rPr/>
-              <a:t>((R code))</a:t>
-            </a:r>
-          </a:p>
-          <a:p>
-            <a:pPr lvl="0" marL="0" indent="0">
-              <a:buNone/>
-            </a:pPr>
-            <a:r>
-              <a:rPr/>
-              <a:t>((Tableau steps))</a:t>
-            </a:r>
-          </a:p>
-        </p:txBody>
-      </p:sp>
-    </p:spTree>
-  </p:cSld>
-</p:sld>
-</file>
-
 <file path=ppt/slides/slide47.xml><?xml version="1.0" encoding="utf-8"?>
 <p:sld xmlns:a="http://schemas.openxmlformats.org/drawingml/2006/main" xmlns:r="http://schemas.openxmlformats.org/officeDocument/2006/relationships" xmlns:p="http://schemas.openxmlformats.org/presentationml/2006/main">
   <p:cSld>
@@ -19838,7 +19871,7 @@
             </a:pPr>
             <a:r>
               <a:rPr/>
-              <a:t>What</a:t>
+              <a:t>On</a:t>
             </a:r>
             <a:r>
               <a:rPr/>
@@ -19854,31 +19887,7 @@
             </a:r>
             <a:r>
               <a:rPr/>
-              <a:t>visualization</a:t>
-            </a:r>
-            <a:r>
-              <a:rPr/>
-              <a:t> </a:t>
-            </a:r>
-            <a:r>
-              <a:rPr/>
-              <a:t>might</a:t>
-            </a:r>
-            <a:r>
-              <a:rPr/>
-              <a:t> </a:t>
-            </a:r>
-            <a:r>
-              <a:rPr/>
-              <a:t>look</a:t>
-            </a:r>
-            <a:r>
-              <a:rPr/>
-              <a:t> </a:t>
-            </a:r>
-            <a:r>
-              <a:rPr/>
-              <a:t>like</a:t>
+              <a:t>own</a:t>
             </a:r>
           </a:p>
         </p:txBody>
@@ -19898,12 +19907,10 @@
           <a:bodyPr/>
           <a:lstStyle/>
           <a:p>
-            <a:pPr lvl="0" marL="0" indent="0">
-              <a:buNone/>
-            </a:pPr>
-            <a:r>
-              <a:rPr/>
-              <a:t>((Show visualization))</a:t>
+            <a:pPr lvl="1"/>
+            <a:r>
+              <a:rPr/>
+              <a:t>Draw a horizontal and vertical bar chart showing the number of people in each gender (use the Sex variable).</a:t>
             </a:r>
           </a:p>
         </p:txBody>
@@ -19950,23 +19957,23 @@
             </a:pPr>
             <a:r>
               <a:rPr/>
-              <a:t>Thoughts</a:t>
-            </a:r>
-            <a:r>
-              <a:rPr/>
-              <a:t> </a:t>
-            </a:r>
-            <a:r>
-              <a:rPr/>
-              <a:t>on</a:t>
-            </a:r>
-            <a:r>
-              <a:rPr/>
-              <a:t> </a:t>
-            </a:r>
-            <a:r>
-              <a:rPr/>
-              <a:t>location</a:t>
+              <a:t>Wait</a:t>
+            </a:r>
+            <a:r>
+              <a:rPr/>
+              <a:t> </a:t>
+            </a:r>
+            <a:r>
+              <a:rPr/>
+              <a:t>before</a:t>
+            </a:r>
+            <a:r>
+              <a:rPr/>
+              <a:t> </a:t>
+            </a:r>
+            <a:r>
+              <a:rPr/>
+              <a:t>showing</a:t>
             </a:r>
           </a:p>
         </p:txBody>
@@ -19986,17 +19993,30 @@
           <a:bodyPr/>
           <a:lstStyle/>
           <a:p>
-            <a:pPr lvl="1"/>
-            <a:r>
-              <a:rPr/>
-              <a:t>Axis labels often fit better on vertical location</a:t>
-            </a:r>
-          </a:p>
-          <a:p>
-            <a:pPr lvl="1"/>
-            <a:r>
-              <a:rPr/>
-              <a:t>Cannot vary both X and Y</a:t>
+            <a:pPr lvl="0" marL="0" indent="0">
+              <a:buNone/>
+            </a:pPr>
+            <a:r>
+              <a:rPr/>
+              <a:t>((Python code))</a:t>
+            </a:r>
+          </a:p>
+          <a:p>
+            <a:pPr lvl="0" marL="0" indent="0">
+              <a:buNone/>
+            </a:pPr>
+            <a:r>
+              <a:rPr/>
+              <a:t>((R code))</a:t>
+            </a:r>
+          </a:p>
+          <a:p>
+            <a:pPr lvl="0" marL="0" indent="0">
+              <a:buNone/>
+            </a:pPr>
+            <a:r>
+              <a:rPr/>
+              <a:t>((Tableau steps))</a:t>
             </a:r>
           </a:p>
         </p:txBody>
@@ -20043,7 +20063,47 @@
             </a:pPr>
             <a:r>
               <a:rPr/>
-              <a:t>Size</a:t>
+              <a:t>What</a:t>
+            </a:r>
+            <a:r>
+              <a:rPr/>
+              <a:t> </a:t>
+            </a:r>
+            <a:r>
+              <a:rPr/>
+              <a:t>your</a:t>
+            </a:r>
+            <a:r>
+              <a:rPr/>
+              <a:t> </a:t>
+            </a:r>
+            <a:r>
+              <a:rPr/>
+              <a:t>visualization</a:t>
+            </a:r>
+            <a:r>
+              <a:rPr/>
+              <a:t> </a:t>
+            </a:r>
+            <a:r>
+              <a:rPr/>
+              <a:t>might</a:t>
+            </a:r>
+            <a:r>
+              <a:rPr/>
+              <a:t> </a:t>
+            </a:r>
+            <a:r>
+              <a:rPr/>
+              <a:t>look</a:t>
+            </a:r>
+            <a:r>
+              <a:rPr/>
+              <a:t> </a:t>
+            </a:r>
+            <a:r>
+              <a:rPr/>
+              <a:t>like</a:t>
             </a:r>
           </a:p>
         </p:txBody>
@@ -20063,24 +20123,12 @@
           <a:bodyPr/>
           <a:lstStyle/>
           <a:p>
-            <a:pPr lvl="1"/>
-            <a:r>
-              <a:rPr/>
-              <a:t>Length varies, width doesn’t</a:t>
-            </a:r>
-          </a:p>
-          <a:p>
-            <a:pPr lvl="2"/>
-            <a:r>
-              <a:rPr/>
-              <a:t>Exception, mosaic plots</a:t>
-            </a:r>
-          </a:p>
-          <a:p>
-            <a:pPr lvl="2"/>
-            <a:r>
-              <a:rPr/>
-              <a:t>Think about gaps between bars</a:t>
+            <a:pPr lvl="0" marL="0" indent="0">
+              <a:buNone/>
+            </a:pPr>
+            <a:r>
+              <a:rPr/>
+              <a:t>((Show visualization))</a:t>
             </a:r>
           </a:p>
         </p:txBody>
@@ -20195,6 +20243,183 @@
 </file>
 
 <file path=ppt/slides/slide50.xml><?xml version="1.0" encoding="utf-8"?>
+<p:sld xmlns:a="http://schemas.openxmlformats.org/drawingml/2006/main" xmlns:r="http://schemas.openxmlformats.org/officeDocument/2006/relationships" xmlns:p="http://schemas.openxmlformats.org/presentationml/2006/main">
+  <p:cSld>
+    <p:spTree>
+      <p:nvGrpSpPr>
+        <p:cNvPr id="1" name=""/>
+        <p:cNvGrpSpPr/>
+        <p:nvPr/>
+      </p:nvGrpSpPr>
+      <p:grpSpPr>
+        <a:xfrm>
+          <a:off x="0" y="0"/>
+          <a:ext cx="0" cy="0"/>
+          <a:chOff x="0" y="0"/>
+          <a:chExt cx="0" cy="0"/>
+        </a:xfrm>
+      </p:grpSpPr>
+      <p:sp>
+        <p:nvSpPr>
+          <p:cNvPr id="2" name="Title 1"/>
+          <p:cNvSpPr>
+            <a:spLocks noGrp="1"/>
+          </p:cNvSpPr>
+          <p:nvPr>
+            <p:ph type="title"/>
+          </p:nvPr>
+        </p:nvSpPr>
+        <p:spPr/>
+        <p:txBody>
+          <a:bodyPr/>
+          <a:lstStyle/>
+          <a:p>
+            <a:pPr lvl="0" marL="0" indent="0">
+              <a:buNone/>
+            </a:pPr>
+            <a:r>
+              <a:rPr/>
+              <a:t>Thoughts</a:t>
+            </a:r>
+            <a:r>
+              <a:rPr/>
+              <a:t> </a:t>
+            </a:r>
+            <a:r>
+              <a:rPr/>
+              <a:t>on</a:t>
+            </a:r>
+            <a:r>
+              <a:rPr/>
+              <a:t> </a:t>
+            </a:r>
+            <a:r>
+              <a:rPr/>
+              <a:t>location</a:t>
+            </a:r>
+          </a:p>
+        </p:txBody>
+      </p:sp>
+      <p:sp>
+        <p:nvSpPr>
+          <p:cNvPr id="3" name="Content Placeholder 2"/>
+          <p:cNvSpPr>
+            <a:spLocks noGrp="1"/>
+          </p:cNvSpPr>
+          <p:nvPr>
+            <p:ph idx="1"/>
+          </p:nvPr>
+        </p:nvSpPr>
+        <p:spPr/>
+        <p:txBody>
+          <a:bodyPr/>
+          <a:lstStyle/>
+          <a:p>
+            <a:pPr lvl="1"/>
+            <a:r>
+              <a:rPr/>
+              <a:t>Axis labels often fit better on vertical location</a:t>
+            </a:r>
+          </a:p>
+          <a:p>
+            <a:pPr lvl="1"/>
+            <a:r>
+              <a:rPr/>
+              <a:t>Cannot vary both X and Y</a:t>
+            </a:r>
+          </a:p>
+        </p:txBody>
+      </p:sp>
+    </p:spTree>
+  </p:cSld>
+</p:sld>
+</file>
+
+<file path=ppt/slides/slide51.xml><?xml version="1.0" encoding="utf-8"?>
+<p:sld xmlns:a="http://schemas.openxmlformats.org/drawingml/2006/main" xmlns:r="http://schemas.openxmlformats.org/officeDocument/2006/relationships" xmlns:p="http://schemas.openxmlformats.org/presentationml/2006/main">
+  <p:cSld>
+    <p:spTree>
+      <p:nvGrpSpPr>
+        <p:cNvPr id="1" name=""/>
+        <p:cNvGrpSpPr/>
+        <p:nvPr/>
+      </p:nvGrpSpPr>
+      <p:grpSpPr>
+        <a:xfrm>
+          <a:off x="0" y="0"/>
+          <a:ext cx="0" cy="0"/>
+          <a:chOff x="0" y="0"/>
+          <a:chExt cx="0" cy="0"/>
+        </a:xfrm>
+      </p:grpSpPr>
+      <p:sp>
+        <p:nvSpPr>
+          <p:cNvPr id="2" name="Title 1"/>
+          <p:cNvSpPr>
+            <a:spLocks noGrp="1"/>
+          </p:cNvSpPr>
+          <p:nvPr>
+            <p:ph type="title"/>
+          </p:nvPr>
+        </p:nvSpPr>
+        <p:spPr/>
+        <p:txBody>
+          <a:bodyPr/>
+          <a:lstStyle/>
+          <a:p>
+            <a:pPr lvl="0" marL="0" indent="0">
+              <a:buNone/>
+            </a:pPr>
+            <a:r>
+              <a:rPr/>
+              <a:t>Size</a:t>
+            </a:r>
+          </a:p>
+        </p:txBody>
+      </p:sp>
+      <p:sp>
+        <p:nvSpPr>
+          <p:cNvPr id="3" name="Content Placeholder 2"/>
+          <p:cNvSpPr>
+            <a:spLocks noGrp="1"/>
+          </p:cNvSpPr>
+          <p:nvPr>
+            <p:ph idx="1"/>
+          </p:nvPr>
+        </p:nvSpPr>
+        <p:spPr/>
+        <p:txBody>
+          <a:bodyPr/>
+          <a:lstStyle/>
+          <a:p>
+            <a:pPr lvl="1"/>
+            <a:r>
+              <a:rPr/>
+              <a:t>Length varies, width doesn’t</a:t>
+            </a:r>
+          </a:p>
+          <a:p>
+            <a:pPr lvl="2"/>
+            <a:r>
+              <a:rPr/>
+              <a:t>Exception, mosaic plots</a:t>
+            </a:r>
+          </a:p>
+          <a:p>
+            <a:pPr lvl="2"/>
+            <a:r>
+              <a:rPr/>
+              <a:t>Think about gaps between bars</a:t>
+            </a:r>
+          </a:p>
+        </p:txBody>
+      </p:sp>
+    </p:spTree>
+  </p:cSld>
+</p:sld>
+</file>
+
+<file path=ppt/slides/slide52.xml><?xml version="1.0" encoding="utf-8"?>
 <p:sld xmlns:a="http://schemas.openxmlformats.org/drawingml/2006/main" xmlns:r="http://schemas.openxmlformats.org/officeDocument/2006/relationships" xmlns:p="http://schemas.openxmlformats.org/presentationml/2006/main">
   <p:cSld>
     <p:spTree>
@@ -20405,7 +20630,7 @@
 </p:sld>
 </file>
 
-<file path=ppt/slides/slide51.xml><?xml version="1.0" encoding="utf-8"?>
+<file path=ppt/slides/slide53.xml><?xml version="1.0" encoding="utf-8"?>
 <p:sld xmlns:a="http://schemas.openxmlformats.org/drawingml/2006/main" xmlns:r="http://schemas.openxmlformats.org/officeDocument/2006/relationships" xmlns:p="http://schemas.openxmlformats.org/presentationml/2006/main">
   <p:cSld>
     <p:spTree>
@@ -20568,7 +20793,7 @@
 </p:sld>
 </file>
 
-<file path=ppt/slides/slide52.xml><?xml version="1.0" encoding="utf-8"?>
+<file path=ppt/slides/slide54.xml><?xml version="1.0" encoding="utf-8"?>
 <p:sld xmlns:a="http://schemas.openxmlformats.org/drawingml/2006/main" xmlns:r="http://schemas.openxmlformats.org/officeDocument/2006/relationships" xmlns:p="http://schemas.openxmlformats.org/presentationml/2006/main">
   <p:cSld>
     <p:spTree>
@@ -20633,7 +20858,7 @@
 </p:sld>
 </file>
 
-<file path=ppt/slides/slide53.xml><?xml version="1.0" encoding="utf-8"?>
+<file path=ppt/slides/slide55.xml><?xml version="1.0" encoding="utf-8"?>
 <p:sld xmlns:a="http://schemas.openxmlformats.org/drawingml/2006/main" xmlns:r="http://schemas.openxmlformats.org/officeDocument/2006/relationships" xmlns:p="http://schemas.openxmlformats.org/presentationml/2006/main">
   <p:cSld>
     <p:spTree>
@@ -20710,198 +20935,6 @@
 </p:sld>
 </file>
 
-<file path=ppt/slides/slide54.xml><?xml version="1.0" encoding="utf-8"?>
-<p:sld xmlns:a="http://schemas.openxmlformats.org/drawingml/2006/main" xmlns:r="http://schemas.openxmlformats.org/officeDocument/2006/relationships" xmlns:p="http://schemas.openxmlformats.org/presentationml/2006/main">
-  <p:cSld>
-    <p:spTree>
-      <p:nvGrpSpPr>
-        <p:cNvPr id="1" name=""/>
-        <p:cNvGrpSpPr/>
-        <p:nvPr/>
-      </p:nvGrpSpPr>
-      <p:grpSpPr>
-        <a:xfrm>
-          <a:off x="0" y="0"/>
-          <a:ext cx="0" cy="0"/>
-          <a:chOff x="0" y="0"/>
-          <a:chExt cx="0" cy="0"/>
-        </a:xfrm>
-      </p:grpSpPr>
-      <p:sp>
-        <p:nvSpPr>
-          <p:cNvPr id="2" name="Title 1"/>
-          <p:cNvSpPr>
-            <a:spLocks noGrp="1"/>
-          </p:cNvSpPr>
-          <p:nvPr>
-            <p:ph type="title"/>
-          </p:nvPr>
-        </p:nvSpPr>
-        <p:spPr/>
-        <p:txBody>
-          <a:bodyPr/>
-          <a:lstStyle/>
-          <a:p>
-            <a:pPr lvl="0" marL="0" indent="0">
-              <a:buNone/>
-            </a:pPr>
-            <a:r>
-              <a:rPr/>
-              <a:t>On</a:t>
-            </a:r>
-            <a:r>
-              <a:rPr/>
-              <a:t> </a:t>
-            </a:r>
-            <a:r>
-              <a:rPr/>
-              <a:t>your</a:t>
-            </a:r>
-            <a:r>
-              <a:rPr/>
-              <a:t> </a:t>
-            </a:r>
-            <a:r>
-              <a:rPr/>
-              <a:t>own</a:t>
-            </a:r>
-          </a:p>
-        </p:txBody>
-      </p:sp>
-      <p:sp>
-        <p:nvSpPr>
-          <p:cNvPr id="3" name="Content Placeholder 2"/>
-          <p:cNvSpPr>
-            <a:spLocks noGrp="1"/>
-          </p:cNvSpPr>
-          <p:nvPr>
-            <p:ph idx="1"/>
-          </p:nvPr>
-        </p:nvSpPr>
-        <p:spPr/>
-        <p:txBody>
-          <a:bodyPr/>
-          <a:lstStyle/>
-          <a:p>
-            <a:pPr lvl="1"/>
-            <a:r>
-              <a:rPr/>
-              <a:t>Make the first class bar red to show Leonardo di Caprio’s perspective on the Titanic.</a:t>
-            </a:r>
-          </a:p>
-        </p:txBody>
-      </p:sp>
-    </p:spTree>
-  </p:cSld>
-</p:sld>
-</file>
-
-<file path=ppt/slides/slide55.xml><?xml version="1.0" encoding="utf-8"?>
-<p:sld xmlns:a="http://schemas.openxmlformats.org/drawingml/2006/main" xmlns:r="http://schemas.openxmlformats.org/officeDocument/2006/relationships" xmlns:p="http://schemas.openxmlformats.org/presentationml/2006/main">
-  <p:cSld>
-    <p:spTree>
-      <p:nvGrpSpPr>
-        <p:cNvPr id="1" name=""/>
-        <p:cNvGrpSpPr/>
-        <p:nvPr/>
-      </p:nvGrpSpPr>
-      <p:grpSpPr>
-        <a:xfrm>
-          <a:off x="0" y="0"/>
-          <a:ext cx="0" cy="0"/>
-          <a:chOff x="0" y="0"/>
-          <a:chExt cx="0" cy="0"/>
-        </a:xfrm>
-      </p:grpSpPr>
-      <p:sp>
-        <p:nvSpPr>
-          <p:cNvPr id="2" name="Title 1"/>
-          <p:cNvSpPr>
-            <a:spLocks noGrp="1"/>
-          </p:cNvSpPr>
-          <p:nvPr>
-            <p:ph type="title"/>
-          </p:nvPr>
-        </p:nvSpPr>
-        <p:spPr/>
-        <p:txBody>
-          <a:bodyPr/>
-          <a:lstStyle/>
-          <a:p>
-            <a:pPr lvl="0" marL="0" indent="0">
-              <a:buNone/>
-            </a:pPr>
-            <a:r>
-              <a:rPr/>
-              <a:t>Wait</a:t>
-            </a:r>
-            <a:r>
-              <a:rPr/>
-              <a:t> </a:t>
-            </a:r>
-            <a:r>
-              <a:rPr/>
-              <a:t>before</a:t>
-            </a:r>
-            <a:r>
-              <a:rPr/>
-              <a:t> </a:t>
-            </a:r>
-            <a:r>
-              <a:rPr/>
-              <a:t>showing</a:t>
-            </a:r>
-          </a:p>
-        </p:txBody>
-      </p:sp>
-      <p:sp>
-        <p:nvSpPr>
-          <p:cNvPr id="3" name="Content Placeholder 2"/>
-          <p:cNvSpPr>
-            <a:spLocks noGrp="1"/>
-          </p:cNvSpPr>
-          <p:nvPr>
-            <p:ph idx="1"/>
-          </p:nvPr>
-        </p:nvSpPr>
-        <p:spPr/>
-        <p:txBody>
-          <a:bodyPr/>
-          <a:lstStyle/>
-          <a:p>
-            <a:pPr lvl="0" marL="0" indent="0">
-              <a:buNone/>
-            </a:pPr>
-            <a:r>
-              <a:rPr/>
-              <a:t>((Python code))</a:t>
-            </a:r>
-          </a:p>
-          <a:p>
-            <a:pPr lvl="0" marL="0" indent="0">
-              <a:buNone/>
-            </a:pPr>
-            <a:r>
-              <a:rPr/>
-              <a:t>((R code))</a:t>
-            </a:r>
-          </a:p>
-          <a:p>
-            <a:pPr lvl="0" marL="0" indent="0">
-              <a:buNone/>
-            </a:pPr>
-            <a:r>
-              <a:rPr/>
-              <a:t>((Tableau steps))</a:t>
-            </a:r>
-          </a:p>
-        </p:txBody>
-      </p:sp>
-    </p:spTree>
-  </p:cSld>
-</p:sld>
-</file>
-
 <file path=ppt/slides/slide56.xml><?xml version="1.0" encoding="utf-8"?>
 <p:sld xmlns:a="http://schemas.openxmlformats.org/drawingml/2006/main" xmlns:r="http://schemas.openxmlformats.org/officeDocument/2006/relationships" xmlns:p="http://schemas.openxmlformats.org/presentationml/2006/main">
   <p:cSld>
@@ -20939,7 +20972,7 @@
             </a:pPr>
             <a:r>
               <a:rPr/>
-              <a:t>What</a:t>
+              <a:t>On</a:t>
             </a:r>
             <a:r>
               <a:rPr/>
@@ -20955,31 +20988,7 @@
             </a:r>
             <a:r>
               <a:rPr/>
-              <a:t>visualization</a:t>
-            </a:r>
-            <a:r>
-              <a:rPr/>
-              <a:t> </a:t>
-            </a:r>
-            <a:r>
-              <a:rPr/>
-              <a:t>might</a:t>
-            </a:r>
-            <a:r>
-              <a:rPr/>
-              <a:t> </a:t>
-            </a:r>
-            <a:r>
-              <a:rPr/>
-              <a:t>look</a:t>
-            </a:r>
-            <a:r>
-              <a:rPr/>
-              <a:t> </a:t>
-            </a:r>
-            <a:r>
-              <a:rPr/>
-              <a:t>like</a:t>
+              <a:t>own</a:t>
             </a:r>
           </a:p>
         </p:txBody>
@@ -20999,12 +21008,10 @@
           <a:bodyPr/>
           <a:lstStyle/>
           <a:p>
-            <a:pPr lvl="0" marL="0" indent="0">
-              <a:buNone/>
-            </a:pPr>
-            <a:r>
-              <a:rPr/>
-              <a:t>((Show visualization))</a:t>
+            <a:pPr lvl="1"/>
+            <a:r>
+              <a:rPr/>
+              <a:t>Make the first class bar red to show Leonardo di Caprio’s perspective on the Titanic.</a:t>
             </a:r>
           </a:p>
         </p:txBody>
@@ -21051,7 +21058,23 @@
             </a:pPr>
             <a:r>
               <a:rPr/>
-              <a:t>Color</a:t>
+              <a:t>Wait</a:t>
+            </a:r>
+            <a:r>
+              <a:rPr/>
+              <a:t> </a:t>
+            </a:r>
+            <a:r>
+              <a:rPr/>
+              <a:t>before</a:t>
+            </a:r>
+            <a:r>
+              <a:rPr/>
+              <a:t> </a:t>
+            </a:r>
+            <a:r>
+              <a:rPr/>
+              <a:t>showing</a:t>
             </a:r>
           </a:p>
         </p:txBody>
@@ -21071,17 +21094,30 @@
           <a:bodyPr/>
           <a:lstStyle/>
           <a:p>
-            <a:pPr lvl="1"/>
-            <a:r>
-              <a:rPr/>
-              <a:t>Use for emphasis in simple bar charts</a:t>
-            </a:r>
-          </a:p>
-          <a:p>
-            <a:pPr lvl="1"/>
-            <a:r>
-              <a:rPr/>
-              <a:t>Very important for stacked or side-by-side bar charts</a:t>
+            <a:pPr lvl="0" marL="0" indent="0">
+              <a:buNone/>
+            </a:pPr>
+            <a:r>
+              <a:rPr/>
+              <a:t>((Python code))</a:t>
+            </a:r>
+          </a:p>
+          <a:p>
+            <a:pPr lvl="0" marL="0" indent="0">
+              <a:buNone/>
+            </a:pPr>
+            <a:r>
+              <a:rPr/>
+              <a:t>((R code))</a:t>
+            </a:r>
+          </a:p>
+          <a:p>
+            <a:pPr lvl="0" marL="0" indent="0">
+              <a:buNone/>
+            </a:pPr>
+            <a:r>
+              <a:rPr/>
+              <a:t>((Tableau steps))</a:t>
             </a:r>
           </a:p>
         </p:txBody>
@@ -21128,7 +21164,7 @@
             </a:pPr>
             <a:r>
               <a:rPr/>
-              <a:t>On</a:t>
+              <a:t>What</a:t>
             </a:r>
             <a:r>
               <a:rPr/>
@@ -21144,7 +21180,31 @@
             </a:r>
             <a:r>
               <a:rPr/>
-              <a:t>own</a:t>
+              <a:t>visualization</a:t>
+            </a:r>
+            <a:r>
+              <a:rPr/>
+              <a:t> </a:t>
+            </a:r>
+            <a:r>
+              <a:rPr/>
+              <a:t>might</a:t>
+            </a:r>
+            <a:r>
+              <a:rPr/>
+              <a:t> </a:t>
+            </a:r>
+            <a:r>
+              <a:rPr/>
+              <a:t>look</a:t>
+            </a:r>
+            <a:r>
+              <a:rPr/>
+              <a:t> </a:t>
+            </a:r>
+            <a:r>
+              <a:rPr/>
+              <a:t>like</a:t>
             </a:r>
           </a:p>
         </p:txBody>
@@ -21164,10 +21224,12 @@
           <a:bodyPr/>
           <a:lstStyle/>
           <a:p>
-            <a:pPr lvl="1"/>
-            <a:r>
-              <a:rPr/>
-              <a:t>Revise this visualization so the first class bar is red.</a:t>
+            <a:pPr lvl="0" marL="0" indent="0">
+              <a:buNone/>
+            </a:pPr>
+            <a:r>
+              <a:rPr/>
+              <a:t>((Show visualization))</a:t>
             </a:r>
           </a:p>
         </p:txBody>
@@ -21214,23 +21276,7 @@
             </a:pPr>
             <a:r>
               <a:rPr/>
-              <a:t>Wait</a:t>
-            </a:r>
-            <a:r>
-              <a:rPr/>
-              <a:t> </a:t>
-            </a:r>
-            <a:r>
-              <a:rPr/>
-              <a:t>before</a:t>
-            </a:r>
-            <a:r>
-              <a:rPr/>
-              <a:t> </a:t>
-            </a:r>
-            <a:r>
-              <a:rPr/>
-              <a:t>showing</a:t>
+              <a:t>Color</a:t>
             </a:r>
           </a:p>
         </p:txBody>
@@ -21250,30 +21296,17 @@
           <a:bodyPr/>
           <a:lstStyle/>
           <a:p>
-            <a:pPr lvl="0" marL="0" indent="0">
-              <a:buNone/>
-            </a:pPr>
-            <a:r>
-              <a:rPr/>
-              <a:t>((Python code))</a:t>
-            </a:r>
-          </a:p>
-          <a:p>
-            <a:pPr lvl="0" marL="0" indent="0">
-              <a:buNone/>
-            </a:pPr>
-            <a:r>
-              <a:rPr/>
-              <a:t>((R code))</a:t>
-            </a:r>
-          </a:p>
-          <a:p>
-            <a:pPr lvl="0" marL="0" indent="0">
-              <a:buNone/>
-            </a:pPr>
-            <a:r>
-              <a:rPr/>
-              <a:t>((Tableau steps))</a:t>
+            <a:pPr lvl="1"/>
+            <a:r>
+              <a:rPr/>
+              <a:t>Use for emphasis in simple bar charts</a:t>
+            </a:r>
+          </a:p>
+          <a:p>
+            <a:pPr lvl="1"/>
+            <a:r>
+              <a:rPr/>
+              <a:t>Very important for stacked or side-by-side bar charts</a:t>
             </a:r>
           </a:p>
         </p:txBody>
@@ -21424,7 +21457,7 @@
             </a:pPr>
             <a:r>
               <a:rPr/>
-              <a:t>What</a:t>
+              <a:t>On</a:t>
             </a:r>
             <a:r>
               <a:rPr/>
@@ -21440,31 +21473,7 @@
             </a:r>
             <a:r>
               <a:rPr/>
-              <a:t>visualization</a:t>
-            </a:r>
-            <a:r>
-              <a:rPr/>
-              <a:t> </a:t>
-            </a:r>
-            <a:r>
-              <a:rPr/>
-              <a:t>might</a:t>
-            </a:r>
-            <a:r>
-              <a:rPr/>
-              <a:t> </a:t>
-            </a:r>
-            <a:r>
-              <a:rPr/>
-              <a:t>look</a:t>
-            </a:r>
-            <a:r>
-              <a:rPr/>
-              <a:t> </a:t>
-            </a:r>
-            <a:r>
-              <a:rPr/>
-              <a:t>like</a:t>
+              <a:t>own</a:t>
             </a:r>
           </a:p>
         </p:txBody>
@@ -21484,12 +21493,10 @@
           <a:bodyPr/>
           <a:lstStyle/>
           <a:p>
-            <a:pPr lvl="0" marL="0" indent="0">
-              <a:buNone/>
-            </a:pPr>
-            <a:r>
-              <a:rPr/>
-              <a:t>((Show visualization))</a:t>
+            <a:pPr lvl="1"/>
+            <a:r>
+              <a:rPr/>
+              <a:t>Revise this visualization so the first class bar is red.</a:t>
             </a:r>
           </a:p>
         </p:txBody>
@@ -21536,23 +21543,23 @@
             </a:pPr>
             <a:r>
               <a:rPr/>
-              <a:t>Stack</a:t>
-            </a:r>
-            <a:r>
-              <a:rPr/>
-              <a:t> </a:t>
-            </a:r>
-            <a:r>
-              <a:rPr/>
-              <a:t>versus</a:t>
-            </a:r>
-            <a:r>
-              <a:rPr/>
-              <a:t> </a:t>
-            </a:r>
-            <a:r>
-              <a:rPr/>
-              <a:t>dodge</a:t>
+              <a:t>Wait</a:t>
+            </a:r>
+            <a:r>
+              <a:rPr/>
+              <a:t> </a:t>
+            </a:r>
+            <a:r>
+              <a:rPr/>
+              <a:t>before</a:t>
+            </a:r>
+            <a:r>
+              <a:rPr/>
+              <a:t> </a:t>
+            </a:r>
+            <a:r>
+              <a:rPr/>
+              <a:t>showing</a:t>
             </a:r>
           </a:p>
         </p:txBody>
@@ -21572,52 +21579,30 @@
           <a:bodyPr/>
           <a:lstStyle/>
           <a:p>
-            <a:pPr lvl="1"/>
-            <a:r>
-              <a:rPr/>
-              <a:t>Summarize by two categories</a:t>
-            </a:r>
-          </a:p>
-          <a:p>
-            <a:pPr lvl="1"/>
-            <a:r>
-              <a:rPr/>
-              <a:t>Facet</a:t>
-            </a:r>
-          </a:p>
-          <a:p>
-            <a:pPr lvl="2"/>
-            <a:r>
-              <a:rPr/>
-              <a:t>Separate plots</a:t>
-            </a:r>
-          </a:p>
-          <a:p>
-            <a:pPr lvl="1"/>
-            <a:r>
-              <a:rPr/>
-              <a:t>Dodge</a:t>
-            </a:r>
-          </a:p>
-          <a:p>
-            <a:pPr lvl="2"/>
-            <a:r>
-              <a:rPr/>
-              <a:t>Side by side</a:t>
-            </a:r>
-          </a:p>
-          <a:p>
-            <a:pPr lvl="1"/>
-            <a:r>
-              <a:rPr/>
-              <a:t>Stack</a:t>
-            </a:r>
-          </a:p>
-          <a:p>
-            <a:pPr lvl="2"/>
-            <a:r>
-              <a:rPr/>
-              <a:t>One on top, one on bottom</a:t>
+            <a:pPr lvl="0" marL="0" indent="0">
+              <a:buNone/>
+            </a:pPr>
+            <a:r>
+              <a:rPr/>
+              <a:t>((Python code))</a:t>
+            </a:r>
+          </a:p>
+          <a:p>
+            <a:pPr lvl="0" marL="0" indent="0">
+              <a:buNone/>
+            </a:pPr>
+            <a:r>
+              <a:rPr/>
+              <a:t>((R code))</a:t>
+            </a:r>
+          </a:p>
+          <a:p>
+            <a:pPr lvl="0" marL="0" indent="0">
+              <a:buNone/>
+            </a:pPr>
+            <a:r>
+              <a:rPr/>
+              <a:t>((Tableau steps))</a:t>
             </a:r>
           </a:p>
         </p:txBody>
@@ -21664,73 +21649,76 @@
             </a:pPr>
             <a:r>
               <a:rPr/>
-              <a:t>Titanic</a:t>
-            </a:r>
-            <a:r>
-              <a:rPr/>
-              <a:t> </a:t>
-            </a:r>
-            <a:r>
-              <a:rPr/>
-              <a:t>passenger</a:t>
-            </a:r>
-            <a:r>
-              <a:rPr/>
-              <a:t> </a:t>
-            </a:r>
-            <a:r>
-              <a:rPr/>
-              <a:t>count</a:t>
-            </a:r>
-            <a:r>
-              <a:rPr/>
-              <a:t> </a:t>
-            </a:r>
-            <a:r>
-              <a:rPr/>
-              <a:t>by</a:t>
-            </a:r>
-            <a:r>
-              <a:rPr/>
-              <a:t> </a:t>
-            </a:r>
-            <a:r>
-              <a:rPr/>
-              <a:t>gender</a:t>
+              <a:t>What</a:t>
+            </a:r>
+            <a:r>
+              <a:rPr/>
+              <a:t> </a:t>
+            </a:r>
+            <a:r>
+              <a:rPr/>
+              <a:t>your</a:t>
+            </a:r>
+            <a:r>
+              <a:rPr/>
+              <a:t> </a:t>
+            </a:r>
+            <a:r>
+              <a:rPr/>
+              <a:t>visualization</a:t>
+            </a:r>
+            <a:r>
+              <a:rPr/>
+              <a:t> </a:t>
+            </a:r>
+            <a:r>
+              <a:rPr/>
+              <a:t>might</a:t>
+            </a:r>
+            <a:r>
+              <a:rPr/>
+              <a:t> </a:t>
+            </a:r>
+            <a:r>
+              <a:rPr/>
+              <a:t>look</a:t>
+            </a:r>
+            <a:r>
+              <a:rPr/>
+              <a:t> </a:t>
+            </a:r>
+            <a:r>
+              <a:rPr/>
+              <a:t>like</a:t>
             </a:r>
           </a:p>
         </p:txBody>
       </p:sp>
-      <p:pic>
-        <p:nvPicPr>
-          <p:cNvPr descr="data-visualization-02-bars_files/figure-pptx/count-by-gender-1.png" id="0" name="Picture 1"/>
-          <p:cNvPicPr>
-            <a:picLocks noGrp="1" noChangeAspect="1"/>
-          </p:cNvPicPr>
-          <p:nvPr/>
-        </p:nvPicPr>
-        <p:blipFill>
-          <a:blip r:embed="rId2"/>
-          <a:stretch>
-            <a:fillRect/>
-          </a:stretch>
-        </p:blipFill>
-        <p:spPr bwMode="auto">
-          <a:xfrm>
-            <a:off x="1752600" y="1600200"/>
-            <a:ext cx="5651500" cy="4521200"/>
-          </a:xfrm>
-          <a:prstGeom prst="rect">
-            <a:avLst/>
-          </a:prstGeom>
-          <a:noFill/>
-          <a:ln w="9525">
-            <a:noFill/>
-            <a:headEnd/>
-            <a:tailEnd/>
-          </a:ln>
-        </p:spPr>
-      </p:pic>
+      <p:sp>
+        <p:nvSpPr>
+          <p:cNvPr id="3" name="Content Placeholder 2"/>
+          <p:cNvSpPr>
+            <a:spLocks noGrp="1"/>
+          </p:cNvSpPr>
+          <p:nvPr>
+            <p:ph idx="1"/>
+          </p:nvPr>
+        </p:nvSpPr>
+        <p:spPr/>
+        <p:txBody>
+          <a:bodyPr/>
+          <a:lstStyle/>
+          <a:p>
+            <a:pPr lvl="0" marL="0" indent="0">
+              <a:buNone/>
+            </a:pPr>
+            <a:r>
+              <a:rPr/>
+              <a:t>((Show visualization))</a:t>
+            </a:r>
+          </a:p>
+        </p:txBody>
+      </p:sp>
     </p:spTree>
   </p:cSld>
 </p:sld>
@@ -21773,81 +21761,92 @@
             </a:pPr>
             <a:r>
               <a:rPr/>
-              <a:t>Titanic</a:t>
-            </a:r>
-            <a:r>
-              <a:rPr/>
-              <a:t> </a:t>
-            </a:r>
-            <a:r>
-              <a:rPr/>
-              <a:t>passenger</a:t>
-            </a:r>
-            <a:r>
-              <a:rPr/>
-              <a:t> </a:t>
-            </a:r>
-            <a:r>
-              <a:rPr/>
-              <a:t>count</a:t>
-            </a:r>
-            <a:r>
-              <a:rPr/>
-              <a:t> </a:t>
-            </a:r>
-            <a:r>
-              <a:rPr/>
-              <a:t>by</a:t>
-            </a:r>
-            <a:r>
-              <a:rPr/>
-              <a:t> </a:t>
-            </a:r>
-            <a:r>
-              <a:rPr/>
-              <a:t>passenger</a:t>
-            </a:r>
-            <a:r>
-              <a:rPr/>
-              <a:t> </a:t>
-            </a:r>
-            <a:r>
-              <a:rPr/>
-              <a:t>class</a:t>
+              <a:t>Stack</a:t>
+            </a:r>
+            <a:r>
+              <a:rPr/>
+              <a:t> </a:t>
+            </a:r>
+            <a:r>
+              <a:rPr/>
+              <a:t>versus</a:t>
+            </a:r>
+            <a:r>
+              <a:rPr/>
+              <a:t> </a:t>
+            </a:r>
+            <a:r>
+              <a:rPr/>
+              <a:t>dodge</a:t>
             </a:r>
           </a:p>
         </p:txBody>
       </p:sp>
-      <p:pic>
-        <p:nvPicPr>
-          <p:cNvPr descr="data-visualization-02-bars_files/figure-pptx/count-by-passenger-class-1.png" id="0" name="Picture 1"/>
-          <p:cNvPicPr>
-            <a:picLocks noGrp="1" noChangeAspect="1"/>
-          </p:cNvPicPr>
-          <p:nvPr/>
-        </p:nvPicPr>
-        <p:blipFill>
-          <a:blip r:embed="rId2"/>
-          <a:stretch>
-            <a:fillRect/>
-          </a:stretch>
-        </p:blipFill>
-        <p:spPr bwMode="auto">
-          <a:xfrm>
-            <a:off x="1752600" y="1600200"/>
-            <a:ext cx="5651500" cy="4521200"/>
-          </a:xfrm>
-          <a:prstGeom prst="rect">
-            <a:avLst/>
-          </a:prstGeom>
-          <a:noFill/>
-          <a:ln w="9525">
-            <a:noFill/>
-            <a:headEnd/>
-            <a:tailEnd/>
-          </a:ln>
-        </p:spPr>
-      </p:pic>
+      <p:sp>
+        <p:nvSpPr>
+          <p:cNvPr id="3" name="Content Placeholder 2"/>
+          <p:cNvSpPr>
+            <a:spLocks noGrp="1"/>
+          </p:cNvSpPr>
+          <p:nvPr>
+            <p:ph idx="1"/>
+          </p:nvPr>
+        </p:nvSpPr>
+        <p:spPr/>
+        <p:txBody>
+          <a:bodyPr/>
+          <a:lstStyle/>
+          <a:p>
+            <a:pPr lvl="1"/>
+            <a:r>
+              <a:rPr/>
+              <a:t>Summarize by two categories</a:t>
+            </a:r>
+          </a:p>
+          <a:p>
+            <a:pPr lvl="1"/>
+            <a:r>
+              <a:rPr/>
+              <a:t>Facet</a:t>
+            </a:r>
+          </a:p>
+          <a:p>
+            <a:pPr lvl="2"/>
+            <a:r>
+              <a:rPr/>
+              <a:t>Separate plots</a:t>
+            </a:r>
+          </a:p>
+          <a:p>
+            <a:pPr lvl="1"/>
+            <a:r>
+              <a:rPr/>
+              <a:t>Dodge</a:t>
+            </a:r>
+          </a:p>
+          <a:p>
+            <a:pPr lvl="2"/>
+            <a:r>
+              <a:rPr/>
+              <a:t>Side by side</a:t>
+            </a:r>
+          </a:p>
+          <a:p>
+            <a:pPr lvl="1"/>
+            <a:r>
+              <a:rPr/>
+              <a:t>Stack</a:t>
+            </a:r>
+          </a:p>
+          <a:p>
+            <a:pPr lvl="2"/>
+            <a:r>
+              <a:rPr/>
+              <a:t>One on top, one on bottom</a:t>
+            </a:r>
+          </a:p>
+        </p:txBody>
+      </p:sp>
     </p:spTree>
   </p:cSld>
 </p:sld>
@@ -21898,14 +21897,38 @@
             </a:r>
             <a:r>
               <a:rPr/>
-              <a:t>facet</a:t>
+              <a:t>passenger</a:t>
+            </a:r>
+            <a:r>
+              <a:rPr/>
+              <a:t> </a:t>
+            </a:r>
+            <a:r>
+              <a:rPr/>
+              <a:t>count</a:t>
+            </a:r>
+            <a:r>
+              <a:rPr/>
+              <a:t> </a:t>
+            </a:r>
+            <a:r>
+              <a:rPr/>
+              <a:t>by</a:t>
+            </a:r>
+            <a:r>
+              <a:rPr/>
+              <a:t> </a:t>
+            </a:r>
+            <a:r>
+              <a:rPr/>
+              <a:t>gender</a:t>
             </a:r>
           </a:p>
         </p:txBody>
       </p:sp>
       <p:pic>
         <p:nvPicPr>
-          <p:cNvPr descr="data-visualization-02-bars_files/figure-pptx/count-by-facet-1.png" id="0" name="Picture 1"/>
+          <p:cNvPr descr="data-visualization-02-bars_files/figure-pptx/count-by-gender-1.png" id="0" name="Picture 1"/>
           <p:cNvPicPr>
             <a:picLocks noGrp="1" noChangeAspect="1"/>
           </p:cNvPicPr>
@@ -21983,14 +22006,46 @@
             </a:r>
             <a:r>
               <a:rPr/>
-              <a:t>dodge</a:t>
+              <a:t>passenger</a:t>
+            </a:r>
+            <a:r>
+              <a:rPr/>
+              <a:t> </a:t>
+            </a:r>
+            <a:r>
+              <a:rPr/>
+              <a:t>count</a:t>
+            </a:r>
+            <a:r>
+              <a:rPr/>
+              <a:t> </a:t>
+            </a:r>
+            <a:r>
+              <a:rPr/>
+              <a:t>by</a:t>
+            </a:r>
+            <a:r>
+              <a:rPr/>
+              <a:t> </a:t>
+            </a:r>
+            <a:r>
+              <a:rPr/>
+              <a:t>passenger</a:t>
+            </a:r>
+            <a:r>
+              <a:rPr/>
+              <a:t> </a:t>
+            </a:r>
+            <a:r>
+              <a:rPr/>
+              <a:t>class</a:t>
             </a:r>
           </a:p>
         </p:txBody>
       </p:sp>
       <p:pic>
         <p:nvPicPr>
-          <p:cNvPr descr="data-visualization-02-bars_files/figure-pptx/count-by-dodge-1.png" id="0" name="Picture 1"/>
+          <p:cNvPr descr="data-visualization-02-bars_files/figure-pptx/count-by-passenger-class-1.png" id="0" name="Picture 1"/>
           <p:cNvPicPr>
             <a:picLocks noGrp="1" noChangeAspect="1"/>
           </p:cNvPicPr>
@@ -22068,14 +22123,14 @@
             </a:r>
             <a:r>
               <a:rPr/>
-              <a:t>stack</a:t>
+              <a:t>facet</a:t>
             </a:r>
           </a:p>
         </p:txBody>
       </p:sp>
       <p:pic>
         <p:nvPicPr>
-          <p:cNvPr descr="data-visualization-02-bars_files/figure-pptx/count-by-stack-1.png" id="0" name="Picture 1"/>
+          <p:cNvPr descr="data-visualization-02-bars_files/figure-pptx/count-by-facet-1.png" id="0" name="Picture 1"/>
           <p:cNvPicPr>
             <a:picLocks noGrp="1" noChangeAspect="1"/>
           </p:cNvPicPr>
@@ -22145,275 +22200,22 @@
             </a:pPr>
             <a:r>
               <a:rPr/>
-              <a:t>On</a:t>
-            </a:r>
-            <a:r>
-              <a:rPr/>
-              <a:t> </a:t>
-            </a:r>
-            <a:r>
-              <a:rPr/>
-              <a:t>your</a:t>
-            </a:r>
-            <a:r>
-              <a:rPr/>
-              <a:t> </a:t>
-            </a:r>
-            <a:r>
-              <a:rPr/>
-              <a:t>own</a:t>
-            </a:r>
-          </a:p>
-        </p:txBody>
-      </p:sp>
-      <p:sp>
-        <p:nvSpPr>
-          <p:cNvPr id="3" name="Content Placeholder 2"/>
-          <p:cNvSpPr>
-            <a:spLocks noGrp="1"/>
-          </p:cNvSpPr>
-          <p:nvPr>
-            <p:ph idx="1"/>
-          </p:nvPr>
-        </p:nvSpPr>
-        <p:spPr/>
-        <p:txBody>
-          <a:bodyPr/>
-          <a:lstStyle/>
-          <a:p>
-            <a:pPr lvl="1"/>
-            <a:r>
-              <a:rPr/>
-              <a:t>Draw a bar chart showing counts involving both mortality and gender. Use a panel, then stacking, then dodging. Which do you like best?</a:t>
-            </a:r>
-          </a:p>
-        </p:txBody>
-      </p:sp>
-    </p:spTree>
-  </p:cSld>
-</p:sld>
-</file>
-
-<file path=ppt/slides/slide68.xml><?xml version="1.0" encoding="utf-8"?>
-<p:sld xmlns:a="http://schemas.openxmlformats.org/drawingml/2006/main" xmlns:r="http://schemas.openxmlformats.org/officeDocument/2006/relationships" xmlns:p="http://schemas.openxmlformats.org/presentationml/2006/main">
-  <p:cSld>
-    <p:spTree>
-      <p:nvGrpSpPr>
-        <p:cNvPr id="1" name=""/>
-        <p:cNvGrpSpPr/>
-        <p:nvPr/>
-      </p:nvGrpSpPr>
-      <p:grpSpPr>
-        <a:xfrm>
-          <a:off x="0" y="0"/>
-          <a:ext cx="0" cy="0"/>
-          <a:chOff x="0" y="0"/>
-          <a:chExt cx="0" cy="0"/>
-        </a:xfrm>
-      </p:grpSpPr>
-      <p:sp>
-        <p:nvSpPr>
-          <p:cNvPr id="2" name="Title 1"/>
-          <p:cNvSpPr>
-            <a:spLocks noGrp="1"/>
-          </p:cNvSpPr>
-          <p:nvPr>
-            <p:ph type="title"/>
-          </p:nvPr>
-        </p:nvSpPr>
-        <p:spPr/>
-        <p:txBody>
-          <a:bodyPr/>
-          <a:lstStyle/>
-          <a:p>
-            <a:pPr lvl="0" marL="0" indent="0">
-              <a:buNone/>
-            </a:pPr>
-            <a:r>
-              <a:rPr/>
-              <a:t>Wait</a:t>
-            </a:r>
-            <a:r>
-              <a:rPr/>
-              <a:t> </a:t>
-            </a:r>
-            <a:r>
-              <a:rPr/>
-              <a:t>a</a:t>
-            </a:r>
-            <a:r>
-              <a:rPr/>
-              <a:t> </a:t>
-            </a:r>
-            <a:r>
-              <a:rPr/>
-              <a:t>bit</a:t>
-            </a:r>
-            <a:r>
-              <a:rPr/>
-              <a:t> </a:t>
-            </a:r>
-            <a:r>
-              <a:rPr/>
-              <a:t>before</a:t>
-            </a:r>
-            <a:r>
-              <a:rPr/>
-              <a:t> </a:t>
-            </a:r>
-            <a:r>
-              <a:rPr/>
-              <a:t>showing</a:t>
-            </a:r>
-            <a:r>
-              <a:rPr/>
-              <a:t> </a:t>
-            </a:r>
-            <a:r>
-              <a:rPr/>
-              <a:t>the</a:t>
-            </a:r>
-            <a:r>
-              <a:rPr/>
-              <a:t> </a:t>
-            </a:r>
-            <a:r>
-              <a:rPr/>
-              <a:t>code</a:t>
-            </a:r>
-          </a:p>
-        </p:txBody>
-      </p:sp>
-      <p:sp>
-        <p:nvSpPr>
-          <p:cNvPr id="3" name="Content Placeholder 2"/>
-          <p:cNvSpPr>
-            <a:spLocks noGrp="1"/>
-          </p:cNvSpPr>
-          <p:nvPr>
-            <p:ph idx="1"/>
-          </p:nvPr>
-        </p:nvSpPr>
-        <p:spPr/>
-        <p:txBody>
-          <a:bodyPr/>
-          <a:lstStyle/>
-          <a:p>
-            <a:pPr lvl="1"/>
-            <a:r>
-              <a:rPr/>
-              <a:t>Did you make the panel/stack/dodge Survived or did you make it Sex? Here’s some code, but yours might be different.</a:t>
-            </a:r>
-          </a:p>
-          <a:p>
-            <a:pPr lvl="0" marL="0" indent="0">
-              <a:buNone/>
-            </a:pPr>
-            <a:r>
-              <a:rPr/>
-              <a:t>((Show Python code))</a:t>
-            </a:r>
-          </a:p>
-          <a:p>
-            <a:pPr lvl="0" marL="0" indent="0">
-              <a:buNone/>
-            </a:pPr>
-            <a:r>
-              <a:rPr/>
-              <a:t>R code</a:t>
-            </a:r>
-          </a:p>
-          <a:p>
-            <a:pPr lvl="0" marL="1270000" indent="0">
-              <a:buNone/>
-            </a:pPr>
-            <a:r>
-              <a:rPr sz="1800">
-                <a:latin typeface="Courier"/>
-              </a:rPr>
-              <a:t>titanic %&gt;%
-  ggplot(aes(x=Sex, fill=Survived)) +
-    geom_bar() +
-    facet_grid(cols=vars(Survived))</a:t>
-            </a:r>
-          </a:p>
-          <a:p>
-            <a:pPr lvl="0" marL="0" indent="0">
-              <a:buNone/>
-            </a:pPr>
-            <a:r>
-              <a:rPr/>
-              <a:t>((Show Tableau))</a:t>
-            </a:r>
-          </a:p>
-        </p:txBody>
-      </p:sp>
-    </p:spTree>
-  </p:cSld>
-</p:sld>
-</file>
-
-<file path=ppt/slides/slide69.xml><?xml version="1.0" encoding="utf-8"?>
-<p:sld xmlns:a="http://schemas.openxmlformats.org/drawingml/2006/main" xmlns:r="http://schemas.openxmlformats.org/officeDocument/2006/relationships" xmlns:p="http://schemas.openxmlformats.org/presentationml/2006/main">
-  <p:cSld>
-    <p:spTree>
-      <p:nvGrpSpPr>
-        <p:cNvPr id="1" name=""/>
-        <p:cNvGrpSpPr/>
-        <p:nvPr/>
-      </p:nvGrpSpPr>
-      <p:grpSpPr>
-        <a:xfrm>
-          <a:off x="0" y="0"/>
-          <a:ext cx="0" cy="0"/>
-          <a:chOff x="0" y="0"/>
-          <a:chExt cx="0" cy="0"/>
-        </a:xfrm>
-      </p:grpSpPr>
-      <p:sp>
-        <p:nvSpPr>
-          <p:cNvPr id="2" name="Title 1"/>
-          <p:cNvSpPr>
-            <a:spLocks noGrp="1"/>
-          </p:cNvSpPr>
-          <p:nvPr>
-            <p:ph type="title"/>
-          </p:nvPr>
-        </p:nvSpPr>
-        <p:spPr/>
-        <p:txBody>
-          <a:bodyPr/>
-          <a:lstStyle/>
-          <a:p>
-            <a:pPr lvl="0" marL="0" indent="0">
-              <a:buNone/>
-            </a:pPr>
-            <a:r>
-              <a:rPr/>
-              <a:t>Panel,</a:t>
-            </a:r>
-            <a:r>
-              <a:rPr/>
-              <a:t> </a:t>
-            </a:r>
-            <a:r>
-              <a:rPr/>
-              <a:t>one</a:t>
-            </a:r>
-            <a:r>
-              <a:rPr/>
-              <a:t> </a:t>
-            </a:r>
-            <a:r>
-              <a:rPr/>
-              <a:t>approach</a:t>
+              <a:t>Titanic</a:t>
+            </a:r>
+            <a:r>
+              <a:rPr/>
+              <a:t> </a:t>
+            </a:r>
+            <a:r>
+              <a:rPr/>
+              <a:t>dodge</a:t>
             </a:r>
           </a:p>
         </p:txBody>
       </p:sp>
       <p:pic>
         <p:nvPicPr>
-          <p:cNvPr descr="data-visualization-02-bars_files/figure-pptx/mortality-by-panel-1.png" id="0" name="Picture 1"/>
+          <p:cNvPr descr="data-visualization-02-bars_files/figure-pptx/count-by-dodge-1.png" id="0" name="Picture 1"/>
           <p:cNvPicPr>
             <a:picLocks noGrp="1" noChangeAspect="1"/>
           </p:cNvPicPr>
@@ -22446,7 +22248,7 @@
 </p:sld>
 </file>
 
-<file path=ppt/slides/slide7.xml><?xml version="1.0" encoding="utf-8"?>
+<file path=ppt/slides/slide68.xml><?xml version="1.0" encoding="utf-8"?>
 <p:sld xmlns:a="http://schemas.openxmlformats.org/drawingml/2006/main" xmlns:r="http://schemas.openxmlformats.org/officeDocument/2006/relationships" xmlns:p="http://schemas.openxmlformats.org/presentationml/2006/main">
   <p:cSld>
     <p:spTree>
@@ -22483,134 +22285,22 @@
             </a:pPr>
             <a:r>
               <a:rPr/>
-              <a:t>Tableau</a:t>
-            </a:r>
-            <a:r>
-              <a:rPr/>
-              <a:t> </a:t>
-            </a:r>
-            <a:r>
-              <a:rPr/>
-              <a:t>steps</a:t>
-            </a:r>
-            <a:r>
-              <a:rPr/>
-              <a:t> </a:t>
-            </a:r>
-            <a:r>
-              <a:rPr/>
-              <a:t>to</a:t>
-            </a:r>
-            <a:r>
-              <a:rPr/>
-              <a:t> </a:t>
-            </a:r>
-            <a:r>
-              <a:rPr/>
-              <a:t>get</a:t>
-            </a:r>
-            <a:r>
-              <a:rPr/>
-              <a:t> </a:t>
-            </a:r>
-            <a:r>
-              <a:rPr/>
-              <a:t>started</a:t>
-            </a:r>
-          </a:p>
-        </p:txBody>
-      </p:sp>
-      <p:sp>
-        <p:nvSpPr>
-          <p:cNvPr id="3" name="Content Placeholder 2"/>
-          <p:cNvSpPr>
-            <a:spLocks noGrp="1"/>
-          </p:cNvSpPr>
-          <p:nvPr>
-            <p:ph idx="1"/>
-          </p:nvPr>
-        </p:nvSpPr>
-        <p:spPr/>
-        <p:txBody>
-          <a:bodyPr/>
-          <a:lstStyle/>
-          <a:p>
-            <a:pPr lvl="0" marL="0" indent="0">
-              <a:buNone/>
-            </a:pPr>
-            <a:r>
-              <a:rPr/>
-              <a:t>((Add later))</a:t>
-            </a:r>
-          </a:p>
-        </p:txBody>
-      </p:sp>
-    </p:spTree>
-  </p:cSld>
-</p:sld>
-</file>
-
-<file path=ppt/slides/slide70.xml><?xml version="1.0" encoding="utf-8"?>
-<p:sld xmlns:a="http://schemas.openxmlformats.org/drawingml/2006/main" xmlns:r="http://schemas.openxmlformats.org/officeDocument/2006/relationships" xmlns:p="http://schemas.openxmlformats.org/presentationml/2006/main">
-  <p:cSld>
-    <p:spTree>
-      <p:nvGrpSpPr>
-        <p:cNvPr id="1" name=""/>
-        <p:cNvGrpSpPr/>
-        <p:nvPr/>
-      </p:nvGrpSpPr>
-      <p:grpSpPr>
-        <a:xfrm>
-          <a:off x="0" y="0"/>
-          <a:ext cx="0" cy="0"/>
-          <a:chOff x="0" y="0"/>
-          <a:chExt cx="0" cy="0"/>
-        </a:xfrm>
-      </p:grpSpPr>
-      <p:sp>
-        <p:nvSpPr>
-          <p:cNvPr id="2" name="Title 1"/>
-          <p:cNvSpPr>
-            <a:spLocks noGrp="1"/>
-          </p:cNvSpPr>
-          <p:nvPr>
-            <p:ph type="title"/>
-          </p:nvPr>
-        </p:nvSpPr>
-        <p:spPr/>
-        <p:txBody>
-          <a:bodyPr/>
-          <a:lstStyle/>
-          <a:p>
-            <a:pPr lvl="0" marL="0" indent="0">
-              <a:buNone/>
-            </a:pPr>
-            <a:r>
-              <a:rPr/>
-              <a:t>Panel,</a:t>
-            </a:r>
-            <a:r>
-              <a:rPr/>
-              <a:t> </a:t>
-            </a:r>
-            <a:r>
-              <a:rPr/>
-              <a:t>alternate</a:t>
-            </a:r>
-            <a:r>
-              <a:rPr/>
-              <a:t> </a:t>
-            </a:r>
-            <a:r>
-              <a:rPr/>
-              <a:t>approach</a:t>
+              <a:t>Titanic</a:t>
+            </a:r>
+            <a:r>
+              <a:rPr/>
+              <a:t> </a:t>
+            </a:r>
+            <a:r>
+              <a:rPr/>
+              <a:t>stack</a:t>
             </a:r>
           </a:p>
         </p:txBody>
       </p:sp>
       <p:pic>
         <p:nvPicPr>
-          <p:cNvPr descr="data-visualization-02-bars_files/figure-pptx/mortality-by-panel-alt-1.png" id="0" name="Picture 1"/>
+          <p:cNvPr descr="data-visualization-02-bars_files/figure-pptx/count-by-stack-1.png" id="0" name="Picture 1"/>
           <p:cNvPicPr>
             <a:picLocks noGrp="1" noChangeAspect="1"/>
           </p:cNvPicPr>
@@ -22643,6 +22333,355 @@
 </p:sld>
 </file>
 
+<file path=ppt/slides/slide69.xml><?xml version="1.0" encoding="utf-8"?>
+<p:sld xmlns:a="http://schemas.openxmlformats.org/drawingml/2006/main" xmlns:r="http://schemas.openxmlformats.org/officeDocument/2006/relationships" xmlns:p="http://schemas.openxmlformats.org/presentationml/2006/main">
+  <p:cSld>
+    <p:spTree>
+      <p:nvGrpSpPr>
+        <p:cNvPr id="1" name=""/>
+        <p:cNvGrpSpPr/>
+        <p:nvPr/>
+      </p:nvGrpSpPr>
+      <p:grpSpPr>
+        <a:xfrm>
+          <a:off x="0" y="0"/>
+          <a:ext cx="0" cy="0"/>
+          <a:chOff x="0" y="0"/>
+          <a:chExt cx="0" cy="0"/>
+        </a:xfrm>
+      </p:grpSpPr>
+      <p:sp>
+        <p:nvSpPr>
+          <p:cNvPr id="2" name="Title 1"/>
+          <p:cNvSpPr>
+            <a:spLocks noGrp="1"/>
+          </p:cNvSpPr>
+          <p:nvPr>
+            <p:ph type="title"/>
+          </p:nvPr>
+        </p:nvSpPr>
+        <p:spPr/>
+        <p:txBody>
+          <a:bodyPr/>
+          <a:lstStyle/>
+          <a:p>
+            <a:pPr lvl="0" marL="0" indent="0">
+              <a:buNone/>
+            </a:pPr>
+            <a:r>
+              <a:rPr/>
+              <a:t>On</a:t>
+            </a:r>
+            <a:r>
+              <a:rPr/>
+              <a:t> </a:t>
+            </a:r>
+            <a:r>
+              <a:rPr/>
+              <a:t>your</a:t>
+            </a:r>
+            <a:r>
+              <a:rPr/>
+              <a:t> </a:t>
+            </a:r>
+            <a:r>
+              <a:rPr/>
+              <a:t>own</a:t>
+            </a:r>
+          </a:p>
+        </p:txBody>
+      </p:sp>
+      <p:sp>
+        <p:nvSpPr>
+          <p:cNvPr id="3" name="Content Placeholder 2"/>
+          <p:cNvSpPr>
+            <a:spLocks noGrp="1"/>
+          </p:cNvSpPr>
+          <p:nvPr>
+            <p:ph idx="1"/>
+          </p:nvPr>
+        </p:nvSpPr>
+        <p:spPr/>
+        <p:txBody>
+          <a:bodyPr/>
+          <a:lstStyle/>
+          <a:p>
+            <a:pPr lvl="1"/>
+            <a:r>
+              <a:rPr/>
+              <a:t>Draw a bar chart showing counts involving both mortality and gender. Use a panel, then stacking, then dodging. Which do you like best?</a:t>
+            </a:r>
+          </a:p>
+        </p:txBody>
+      </p:sp>
+    </p:spTree>
+  </p:cSld>
+</p:sld>
+</file>
+
+<file path=ppt/slides/slide7.xml><?xml version="1.0" encoding="utf-8"?>
+<p:sld xmlns:a="http://schemas.openxmlformats.org/drawingml/2006/main" xmlns:r="http://schemas.openxmlformats.org/officeDocument/2006/relationships" xmlns:p="http://schemas.openxmlformats.org/presentationml/2006/main">
+  <p:cSld>
+    <p:spTree>
+      <p:nvGrpSpPr>
+        <p:cNvPr id="1" name=""/>
+        <p:cNvGrpSpPr/>
+        <p:nvPr/>
+      </p:nvGrpSpPr>
+      <p:grpSpPr>
+        <a:xfrm>
+          <a:off x="0" y="0"/>
+          <a:ext cx="0" cy="0"/>
+          <a:chOff x="0" y="0"/>
+          <a:chExt cx="0" cy="0"/>
+        </a:xfrm>
+      </p:grpSpPr>
+      <p:sp>
+        <p:nvSpPr>
+          <p:cNvPr id="2" name="Title 1"/>
+          <p:cNvSpPr>
+            <a:spLocks noGrp="1"/>
+          </p:cNvSpPr>
+          <p:nvPr>
+            <p:ph type="title"/>
+          </p:nvPr>
+        </p:nvSpPr>
+        <p:spPr/>
+        <p:txBody>
+          <a:bodyPr/>
+          <a:lstStyle/>
+          <a:p>
+            <a:pPr lvl="0" marL="0" indent="0">
+              <a:buNone/>
+            </a:pPr>
+            <a:r>
+              <a:rPr/>
+              <a:t>Tableau</a:t>
+            </a:r>
+            <a:r>
+              <a:rPr/>
+              <a:t> </a:t>
+            </a:r>
+            <a:r>
+              <a:rPr/>
+              <a:t>steps</a:t>
+            </a:r>
+            <a:r>
+              <a:rPr/>
+              <a:t> </a:t>
+            </a:r>
+            <a:r>
+              <a:rPr/>
+              <a:t>to</a:t>
+            </a:r>
+            <a:r>
+              <a:rPr/>
+              <a:t> </a:t>
+            </a:r>
+            <a:r>
+              <a:rPr/>
+              <a:t>get</a:t>
+            </a:r>
+            <a:r>
+              <a:rPr/>
+              <a:t> </a:t>
+            </a:r>
+            <a:r>
+              <a:rPr/>
+              <a:t>started</a:t>
+            </a:r>
+          </a:p>
+        </p:txBody>
+      </p:sp>
+      <p:sp>
+        <p:nvSpPr>
+          <p:cNvPr id="3" name="Content Placeholder 2"/>
+          <p:cNvSpPr>
+            <a:spLocks noGrp="1"/>
+          </p:cNvSpPr>
+          <p:nvPr>
+            <p:ph idx="1"/>
+          </p:nvPr>
+        </p:nvSpPr>
+        <p:spPr/>
+        <p:txBody>
+          <a:bodyPr/>
+          <a:lstStyle/>
+          <a:p>
+            <a:pPr lvl="0" marL="0" indent="0">
+              <a:buNone/>
+            </a:pPr>
+            <a:r>
+              <a:rPr/>
+              <a:t>((Add later))</a:t>
+            </a:r>
+          </a:p>
+        </p:txBody>
+      </p:sp>
+    </p:spTree>
+  </p:cSld>
+</p:sld>
+</file>
+
+<file path=ppt/slides/slide70.xml><?xml version="1.0" encoding="utf-8"?>
+<p:sld xmlns:a="http://schemas.openxmlformats.org/drawingml/2006/main" xmlns:r="http://schemas.openxmlformats.org/officeDocument/2006/relationships" xmlns:p="http://schemas.openxmlformats.org/presentationml/2006/main">
+  <p:cSld>
+    <p:spTree>
+      <p:nvGrpSpPr>
+        <p:cNvPr id="1" name=""/>
+        <p:cNvGrpSpPr/>
+        <p:nvPr/>
+      </p:nvGrpSpPr>
+      <p:grpSpPr>
+        <a:xfrm>
+          <a:off x="0" y="0"/>
+          <a:ext cx="0" cy="0"/>
+          <a:chOff x="0" y="0"/>
+          <a:chExt cx="0" cy="0"/>
+        </a:xfrm>
+      </p:grpSpPr>
+      <p:sp>
+        <p:nvSpPr>
+          <p:cNvPr id="2" name="Title 1"/>
+          <p:cNvSpPr>
+            <a:spLocks noGrp="1"/>
+          </p:cNvSpPr>
+          <p:nvPr>
+            <p:ph type="title"/>
+          </p:nvPr>
+        </p:nvSpPr>
+        <p:spPr/>
+        <p:txBody>
+          <a:bodyPr/>
+          <a:lstStyle/>
+          <a:p>
+            <a:pPr lvl="0" marL="0" indent="0">
+              <a:buNone/>
+            </a:pPr>
+            <a:r>
+              <a:rPr/>
+              <a:t>Wait</a:t>
+            </a:r>
+            <a:r>
+              <a:rPr/>
+              <a:t> </a:t>
+            </a:r>
+            <a:r>
+              <a:rPr/>
+              <a:t>a</a:t>
+            </a:r>
+            <a:r>
+              <a:rPr/>
+              <a:t> </a:t>
+            </a:r>
+            <a:r>
+              <a:rPr/>
+              <a:t>bit</a:t>
+            </a:r>
+            <a:r>
+              <a:rPr/>
+              <a:t> </a:t>
+            </a:r>
+            <a:r>
+              <a:rPr/>
+              <a:t>before</a:t>
+            </a:r>
+            <a:r>
+              <a:rPr/>
+              <a:t> </a:t>
+            </a:r>
+            <a:r>
+              <a:rPr/>
+              <a:t>showing</a:t>
+            </a:r>
+            <a:r>
+              <a:rPr/>
+              <a:t> </a:t>
+            </a:r>
+            <a:r>
+              <a:rPr/>
+              <a:t>the</a:t>
+            </a:r>
+            <a:r>
+              <a:rPr/>
+              <a:t> </a:t>
+            </a:r>
+            <a:r>
+              <a:rPr/>
+              <a:t>code</a:t>
+            </a:r>
+          </a:p>
+        </p:txBody>
+      </p:sp>
+      <p:sp>
+        <p:nvSpPr>
+          <p:cNvPr id="3" name="Content Placeholder 2"/>
+          <p:cNvSpPr>
+            <a:spLocks noGrp="1"/>
+          </p:cNvSpPr>
+          <p:nvPr>
+            <p:ph idx="1"/>
+          </p:nvPr>
+        </p:nvSpPr>
+        <p:spPr/>
+        <p:txBody>
+          <a:bodyPr/>
+          <a:lstStyle/>
+          <a:p>
+            <a:pPr lvl="1"/>
+            <a:r>
+              <a:rPr/>
+              <a:t>Did you make the panel/stack/dodge Survived or did you make it Sex? Here’s some code, but yours might be different.</a:t>
+            </a:r>
+          </a:p>
+          <a:p>
+            <a:pPr lvl="0" marL="0" indent="0">
+              <a:buNone/>
+            </a:pPr>
+            <a:r>
+              <a:rPr/>
+              <a:t>((Show Python code))</a:t>
+            </a:r>
+          </a:p>
+          <a:p>
+            <a:pPr lvl="0" marL="0" indent="0">
+              <a:buNone/>
+            </a:pPr>
+            <a:r>
+              <a:rPr/>
+              <a:t>R code</a:t>
+            </a:r>
+          </a:p>
+          <a:p>
+            <a:pPr lvl="0" marL="1270000" indent="0">
+              <a:buNone/>
+            </a:pPr>
+            <a:r>
+              <a:rPr sz="1800">
+                <a:latin typeface="Courier"/>
+              </a:rPr>
+              <a:t>titanic %&gt;%
+  ggplot(aes(x=Sex, fill=Survived)) +
+    geom_bar() +
+    facet_grid(cols=vars(Survived))</a:t>
+            </a:r>
+          </a:p>
+          <a:p>
+            <a:pPr lvl="0" marL="0" indent="0">
+              <a:buNone/>
+            </a:pPr>
+            <a:r>
+              <a:rPr/>
+              <a:t>((Show Tableau))</a:t>
+            </a:r>
+          </a:p>
+        </p:txBody>
+      </p:sp>
+    </p:spTree>
+  </p:cSld>
+</p:sld>
+</file>
+
 <file path=ppt/slides/slide71.xml><?xml version="1.0" encoding="utf-8"?>
 <p:sld xmlns:a="http://schemas.openxmlformats.org/drawingml/2006/main" xmlns:r="http://schemas.openxmlformats.org/officeDocument/2006/relationships" xmlns:p="http://schemas.openxmlformats.org/presentationml/2006/main">
   <p:cSld>
@@ -22680,7 +22719,7 @@
             </a:pPr>
             <a:r>
               <a:rPr/>
-              <a:t>Stack,</a:t>
+              <a:t>Panel,</a:t>
             </a:r>
             <a:r>
               <a:rPr/>
@@ -22703,7 +22742,7 @@
       </p:sp>
       <p:pic>
         <p:nvPicPr>
-          <p:cNvPr descr="data-visualization-02-bars_files/figure-pptx/mortality-by-stack-1.png" id="0" name="Picture 1"/>
+          <p:cNvPr descr="data-visualization-02-bars_files/figure-pptx/mortality-by-panel-1.png" id="0" name="Picture 1"/>
           <p:cNvPicPr>
             <a:picLocks noGrp="1" noChangeAspect="1"/>
           </p:cNvPicPr>
@@ -22773,7 +22812,7 @@
             </a:pPr>
             <a:r>
               <a:rPr/>
-              <a:t>Stack,</a:t>
+              <a:t>Panel,</a:t>
             </a:r>
             <a:r>
               <a:rPr/>
@@ -22796,7 +22835,7 @@
       </p:sp>
       <p:pic>
         <p:nvPicPr>
-          <p:cNvPr descr="data-visualization-02-bars_files/figure-pptx/mortality-by-stack-alt-1.png" id="0" name="Picture 1"/>
+          <p:cNvPr descr="data-visualization-02-bars_files/figure-pptx/mortality-by-panel-alt-1.png" id="0" name="Picture 1"/>
           <p:cNvPicPr>
             <a:picLocks noGrp="1" noChangeAspect="1"/>
           </p:cNvPicPr>
@@ -22866,7 +22905,7 @@
             </a:pPr>
             <a:r>
               <a:rPr/>
-              <a:t>Dodge,</a:t>
+              <a:t>Stack,</a:t>
             </a:r>
             <a:r>
               <a:rPr/>
@@ -22889,7 +22928,7 @@
       </p:sp>
       <p:pic>
         <p:nvPicPr>
-          <p:cNvPr descr="data-visualization-02-bars_files/figure-pptx/mortality-by-dodge-1.png" id="0" name="Picture 1"/>
+          <p:cNvPr descr="data-visualization-02-bars_files/figure-pptx/mortality-by-stack-1.png" id="0" name="Picture 1"/>
           <p:cNvPicPr>
             <a:picLocks noGrp="1" noChangeAspect="1"/>
           </p:cNvPicPr>
@@ -22959,7 +22998,7 @@
             </a:pPr>
             <a:r>
               <a:rPr/>
-              <a:t>Dodge,</a:t>
+              <a:t>Stack,</a:t>
             </a:r>
             <a:r>
               <a:rPr/>
@@ -22982,7 +23021,7 @@
       </p:sp>
       <p:pic>
         <p:nvPicPr>
-          <p:cNvPr descr="data-visualization-02-bars_files/figure-pptx/mortality-by-dodge-alt-1.png" id="0" name="Picture 1"/>
+          <p:cNvPr descr="data-visualization-02-bars_files/figure-pptx/mortality-by-stack-alt-1.png" id="0" name="Picture 1"/>
           <p:cNvPicPr>
             <a:picLocks noGrp="1" noChangeAspect="1"/>
           </p:cNvPicPr>
@@ -23052,65 +23091,57 @@
             </a:pPr>
             <a:r>
               <a:rPr/>
-              <a:t>Group</a:t>
-            </a:r>
-            <a:r>
-              <a:rPr/>
-              <a:t> </a:t>
-            </a:r>
-            <a:r>
-              <a:rPr/>
-              <a:t>exercise</a:t>
+              <a:t>Dodge,</a:t>
+            </a:r>
+            <a:r>
+              <a:rPr/>
+              <a:t> </a:t>
+            </a:r>
+            <a:r>
+              <a:rPr/>
+              <a:t>one</a:t>
+            </a:r>
+            <a:r>
+              <a:rPr/>
+              <a:t> </a:t>
+            </a:r>
+            <a:r>
+              <a:rPr/>
+              <a:t>approach</a:t>
             </a:r>
           </a:p>
         </p:txBody>
       </p:sp>
-      <p:sp>
-        <p:nvSpPr>
-          <p:cNvPr id="3" name="Content Placeholder 2"/>
-          <p:cNvSpPr>
-            <a:spLocks noGrp="1"/>
-          </p:cNvSpPr>
-          <p:nvPr>
-            <p:ph idx="1"/>
-          </p:nvPr>
-        </p:nvSpPr>
-        <p:spPr/>
-        <p:txBody>
-          <a:bodyPr/>
-          <a:lstStyle/>
-          <a:p>
-            <a:pPr lvl="1"/>
-            <a:r>
-              <a:rPr/>
-              <a:t>Review the following visualization in your group</a:t>
-            </a:r>
-          </a:p>
-          <a:p>
-            <a:pPr lvl="2"/>
-            <a:r>
-              <a:rPr/>
-              <a:t>Summarize what aesthetics appear in the graph</a:t>
-            </a:r>
-          </a:p>
-          <a:p>
-            <a:pPr lvl="2"/>
-            <a:r>
-              <a:rPr/>
-              <a:t>What variables map to each aesthetic?</a:t>
-            </a:r>
-          </a:p>
-          <a:p>
-            <a:pPr lvl="0" marL="0" indent="0">
-              <a:buNone/>
-            </a:pPr>
-            <a:r>
-              <a:rPr/>
-              <a:t>((Provide visualization. Maybe use the visualization from the earlier exercise?))</a:t>
-            </a:r>
-          </a:p>
-        </p:txBody>
-      </p:sp>
+      <p:pic>
+        <p:nvPicPr>
+          <p:cNvPr descr="data-visualization-02-bars_files/figure-pptx/mortality-by-dodge-1.png" id="0" name="Picture 1"/>
+          <p:cNvPicPr>
+            <a:picLocks noGrp="1" noChangeAspect="1"/>
+          </p:cNvPicPr>
+          <p:nvPr/>
+        </p:nvPicPr>
+        <p:blipFill>
+          <a:blip r:embed="rId2"/>
+          <a:stretch>
+            <a:fillRect/>
+          </a:stretch>
+        </p:blipFill>
+        <p:spPr bwMode="auto">
+          <a:xfrm>
+            <a:off x="1752600" y="1600200"/>
+            <a:ext cx="5651500" cy="4521200"/>
+          </a:xfrm>
+          <a:prstGeom prst="rect">
+            <a:avLst/>
+          </a:prstGeom>
+          <a:noFill/>
+          <a:ln w="9525">
+            <a:noFill/>
+            <a:headEnd/>
+            <a:tailEnd/>
+          </a:ln>
+        </p:spPr>
+      </p:pic>
     </p:spTree>
   </p:cSld>
 </p:sld>
@@ -23153,69 +23184,57 @@
             </a:pPr>
             <a:r>
               <a:rPr/>
-              <a:t>Summarizations</a:t>
+              <a:t>Dodge,</a:t>
+            </a:r>
+            <a:r>
+              <a:rPr/>
+              <a:t> </a:t>
+            </a:r>
+            <a:r>
+              <a:rPr/>
+              <a:t>alternate</a:t>
+            </a:r>
+            <a:r>
+              <a:rPr/>
+              <a:t> </a:t>
+            </a:r>
+            <a:r>
+              <a:rPr/>
+              <a:t>approach</a:t>
             </a:r>
           </a:p>
         </p:txBody>
       </p:sp>
-      <p:sp>
-        <p:nvSpPr>
-          <p:cNvPr id="3" name="Content Placeholder 2"/>
-          <p:cNvSpPr>
-            <a:spLocks noGrp="1"/>
-          </p:cNvSpPr>
-          <p:nvPr>
-            <p:ph idx="1"/>
-          </p:nvPr>
-        </p:nvSpPr>
-        <p:spPr/>
-        <p:txBody>
-          <a:bodyPr/>
-          <a:lstStyle/>
-          <a:p>
-            <a:pPr lvl="1"/>
-            <a:r>
-              <a:rPr/>
-              <a:t>One number summary (mean or percentage)</a:t>
-            </a:r>
-          </a:p>
-          <a:p>
-            <a:pPr lvl="1"/>
-            <a:r>
-              <a:rPr/>
-              <a:t>Two number summary (error bars)</a:t>
-            </a:r>
-          </a:p>
-          <a:p>
-            <a:pPr lvl="1"/>
-            <a:r>
-              <a:rPr/>
-              <a:t>Five number summary (boxplots)</a:t>
-            </a:r>
-          </a:p>
-          <a:p>
-            <a:pPr lvl="1"/>
-            <a:r>
-              <a:rPr/>
-              <a:t>All the data</a:t>
-            </a:r>
-          </a:p>
-          <a:p>
-            <a:pPr lvl="2"/>
-            <a:r>
-              <a:rPr/>
-              <a:t>Jittering</a:t>
-            </a:r>
-          </a:p>
-          <a:p>
-            <a:pPr lvl="2"/>
-            <a:r>
-              <a:rPr/>
-              <a:t>Opacity</a:t>
-            </a:r>
-          </a:p>
-        </p:txBody>
-      </p:sp>
+      <p:pic>
+        <p:nvPicPr>
+          <p:cNvPr descr="data-visualization-02-bars_files/figure-pptx/mortality-by-dodge-alt-1.png" id="0" name="Picture 1"/>
+          <p:cNvPicPr>
+            <a:picLocks noGrp="1" noChangeAspect="1"/>
+          </p:cNvPicPr>
+          <p:nvPr/>
+        </p:nvPicPr>
+        <p:blipFill>
+          <a:blip r:embed="rId2"/>
+          <a:stretch>
+            <a:fillRect/>
+          </a:stretch>
+        </p:blipFill>
+        <p:spPr bwMode="auto">
+          <a:xfrm>
+            <a:off x="1752600" y="1600200"/>
+            <a:ext cx="5651500" cy="4521200"/>
+          </a:xfrm>
+          <a:prstGeom prst="rect">
+            <a:avLst/>
+          </a:prstGeom>
+          <a:noFill/>
+          <a:ln w="9525">
+            <a:noFill/>
+            <a:headEnd/>
+            <a:tailEnd/>
+          </a:ln>
+        </p:spPr>
+      </p:pic>
     </p:spTree>
   </p:cSld>
 </p:sld>
@@ -23258,39 +23277,15 @@
             </a:pPr>
             <a:r>
               <a:rPr/>
-              <a:t>Switching</a:t>
-            </a:r>
-            <a:r>
-              <a:rPr/>
-              <a:t> </a:t>
-            </a:r>
-            <a:r>
-              <a:rPr/>
-              <a:t>from</a:t>
-            </a:r>
-            <a:r>
-              <a:rPr/>
-              <a:t> </a:t>
-            </a:r>
-            <a:r>
-              <a:rPr/>
-              <a:t>count</a:t>
-            </a:r>
-            <a:r>
-              <a:rPr/>
-              <a:t> </a:t>
-            </a:r>
-            <a:r>
-              <a:rPr/>
-              <a:t>to</a:t>
-            </a:r>
-            <a:r>
-              <a:rPr/>
-              <a:t> </a:t>
-            </a:r>
-            <a:r>
-              <a:rPr/>
-              <a:t>percent</a:t>
+              <a:t>Group</a:t>
+            </a:r>
+            <a:r>
+              <a:rPr/>
+              <a:t> </a:t>
+            </a:r>
+            <a:r>
+              <a:rPr/>
+              <a:t>exercise</a:t>
             </a:r>
           </a:p>
         </p:txBody>
@@ -23310,12 +23305,33 @@
           <a:bodyPr/>
           <a:lstStyle/>
           <a:p>
+            <a:pPr lvl="1"/>
+            <a:r>
+              <a:rPr/>
+              <a:t>Review the following visualization in your group</a:t>
+            </a:r>
+          </a:p>
+          <a:p>
+            <a:pPr lvl="2"/>
+            <a:r>
+              <a:rPr/>
+              <a:t>Summarize what aesthetics appear in the graph</a:t>
+            </a:r>
+          </a:p>
+          <a:p>
+            <a:pPr lvl="2"/>
+            <a:r>
+              <a:rPr/>
+              <a:t>What variables map to each aesthetic?</a:t>
+            </a:r>
+          </a:p>
+          <a:p>
             <a:pPr lvl="0" marL="0" indent="0">
               <a:buNone/>
             </a:pPr>
             <a:r>
               <a:rPr/>
-              <a:t>((Show the code in Python, R, and Tableau. Explain why you might want counts versus percents.))</a:t>
+              <a:t>((Provide visualization. Maybe use the visualization from the earlier exercise?))</a:t>
             </a:r>
           </a:p>
         </p:txBody>
@@ -23362,23 +23378,7 @@
             </a:pPr>
             <a:r>
               <a:rPr/>
-              <a:t>Example</a:t>
-            </a:r>
-            <a:r>
-              <a:rPr/>
-              <a:t> </a:t>
-            </a:r>
-            <a:r>
-              <a:rPr/>
-              <a:t>with</a:t>
-            </a:r>
-            <a:r>
-              <a:rPr/>
-              <a:t> </a:t>
-            </a:r>
-            <a:r>
-              <a:rPr/>
-              <a:t>means</a:t>
+              <a:t>Summarizations</a:t>
             </a:r>
           </a:p>
         </p:txBody>
@@ -23398,12 +23398,45 @@
           <a:bodyPr/>
           <a:lstStyle/>
           <a:p>
-            <a:pPr lvl="0" marL="0" indent="0">
-              <a:buNone/>
-            </a:pPr>
-            <a:r>
-              <a:rPr/>
-              <a:t>((Need to find the right data set to illustrate this. Maybe the Saratoga house prices?))</a:t>
+            <a:pPr lvl="1"/>
+            <a:r>
+              <a:rPr/>
+              <a:t>One number summary (mean or percentage)</a:t>
+            </a:r>
+          </a:p>
+          <a:p>
+            <a:pPr lvl="1"/>
+            <a:r>
+              <a:rPr/>
+              <a:t>Two number summary (error bars)</a:t>
+            </a:r>
+          </a:p>
+          <a:p>
+            <a:pPr lvl="1"/>
+            <a:r>
+              <a:rPr/>
+              <a:t>Five number summary (boxplots)</a:t>
+            </a:r>
+          </a:p>
+          <a:p>
+            <a:pPr lvl="1"/>
+            <a:r>
+              <a:rPr/>
+              <a:t>All the data</a:t>
+            </a:r>
+          </a:p>
+          <a:p>
+            <a:pPr lvl="2"/>
+            <a:r>
+              <a:rPr/>
+              <a:t>Jittering</a:t>
+            </a:r>
+          </a:p>
+          <a:p>
+            <a:pPr lvl="2"/>
+            <a:r>
+              <a:rPr/>
+              <a:t>Opacity</a:t>
             </a:r>
           </a:p>
         </p:txBody>
@@ -23450,23 +23483,39 @@
             </a:pPr>
             <a:r>
               <a:rPr/>
-              <a:t>Example</a:t>
-            </a:r>
-            <a:r>
-              <a:rPr/>
-              <a:t> </a:t>
-            </a:r>
-            <a:r>
-              <a:rPr/>
-              <a:t>with</a:t>
-            </a:r>
-            <a:r>
-              <a:rPr/>
-              <a:t> </a:t>
-            </a:r>
-            <a:r>
-              <a:rPr/>
-              <a:t>totals</a:t>
+              <a:t>Switching</a:t>
+            </a:r>
+            <a:r>
+              <a:rPr/>
+              <a:t> </a:t>
+            </a:r>
+            <a:r>
+              <a:rPr/>
+              <a:t>from</a:t>
+            </a:r>
+            <a:r>
+              <a:rPr/>
+              <a:t> </a:t>
+            </a:r>
+            <a:r>
+              <a:rPr/>
+              <a:t>count</a:t>
+            </a:r>
+            <a:r>
+              <a:rPr/>
+              <a:t> </a:t>
+            </a:r>
+            <a:r>
+              <a:rPr/>
+              <a:t>to</a:t>
+            </a:r>
+            <a:r>
+              <a:rPr/>
+              <a:t> </a:t>
+            </a:r>
+            <a:r>
+              <a:rPr/>
+              <a:t>percent</a:t>
             </a:r>
           </a:p>
         </p:txBody>
@@ -23491,7 +23540,7 @@
             </a:pPr>
             <a:r>
               <a:rPr/>
-              <a:t>((Same data. What means tell you versus totals.))</a:t>
+              <a:t>((Show the code in Python, R, and Tableau. Explain why you might want counts versus percents.))</a:t>
             </a:r>
           </a:p>
         </p:txBody>
@@ -23679,15 +23728,23 @@
             </a:pPr>
             <a:r>
               <a:rPr/>
-              <a:t>Boxplots</a:t>
-            </a:r>
-            <a:r>
-              <a:rPr/>
-              <a:t> </a:t>
-            </a:r>
-            <a:r>
-              <a:rPr/>
-              <a:t>example</a:t>
+              <a:t>Example</a:t>
+            </a:r>
+            <a:r>
+              <a:rPr/>
+              <a:t> </a:t>
+            </a:r>
+            <a:r>
+              <a:rPr/>
+              <a:t>with</a:t>
+            </a:r>
+            <a:r>
+              <a:rPr/>
+              <a:t> </a:t>
+            </a:r>
+            <a:r>
+              <a:rPr/>
+              <a:t>means</a:t>
             </a:r>
           </a:p>
         </p:txBody>
@@ -23712,7 +23769,7 @@
             </a:pPr>
             <a:r>
               <a:rPr/>
-              <a:t>((Include an explanation of what a boxplot is))</a:t>
+              <a:t>((Need to find the right data set to illustrate this. Maybe the Saratoga house prices?))</a:t>
             </a:r>
           </a:p>
         </p:txBody>
@@ -23759,15 +23816,23 @@
             </a:pPr>
             <a:r>
               <a:rPr/>
-              <a:t>Jittering</a:t>
-            </a:r>
-            <a:r>
-              <a:rPr/>
-              <a:t> </a:t>
-            </a:r>
-            <a:r>
-              <a:rPr/>
-              <a:t>example</a:t>
+              <a:t>Example</a:t>
+            </a:r>
+            <a:r>
+              <a:rPr/>
+              <a:t> </a:t>
+            </a:r>
+            <a:r>
+              <a:rPr/>
+              <a:t>with</a:t>
+            </a:r>
+            <a:r>
+              <a:rPr/>
+              <a:t> </a:t>
+            </a:r>
+            <a:r>
+              <a:rPr/>
+              <a:t>totals</a:t>
             </a:r>
           </a:p>
         </p:txBody>
@@ -23792,7 +23857,7 @@
             </a:pPr>
             <a:r>
               <a:rPr/>
-              <a:t>((Include an explanation on when it doesn’t work.))</a:t>
+              <a:t>((Same data. What means tell you versus totals.))</a:t>
             </a:r>
           </a:p>
         </p:txBody>
@@ -23839,7 +23904,7 @@
             </a:pPr>
             <a:r>
               <a:rPr/>
-              <a:t>Opacity</a:t>
+              <a:t>Boxplots</a:t>
             </a:r>
             <a:r>
               <a:rPr/>
@@ -23872,7 +23937,7 @@
             </a:pPr>
             <a:r>
               <a:rPr/>
-              <a:t>((Note the computational expense.))</a:t>
+              <a:t>((Include an explanation of what a boxplot is))</a:t>
             </a:r>
           </a:p>
         </p:txBody>
@@ -23919,23 +23984,15 @@
             </a:pPr>
             <a:r>
               <a:rPr/>
-              <a:t>On</a:t>
-            </a:r>
-            <a:r>
-              <a:rPr/>
-              <a:t> </a:t>
-            </a:r>
-            <a:r>
-              <a:rPr/>
-              <a:t>your</a:t>
-            </a:r>
-            <a:r>
-              <a:rPr/>
-              <a:t> </a:t>
-            </a:r>
-            <a:r>
-              <a:rPr/>
-              <a:t>own</a:t>
+              <a:t>Jittering</a:t>
+            </a:r>
+            <a:r>
+              <a:rPr/>
+              <a:t> </a:t>
+            </a:r>
+            <a:r>
+              <a:rPr/>
+              <a:t>example</a:t>
             </a:r>
           </a:p>
         </p:txBody>
@@ -23960,7 +24017,7 @@
             </a:pPr>
             <a:r>
               <a:rPr/>
-              <a:t>((Find a totally different data set and get the students to draw four different visualizations. Have them divide into groups that like the same visualization software and have each person do a different visualization.))</a:t>
+              <a:t>((Include an explanation on when it doesn’t work.))</a:t>
             </a:r>
           </a:p>
         </p:txBody>
@@ -24007,7 +24064,15 @@
             </a:pPr>
             <a:r>
               <a:rPr/>
-              <a:t>Summary</a:t>
+              <a:t>Opacity</a:t>
+            </a:r>
+            <a:r>
+              <a:rPr/>
+              <a:t> </a:t>
+            </a:r>
+            <a:r>
+              <a:rPr/>
+              <a:t>example</a:t>
             </a:r>
           </a:p>
         </p:txBody>
@@ -24027,52 +24092,12 @@
           <a:bodyPr/>
           <a:lstStyle/>
           <a:p>
-            <a:pPr lvl="1"/>
-            <a:r>
-              <a:rPr/>
-              <a:t>“A mapping of data to the visual aesthetics of geometries/marks”</a:t>
-            </a:r>
-          </a:p>
-          <a:p>
-            <a:pPr lvl="2"/>
-            <a:r>
-              <a:rPr/>
-              <a:t>Bars are a type of geometry/mark</a:t>
-            </a:r>
-          </a:p>
-          <a:p>
-            <a:pPr lvl="2"/>
-            <a:r>
-              <a:rPr/>
-              <a:t>Aesthetics for bars include location, size, color</a:t>
-            </a:r>
-          </a:p>
-          <a:p>
-            <a:pPr lvl="2"/>
-            <a:r>
-              <a:rPr/>
-              <a:t>Stack versus dodge</a:t>
-            </a:r>
-          </a:p>
-          <a:p>
-            <a:pPr lvl="1"/>
-            <a:r>
-              <a:rPr/>
-              <a:t>Basic tips</a:t>
-            </a:r>
-          </a:p>
-          <a:p>
-            <a:pPr lvl="2"/>
-            <a:r>
-              <a:rPr/>
-              <a:t>Place comparators close</a:t>
-            </a:r>
-          </a:p>
-          <a:p>
-            <a:pPr lvl="2"/>
-            <a:r>
-              <a:rPr/>
-              <a:t>Use axis ticks, light grid lines</a:t>
+            <a:pPr lvl="0" marL="0" indent="0">
+              <a:buNone/>
+            </a:pPr>
+            <a:r>
+              <a:rPr/>
+              <a:t>((Note the computational expense.))</a:t>
             </a:r>
           </a:p>
         </p:txBody>
@@ -24083,6 +24108,206 @@
 </file>
 
 <file path=ppt/slides/slide85.xml><?xml version="1.0" encoding="utf-8"?>
+<p:sld xmlns:a="http://schemas.openxmlformats.org/drawingml/2006/main" xmlns:r="http://schemas.openxmlformats.org/officeDocument/2006/relationships" xmlns:p="http://schemas.openxmlformats.org/presentationml/2006/main">
+  <p:cSld>
+    <p:spTree>
+      <p:nvGrpSpPr>
+        <p:cNvPr id="1" name=""/>
+        <p:cNvGrpSpPr/>
+        <p:nvPr/>
+      </p:nvGrpSpPr>
+      <p:grpSpPr>
+        <a:xfrm>
+          <a:off x="0" y="0"/>
+          <a:ext cx="0" cy="0"/>
+          <a:chOff x="0" y="0"/>
+          <a:chExt cx="0" cy="0"/>
+        </a:xfrm>
+      </p:grpSpPr>
+      <p:sp>
+        <p:nvSpPr>
+          <p:cNvPr id="2" name="Title 1"/>
+          <p:cNvSpPr>
+            <a:spLocks noGrp="1"/>
+          </p:cNvSpPr>
+          <p:nvPr>
+            <p:ph type="title"/>
+          </p:nvPr>
+        </p:nvSpPr>
+        <p:spPr/>
+        <p:txBody>
+          <a:bodyPr/>
+          <a:lstStyle/>
+          <a:p>
+            <a:pPr lvl="0" marL="0" indent="0">
+              <a:buNone/>
+            </a:pPr>
+            <a:r>
+              <a:rPr/>
+              <a:t>On</a:t>
+            </a:r>
+            <a:r>
+              <a:rPr/>
+              <a:t> </a:t>
+            </a:r>
+            <a:r>
+              <a:rPr/>
+              <a:t>your</a:t>
+            </a:r>
+            <a:r>
+              <a:rPr/>
+              <a:t> </a:t>
+            </a:r>
+            <a:r>
+              <a:rPr/>
+              <a:t>own</a:t>
+            </a:r>
+          </a:p>
+        </p:txBody>
+      </p:sp>
+      <p:sp>
+        <p:nvSpPr>
+          <p:cNvPr id="3" name="Content Placeholder 2"/>
+          <p:cNvSpPr>
+            <a:spLocks noGrp="1"/>
+          </p:cNvSpPr>
+          <p:nvPr>
+            <p:ph idx="1"/>
+          </p:nvPr>
+        </p:nvSpPr>
+        <p:spPr/>
+        <p:txBody>
+          <a:bodyPr/>
+          <a:lstStyle/>
+          <a:p>
+            <a:pPr lvl="0" marL="0" indent="0">
+              <a:buNone/>
+            </a:pPr>
+            <a:r>
+              <a:rPr/>
+              <a:t>((Find a totally different data set and get the students to draw four different visualizations. Have them divide into groups that like the same visualization software and have each person do a different visualization.))</a:t>
+            </a:r>
+          </a:p>
+        </p:txBody>
+      </p:sp>
+    </p:spTree>
+  </p:cSld>
+</p:sld>
+</file>
+
+<file path=ppt/slides/slide86.xml><?xml version="1.0" encoding="utf-8"?>
+<p:sld xmlns:a="http://schemas.openxmlformats.org/drawingml/2006/main" xmlns:r="http://schemas.openxmlformats.org/officeDocument/2006/relationships" xmlns:p="http://schemas.openxmlformats.org/presentationml/2006/main">
+  <p:cSld>
+    <p:spTree>
+      <p:nvGrpSpPr>
+        <p:cNvPr id="1" name=""/>
+        <p:cNvGrpSpPr/>
+        <p:nvPr/>
+      </p:nvGrpSpPr>
+      <p:grpSpPr>
+        <a:xfrm>
+          <a:off x="0" y="0"/>
+          <a:ext cx="0" cy="0"/>
+          <a:chOff x="0" y="0"/>
+          <a:chExt cx="0" cy="0"/>
+        </a:xfrm>
+      </p:grpSpPr>
+      <p:sp>
+        <p:nvSpPr>
+          <p:cNvPr id="2" name="Title 1"/>
+          <p:cNvSpPr>
+            <a:spLocks noGrp="1"/>
+          </p:cNvSpPr>
+          <p:nvPr>
+            <p:ph type="title"/>
+          </p:nvPr>
+        </p:nvSpPr>
+        <p:spPr/>
+        <p:txBody>
+          <a:bodyPr/>
+          <a:lstStyle/>
+          <a:p>
+            <a:pPr lvl="0" marL="0" indent="0">
+              <a:buNone/>
+            </a:pPr>
+            <a:r>
+              <a:rPr/>
+              <a:t>Summary</a:t>
+            </a:r>
+          </a:p>
+        </p:txBody>
+      </p:sp>
+      <p:sp>
+        <p:nvSpPr>
+          <p:cNvPr id="3" name="Content Placeholder 2"/>
+          <p:cNvSpPr>
+            <a:spLocks noGrp="1"/>
+          </p:cNvSpPr>
+          <p:nvPr>
+            <p:ph idx="1"/>
+          </p:nvPr>
+        </p:nvSpPr>
+        <p:spPr/>
+        <p:txBody>
+          <a:bodyPr/>
+          <a:lstStyle/>
+          <a:p>
+            <a:pPr lvl="1"/>
+            <a:r>
+              <a:rPr/>
+              <a:t>“A mapping of data to the visual aesthetics of geometries/marks”</a:t>
+            </a:r>
+          </a:p>
+          <a:p>
+            <a:pPr lvl="2"/>
+            <a:r>
+              <a:rPr/>
+              <a:t>Bars are a type of geometry/mark</a:t>
+            </a:r>
+          </a:p>
+          <a:p>
+            <a:pPr lvl="2"/>
+            <a:r>
+              <a:rPr/>
+              <a:t>Aesthetics for bars include location, size, color</a:t>
+            </a:r>
+          </a:p>
+          <a:p>
+            <a:pPr lvl="2"/>
+            <a:r>
+              <a:rPr/>
+              <a:t>Stack versus dodge</a:t>
+            </a:r>
+          </a:p>
+          <a:p>
+            <a:pPr lvl="1"/>
+            <a:r>
+              <a:rPr/>
+              <a:t>Basic tips</a:t>
+            </a:r>
+          </a:p>
+          <a:p>
+            <a:pPr lvl="2"/>
+            <a:r>
+              <a:rPr/>
+              <a:t>Place comparators close</a:t>
+            </a:r>
+          </a:p>
+          <a:p>
+            <a:pPr lvl="2"/>
+            <a:r>
+              <a:rPr/>
+              <a:t>Use axis ticks, light grid lines</a:t>
+            </a:r>
+          </a:p>
+        </p:txBody>
+      </p:sp>
+    </p:spTree>
+  </p:cSld>
+</p:sld>
+</file>
+
+<file path=ppt/slides/slide87.xml><?xml version="1.0" encoding="utf-8"?>
 <p:sld xmlns:a="http://schemas.openxmlformats.org/drawingml/2006/main" xmlns:r="http://schemas.openxmlformats.org/officeDocument/2006/relationships" xmlns:p="http://schemas.openxmlformats.org/presentationml/2006/main">
   <p:cSld>
     <p:spTree>

</xml_diff>